<commit_message>
Documentation + ChatWebApi with data tampering prevention logic
</commit_message>
<xml_diff>
--- a/docs/azure-openai-chat-web-part-presentation.pptx
+++ b/docs/azure-openai-chat-web-part-presentation.pptx
@@ -220,7 +220,7 @@
           <a:p>
             <a:fld id="{36A20F55-E09E-7F42-B5C2-206BEAFB62A2}" type="datetimeFigureOut">
               <a:rPr lang="sv-SE" smtClean="0"/>
-              <a:t>2023-11-27</a:t>
+              <a:t>2023-12-03</a:t>
             </a:fld>
             <a:endParaRPr lang="sv-SE"/>
           </a:p>
@@ -677,7 +677,7 @@
           <p:cNvPr id="6" name="Bild 5">
             <a:extLst>
               <a:ext uri="{FF2B5EF4-FFF2-40B4-BE49-F238E27FC236}">
-                <a16:creationId xmlns:a16="http://schemas.microsoft.com/office/drawing/2014/main" xmlns="" id="{3C48E9F4-AC74-22A6-F2E4-CAD2F8589E74}"/>
+                <a16:creationId xmlns:a16="http://schemas.microsoft.com/office/drawing/2014/main" id="{3C48E9F4-AC74-22A6-F2E4-CAD2F8589E74}"/>
               </a:ext>
             </a:extLst>
           </p:cNvPr>
@@ -785,7 +785,7 @@
           <p:cNvPr id="3" name="Underrubrik 2">
             <a:extLst>
               <a:ext uri="{FF2B5EF4-FFF2-40B4-BE49-F238E27FC236}">
-                <a16:creationId xmlns:a16="http://schemas.microsoft.com/office/drawing/2014/main" xmlns="" id="{BE1BC57A-34BD-A7A2-9F51-00A898B6233D}"/>
+                <a16:creationId xmlns:a16="http://schemas.microsoft.com/office/drawing/2014/main" id="{BE1BC57A-34BD-A7A2-9F51-00A898B6233D}"/>
               </a:ext>
             </a:extLst>
           </p:cNvPr>
@@ -870,7 +870,7 @@
           <p:cNvPr id="4" name="Platshållare för datum 3">
             <a:extLst>
               <a:ext uri="{FF2B5EF4-FFF2-40B4-BE49-F238E27FC236}">
-                <a16:creationId xmlns:a16="http://schemas.microsoft.com/office/drawing/2014/main" xmlns="" id="{E3A6CB11-1C72-4C37-88CE-A222673A3325}"/>
+                <a16:creationId xmlns:a16="http://schemas.microsoft.com/office/drawing/2014/main" id="{E3A6CB11-1C72-4C37-88CE-A222673A3325}"/>
               </a:ext>
             </a:extLst>
           </p:cNvPr>
@@ -906,7 +906,7 @@
             <a:fld id="{C6F47C66-D121-9A42-BA24-809897433D99}" type="datetimeFigureOut">
               <a:rPr lang="sv-SE" smtClean="0"/>
               <a:pPr/>
-              <a:t>2023-11-27</a:t>
+              <a:t>2023-12-03</a:t>
             </a:fld>
             <a:endParaRPr lang="sv-SE" dirty="0"/>
           </a:p>
@@ -917,7 +917,7 @@
           <p:cNvPr id="2" name="Rubrik 1">
             <a:extLst>
               <a:ext uri="{FF2B5EF4-FFF2-40B4-BE49-F238E27FC236}">
-                <a16:creationId xmlns:a16="http://schemas.microsoft.com/office/drawing/2014/main" xmlns="" id="{3510689B-740C-4BF0-2264-8DEAA8D292F9}"/>
+                <a16:creationId xmlns:a16="http://schemas.microsoft.com/office/drawing/2014/main" id="{3510689B-740C-4BF0-2264-8DEAA8D292F9}"/>
               </a:ext>
             </a:extLst>
           </p:cNvPr>
@@ -963,7 +963,7 @@
           <p:cNvPr id="13" name="Platshållare för text 7">
             <a:extLst>
               <a:ext uri="{FF2B5EF4-FFF2-40B4-BE49-F238E27FC236}">
-                <a16:creationId xmlns:a16="http://schemas.microsoft.com/office/drawing/2014/main" xmlns="" id="{0B9E6B22-CE97-522C-3C2F-83B869AF0DA8}"/>
+                <a16:creationId xmlns:a16="http://schemas.microsoft.com/office/drawing/2014/main" id="{0B9E6B22-CE97-522C-3C2F-83B869AF0DA8}"/>
               </a:ext>
             </a:extLst>
           </p:cNvPr>
@@ -1022,7 +1022,7 @@
           <p:cNvPr id="17" name="Bild 16">
             <a:extLst>
               <a:ext uri="{FF2B5EF4-FFF2-40B4-BE49-F238E27FC236}">
-                <a16:creationId xmlns:a16="http://schemas.microsoft.com/office/drawing/2014/main" xmlns="" id="{5F4EFF04-6F3E-122F-D830-5E5EC679D94A}"/>
+                <a16:creationId xmlns:a16="http://schemas.microsoft.com/office/drawing/2014/main" id="{5F4EFF04-6F3E-122F-D830-5E5EC679D94A}"/>
               </a:ext>
             </a:extLst>
           </p:cNvPr>
@@ -1038,7 +1038,7 @@
                 <a14:useLocalDpi xmlns:a14="http://schemas.microsoft.com/office/drawing/2010/main"/>
               </a:ext>
               <a:ext uri="{96DAC541-7B7A-43D3-8B79-37D633B846F1}">
-                <asvg:svgBlip xmlns:asvg="http://schemas.microsoft.com/office/drawing/2016/SVG/main" xmlns="" r:embed="rId3"/>
+                <asvg:svgBlip xmlns:asvg="http://schemas.microsoft.com/office/drawing/2016/SVG/main" r:embed="rId3"/>
               </a:ext>
             </a:extLst>
           </a:blip>
@@ -1061,7 +1061,7 @@
           <p:cNvPr id="5" name="Platshållare för bild 9">
             <a:extLst>
               <a:ext uri="{FF2B5EF4-FFF2-40B4-BE49-F238E27FC236}">
-                <a16:creationId xmlns:a16="http://schemas.microsoft.com/office/drawing/2014/main" xmlns="" id="{F1CCFDFC-8116-577E-8BE8-AC257A265CD3}"/>
+                <a16:creationId xmlns:a16="http://schemas.microsoft.com/office/drawing/2014/main" id="{F1CCFDFC-8116-577E-8BE8-AC257A265CD3}"/>
               </a:ext>
             </a:extLst>
           </p:cNvPr>
@@ -1234,7 +1234,7 @@
           <p:cNvPr id="3" name="Platshållare för innehåll 2">
             <a:extLst>
               <a:ext uri="{FF2B5EF4-FFF2-40B4-BE49-F238E27FC236}">
-                <a16:creationId xmlns:a16="http://schemas.microsoft.com/office/drawing/2014/main" xmlns="" id="{85BA4CA5-77B2-FB63-8A08-C2E19CBEB9B6}"/>
+                <a16:creationId xmlns:a16="http://schemas.microsoft.com/office/drawing/2014/main" id="{85BA4CA5-77B2-FB63-8A08-C2E19CBEB9B6}"/>
               </a:ext>
             </a:extLst>
           </p:cNvPr>
@@ -1325,7 +1325,7 @@
           <p:cNvPr id="8" name="Platshållare för text 7">
             <a:extLst>
               <a:ext uri="{FF2B5EF4-FFF2-40B4-BE49-F238E27FC236}">
-                <a16:creationId xmlns:a16="http://schemas.microsoft.com/office/drawing/2014/main" xmlns="" id="{EAF389C4-B187-BA2F-2752-1C2412D79217}"/>
+                <a16:creationId xmlns:a16="http://schemas.microsoft.com/office/drawing/2014/main" id="{EAF389C4-B187-BA2F-2752-1C2412D79217}"/>
               </a:ext>
             </a:extLst>
           </p:cNvPr>
@@ -1384,7 +1384,7 @@
           <p:cNvPr id="9" name="Rubrik 8">
             <a:extLst>
               <a:ext uri="{FF2B5EF4-FFF2-40B4-BE49-F238E27FC236}">
-                <a16:creationId xmlns:a16="http://schemas.microsoft.com/office/drawing/2014/main" xmlns="" id="{7484591A-8006-B6C8-67CC-D47A9ACA3DBD}"/>
+                <a16:creationId xmlns:a16="http://schemas.microsoft.com/office/drawing/2014/main" id="{7484591A-8006-B6C8-67CC-D47A9ACA3DBD}"/>
               </a:ext>
             </a:extLst>
           </p:cNvPr>
@@ -1417,7 +1417,7 @@
           <p:cNvPr id="2" name="Platshållare för innehåll 2">
             <a:extLst>
               <a:ext uri="{FF2B5EF4-FFF2-40B4-BE49-F238E27FC236}">
-                <a16:creationId xmlns:a16="http://schemas.microsoft.com/office/drawing/2014/main" xmlns="" id="{0574A7DB-B008-DA8B-72F4-BA604B95E859}"/>
+                <a16:creationId xmlns:a16="http://schemas.microsoft.com/office/drawing/2014/main" id="{0574A7DB-B008-DA8B-72F4-BA604B95E859}"/>
               </a:ext>
             </a:extLst>
           </p:cNvPr>
@@ -1538,7 +1538,7 @@
           <p:cNvPr id="3" name="Platshållare för innehåll 2">
             <a:extLst>
               <a:ext uri="{FF2B5EF4-FFF2-40B4-BE49-F238E27FC236}">
-                <a16:creationId xmlns:a16="http://schemas.microsoft.com/office/drawing/2014/main" xmlns="" id="{85BA4CA5-77B2-FB63-8A08-C2E19CBEB9B6}"/>
+                <a16:creationId xmlns:a16="http://schemas.microsoft.com/office/drawing/2014/main" id="{85BA4CA5-77B2-FB63-8A08-C2E19CBEB9B6}"/>
               </a:ext>
             </a:extLst>
           </p:cNvPr>
@@ -1629,7 +1629,7 @@
           <p:cNvPr id="8" name="Platshållare för text 7">
             <a:extLst>
               <a:ext uri="{FF2B5EF4-FFF2-40B4-BE49-F238E27FC236}">
-                <a16:creationId xmlns:a16="http://schemas.microsoft.com/office/drawing/2014/main" xmlns="" id="{EAF389C4-B187-BA2F-2752-1C2412D79217}"/>
+                <a16:creationId xmlns:a16="http://schemas.microsoft.com/office/drawing/2014/main" id="{EAF389C4-B187-BA2F-2752-1C2412D79217}"/>
               </a:ext>
             </a:extLst>
           </p:cNvPr>
@@ -1688,7 +1688,7 @@
           <p:cNvPr id="4" name="Platshållare för bild 3">
             <a:extLst>
               <a:ext uri="{FF2B5EF4-FFF2-40B4-BE49-F238E27FC236}">
-                <a16:creationId xmlns:a16="http://schemas.microsoft.com/office/drawing/2014/main" xmlns="" id="{6B38ABA2-E775-31BD-E6DF-5D9028083F39}"/>
+                <a16:creationId xmlns:a16="http://schemas.microsoft.com/office/drawing/2014/main" id="{6B38ABA2-E775-31BD-E6DF-5D9028083F39}"/>
               </a:ext>
             </a:extLst>
           </p:cNvPr>
@@ -1718,7 +1718,7 @@
           <p:cNvPr id="5" name="Rubrik 8">
             <a:extLst>
               <a:ext uri="{FF2B5EF4-FFF2-40B4-BE49-F238E27FC236}">
-                <a16:creationId xmlns:a16="http://schemas.microsoft.com/office/drawing/2014/main" xmlns="" id="{E90C16AA-FCEE-64BB-CFC7-C0AE2DFB2A30}"/>
+                <a16:creationId xmlns:a16="http://schemas.microsoft.com/office/drawing/2014/main" id="{E90C16AA-FCEE-64BB-CFC7-C0AE2DFB2A30}"/>
               </a:ext>
             </a:extLst>
           </p:cNvPr>
@@ -1781,7 +1781,7 @@
           <p:cNvPr id="3" name="Platshållare för innehåll 2">
             <a:extLst>
               <a:ext uri="{FF2B5EF4-FFF2-40B4-BE49-F238E27FC236}">
-                <a16:creationId xmlns:a16="http://schemas.microsoft.com/office/drawing/2014/main" xmlns="" id="{85BA4CA5-77B2-FB63-8A08-C2E19CBEB9B6}"/>
+                <a16:creationId xmlns:a16="http://schemas.microsoft.com/office/drawing/2014/main" id="{85BA4CA5-77B2-FB63-8A08-C2E19CBEB9B6}"/>
               </a:ext>
             </a:extLst>
           </p:cNvPr>
@@ -1872,7 +1872,7 @@
           <p:cNvPr id="8" name="Platshållare för text 7">
             <a:extLst>
               <a:ext uri="{FF2B5EF4-FFF2-40B4-BE49-F238E27FC236}">
-                <a16:creationId xmlns:a16="http://schemas.microsoft.com/office/drawing/2014/main" xmlns="" id="{EAF389C4-B187-BA2F-2752-1C2412D79217}"/>
+                <a16:creationId xmlns:a16="http://schemas.microsoft.com/office/drawing/2014/main" id="{EAF389C4-B187-BA2F-2752-1C2412D79217}"/>
               </a:ext>
             </a:extLst>
           </p:cNvPr>
@@ -1931,7 +1931,7 @@
           <p:cNvPr id="9" name="Rubrik 8">
             <a:extLst>
               <a:ext uri="{FF2B5EF4-FFF2-40B4-BE49-F238E27FC236}">
-                <a16:creationId xmlns:a16="http://schemas.microsoft.com/office/drawing/2014/main" xmlns="" id="{7484591A-8006-B6C8-67CC-D47A9ACA3DBD}"/>
+                <a16:creationId xmlns:a16="http://schemas.microsoft.com/office/drawing/2014/main" id="{7484591A-8006-B6C8-67CC-D47A9ACA3DBD}"/>
               </a:ext>
             </a:extLst>
           </p:cNvPr>
@@ -1964,7 +1964,7 @@
           <p:cNvPr id="2" name="Platshållare för bild 3">
             <a:extLst>
               <a:ext uri="{FF2B5EF4-FFF2-40B4-BE49-F238E27FC236}">
-                <a16:creationId xmlns:a16="http://schemas.microsoft.com/office/drawing/2014/main" xmlns="" id="{650C9654-1BD9-F9FB-40DF-6D27DE36353C}"/>
+                <a16:creationId xmlns:a16="http://schemas.microsoft.com/office/drawing/2014/main" id="{650C9654-1BD9-F9FB-40DF-6D27DE36353C}"/>
               </a:ext>
             </a:extLst>
           </p:cNvPr>
@@ -2024,7 +2024,7 @@
           <p:cNvPr id="3" name="Platshållare för innehåll 2">
             <a:extLst>
               <a:ext uri="{FF2B5EF4-FFF2-40B4-BE49-F238E27FC236}">
-                <a16:creationId xmlns:a16="http://schemas.microsoft.com/office/drawing/2014/main" xmlns="" id="{85BA4CA5-77B2-FB63-8A08-C2E19CBEB9B6}"/>
+                <a16:creationId xmlns:a16="http://schemas.microsoft.com/office/drawing/2014/main" id="{85BA4CA5-77B2-FB63-8A08-C2E19CBEB9B6}"/>
               </a:ext>
             </a:extLst>
           </p:cNvPr>
@@ -2115,7 +2115,7 @@
           <p:cNvPr id="8" name="Platshållare för text 7">
             <a:extLst>
               <a:ext uri="{FF2B5EF4-FFF2-40B4-BE49-F238E27FC236}">
-                <a16:creationId xmlns:a16="http://schemas.microsoft.com/office/drawing/2014/main" xmlns="" id="{EAF389C4-B187-BA2F-2752-1C2412D79217}"/>
+                <a16:creationId xmlns:a16="http://schemas.microsoft.com/office/drawing/2014/main" id="{EAF389C4-B187-BA2F-2752-1C2412D79217}"/>
               </a:ext>
             </a:extLst>
           </p:cNvPr>
@@ -2174,7 +2174,7 @@
           <p:cNvPr id="9" name="Rubrik 8">
             <a:extLst>
               <a:ext uri="{FF2B5EF4-FFF2-40B4-BE49-F238E27FC236}">
-                <a16:creationId xmlns:a16="http://schemas.microsoft.com/office/drawing/2014/main" xmlns="" id="{7484591A-8006-B6C8-67CC-D47A9ACA3DBD}"/>
+                <a16:creationId xmlns:a16="http://schemas.microsoft.com/office/drawing/2014/main" id="{7484591A-8006-B6C8-67CC-D47A9ACA3DBD}"/>
               </a:ext>
             </a:extLst>
           </p:cNvPr>
@@ -2207,7 +2207,7 @@
           <p:cNvPr id="15" name="Platshållare för bild 14">
             <a:extLst>
               <a:ext uri="{FF2B5EF4-FFF2-40B4-BE49-F238E27FC236}">
-                <a16:creationId xmlns:a16="http://schemas.microsoft.com/office/drawing/2014/main" xmlns="" id="{F52E3BA0-C4F0-42CF-9D9C-C28F5E42742A}"/>
+                <a16:creationId xmlns:a16="http://schemas.microsoft.com/office/drawing/2014/main" id="{F52E3BA0-C4F0-42CF-9D9C-C28F5E42742A}"/>
               </a:ext>
             </a:extLst>
           </p:cNvPr>
@@ -2335,7 +2335,7 @@
           <p:cNvPr id="4" name="Rektangel 3">
             <a:extLst>
               <a:ext uri="{FF2B5EF4-FFF2-40B4-BE49-F238E27FC236}">
-                <a16:creationId xmlns:a16="http://schemas.microsoft.com/office/drawing/2014/main" xmlns="" id="{9AF3D6A7-A7B7-7718-CBA9-3A9F17A6A26E}"/>
+                <a16:creationId xmlns:a16="http://schemas.microsoft.com/office/drawing/2014/main" id="{9AF3D6A7-A7B7-7718-CBA9-3A9F17A6A26E}"/>
               </a:ext>
             </a:extLst>
           </p:cNvPr>
@@ -2387,7 +2387,7 @@
           <p:cNvPr id="3" name="Platshållare för innehåll 2">
             <a:extLst>
               <a:ext uri="{FF2B5EF4-FFF2-40B4-BE49-F238E27FC236}">
-                <a16:creationId xmlns:a16="http://schemas.microsoft.com/office/drawing/2014/main" xmlns="" id="{85BA4CA5-77B2-FB63-8A08-C2E19CBEB9B6}"/>
+                <a16:creationId xmlns:a16="http://schemas.microsoft.com/office/drawing/2014/main" id="{85BA4CA5-77B2-FB63-8A08-C2E19CBEB9B6}"/>
               </a:ext>
             </a:extLst>
           </p:cNvPr>
@@ -2452,7 +2452,7 @@
           <p:cNvPr id="8" name="Platshållare för text 7">
             <a:extLst>
               <a:ext uri="{FF2B5EF4-FFF2-40B4-BE49-F238E27FC236}">
-                <a16:creationId xmlns:a16="http://schemas.microsoft.com/office/drawing/2014/main" xmlns="" id="{EAF389C4-B187-BA2F-2752-1C2412D79217}"/>
+                <a16:creationId xmlns:a16="http://schemas.microsoft.com/office/drawing/2014/main" id="{EAF389C4-B187-BA2F-2752-1C2412D79217}"/>
               </a:ext>
             </a:extLst>
           </p:cNvPr>
@@ -2511,7 +2511,7 @@
           <p:cNvPr id="9" name="Rubrik 8">
             <a:extLst>
               <a:ext uri="{FF2B5EF4-FFF2-40B4-BE49-F238E27FC236}">
-                <a16:creationId xmlns:a16="http://schemas.microsoft.com/office/drawing/2014/main" xmlns="" id="{7484591A-8006-B6C8-67CC-D47A9ACA3DBD}"/>
+                <a16:creationId xmlns:a16="http://schemas.microsoft.com/office/drawing/2014/main" id="{7484591A-8006-B6C8-67CC-D47A9ACA3DBD}"/>
               </a:ext>
             </a:extLst>
           </p:cNvPr>
@@ -2544,7 +2544,7 @@
           <p:cNvPr id="2" name="Rektangel 1">
             <a:extLst>
               <a:ext uri="{FF2B5EF4-FFF2-40B4-BE49-F238E27FC236}">
-                <a16:creationId xmlns:a16="http://schemas.microsoft.com/office/drawing/2014/main" xmlns="" id="{42A6738C-DF5C-03CA-34FF-82513AABEC06}"/>
+                <a16:creationId xmlns:a16="http://schemas.microsoft.com/office/drawing/2014/main" id="{42A6738C-DF5C-03CA-34FF-82513AABEC06}"/>
               </a:ext>
             </a:extLst>
           </p:cNvPr>
@@ -2642,7 +2642,7 @@
           <p:cNvPr id="6" name="Rektangel 5">
             <a:extLst>
               <a:ext uri="{FF2B5EF4-FFF2-40B4-BE49-F238E27FC236}">
-                <a16:creationId xmlns:a16="http://schemas.microsoft.com/office/drawing/2014/main" xmlns="" id="{27246952-B5FB-AD2F-F939-F9EB11E34BDD}"/>
+                <a16:creationId xmlns:a16="http://schemas.microsoft.com/office/drawing/2014/main" id="{27246952-B5FB-AD2F-F939-F9EB11E34BDD}"/>
               </a:ext>
             </a:extLst>
           </p:cNvPr>
@@ -2757,7 +2757,7 @@
           <p:cNvPr id="3" name="Platshållare för innehåll 2">
             <a:extLst>
               <a:ext uri="{FF2B5EF4-FFF2-40B4-BE49-F238E27FC236}">
-                <a16:creationId xmlns:a16="http://schemas.microsoft.com/office/drawing/2014/main" xmlns="" id="{85BA4CA5-77B2-FB63-8A08-C2E19CBEB9B6}"/>
+                <a16:creationId xmlns:a16="http://schemas.microsoft.com/office/drawing/2014/main" id="{85BA4CA5-77B2-FB63-8A08-C2E19CBEB9B6}"/>
               </a:ext>
             </a:extLst>
           </p:cNvPr>
@@ -2822,7 +2822,7 @@
           <p:cNvPr id="8" name="Platshållare för text 7">
             <a:extLst>
               <a:ext uri="{FF2B5EF4-FFF2-40B4-BE49-F238E27FC236}">
-                <a16:creationId xmlns:a16="http://schemas.microsoft.com/office/drawing/2014/main" xmlns="" id="{EAF389C4-B187-BA2F-2752-1C2412D79217}"/>
+                <a16:creationId xmlns:a16="http://schemas.microsoft.com/office/drawing/2014/main" id="{EAF389C4-B187-BA2F-2752-1C2412D79217}"/>
               </a:ext>
             </a:extLst>
           </p:cNvPr>
@@ -2881,7 +2881,7 @@
           <p:cNvPr id="9" name="Rubrik 8">
             <a:extLst>
               <a:ext uri="{FF2B5EF4-FFF2-40B4-BE49-F238E27FC236}">
-                <a16:creationId xmlns:a16="http://schemas.microsoft.com/office/drawing/2014/main" xmlns="" id="{7484591A-8006-B6C8-67CC-D47A9ACA3DBD}"/>
+                <a16:creationId xmlns:a16="http://schemas.microsoft.com/office/drawing/2014/main" id="{7484591A-8006-B6C8-67CC-D47A9ACA3DBD}"/>
               </a:ext>
             </a:extLst>
           </p:cNvPr>
@@ -2944,7 +2944,7 @@
           <p:cNvPr id="4" name="Rektangel 3">
             <a:extLst>
               <a:ext uri="{FF2B5EF4-FFF2-40B4-BE49-F238E27FC236}">
-                <a16:creationId xmlns:a16="http://schemas.microsoft.com/office/drawing/2014/main" xmlns="" id="{3E12451C-C286-AD44-5731-5E1FCB6A345F}"/>
+                <a16:creationId xmlns:a16="http://schemas.microsoft.com/office/drawing/2014/main" id="{3E12451C-C286-AD44-5731-5E1FCB6A345F}"/>
               </a:ext>
             </a:extLst>
           </p:cNvPr>
@@ -2996,7 +2996,7 @@
           <p:cNvPr id="3" name="Platshållare för innehåll 2">
             <a:extLst>
               <a:ext uri="{FF2B5EF4-FFF2-40B4-BE49-F238E27FC236}">
-                <a16:creationId xmlns:a16="http://schemas.microsoft.com/office/drawing/2014/main" xmlns="" id="{85BA4CA5-77B2-FB63-8A08-C2E19CBEB9B6}"/>
+                <a16:creationId xmlns:a16="http://schemas.microsoft.com/office/drawing/2014/main" id="{85BA4CA5-77B2-FB63-8A08-C2E19CBEB9B6}"/>
               </a:ext>
             </a:extLst>
           </p:cNvPr>
@@ -3087,7 +3087,7 @@
           <p:cNvPr id="8" name="Platshållare för text 7">
             <a:extLst>
               <a:ext uri="{FF2B5EF4-FFF2-40B4-BE49-F238E27FC236}">
-                <a16:creationId xmlns:a16="http://schemas.microsoft.com/office/drawing/2014/main" xmlns="" id="{EAF389C4-B187-BA2F-2752-1C2412D79217}"/>
+                <a16:creationId xmlns:a16="http://schemas.microsoft.com/office/drawing/2014/main" id="{EAF389C4-B187-BA2F-2752-1C2412D79217}"/>
               </a:ext>
             </a:extLst>
           </p:cNvPr>
@@ -3146,7 +3146,7 @@
           <p:cNvPr id="9" name="Rubrik 8">
             <a:extLst>
               <a:ext uri="{FF2B5EF4-FFF2-40B4-BE49-F238E27FC236}">
-                <a16:creationId xmlns:a16="http://schemas.microsoft.com/office/drawing/2014/main" xmlns="" id="{7484591A-8006-B6C8-67CC-D47A9ACA3DBD}"/>
+                <a16:creationId xmlns:a16="http://schemas.microsoft.com/office/drawing/2014/main" id="{7484591A-8006-B6C8-67CC-D47A9ACA3DBD}"/>
               </a:ext>
             </a:extLst>
           </p:cNvPr>
@@ -3225,7 +3225,7 @@
           <p:cNvPr id="4" name="Rektangel 3">
             <a:extLst>
               <a:ext uri="{FF2B5EF4-FFF2-40B4-BE49-F238E27FC236}">
-                <a16:creationId xmlns:a16="http://schemas.microsoft.com/office/drawing/2014/main" xmlns="" id="{3E12451C-C286-AD44-5731-5E1FCB6A345F}"/>
+                <a16:creationId xmlns:a16="http://schemas.microsoft.com/office/drawing/2014/main" id="{3E12451C-C286-AD44-5731-5E1FCB6A345F}"/>
               </a:ext>
             </a:extLst>
           </p:cNvPr>
@@ -3277,7 +3277,7 @@
           <p:cNvPr id="3" name="Platshållare för innehåll 2">
             <a:extLst>
               <a:ext uri="{FF2B5EF4-FFF2-40B4-BE49-F238E27FC236}">
-                <a16:creationId xmlns:a16="http://schemas.microsoft.com/office/drawing/2014/main" xmlns="" id="{85BA4CA5-77B2-FB63-8A08-C2E19CBEB9B6}"/>
+                <a16:creationId xmlns:a16="http://schemas.microsoft.com/office/drawing/2014/main" id="{85BA4CA5-77B2-FB63-8A08-C2E19CBEB9B6}"/>
               </a:ext>
             </a:extLst>
           </p:cNvPr>
@@ -3368,7 +3368,7 @@
           <p:cNvPr id="8" name="Platshållare för text 7">
             <a:extLst>
               <a:ext uri="{FF2B5EF4-FFF2-40B4-BE49-F238E27FC236}">
-                <a16:creationId xmlns:a16="http://schemas.microsoft.com/office/drawing/2014/main" xmlns="" id="{EAF389C4-B187-BA2F-2752-1C2412D79217}"/>
+                <a16:creationId xmlns:a16="http://schemas.microsoft.com/office/drawing/2014/main" id="{EAF389C4-B187-BA2F-2752-1C2412D79217}"/>
               </a:ext>
             </a:extLst>
           </p:cNvPr>
@@ -3427,7 +3427,7 @@
           <p:cNvPr id="9" name="Rubrik 8">
             <a:extLst>
               <a:ext uri="{FF2B5EF4-FFF2-40B4-BE49-F238E27FC236}">
-                <a16:creationId xmlns:a16="http://schemas.microsoft.com/office/drawing/2014/main" xmlns="" id="{7484591A-8006-B6C8-67CC-D47A9ACA3DBD}"/>
+                <a16:creationId xmlns:a16="http://schemas.microsoft.com/office/drawing/2014/main" id="{7484591A-8006-B6C8-67CC-D47A9ACA3DBD}"/>
               </a:ext>
             </a:extLst>
           </p:cNvPr>
@@ -3490,7 +3490,7 @@
           <p:cNvPr id="3" name="Rektangel 2">
             <a:extLst>
               <a:ext uri="{FF2B5EF4-FFF2-40B4-BE49-F238E27FC236}">
-                <a16:creationId xmlns:a16="http://schemas.microsoft.com/office/drawing/2014/main" xmlns="" id="{B9DC182A-C62D-CBA3-F44E-93338CC677A5}"/>
+                <a16:creationId xmlns:a16="http://schemas.microsoft.com/office/drawing/2014/main" id="{B9DC182A-C62D-CBA3-F44E-93338CC677A5}"/>
               </a:ext>
             </a:extLst>
           </p:cNvPr>
@@ -3542,7 +3542,7 @@
           <p:cNvPr id="5" name="Bild 4">
             <a:extLst>
               <a:ext uri="{FF2B5EF4-FFF2-40B4-BE49-F238E27FC236}">
-                <a16:creationId xmlns:a16="http://schemas.microsoft.com/office/drawing/2014/main" xmlns="" id="{F9CEFC0E-5FF5-6E5A-F78D-11EFD87AAC56}"/>
+                <a16:creationId xmlns:a16="http://schemas.microsoft.com/office/drawing/2014/main" id="{F9CEFC0E-5FF5-6E5A-F78D-11EFD87AAC56}"/>
               </a:ext>
             </a:extLst>
           </p:cNvPr>
@@ -3555,7 +3555,7 @@
           <a:blip r:embed="rId2">
             <a:extLst>
               <a:ext uri="{96DAC541-7B7A-43D3-8B79-37D633B846F1}">
-                <asvg:svgBlip xmlns:asvg="http://schemas.microsoft.com/office/drawing/2016/SVG/main" xmlns="" r:embed="rId3"/>
+                <asvg:svgBlip xmlns:asvg="http://schemas.microsoft.com/office/drawing/2016/SVG/main" r:embed="rId3"/>
               </a:ext>
             </a:extLst>
           </a:blip>
@@ -3578,7 +3578,7 @@
           <p:cNvPr id="14" name="Rak 13">
             <a:extLst>
               <a:ext uri="{FF2B5EF4-FFF2-40B4-BE49-F238E27FC236}">
-                <a16:creationId xmlns:a16="http://schemas.microsoft.com/office/drawing/2014/main" xmlns="" id="{4B14DEDD-5B56-C262-ADAF-FA34435E856B}"/>
+                <a16:creationId xmlns:a16="http://schemas.microsoft.com/office/drawing/2014/main" id="{4B14DEDD-5B56-C262-ADAF-FA34435E856B}"/>
               </a:ext>
             </a:extLst>
           </p:cNvPr>
@@ -3615,7 +3615,7 @@
           <p:cNvPr id="15" name="textruta 14">
             <a:extLst>
               <a:ext uri="{FF2B5EF4-FFF2-40B4-BE49-F238E27FC236}">
-                <a16:creationId xmlns:a16="http://schemas.microsoft.com/office/drawing/2014/main" xmlns="" id="{FE8B656F-A0DD-AA59-BF86-4510FA3E2A5D}"/>
+                <a16:creationId xmlns:a16="http://schemas.microsoft.com/office/drawing/2014/main" id="{FE8B656F-A0DD-AA59-BF86-4510FA3E2A5D}"/>
               </a:ext>
             </a:extLst>
           </p:cNvPr>
@@ -3670,7 +3670,7 @@
           <p:cNvPr id="4" name="Bild 3">
             <a:extLst>
               <a:ext uri="{FF2B5EF4-FFF2-40B4-BE49-F238E27FC236}">
-                <a16:creationId xmlns:a16="http://schemas.microsoft.com/office/drawing/2014/main" xmlns="" id="{B79A4FF7-0A5D-C8AE-5A0B-0784E50696F2}"/>
+                <a16:creationId xmlns:a16="http://schemas.microsoft.com/office/drawing/2014/main" id="{B79A4FF7-0A5D-C8AE-5A0B-0784E50696F2}"/>
               </a:ext>
             </a:extLst>
           </p:cNvPr>
@@ -3686,7 +3686,7 @@
                 <a14:useLocalDpi xmlns:a14="http://schemas.microsoft.com/office/drawing/2010/main"/>
               </a:ext>
               <a:ext uri="{96DAC541-7B7A-43D3-8B79-37D633B846F1}">
-                <asvg:svgBlip xmlns:asvg="http://schemas.microsoft.com/office/drawing/2016/SVG/main" xmlns="" r:embed="rId6"/>
+                <asvg:svgBlip xmlns:asvg="http://schemas.microsoft.com/office/drawing/2016/SVG/main" r:embed="rId6"/>
               </a:ext>
             </a:extLst>
           </a:blip>
@@ -3709,7 +3709,7 @@
           <p:cNvPr id="6" name="textruta 5">
             <a:extLst>
               <a:ext uri="{FF2B5EF4-FFF2-40B4-BE49-F238E27FC236}">
-                <a16:creationId xmlns:a16="http://schemas.microsoft.com/office/drawing/2014/main" xmlns="" id="{7133BC6B-0FF2-2F5C-4EF0-7C6AC121F1FA}"/>
+                <a16:creationId xmlns:a16="http://schemas.microsoft.com/office/drawing/2014/main" id="{7133BC6B-0FF2-2F5C-4EF0-7C6AC121F1FA}"/>
               </a:ext>
             </a:extLst>
           </p:cNvPr>
@@ -3741,7 +3741,7 @@
                 <a:hlinkClick r:id="rId7">
                   <a:extLst>
                     <a:ext uri="{A12FA001-AC4F-418D-AE19-62706E023703}">
-                      <ahyp:hlinkClr xmlns:ahyp="http://schemas.microsoft.com/office/drawing/2018/hyperlinkcolor" xmlns="" val="tx"/>
+                      <ahyp:hlinkClr xmlns:ahyp="http://schemas.microsoft.com/office/drawing/2018/hyperlinkcolor" val="tx"/>
                     </a:ext>
                   </a:extLst>
                 </a:hlinkClick>
@@ -3762,7 +3762,7 @@
           <p:cNvPr id="8" name="textruta 7">
             <a:extLst>
               <a:ext uri="{FF2B5EF4-FFF2-40B4-BE49-F238E27FC236}">
-                <a16:creationId xmlns:a16="http://schemas.microsoft.com/office/drawing/2014/main" xmlns="" id="{C4AAF1C1-2BE8-790F-11CD-6B3433491B36}"/>
+                <a16:creationId xmlns:a16="http://schemas.microsoft.com/office/drawing/2014/main" id="{C4AAF1C1-2BE8-790F-11CD-6B3433491B36}"/>
               </a:ext>
             </a:extLst>
           </p:cNvPr>
@@ -3794,7 +3794,7 @@
                 <a:hlinkClick r:id="rId8">
                   <a:extLst>
                     <a:ext uri="{A12FA001-AC4F-418D-AE19-62706E023703}">
-                      <ahyp:hlinkClr xmlns:ahyp="http://schemas.microsoft.com/office/drawing/2018/hyperlinkcolor" xmlns="" val="tx"/>
+                      <ahyp:hlinkClr xmlns:ahyp="http://schemas.microsoft.com/office/drawing/2018/hyperlinkcolor" val="tx"/>
                     </a:ext>
                   </a:extLst>
                 </a:hlinkClick>
@@ -3815,7 +3815,7 @@
           <p:cNvPr id="10" name="Bild 9">
             <a:extLst>
               <a:ext uri="{FF2B5EF4-FFF2-40B4-BE49-F238E27FC236}">
-                <a16:creationId xmlns:a16="http://schemas.microsoft.com/office/drawing/2014/main" xmlns="" id="{23139753-D898-61D2-94D9-FBDAFEB3FEB9}"/>
+                <a16:creationId xmlns:a16="http://schemas.microsoft.com/office/drawing/2014/main" id="{23139753-D898-61D2-94D9-FBDAFEB3FEB9}"/>
               </a:ext>
             </a:extLst>
           </p:cNvPr>
@@ -3831,7 +3831,7 @@
                 <a14:useLocalDpi xmlns:a14="http://schemas.microsoft.com/office/drawing/2010/main"/>
               </a:ext>
               <a:ext uri="{96DAC541-7B7A-43D3-8B79-37D633B846F1}">
-                <asvg:svgBlip xmlns:asvg="http://schemas.microsoft.com/office/drawing/2016/SVG/main" xmlns="" r:embed="rId10"/>
+                <asvg:svgBlip xmlns:asvg="http://schemas.microsoft.com/office/drawing/2016/SVG/main" r:embed="rId10"/>
               </a:ext>
             </a:extLst>
           </a:blip>
@@ -3854,7 +3854,7 @@
           <p:cNvPr id="12" name="Bild 11">
             <a:extLst>
               <a:ext uri="{FF2B5EF4-FFF2-40B4-BE49-F238E27FC236}">
-                <a16:creationId xmlns:a16="http://schemas.microsoft.com/office/drawing/2014/main" xmlns="" id="{3EA4AE40-4A4A-A866-7591-558D401A456C}"/>
+                <a16:creationId xmlns:a16="http://schemas.microsoft.com/office/drawing/2014/main" id="{3EA4AE40-4A4A-A866-7591-558D401A456C}"/>
               </a:ext>
             </a:extLst>
           </p:cNvPr>
@@ -3870,7 +3870,7 @@
                 <a14:useLocalDpi xmlns:a14="http://schemas.microsoft.com/office/drawing/2010/main"/>
               </a:ext>
               <a:ext uri="{96DAC541-7B7A-43D3-8B79-37D633B846F1}">
-                <asvg:svgBlip xmlns:asvg="http://schemas.microsoft.com/office/drawing/2016/SVG/main" xmlns="" r:embed="rId12"/>
+                <asvg:svgBlip xmlns:asvg="http://schemas.microsoft.com/office/drawing/2016/SVG/main" r:embed="rId12"/>
               </a:ext>
             </a:extLst>
           </a:blip>
@@ -3893,7 +3893,7 @@
           <p:cNvPr id="13" name="textruta 12">
             <a:extLst>
               <a:ext uri="{FF2B5EF4-FFF2-40B4-BE49-F238E27FC236}">
-                <a16:creationId xmlns:a16="http://schemas.microsoft.com/office/drawing/2014/main" xmlns="" id="{A2256472-1FDC-EE86-1955-5BCE6A5AE2FD}"/>
+                <a16:creationId xmlns:a16="http://schemas.microsoft.com/office/drawing/2014/main" id="{A2256472-1FDC-EE86-1955-5BCE6A5AE2FD}"/>
               </a:ext>
             </a:extLst>
           </p:cNvPr>
@@ -3925,7 +3925,7 @@
                 <a:hlinkClick r:id="rId13">
                   <a:extLst>
                     <a:ext uri="{A12FA001-AC4F-418D-AE19-62706E023703}">
-                      <ahyp:hlinkClr xmlns:ahyp="http://schemas.microsoft.com/office/drawing/2018/hyperlinkcolor" xmlns="" val="tx"/>
+                      <ahyp:hlinkClr xmlns:ahyp="http://schemas.microsoft.com/office/drawing/2018/hyperlinkcolor" val="tx"/>
                     </a:ext>
                   </a:extLst>
                 </a:hlinkClick>
@@ -3992,7 +3992,7 @@
           <p:cNvPr id="2" name="Title 1">
             <a:extLst>
               <a:ext uri="{FF2B5EF4-FFF2-40B4-BE49-F238E27FC236}">
-                <a16:creationId xmlns:a16="http://schemas.microsoft.com/office/drawing/2014/main" xmlns="" id="{415B3628-62D7-4A6D-A79F-34DE91DBA31E}"/>
+                <a16:creationId xmlns:a16="http://schemas.microsoft.com/office/drawing/2014/main" id="{415B3628-62D7-4A6D-A79F-34DE91DBA31E}"/>
               </a:ext>
             </a:extLst>
           </p:cNvPr>
@@ -4031,7 +4031,7 @@
           <p:cNvPr id="3" name="Subtitle 2">
             <a:extLst>
               <a:ext uri="{FF2B5EF4-FFF2-40B4-BE49-F238E27FC236}">
-                <a16:creationId xmlns:a16="http://schemas.microsoft.com/office/drawing/2014/main" xmlns="" id="{55457758-A125-4CEA-A3D5-CBD010417BD2}"/>
+                <a16:creationId xmlns:a16="http://schemas.microsoft.com/office/drawing/2014/main" id="{55457758-A125-4CEA-A3D5-CBD010417BD2}"/>
               </a:ext>
             </a:extLst>
           </p:cNvPr>
@@ -4104,7 +4104,7 @@
           <p:cNvPr id="8" name="Graphic 7">
             <a:extLst>
               <a:ext uri="{FF2B5EF4-FFF2-40B4-BE49-F238E27FC236}">
-                <a16:creationId xmlns:a16="http://schemas.microsoft.com/office/drawing/2014/main" xmlns="" id="{A04F1E16-9A84-4D0E-9706-79C396AF6AE6}"/>
+                <a16:creationId xmlns:a16="http://schemas.microsoft.com/office/drawing/2014/main" id="{A04F1E16-9A84-4D0E-9706-79C396AF6AE6}"/>
               </a:ext>
             </a:extLst>
           </p:cNvPr>
@@ -4117,7 +4117,7 @@
           <a:blip r:embed="rId2">
             <a:extLst>
               <a:ext uri="{96DAC541-7B7A-43D3-8B79-37D633B846F1}">
-                <asvg:svgBlip xmlns:asvg="http://schemas.microsoft.com/office/drawing/2016/SVG/main" xmlns="" r:embed="rId3"/>
+                <asvg:svgBlip xmlns:asvg="http://schemas.microsoft.com/office/drawing/2016/SVG/main" r:embed="rId3"/>
               </a:ext>
             </a:extLst>
           </a:blip>
@@ -4177,7 +4177,7 @@
           <p:cNvPr id="3" name="Underrubrik 2">
             <a:extLst>
               <a:ext uri="{FF2B5EF4-FFF2-40B4-BE49-F238E27FC236}">
-                <a16:creationId xmlns:a16="http://schemas.microsoft.com/office/drawing/2014/main" xmlns="" id="{BE1BC57A-34BD-A7A2-9F51-00A898B6233D}"/>
+                <a16:creationId xmlns:a16="http://schemas.microsoft.com/office/drawing/2014/main" id="{BE1BC57A-34BD-A7A2-9F51-00A898B6233D}"/>
               </a:ext>
             </a:extLst>
           </p:cNvPr>
@@ -4261,7 +4261,7 @@
           <p:cNvPr id="4" name="Platshållare för datum 3">
             <a:extLst>
               <a:ext uri="{FF2B5EF4-FFF2-40B4-BE49-F238E27FC236}">
-                <a16:creationId xmlns:a16="http://schemas.microsoft.com/office/drawing/2014/main" xmlns="" id="{E3A6CB11-1C72-4C37-88CE-A222673A3325}"/>
+                <a16:creationId xmlns:a16="http://schemas.microsoft.com/office/drawing/2014/main" id="{E3A6CB11-1C72-4C37-88CE-A222673A3325}"/>
               </a:ext>
             </a:extLst>
           </p:cNvPr>
@@ -4296,7 +4296,7 @@
             <a:fld id="{C6F47C66-D121-9A42-BA24-809897433D99}" type="datetimeFigureOut">
               <a:rPr lang="sv-SE" smtClean="0"/>
               <a:pPr/>
-              <a:t>2023-11-27</a:t>
+              <a:t>2023-12-03</a:t>
             </a:fld>
             <a:endParaRPr lang="sv-SE" dirty="0"/>
           </a:p>
@@ -4307,7 +4307,7 @@
           <p:cNvPr id="2" name="Rubrik 1">
             <a:extLst>
               <a:ext uri="{FF2B5EF4-FFF2-40B4-BE49-F238E27FC236}">
-                <a16:creationId xmlns:a16="http://schemas.microsoft.com/office/drawing/2014/main" xmlns="" id="{3510689B-740C-4BF0-2264-8DEAA8D292F9}"/>
+                <a16:creationId xmlns:a16="http://schemas.microsoft.com/office/drawing/2014/main" id="{3510689B-740C-4BF0-2264-8DEAA8D292F9}"/>
               </a:ext>
             </a:extLst>
           </p:cNvPr>
@@ -4353,7 +4353,7 @@
           <p:cNvPr id="13" name="Platshållare för text 7">
             <a:extLst>
               <a:ext uri="{FF2B5EF4-FFF2-40B4-BE49-F238E27FC236}">
-                <a16:creationId xmlns:a16="http://schemas.microsoft.com/office/drawing/2014/main" xmlns="" id="{0B9E6B22-CE97-522C-3C2F-83B869AF0DA8}"/>
+                <a16:creationId xmlns:a16="http://schemas.microsoft.com/office/drawing/2014/main" id="{0B9E6B22-CE97-522C-3C2F-83B869AF0DA8}"/>
               </a:ext>
             </a:extLst>
           </p:cNvPr>
@@ -4412,7 +4412,7 @@
           <p:cNvPr id="17" name="Bild 16">
             <a:extLst>
               <a:ext uri="{FF2B5EF4-FFF2-40B4-BE49-F238E27FC236}">
-                <a16:creationId xmlns:a16="http://schemas.microsoft.com/office/drawing/2014/main" xmlns="" id="{5F4EFF04-6F3E-122F-D830-5E5EC679D94A}"/>
+                <a16:creationId xmlns:a16="http://schemas.microsoft.com/office/drawing/2014/main" id="{5F4EFF04-6F3E-122F-D830-5E5EC679D94A}"/>
               </a:ext>
             </a:extLst>
           </p:cNvPr>
@@ -4428,7 +4428,7 @@
                 <a14:useLocalDpi xmlns:a14="http://schemas.microsoft.com/office/drawing/2010/main"/>
               </a:ext>
               <a:ext uri="{96DAC541-7B7A-43D3-8B79-37D633B846F1}">
-                <asvg:svgBlip xmlns:asvg="http://schemas.microsoft.com/office/drawing/2016/SVG/main" xmlns="" r:embed="rId3"/>
+                <asvg:svgBlip xmlns:asvg="http://schemas.microsoft.com/office/drawing/2016/SVG/main" r:embed="rId3"/>
               </a:ext>
             </a:extLst>
           </a:blip>
@@ -4451,7 +4451,7 @@
           <p:cNvPr id="6" name="Rektangel 5">
             <a:extLst>
               <a:ext uri="{FF2B5EF4-FFF2-40B4-BE49-F238E27FC236}">
-                <a16:creationId xmlns:a16="http://schemas.microsoft.com/office/drawing/2014/main" xmlns="" id="{CDA80BF4-9691-9FBE-C0F8-ADCBB6220AFC}"/>
+                <a16:creationId xmlns:a16="http://schemas.microsoft.com/office/drawing/2014/main" id="{CDA80BF4-9691-9FBE-C0F8-ADCBB6220AFC}"/>
               </a:ext>
             </a:extLst>
           </p:cNvPr>
@@ -4541,7 +4541,7 @@
           <p:cNvPr id="8" name="Graphic 7">
             <a:extLst>
               <a:ext uri="{FF2B5EF4-FFF2-40B4-BE49-F238E27FC236}">
-                <a16:creationId xmlns:a16="http://schemas.microsoft.com/office/drawing/2014/main" xmlns="" id="{D514C6BF-376E-43E8-881D-2E767426990A}"/>
+                <a16:creationId xmlns:a16="http://schemas.microsoft.com/office/drawing/2014/main" id="{D514C6BF-376E-43E8-881D-2E767426990A}"/>
               </a:ext>
             </a:extLst>
           </p:cNvPr>
@@ -4554,7 +4554,7 @@
           <a:blip r:embed="rId2">
             <a:extLst>
               <a:ext uri="{96DAC541-7B7A-43D3-8B79-37D633B846F1}">
-                <asvg:svgBlip xmlns:asvg="http://schemas.microsoft.com/office/drawing/2016/SVG/main" xmlns="" r:embed="rId3"/>
+                <asvg:svgBlip xmlns:asvg="http://schemas.microsoft.com/office/drawing/2016/SVG/main" r:embed="rId3"/>
               </a:ext>
             </a:extLst>
           </a:blip>
@@ -4576,7 +4576,7 @@
           <p:cNvPr id="2" name="Title 1">
             <a:extLst>
               <a:ext uri="{FF2B5EF4-FFF2-40B4-BE49-F238E27FC236}">
-                <a16:creationId xmlns:a16="http://schemas.microsoft.com/office/drawing/2014/main" xmlns="" id="{3F0A9B92-C2D0-466A-A680-A35832C452B3}"/>
+                <a16:creationId xmlns:a16="http://schemas.microsoft.com/office/drawing/2014/main" id="{3F0A9B92-C2D0-466A-A680-A35832C452B3}"/>
               </a:ext>
             </a:extLst>
           </p:cNvPr>
@@ -4619,7 +4619,7 @@
           <p:cNvPr id="3" name="Content Placeholder 2">
             <a:extLst>
               <a:ext uri="{FF2B5EF4-FFF2-40B4-BE49-F238E27FC236}">
-                <a16:creationId xmlns:a16="http://schemas.microsoft.com/office/drawing/2014/main" xmlns="" id="{2DA41CE6-5A88-4C5C-B2A4-6A5D2153B16F}"/>
+                <a16:creationId xmlns:a16="http://schemas.microsoft.com/office/drawing/2014/main" id="{2DA41CE6-5A88-4C5C-B2A4-6A5D2153B16F}"/>
               </a:ext>
             </a:extLst>
           </p:cNvPr>
@@ -4739,7 +4739,7 @@
           <p:cNvPr id="4" name="Date Placeholder 3">
             <a:extLst>
               <a:ext uri="{FF2B5EF4-FFF2-40B4-BE49-F238E27FC236}">
-                <a16:creationId xmlns:a16="http://schemas.microsoft.com/office/drawing/2014/main" xmlns="" id="{A39F5093-3C53-4152-B8FE-0522E0795269}"/>
+                <a16:creationId xmlns:a16="http://schemas.microsoft.com/office/drawing/2014/main" id="{A39F5093-3C53-4152-B8FE-0522E0795269}"/>
               </a:ext>
             </a:extLst>
           </p:cNvPr>
@@ -4776,7 +4776,7 @@
           <p:cNvPr id="5" name="Footer Placeholder 4">
             <a:extLst>
               <a:ext uri="{FF2B5EF4-FFF2-40B4-BE49-F238E27FC236}">
-                <a16:creationId xmlns:a16="http://schemas.microsoft.com/office/drawing/2014/main" xmlns="" id="{7727F11D-8AF8-44D6-A48B-D8C7779B8B08}"/>
+                <a16:creationId xmlns:a16="http://schemas.microsoft.com/office/drawing/2014/main" id="{7727F11D-8AF8-44D6-A48B-D8C7779B8B08}"/>
               </a:ext>
             </a:extLst>
           </p:cNvPr>
@@ -4813,7 +4813,7 @@
           <p:cNvPr id="6" name="Slide Number Placeholder 5">
             <a:extLst>
               <a:ext uri="{FF2B5EF4-FFF2-40B4-BE49-F238E27FC236}">
-                <a16:creationId xmlns:a16="http://schemas.microsoft.com/office/drawing/2014/main" xmlns="" id="{658C0879-6B0F-4AF6-A997-EC61DA8964AE}"/>
+                <a16:creationId xmlns:a16="http://schemas.microsoft.com/office/drawing/2014/main" id="{658C0879-6B0F-4AF6-A997-EC61DA8964AE}"/>
               </a:ext>
             </a:extLst>
           </p:cNvPr>
@@ -4882,7 +4882,7 @@
           <p:cNvPr id="2" name="Title 1">
             <a:extLst>
               <a:ext uri="{FF2B5EF4-FFF2-40B4-BE49-F238E27FC236}">
-                <a16:creationId xmlns:a16="http://schemas.microsoft.com/office/drawing/2014/main" xmlns="" id="{23A3821F-4537-4AE7-8829-C2E3AE60F6E1}"/>
+                <a16:creationId xmlns:a16="http://schemas.microsoft.com/office/drawing/2014/main" id="{23A3821F-4537-4AE7-8829-C2E3AE60F6E1}"/>
               </a:ext>
             </a:extLst>
           </p:cNvPr>
@@ -4928,7 +4928,7 @@
           <p:cNvPr id="3" name="Text Placeholder 2">
             <a:extLst>
               <a:ext uri="{FF2B5EF4-FFF2-40B4-BE49-F238E27FC236}">
-                <a16:creationId xmlns:a16="http://schemas.microsoft.com/office/drawing/2014/main" xmlns="" id="{92FD4279-EA62-4397-878A-73F4948DB176}"/>
+                <a16:creationId xmlns:a16="http://schemas.microsoft.com/office/drawing/2014/main" id="{92FD4279-EA62-4397-878A-73F4948DB176}"/>
               </a:ext>
             </a:extLst>
           </p:cNvPr>
@@ -5056,7 +5056,7 @@
           <p:cNvPr id="4" name="Date Placeholder 3">
             <a:extLst>
               <a:ext uri="{FF2B5EF4-FFF2-40B4-BE49-F238E27FC236}">
-                <a16:creationId xmlns:a16="http://schemas.microsoft.com/office/drawing/2014/main" xmlns="" id="{9C11EBF9-6826-475B-8079-C11128991BAE}"/>
+                <a16:creationId xmlns:a16="http://schemas.microsoft.com/office/drawing/2014/main" id="{9C11EBF9-6826-475B-8079-C11128991BAE}"/>
               </a:ext>
             </a:extLst>
           </p:cNvPr>
@@ -5093,7 +5093,7 @@
           <p:cNvPr id="5" name="Footer Placeholder 4">
             <a:extLst>
               <a:ext uri="{FF2B5EF4-FFF2-40B4-BE49-F238E27FC236}">
-                <a16:creationId xmlns:a16="http://schemas.microsoft.com/office/drawing/2014/main" xmlns="" id="{3FB726A3-DF54-47D2-8C3A-34FD43A19E8E}"/>
+                <a16:creationId xmlns:a16="http://schemas.microsoft.com/office/drawing/2014/main" id="{3FB726A3-DF54-47D2-8C3A-34FD43A19E8E}"/>
               </a:ext>
             </a:extLst>
           </p:cNvPr>
@@ -5130,7 +5130,7 @@
           <p:cNvPr id="6" name="Slide Number Placeholder 5">
             <a:extLst>
               <a:ext uri="{FF2B5EF4-FFF2-40B4-BE49-F238E27FC236}">
-                <a16:creationId xmlns:a16="http://schemas.microsoft.com/office/drawing/2014/main" xmlns="" id="{D0CD125A-4493-4967-9146-841D0EF3BC63}"/>
+                <a16:creationId xmlns:a16="http://schemas.microsoft.com/office/drawing/2014/main" id="{D0CD125A-4493-4967-9146-841D0EF3BC63}"/>
               </a:ext>
             </a:extLst>
           </p:cNvPr>
@@ -5164,7 +5164,7 @@
           <p:cNvPr id="7" name="Group 6">
             <a:extLst>
               <a:ext uri="{FF2B5EF4-FFF2-40B4-BE49-F238E27FC236}">
-                <a16:creationId xmlns:a16="http://schemas.microsoft.com/office/drawing/2014/main" xmlns="" id="{D7A1CF8B-3479-49A3-A30E-2F2ECE962075}"/>
+                <a16:creationId xmlns:a16="http://schemas.microsoft.com/office/drawing/2014/main" id="{D7A1CF8B-3479-49A3-A30E-2F2ECE962075}"/>
               </a:ext>
             </a:extLst>
           </p:cNvPr>
@@ -5184,7 +5184,7 @@
             <p:cNvPr id="14" name="Straight Connector 13">
               <a:extLst>
                 <a:ext uri="{FF2B5EF4-FFF2-40B4-BE49-F238E27FC236}">
-                  <a16:creationId xmlns:a16="http://schemas.microsoft.com/office/drawing/2014/main" xmlns="" id="{49FBD260-5143-4B12-B9F8-33E48D548909}"/>
+                  <a16:creationId xmlns:a16="http://schemas.microsoft.com/office/drawing/2014/main" id="{49FBD260-5143-4B12-B9F8-33E48D548909}"/>
                 </a:ext>
               </a:extLst>
             </p:cNvPr>
@@ -5225,7 +5225,7 @@
             <p:cNvPr id="23" name="Straight Connector 22">
               <a:extLst>
                 <a:ext uri="{FF2B5EF4-FFF2-40B4-BE49-F238E27FC236}">
-                  <a16:creationId xmlns:a16="http://schemas.microsoft.com/office/drawing/2014/main" xmlns="" id="{D87F08D6-2CA7-4A5A-BE34-07113DCA535D}"/>
+                  <a16:creationId xmlns:a16="http://schemas.microsoft.com/office/drawing/2014/main" id="{D87F08D6-2CA7-4A5A-BE34-07113DCA535D}"/>
                 </a:ext>
               </a:extLst>
             </p:cNvPr>
@@ -5305,7 +5305,7 @@
           <p:cNvPr id="2" name="Title 1">
             <a:extLst>
               <a:ext uri="{FF2B5EF4-FFF2-40B4-BE49-F238E27FC236}">
-                <a16:creationId xmlns:a16="http://schemas.microsoft.com/office/drawing/2014/main" xmlns="" id="{415B3628-62D7-4A6D-A79F-34DE91DBA31E}"/>
+                <a16:creationId xmlns:a16="http://schemas.microsoft.com/office/drawing/2014/main" id="{415B3628-62D7-4A6D-A79F-34DE91DBA31E}"/>
               </a:ext>
             </a:extLst>
           </p:cNvPr>
@@ -5348,7 +5348,7 @@
           <p:cNvPr id="3" name="Subtitle 2">
             <a:extLst>
               <a:ext uri="{FF2B5EF4-FFF2-40B4-BE49-F238E27FC236}">
-                <a16:creationId xmlns:a16="http://schemas.microsoft.com/office/drawing/2014/main" xmlns="" id="{55457758-A125-4CEA-A3D5-CBD010417BD2}"/>
+                <a16:creationId xmlns:a16="http://schemas.microsoft.com/office/drawing/2014/main" id="{55457758-A125-4CEA-A3D5-CBD010417BD2}"/>
               </a:ext>
             </a:extLst>
           </p:cNvPr>
@@ -5424,7 +5424,7 @@
           <p:cNvPr id="5" name="Graphic 4">
             <a:extLst>
               <a:ext uri="{FF2B5EF4-FFF2-40B4-BE49-F238E27FC236}">
-                <a16:creationId xmlns:a16="http://schemas.microsoft.com/office/drawing/2014/main" xmlns="" id="{F05D2CCB-CCFC-4A8A-ADA9-C1E4D13B9681}"/>
+                <a16:creationId xmlns:a16="http://schemas.microsoft.com/office/drawing/2014/main" id="{F05D2CCB-CCFC-4A8A-ADA9-C1E4D13B9681}"/>
               </a:ext>
             </a:extLst>
           </p:cNvPr>
@@ -5437,7 +5437,7 @@
           <a:blip r:embed="rId2">
             <a:extLst>
               <a:ext uri="{96DAC541-7B7A-43D3-8B79-37D633B846F1}">
-                <asvg:svgBlip xmlns:asvg="http://schemas.microsoft.com/office/drawing/2016/SVG/main" xmlns="" r:embed="rId3"/>
+                <asvg:svgBlip xmlns:asvg="http://schemas.microsoft.com/office/drawing/2016/SVG/main" r:embed="rId3"/>
               </a:ext>
             </a:extLst>
           </a:blip>
@@ -5498,7 +5498,7 @@
           <p:cNvPr id="2" name="Title 1">
             <a:extLst>
               <a:ext uri="{FF2B5EF4-FFF2-40B4-BE49-F238E27FC236}">
-                <a16:creationId xmlns:a16="http://schemas.microsoft.com/office/drawing/2014/main" xmlns="" id="{EE5C4E19-B78B-4E39-B661-7E6A2E6C5002}"/>
+                <a16:creationId xmlns:a16="http://schemas.microsoft.com/office/drawing/2014/main" id="{EE5C4E19-B78B-4E39-B661-7E6A2E6C5002}"/>
               </a:ext>
             </a:extLst>
           </p:cNvPr>
@@ -5539,7 +5539,7 @@
           <p:cNvPr id="3" name="Date Placeholder 2">
             <a:extLst>
               <a:ext uri="{FF2B5EF4-FFF2-40B4-BE49-F238E27FC236}">
-                <a16:creationId xmlns:a16="http://schemas.microsoft.com/office/drawing/2014/main" xmlns="" id="{7E085D26-FA83-4414-959E-98936A772670}"/>
+                <a16:creationId xmlns:a16="http://schemas.microsoft.com/office/drawing/2014/main" id="{7E085D26-FA83-4414-959E-98936A772670}"/>
               </a:ext>
             </a:extLst>
           </p:cNvPr>
@@ -5571,7 +5571,7 @@
           <p:cNvPr id="4" name="Footer Placeholder 3">
             <a:extLst>
               <a:ext uri="{FF2B5EF4-FFF2-40B4-BE49-F238E27FC236}">
-                <a16:creationId xmlns:a16="http://schemas.microsoft.com/office/drawing/2014/main" xmlns="" id="{1FB52E93-DE4C-4341-8D83-F0230E38B1A1}"/>
+                <a16:creationId xmlns:a16="http://schemas.microsoft.com/office/drawing/2014/main" id="{1FB52E93-DE4C-4341-8D83-F0230E38B1A1}"/>
               </a:ext>
             </a:extLst>
           </p:cNvPr>
@@ -5603,7 +5603,7 @@
           <p:cNvPr id="5" name="Slide Number Placeholder 4">
             <a:extLst>
               <a:ext uri="{FF2B5EF4-FFF2-40B4-BE49-F238E27FC236}">
-                <a16:creationId xmlns:a16="http://schemas.microsoft.com/office/drawing/2014/main" xmlns="" id="{AC467230-4A0F-4B18-8BA9-C3B2FDD59CB0}"/>
+                <a16:creationId xmlns:a16="http://schemas.microsoft.com/office/drawing/2014/main" id="{AC467230-4A0F-4B18-8BA9-C3B2FDD59CB0}"/>
               </a:ext>
             </a:extLst>
           </p:cNvPr>
@@ -5637,7 +5637,7 @@
           <p:cNvPr id="7" name="Chart Placeholder 6">
             <a:extLst>
               <a:ext uri="{FF2B5EF4-FFF2-40B4-BE49-F238E27FC236}">
-                <a16:creationId xmlns:a16="http://schemas.microsoft.com/office/drawing/2014/main" xmlns="" id="{08AF2DB4-A973-4307-B59C-6058A138835C}"/>
+                <a16:creationId xmlns:a16="http://schemas.microsoft.com/office/drawing/2014/main" id="{08AF2DB4-A973-4307-B59C-6058A138835C}"/>
               </a:ext>
             </a:extLst>
           </p:cNvPr>
@@ -5706,7 +5706,7 @@
           <p:cNvPr id="2" name="Title 1">
             <a:extLst>
               <a:ext uri="{FF2B5EF4-FFF2-40B4-BE49-F238E27FC236}">
-                <a16:creationId xmlns:a16="http://schemas.microsoft.com/office/drawing/2014/main" xmlns="" id="{EE5C4E19-B78B-4E39-B661-7E6A2E6C5002}"/>
+                <a16:creationId xmlns:a16="http://schemas.microsoft.com/office/drawing/2014/main" id="{EE5C4E19-B78B-4E39-B661-7E6A2E6C5002}"/>
               </a:ext>
             </a:extLst>
           </p:cNvPr>
@@ -5747,7 +5747,7 @@
           <p:cNvPr id="8" name="Table Placeholder 7">
             <a:extLst>
               <a:ext uri="{FF2B5EF4-FFF2-40B4-BE49-F238E27FC236}">
-                <a16:creationId xmlns:a16="http://schemas.microsoft.com/office/drawing/2014/main" xmlns="" id="{C3975522-461E-4D79-B5B9-BF9471B54688}"/>
+                <a16:creationId xmlns:a16="http://schemas.microsoft.com/office/drawing/2014/main" id="{C3975522-461E-4D79-B5B9-BF9471B54688}"/>
               </a:ext>
             </a:extLst>
           </p:cNvPr>
@@ -5781,7 +5781,7 @@
           <p:cNvPr id="3" name="Date Placeholder 2">
             <a:extLst>
               <a:ext uri="{FF2B5EF4-FFF2-40B4-BE49-F238E27FC236}">
-                <a16:creationId xmlns:a16="http://schemas.microsoft.com/office/drawing/2014/main" xmlns="" id="{7E085D26-FA83-4414-959E-98936A772670}"/>
+                <a16:creationId xmlns:a16="http://schemas.microsoft.com/office/drawing/2014/main" id="{7E085D26-FA83-4414-959E-98936A772670}"/>
               </a:ext>
             </a:extLst>
           </p:cNvPr>
@@ -5813,7 +5813,7 @@
           <p:cNvPr id="4" name="Footer Placeholder 3">
             <a:extLst>
               <a:ext uri="{FF2B5EF4-FFF2-40B4-BE49-F238E27FC236}">
-                <a16:creationId xmlns:a16="http://schemas.microsoft.com/office/drawing/2014/main" xmlns="" id="{1FB52E93-DE4C-4341-8D83-F0230E38B1A1}"/>
+                <a16:creationId xmlns:a16="http://schemas.microsoft.com/office/drawing/2014/main" id="{1FB52E93-DE4C-4341-8D83-F0230E38B1A1}"/>
               </a:ext>
             </a:extLst>
           </p:cNvPr>
@@ -5845,7 +5845,7 @@
           <p:cNvPr id="5" name="Slide Number Placeholder 4">
             <a:extLst>
               <a:ext uri="{FF2B5EF4-FFF2-40B4-BE49-F238E27FC236}">
-                <a16:creationId xmlns:a16="http://schemas.microsoft.com/office/drawing/2014/main" xmlns="" id="{AC467230-4A0F-4B18-8BA9-C3B2FDD59CB0}"/>
+                <a16:creationId xmlns:a16="http://schemas.microsoft.com/office/drawing/2014/main" id="{AC467230-4A0F-4B18-8BA9-C3B2FDD59CB0}"/>
               </a:ext>
             </a:extLst>
           </p:cNvPr>
@@ -5909,10 +5909,10 @@
           <p:cNvPr id="7" name="Graphic 6">
             <a:extLst>
               <a:ext uri="{FF2B5EF4-FFF2-40B4-BE49-F238E27FC236}">
-                <a16:creationId xmlns:a16="http://schemas.microsoft.com/office/drawing/2014/main" xmlns="" id="{AEE644D4-F9A4-4237-BD5C-4B97ABA9337E}"/>
+                <a16:creationId xmlns:a16="http://schemas.microsoft.com/office/drawing/2014/main" id="{AEE644D4-F9A4-4237-BD5C-4B97ABA9337E}"/>
               </a:ext>
               <a:ext uri="{C183D7F6-B498-43B3-948B-1728B52AA6E4}">
-                <adec:decorative xmlns:adec="http://schemas.microsoft.com/office/drawing/2017/decorative" xmlns="" val="1"/>
+                <adec:decorative xmlns:adec="http://schemas.microsoft.com/office/drawing/2017/decorative" val="1"/>
               </a:ext>
             </a:extLst>
           </p:cNvPr>
@@ -5925,7 +5925,7 @@
           <a:blip r:embed="rId2">
             <a:extLst>
               <a:ext uri="{96DAC541-7B7A-43D3-8B79-37D633B846F1}">
-                <asvg:svgBlip xmlns:asvg="http://schemas.microsoft.com/office/drawing/2016/SVG/main" xmlns="" r:embed="rId3"/>
+                <asvg:svgBlip xmlns:asvg="http://schemas.microsoft.com/office/drawing/2016/SVG/main" r:embed="rId3"/>
               </a:ext>
             </a:extLst>
           </a:blip>
@@ -5948,7 +5948,7 @@
           <p:cNvPr id="2" name="Title 1">
             <a:extLst>
               <a:ext uri="{FF2B5EF4-FFF2-40B4-BE49-F238E27FC236}">
-                <a16:creationId xmlns:a16="http://schemas.microsoft.com/office/drawing/2014/main" xmlns="" id="{C2FF67A8-55FA-435D-A18C-96D63D22B53E}"/>
+                <a16:creationId xmlns:a16="http://schemas.microsoft.com/office/drawing/2014/main" id="{C2FF67A8-55FA-435D-A18C-96D63D22B53E}"/>
               </a:ext>
             </a:extLst>
           </p:cNvPr>
@@ -5994,7 +5994,7 @@
           <p:cNvPr id="10" name="Subtitle 2">
             <a:extLst>
               <a:ext uri="{FF2B5EF4-FFF2-40B4-BE49-F238E27FC236}">
-                <a16:creationId xmlns:a16="http://schemas.microsoft.com/office/drawing/2014/main" xmlns="" id="{104828DA-5EC5-4A00-9A7B-CD9668EF24D1}"/>
+                <a16:creationId xmlns:a16="http://schemas.microsoft.com/office/drawing/2014/main" id="{104828DA-5EC5-4A00-9A7B-CD9668EF24D1}"/>
               </a:ext>
             </a:extLst>
           </p:cNvPr>
@@ -6072,7 +6072,7 @@
           <p:cNvPr id="3" name="Date Placeholder 2">
             <a:extLst>
               <a:ext uri="{FF2B5EF4-FFF2-40B4-BE49-F238E27FC236}">
-                <a16:creationId xmlns:a16="http://schemas.microsoft.com/office/drawing/2014/main" xmlns="" id="{D9303E9A-96BC-4283-A6E1-5948AEB119F4}"/>
+                <a16:creationId xmlns:a16="http://schemas.microsoft.com/office/drawing/2014/main" id="{D9303E9A-96BC-4283-A6E1-5948AEB119F4}"/>
               </a:ext>
             </a:extLst>
           </p:cNvPr>
@@ -6109,7 +6109,7 @@
           <p:cNvPr id="4" name="Footer Placeholder 3">
             <a:extLst>
               <a:ext uri="{FF2B5EF4-FFF2-40B4-BE49-F238E27FC236}">
-                <a16:creationId xmlns:a16="http://schemas.microsoft.com/office/drawing/2014/main" xmlns="" id="{45A19C49-052B-4D3E-B227-1D787463CE96}"/>
+                <a16:creationId xmlns:a16="http://schemas.microsoft.com/office/drawing/2014/main" id="{45A19C49-052B-4D3E-B227-1D787463CE96}"/>
               </a:ext>
             </a:extLst>
           </p:cNvPr>
@@ -6146,7 +6146,7 @@
           <p:cNvPr id="5" name="Slide Number Placeholder 4">
             <a:extLst>
               <a:ext uri="{FF2B5EF4-FFF2-40B4-BE49-F238E27FC236}">
-                <a16:creationId xmlns:a16="http://schemas.microsoft.com/office/drawing/2014/main" xmlns="" id="{4E5E724A-95F0-41B6-A77E-EDD067272C27}"/>
+                <a16:creationId xmlns:a16="http://schemas.microsoft.com/office/drawing/2014/main" id="{4E5E724A-95F0-41B6-A77E-EDD067272C27}"/>
               </a:ext>
             </a:extLst>
           </p:cNvPr>
@@ -6185,10 +6185,10 @@
           <p:cNvPr id="9" name="Straight Connector 8">
             <a:extLst>
               <a:ext uri="{FF2B5EF4-FFF2-40B4-BE49-F238E27FC236}">
-                <a16:creationId xmlns:a16="http://schemas.microsoft.com/office/drawing/2014/main" xmlns="" id="{BDAC7E4E-FE06-4E90-8107-6B543E5515ED}"/>
+                <a16:creationId xmlns:a16="http://schemas.microsoft.com/office/drawing/2014/main" id="{BDAC7E4E-FE06-4E90-8107-6B543E5515ED}"/>
               </a:ext>
               <a:ext uri="{C183D7F6-B498-43B3-948B-1728B52AA6E4}">
-                <adec:decorative xmlns:adec="http://schemas.microsoft.com/office/drawing/2017/decorative" xmlns="" val="1"/>
+                <adec:decorative xmlns:adec="http://schemas.microsoft.com/office/drawing/2017/decorative" val="1"/>
               </a:ext>
             </a:extLst>
           </p:cNvPr>
@@ -6264,7 +6264,7 @@
           <p:cNvPr id="2" name="Title 1">
             <a:extLst>
               <a:ext uri="{FF2B5EF4-FFF2-40B4-BE49-F238E27FC236}">
-                <a16:creationId xmlns:a16="http://schemas.microsoft.com/office/drawing/2014/main" xmlns="" id="{81CF3B5C-31C4-46BA-9FAD-72DF917A84DA}"/>
+                <a16:creationId xmlns:a16="http://schemas.microsoft.com/office/drawing/2014/main" id="{81CF3B5C-31C4-46BA-9FAD-72DF917A84DA}"/>
               </a:ext>
             </a:extLst>
           </p:cNvPr>
@@ -6310,7 +6310,7 @@
           <p:cNvPr id="11" name="Picture Placeholder 10">
             <a:extLst>
               <a:ext uri="{FF2B5EF4-FFF2-40B4-BE49-F238E27FC236}">
-                <a16:creationId xmlns:a16="http://schemas.microsoft.com/office/drawing/2014/main" xmlns="" id="{B0BDE76A-30A6-4268-9656-28A484C3DCC9}"/>
+                <a16:creationId xmlns:a16="http://schemas.microsoft.com/office/drawing/2014/main" id="{B0BDE76A-30A6-4268-9656-28A484C3DCC9}"/>
               </a:ext>
             </a:extLst>
           </p:cNvPr>
@@ -6349,7 +6349,7 @@
           <p:cNvPr id="3" name="Text Placeholder 2">
             <a:extLst>
               <a:ext uri="{FF2B5EF4-FFF2-40B4-BE49-F238E27FC236}">
-                <a16:creationId xmlns:a16="http://schemas.microsoft.com/office/drawing/2014/main" xmlns="" id="{B659CD1F-9DFB-4048-9B9B-2BD7D4EC6400}"/>
+                <a16:creationId xmlns:a16="http://schemas.microsoft.com/office/drawing/2014/main" id="{B659CD1F-9DFB-4048-9B9B-2BD7D4EC6400}"/>
               </a:ext>
             </a:extLst>
           </p:cNvPr>
@@ -6429,7 +6429,7 @@
           <p:cNvPr id="26" name="Text Placeholder 2">
             <a:extLst>
               <a:ext uri="{FF2B5EF4-FFF2-40B4-BE49-F238E27FC236}">
-                <a16:creationId xmlns:a16="http://schemas.microsoft.com/office/drawing/2014/main" xmlns="" id="{A02C0876-23F7-41FA-9AC9-721097D1A3CD}"/>
+                <a16:creationId xmlns:a16="http://schemas.microsoft.com/office/drawing/2014/main" id="{A02C0876-23F7-41FA-9AC9-721097D1A3CD}"/>
               </a:ext>
             </a:extLst>
           </p:cNvPr>
@@ -6509,7 +6509,7 @@
           <p:cNvPr id="17" name="Picture Placeholder 10">
             <a:extLst>
               <a:ext uri="{FF2B5EF4-FFF2-40B4-BE49-F238E27FC236}">
-                <a16:creationId xmlns:a16="http://schemas.microsoft.com/office/drawing/2014/main" xmlns="" id="{C4CA5C9C-91D5-44B1-A82A-A49732B4691A}"/>
+                <a16:creationId xmlns:a16="http://schemas.microsoft.com/office/drawing/2014/main" id="{C4CA5C9C-91D5-44B1-A82A-A49732B4691A}"/>
               </a:ext>
             </a:extLst>
           </p:cNvPr>
@@ -6548,7 +6548,7 @@
           <p:cNvPr id="23" name="Text Placeholder 2">
             <a:extLst>
               <a:ext uri="{FF2B5EF4-FFF2-40B4-BE49-F238E27FC236}">
-                <a16:creationId xmlns:a16="http://schemas.microsoft.com/office/drawing/2014/main" xmlns="" id="{572D0301-10F1-41B4-BEF8-C53FA4D66214}"/>
+                <a16:creationId xmlns:a16="http://schemas.microsoft.com/office/drawing/2014/main" id="{572D0301-10F1-41B4-BEF8-C53FA4D66214}"/>
               </a:ext>
             </a:extLst>
           </p:cNvPr>
@@ -6628,7 +6628,7 @@
           <p:cNvPr id="27" name="Text Placeholder 2">
             <a:extLst>
               <a:ext uri="{FF2B5EF4-FFF2-40B4-BE49-F238E27FC236}">
-                <a16:creationId xmlns:a16="http://schemas.microsoft.com/office/drawing/2014/main" xmlns="" id="{7ADEB263-F204-4A78-A5E0-7361EFE0B921}"/>
+                <a16:creationId xmlns:a16="http://schemas.microsoft.com/office/drawing/2014/main" id="{7ADEB263-F204-4A78-A5E0-7361EFE0B921}"/>
               </a:ext>
             </a:extLst>
           </p:cNvPr>
@@ -6708,7 +6708,7 @@
           <p:cNvPr id="18" name="Picture Placeholder 10">
             <a:extLst>
               <a:ext uri="{FF2B5EF4-FFF2-40B4-BE49-F238E27FC236}">
-                <a16:creationId xmlns:a16="http://schemas.microsoft.com/office/drawing/2014/main" xmlns="" id="{4EBC7D6F-397D-4C5A-AA62-F683F88531A2}"/>
+                <a16:creationId xmlns:a16="http://schemas.microsoft.com/office/drawing/2014/main" id="{4EBC7D6F-397D-4C5A-AA62-F683F88531A2}"/>
               </a:ext>
             </a:extLst>
           </p:cNvPr>
@@ -6748,7 +6748,7 @@
           <p:cNvPr id="24" name="Text Placeholder 2">
             <a:extLst>
               <a:ext uri="{FF2B5EF4-FFF2-40B4-BE49-F238E27FC236}">
-                <a16:creationId xmlns:a16="http://schemas.microsoft.com/office/drawing/2014/main" xmlns="" id="{E767B9DE-7410-43CC-90CF-52D67EF03D48}"/>
+                <a16:creationId xmlns:a16="http://schemas.microsoft.com/office/drawing/2014/main" id="{E767B9DE-7410-43CC-90CF-52D67EF03D48}"/>
               </a:ext>
             </a:extLst>
           </p:cNvPr>
@@ -6828,7 +6828,7 @@
           <p:cNvPr id="28" name="Text Placeholder 2">
             <a:extLst>
               <a:ext uri="{FF2B5EF4-FFF2-40B4-BE49-F238E27FC236}">
-                <a16:creationId xmlns:a16="http://schemas.microsoft.com/office/drawing/2014/main" xmlns="" id="{103678F5-B025-46E2-BD45-E77861487165}"/>
+                <a16:creationId xmlns:a16="http://schemas.microsoft.com/office/drawing/2014/main" id="{103678F5-B025-46E2-BD45-E77861487165}"/>
               </a:ext>
             </a:extLst>
           </p:cNvPr>
@@ -6908,7 +6908,7 @@
           <p:cNvPr id="19" name="Picture Placeholder 10">
             <a:extLst>
               <a:ext uri="{FF2B5EF4-FFF2-40B4-BE49-F238E27FC236}">
-                <a16:creationId xmlns:a16="http://schemas.microsoft.com/office/drawing/2014/main" xmlns="" id="{92E6B581-A522-4758-A9A4-8B9C7B860CF2}"/>
+                <a16:creationId xmlns:a16="http://schemas.microsoft.com/office/drawing/2014/main" id="{92E6B581-A522-4758-A9A4-8B9C7B860CF2}"/>
               </a:ext>
             </a:extLst>
           </p:cNvPr>
@@ -6947,7 +6947,7 @@
           <p:cNvPr id="25" name="Text Placeholder 2">
             <a:extLst>
               <a:ext uri="{FF2B5EF4-FFF2-40B4-BE49-F238E27FC236}">
-                <a16:creationId xmlns:a16="http://schemas.microsoft.com/office/drawing/2014/main" xmlns="" id="{E13DFE1F-4534-4828-990E-B052F51FC65C}"/>
+                <a16:creationId xmlns:a16="http://schemas.microsoft.com/office/drawing/2014/main" id="{E13DFE1F-4534-4828-990E-B052F51FC65C}"/>
               </a:ext>
             </a:extLst>
           </p:cNvPr>
@@ -7027,7 +7027,7 @@
           <p:cNvPr id="29" name="Text Placeholder 2">
             <a:extLst>
               <a:ext uri="{FF2B5EF4-FFF2-40B4-BE49-F238E27FC236}">
-                <a16:creationId xmlns:a16="http://schemas.microsoft.com/office/drawing/2014/main" xmlns="" id="{7E3F385B-4DD9-4F3C-A02B-179B9FA61292}"/>
+                <a16:creationId xmlns:a16="http://schemas.microsoft.com/office/drawing/2014/main" id="{7E3F385B-4DD9-4F3C-A02B-179B9FA61292}"/>
               </a:ext>
             </a:extLst>
           </p:cNvPr>
@@ -7107,7 +7107,7 @@
           <p:cNvPr id="7" name="Date Placeholder 6">
             <a:extLst>
               <a:ext uri="{FF2B5EF4-FFF2-40B4-BE49-F238E27FC236}">
-                <a16:creationId xmlns:a16="http://schemas.microsoft.com/office/drawing/2014/main" xmlns="" id="{F255C16C-AA88-4BBF-8040-11ECFED618E0}"/>
+                <a16:creationId xmlns:a16="http://schemas.microsoft.com/office/drawing/2014/main" id="{F255C16C-AA88-4BBF-8040-11ECFED618E0}"/>
               </a:ext>
             </a:extLst>
           </p:cNvPr>
@@ -7139,7 +7139,7 @@
           <p:cNvPr id="8" name="Footer Placeholder 7">
             <a:extLst>
               <a:ext uri="{FF2B5EF4-FFF2-40B4-BE49-F238E27FC236}">
-                <a16:creationId xmlns:a16="http://schemas.microsoft.com/office/drawing/2014/main" xmlns="" id="{CBE560E3-F935-488F-8F0E-191D7B6B54B8}"/>
+                <a16:creationId xmlns:a16="http://schemas.microsoft.com/office/drawing/2014/main" id="{CBE560E3-F935-488F-8F0E-191D7B6B54B8}"/>
               </a:ext>
             </a:extLst>
           </p:cNvPr>
@@ -7171,7 +7171,7 @@
           <p:cNvPr id="9" name="Slide Number Placeholder 8">
             <a:extLst>
               <a:ext uri="{FF2B5EF4-FFF2-40B4-BE49-F238E27FC236}">
-                <a16:creationId xmlns:a16="http://schemas.microsoft.com/office/drawing/2014/main" xmlns="" id="{9B9CD8B2-CC23-467F-B0EE-2CC06D6308BD}"/>
+                <a16:creationId xmlns:a16="http://schemas.microsoft.com/office/drawing/2014/main" id="{9B9CD8B2-CC23-467F-B0EE-2CC06D6308BD}"/>
               </a:ext>
             </a:extLst>
           </p:cNvPr>
@@ -7205,10 +7205,10 @@
           <p:cNvPr id="4" name="Group 3">
             <a:extLst>
               <a:ext uri="{FF2B5EF4-FFF2-40B4-BE49-F238E27FC236}">
-                <a16:creationId xmlns:a16="http://schemas.microsoft.com/office/drawing/2014/main" xmlns="" id="{73C911F2-9041-416A-B83C-F23B354E063B}"/>
+                <a16:creationId xmlns:a16="http://schemas.microsoft.com/office/drawing/2014/main" id="{73C911F2-9041-416A-B83C-F23B354E063B}"/>
               </a:ext>
               <a:ext uri="{C183D7F6-B498-43B3-948B-1728B52AA6E4}">
-                <adec:decorative xmlns:adec="http://schemas.microsoft.com/office/drawing/2017/decorative" xmlns="" val="1"/>
+                <adec:decorative xmlns:adec="http://schemas.microsoft.com/office/drawing/2017/decorative" val="1"/>
               </a:ext>
             </a:extLst>
           </p:cNvPr>
@@ -7228,7 +7228,7 @@
             <p:cNvPr id="10" name="Straight Connector 9">
               <a:extLst>
                 <a:ext uri="{FF2B5EF4-FFF2-40B4-BE49-F238E27FC236}">
-                  <a16:creationId xmlns:a16="http://schemas.microsoft.com/office/drawing/2014/main" xmlns="" id="{4E4B72DA-52CB-4D39-A342-8857B4D959B2}"/>
+                  <a16:creationId xmlns:a16="http://schemas.microsoft.com/office/drawing/2014/main" id="{4E4B72DA-52CB-4D39-A342-8857B4D959B2}"/>
                 </a:ext>
               </a:extLst>
             </p:cNvPr>
@@ -7269,7 +7269,7 @@
             <p:cNvPr id="15" name="Straight Connector 14">
               <a:extLst>
                 <a:ext uri="{FF2B5EF4-FFF2-40B4-BE49-F238E27FC236}">
-                  <a16:creationId xmlns:a16="http://schemas.microsoft.com/office/drawing/2014/main" xmlns="" id="{21D9BCDA-DFB7-41A4-A7C7-CEE86CEDCBE5}"/>
+                  <a16:creationId xmlns:a16="http://schemas.microsoft.com/office/drawing/2014/main" id="{21D9BCDA-DFB7-41A4-A7C7-CEE86CEDCBE5}"/>
                 </a:ext>
               </a:extLst>
             </p:cNvPr>
@@ -7351,10 +7351,10 @@
           <p:cNvPr id="4" name="Group 3">
             <a:extLst>
               <a:ext uri="{FF2B5EF4-FFF2-40B4-BE49-F238E27FC236}">
-                <a16:creationId xmlns:a16="http://schemas.microsoft.com/office/drawing/2014/main" xmlns="" id="{187AAB93-862D-455E-9E73-3D0DAEFDEDB4}"/>
+                <a16:creationId xmlns:a16="http://schemas.microsoft.com/office/drawing/2014/main" id="{187AAB93-862D-455E-9E73-3D0DAEFDEDB4}"/>
               </a:ext>
               <a:ext uri="{C183D7F6-B498-43B3-948B-1728B52AA6E4}">
-                <adec:decorative xmlns:adec="http://schemas.microsoft.com/office/drawing/2017/decorative" xmlns="" val="1"/>
+                <adec:decorative xmlns:adec="http://schemas.microsoft.com/office/drawing/2017/decorative" val="1"/>
               </a:ext>
             </a:extLst>
           </p:cNvPr>
@@ -7374,7 +7374,7 @@
             <p:cNvPr id="13" name="Graphic 12">
               <a:extLst>
                 <a:ext uri="{FF2B5EF4-FFF2-40B4-BE49-F238E27FC236}">
-                  <a16:creationId xmlns:a16="http://schemas.microsoft.com/office/drawing/2014/main" xmlns="" id="{B0DFD584-E5CF-41EF-B51E-679CE22DDF93}"/>
+                  <a16:creationId xmlns:a16="http://schemas.microsoft.com/office/drawing/2014/main" id="{B0DFD584-E5CF-41EF-B51E-679CE22DDF93}"/>
                 </a:ext>
               </a:extLst>
             </p:cNvPr>
@@ -7387,7 +7387,7 @@
             <a:blip r:embed="rId2">
               <a:extLst>
                 <a:ext uri="{96DAC541-7B7A-43D3-8B79-37D633B846F1}">
-                  <asvg:svgBlip xmlns:asvg="http://schemas.microsoft.com/office/drawing/2016/SVG/main" xmlns="" r:embed="rId3"/>
+                  <asvg:svgBlip xmlns:asvg="http://schemas.microsoft.com/office/drawing/2016/SVG/main" r:embed="rId3"/>
                 </a:ext>
               </a:extLst>
             </a:blip>
@@ -7410,7 +7410,7 @@
             <p:cNvPr id="14" name="Graphic 13">
               <a:extLst>
                 <a:ext uri="{FF2B5EF4-FFF2-40B4-BE49-F238E27FC236}">
-                  <a16:creationId xmlns:a16="http://schemas.microsoft.com/office/drawing/2014/main" xmlns="" id="{E5C02DDF-25A6-42C7-9525-F279CE2095C0}"/>
+                  <a16:creationId xmlns:a16="http://schemas.microsoft.com/office/drawing/2014/main" id="{E5C02DDF-25A6-42C7-9525-F279CE2095C0}"/>
                 </a:ext>
               </a:extLst>
             </p:cNvPr>
@@ -7423,7 +7423,7 @@
             <a:blip r:embed="rId4">
               <a:extLst>
                 <a:ext uri="{96DAC541-7B7A-43D3-8B79-37D633B846F1}">
-                  <asvg:svgBlip xmlns:asvg="http://schemas.microsoft.com/office/drawing/2016/SVG/main" xmlns="" r:embed="rId5"/>
+                  <asvg:svgBlip xmlns:asvg="http://schemas.microsoft.com/office/drawing/2016/SVG/main" r:embed="rId5"/>
                 </a:ext>
               </a:extLst>
             </a:blip>
@@ -7447,7 +7447,7 @@
           <p:cNvPr id="2" name="Title 1">
             <a:extLst>
               <a:ext uri="{FF2B5EF4-FFF2-40B4-BE49-F238E27FC236}">
-                <a16:creationId xmlns:a16="http://schemas.microsoft.com/office/drawing/2014/main" xmlns="" id="{81CF3B5C-31C4-46BA-9FAD-72DF917A84DA}"/>
+                <a16:creationId xmlns:a16="http://schemas.microsoft.com/office/drawing/2014/main" id="{81CF3B5C-31C4-46BA-9FAD-72DF917A84DA}"/>
               </a:ext>
             </a:extLst>
           </p:cNvPr>
@@ -7493,7 +7493,7 @@
           <p:cNvPr id="11" name="Picture Placeholder 10">
             <a:extLst>
               <a:ext uri="{FF2B5EF4-FFF2-40B4-BE49-F238E27FC236}">
-                <a16:creationId xmlns:a16="http://schemas.microsoft.com/office/drawing/2014/main" xmlns="" id="{B0BDE76A-30A6-4268-9656-28A484C3DCC9}"/>
+                <a16:creationId xmlns:a16="http://schemas.microsoft.com/office/drawing/2014/main" id="{B0BDE76A-30A6-4268-9656-28A484C3DCC9}"/>
               </a:ext>
             </a:extLst>
           </p:cNvPr>
@@ -7545,7 +7545,7 @@
           <p:cNvPr id="3" name="Text Placeholder 2">
             <a:extLst>
               <a:ext uri="{FF2B5EF4-FFF2-40B4-BE49-F238E27FC236}">
-                <a16:creationId xmlns:a16="http://schemas.microsoft.com/office/drawing/2014/main" xmlns="" id="{B659CD1F-9DFB-4048-9B9B-2BD7D4EC6400}"/>
+                <a16:creationId xmlns:a16="http://schemas.microsoft.com/office/drawing/2014/main" id="{B659CD1F-9DFB-4048-9B9B-2BD7D4EC6400}"/>
               </a:ext>
             </a:extLst>
           </p:cNvPr>
@@ -7625,7 +7625,7 @@
           <p:cNvPr id="26" name="Text Placeholder 2">
             <a:extLst>
               <a:ext uri="{FF2B5EF4-FFF2-40B4-BE49-F238E27FC236}">
-                <a16:creationId xmlns:a16="http://schemas.microsoft.com/office/drawing/2014/main" xmlns="" id="{A02C0876-23F7-41FA-9AC9-721097D1A3CD}"/>
+                <a16:creationId xmlns:a16="http://schemas.microsoft.com/office/drawing/2014/main" id="{A02C0876-23F7-41FA-9AC9-721097D1A3CD}"/>
               </a:ext>
             </a:extLst>
           </p:cNvPr>
@@ -7705,7 +7705,7 @@
           <p:cNvPr id="17" name="Picture Placeholder 10">
             <a:extLst>
               <a:ext uri="{FF2B5EF4-FFF2-40B4-BE49-F238E27FC236}">
-                <a16:creationId xmlns:a16="http://schemas.microsoft.com/office/drawing/2014/main" xmlns="" id="{C4CA5C9C-91D5-44B1-A82A-A49732B4691A}"/>
+                <a16:creationId xmlns:a16="http://schemas.microsoft.com/office/drawing/2014/main" id="{C4CA5C9C-91D5-44B1-A82A-A49732B4691A}"/>
               </a:ext>
             </a:extLst>
           </p:cNvPr>
@@ -7756,7 +7756,7 @@
           <p:cNvPr id="23" name="Text Placeholder 2">
             <a:extLst>
               <a:ext uri="{FF2B5EF4-FFF2-40B4-BE49-F238E27FC236}">
-                <a16:creationId xmlns:a16="http://schemas.microsoft.com/office/drawing/2014/main" xmlns="" id="{572D0301-10F1-41B4-BEF8-C53FA4D66214}"/>
+                <a16:creationId xmlns:a16="http://schemas.microsoft.com/office/drawing/2014/main" id="{572D0301-10F1-41B4-BEF8-C53FA4D66214}"/>
               </a:ext>
             </a:extLst>
           </p:cNvPr>
@@ -7836,7 +7836,7 @@
           <p:cNvPr id="27" name="Text Placeholder 2">
             <a:extLst>
               <a:ext uri="{FF2B5EF4-FFF2-40B4-BE49-F238E27FC236}">
-                <a16:creationId xmlns:a16="http://schemas.microsoft.com/office/drawing/2014/main" xmlns="" id="{7ADEB263-F204-4A78-A5E0-7361EFE0B921}"/>
+                <a16:creationId xmlns:a16="http://schemas.microsoft.com/office/drawing/2014/main" id="{7ADEB263-F204-4A78-A5E0-7361EFE0B921}"/>
               </a:ext>
             </a:extLst>
           </p:cNvPr>
@@ -7916,7 +7916,7 @@
           <p:cNvPr id="32" name="Picture Placeholder 10">
             <a:extLst>
               <a:ext uri="{FF2B5EF4-FFF2-40B4-BE49-F238E27FC236}">
-                <a16:creationId xmlns:a16="http://schemas.microsoft.com/office/drawing/2014/main" xmlns="" id="{1938DB4D-239F-4E8E-8802-0470B0131189}"/>
+                <a16:creationId xmlns:a16="http://schemas.microsoft.com/office/drawing/2014/main" id="{1938DB4D-239F-4E8E-8802-0470B0131189}"/>
               </a:ext>
             </a:extLst>
           </p:cNvPr>
@@ -7967,7 +7967,7 @@
           <p:cNvPr id="24" name="Text Placeholder 2">
             <a:extLst>
               <a:ext uri="{FF2B5EF4-FFF2-40B4-BE49-F238E27FC236}">
-                <a16:creationId xmlns:a16="http://schemas.microsoft.com/office/drawing/2014/main" xmlns="" id="{E767B9DE-7410-43CC-90CF-52D67EF03D48}"/>
+                <a16:creationId xmlns:a16="http://schemas.microsoft.com/office/drawing/2014/main" id="{E767B9DE-7410-43CC-90CF-52D67EF03D48}"/>
               </a:ext>
             </a:extLst>
           </p:cNvPr>
@@ -8047,7 +8047,7 @@
           <p:cNvPr id="28" name="Text Placeholder 2">
             <a:extLst>
               <a:ext uri="{FF2B5EF4-FFF2-40B4-BE49-F238E27FC236}">
-                <a16:creationId xmlns:a16="http://schemas.microsoft.com/office/drawing/2014/main" xmlns="" id="{103678F5-B025-46E2-BD45-E77861487165}"/>
+                <a16:creationId xmlns:a16="http://schemas.microsoft.com/office/drawing/2014/main" id="{103678F5-B025-46E2-BD45-E77861487165}"/>
               </a:ext>
             </a:extLst>
           </p:cNvPr>
@@ -8127,7 +8127,7 @@
           <p:cNvPr id="19" name="Picture Placeholder 10">
             <a:extLst>
               <a:ext uri="{FF2B5EF4-FFF2-40B4-BE49-F238E27FC236}">
-                <a16:creationId xmlns:a16="http://schemas.microsoft.com/office/drawing/2014/main" xmlns="" id="{92E6B581-A522-4758-A9A4-8B9C7B860CF2}"/>
+                <a16:creationId xmlns:a16="http://schemas.microsoft.com/office/drawing/2014/main" id="{92E6B581-A522-4758-A9A4-8B9C7B860CF2}"/>
               </a:ext>
             </a:extLst>
           </p:cNvPr>
@@ -8178,7 +8178,7 @@
           <p:cNvPr id="25" name="Text Placeholder 2">
             <a:extLst>
               <a:ext uri="{FF2B5EF4-FFF2-40B4-BE49-F238E27FC236}">
-                <a16:creationId xmlns:a16="http://schemas.microsoft.com/office/drawing/2014/main" xmlns="" id="{E13DFE1F-4534-4828-990E-B052F51FC65C}"/>
+                <a16:creationId xmlns:a16="http://schemas.microsoft.com/office/drawing/2014/main" id="{E13DFE1F-4534-4828-990E-B052F51FC65C}"/>
               </a:ext>
             </a:extLst>
           </p:cNvPr>
@@ -8258,7 +8258,7 @@
           <p:cNvPr id="29" name="Text Placeholder 2">
             <a:extLst>
               <a:ext uri="{FF2B5EF4-FFF2-40B4-BE49-F238E27FC236}">
-                <a16:creationId xmlns:a16="http://schemas.microsoft.com/office/drawing/2014/main" xmlns="" id="{7E3F385B-4DD9-4F3C-A02B-179B9FA61292}"/>
+                <a16:creationId xmlns:a16="http://schemas.microsoft.com/office/drawing/2014/main" id="{7E3F385B-4DD9-4F3C-A02B-179B9FA61292}"/>
               </a:ext>
             </a:extLst>
           </p:cNvPr>
@@ -8338,7 +8338,7 @@
           <p:cNvPr id="55" name="Picture Placeholder 10">
             <a:extLst>
               <a:ext uri="{FF2B5EF4-FFF2-40B4-BE49-F238E27FC236}">
-                <a16:creationId xmlns:a16="http://schemas.microsoft.com/office/drawing/2014/main" xmlns="" id="{1EBAEB1D-A7F9-4F90-B642-4277D3802BAB}"/>
+                <a16:creationId xmlns:a16="http://schemas.microsoft.com/office/drawing/2014/main" id="{1EBAEB1D-A7F9-4F90-B642-4277D3802BAB}"/>
               </a:ext>
             </a:extLst>
           </p:cNvPr>
@@ -8389,7 +8389,7 @@
           <p:cNvPr id="54" name="Text Placeholder 2">
             <a:extLst>
               <a:ext uri="{FF2B5EF4-FFF2-40B4-BE49-F238E27FC236}">
-                <a16:creationId xmlns:a16="http://schemas.microsoft.com/office/drawing/2014/main" xmlns="" id="{22930C5B-603C-494E-A467-8B394D01D406}"/>
+                <a16:creationId xmlns:a16="http://schemas.microsoft.com/office/drawing/2014/main" id="{22930C5B-603C-494E-A467-8B394D01D406}"/>
               </a:ext>
             </a:extLst>
           </p:cNvPr>
@@ -8469,7 +8469,7 @@
           <p:cNvPr id="62" name="Text Placeholder 2">
             <a:extLst>
               <a:ext uri="{FF2B5EF4-FFF2-40B4-BE49-F238E27FC236}">
-                <a16:creationId xmlns:a16="http://schemas.microsoft.com/office/drawing/2014/main" xmlns="" id="{540C455F-A23B-493F-B95E-AB485D91DA6A}"/>
+                <a16:creationId xmlns:a16="http://schemas.microsoft.com/office/drawing/2014/main" id="{540C455F-A23B-493F-B95E-AB485D91DA6A}"/>
               </a:ext>
             </a:extLst>
           </p:cNvPr>
@@ -8549,7 +8549,7 @@
           <p:cNvPr id="56" name="Picture Placeholder 10">
             <a:extLst>
               <a:ext uri="{FF2B5EF4-FFF2-40B4-BE49-F238E27FC236}">
-                <a16:creationId xmlns:a16="http://schemas.microsoft.com/office/drawing/2014/main" xmlns="" id="{9461A69E-14C8-4325-89AF-D4257C1C05BA}"/>
+                <a16:creationId xmlns:a16="http://schemas.microsoft.com/office/drawing/2014/main" id="{9461A69E-14C8-4325-89AF-D4257C1C05BA}"/>
               </a:ext>
             </a:extLst>
           </p:cNvPr>
@@ -8600,7 +8600,7 @@
           <p:cNvPr id="59" name="Text Placeholder 2">
             <a:extLst>
               <a:ext uri="{FF2B5EF4-FFF2-40B4-BE49-F238E27FC236}">
-                <a16:creationId xmlns:a16="http://schemas.microsoft.com/office/drawing/2014/main" xmlns="" id="{6D1C374C-DAF7-40EF-B279-4EC7A2AFE6A2}"/>
+                <a16:creationId xmlns:a16="http://schemas.microsoft.com/office/drawing/2014/main" id="{6D1C374C-DAF7-40EF-B279-4EC7A2AFE6A2}"/>
               </a:ext>
             </a:extLst>
           </p:cNvPr>
@@ -8680,7 +8680,7 @@
           <p:cNvPr id="63" name="Text Placeholder 2">
             <a:extLst>
               <a:ext uri="{FF2B5EF4-FFF2-40B4-BE49-F238E27FC236}">
-                <a16:creationId xmlns:a16="http://schemas.microsoft.com/office/drawing/2014/main" xmlns="" id="{421FF438-E4E8-4643-BCB3-4A1C12429042}"/>
+                <a16:creationId xmlns:a16="http://schemas.microsoft.com/office/drawing/2014/main" id="{421FF438-E4E8-4643-BCB3-4A1C12429042}"/>
               </a:ext>
             </a:extLst>
           </p:cNvPr>
@@ -8760,7 +8760,7 @@
           <p:cNvPr id="33" name="Picture Placeholder 10">
             <a:extLst>
               <a:ext uri="{FF2B5EF4-FFF2-40B4-BE49-F238E27FC236}">
-                <a16:creationId xmlns:a16="http://schemas.microsoft.com/office/drawing/2014/main" xmlns="" id="{E029C5CA-EDDA-4BF9-9051-8B09E98EE1E2}"/>
+                <a16:creationId xmlns:a16="http://schemas.microsoft.com/office/drawing/2014/main" id="{E029C5CA-EDDA-4BF9-9051-8B09E98EE1E2}"/>
               </a:ext>
             </a:extLst>
           </p:cNvPr>
@@ -8811,7 +8811,7 @@
           <p:cNvPr id="60" name="Text Placeholder 2">
             <a:extLst>
               <a:ext uri="{FF2B5EF4-FFF2-40B4-BE49-F238E27FC236}">
-                <a16:creationId xmlns:a16="http://schemas.microsoft.com/office/drawing/2014/main" xmlns="" id="{D4FEDD19-A7BA-45BB-93A0-F1E896C9F26D}"/>
+                <a16:creationId xmlns:a16="http://schemas.microsoft.com/office/drawing/2014/main" id="{D4FEDD19-A7BA-45BB-93A0-F1E896C9F26D}"/>
               </a:ext>
             </a:extLst>
           </p:cNvPr>
@@ -8891,7 +8891,7 @@
           <p:cNvPr id="64" name="Text Placeholder 2">
             <a:extLst>
               <a:ext uri="{FF2B5EF4-FFF2-40B4-BE49-F238E27FC236}">
-                <a16:creationId xmlns:a16="http://schemas.microsoft.com/office/drawing/2014/main" xmlns="" id="{A12F0175-7AEE-46B1-9590-D4A427680DC7}"/>
+                <a16:creationId xmlns:a16="http://schemas.microsoft.com/office/drawing/2014/main" id="{A12F0175-7AEE-46B1-9590-D4A427680DC7}"/>
               </a:ext>
             </a:extLst>
           </p:cNvPr>
@@ -8971,7 +8971,7 @@
           <p:cNvPr id="58" name="Picture Placeholder 10">
             <a:extLst>
               <a:ext uri="{FF2B5EF4-FFF2-40B4-BE49-F238E27FC236}">
-                <a16:creationId xmlns:a16="http://schemas.microsoft.com/office/drawing/2014/main" xmlns="" id="{622ED9F4-EB9B-4588-8501-BFECB846EE73}"/>
+                <a16:creationId xmlns:a16="http://schemas.microsoft.com/office/drawing/2014/main" id="{622ED9F4-EB9B-4588-8501-BFECB846EE73}"/>
               </a:ext>
             </a:extLst>
           </p:cNvPr>
@@ -9022,7 +9022,7 @@
           <p:cNvPr id="61" name="Text Placeholder 2">
             <a:extLst>
               <a:ext uri="{FF2B5EF4-FFF2-40B4-BE49-F238E27FC236}">
-                <a16:creationId xmlns:a16="http://schemas.microsoft.com/office/drawing/2014/main" xmlns="" id="{5026D39F-46AB-4680-9A52-F367344A3531}"/>
+                <a16:creationId xmlns:a16="http://schemas.microsoft.com/office/drawing/2014/main" id="{5026D39F-46AB-4680-9A52-F367344A3531}"/>
               </a:ext>
             </a:extLst>
           </p:cNvPr>
@@ -9102,7 +9102,7 @@
           <p:cNvPr id="65" name="Text Placeholder 2">
             <a:extLst>
               <a:ext uri="{FF2B5EF4-FFF2-40B4-BE49-F238E27FC236}">
-                <a16:creationId xmlns:a16="http://schemas.microsoft.com/office/drawing/2014/main" xmlns="" id="{04E11FE2-6320-4E8C-A5B3-8104AF329ADA}"/>
+                <a16:creationId xmlns:a16="http://schemas.microsoft.com/office/drawing/2014/main" id="{04E11FE2-6320-4E8C-A5B3-8104AF329ADA}"/>
               </a:ext>
             </a:extLst>
           </p:cNvPr>
@@ -9182,7 +9182,7 @@
           <p:cNvPr id="7" name="Date Placeholder 6">
             <a:extLst>
               <a:ext uri="{FF2B5EF4-FFF2-40B4-BE49-F238E27FC236}">
-                <a16:creationId xmlns:a16="http://schemas.microsoft.com/office/drawing/2014/main" xmlns="" id="{F255C16C-AA88-4BBF-8040-11ECFED618E0}"/>
+                <a16:creationId xmlns:a16="http://schemas.microsoft.com/office/drawing/2014/main" id="{F255C16C-AA88-4BBF-8040-11ECFED618E0}"/>
               </a:ext>
             </a:extLst>
           </p:cNvPr>
@@ -9218,7 +9218,7 @@
           <p:cNvPr id="8" name="Footer Placeholder 7">
             <a:extLst>
               <a:ext uri="{FF2B5EF4-FFF2-40B4-BE49-F238E27FC236}">
-                <a16:creationId xmlns:a16="http://schemas.microsoft.com/office/drawing/2014/main" xmlns="" id="{CBE560E3-F935-488F-8F0E-191D7B6B54B8}"/>
+                <a16:creationId xmlns:a16="http://schemas.microsoft.com/office/drawing/2014/main" id="{CBE560E3-F935-488F-8F0E-191D7B6B54B8}"/>
               </a:ext>
             </a:extLst>
           </p:cNvPr>
@@ -9254,7 +9254,7 @@
           <p:cNvPr id="9" name="Slide Number Placeholder 8">
             <a:extLst>
               <a:ext uri="{FF2B5EF4-FFF2-40B4-BE49-F238E27FC236}">
-                <a16:creationId xmlns:a16="http://schemas.microsoft.com/office/drawing/2014/main" xmlns="" id="{9B9CD8B2-CC23-467F-B0EE-2CC06D6308BD}"/>
+                <a16:creationId xmlns:a16="http://schemas.microsoft.com/office/drawing/2014/main" id="{9B9CD8B2-CC23-467F-B0EE-2CC06D6308BD}"/>
               </a:ext>
             </a:extLst>
           </p:cNvPr>
@@ -9327,10 +9327,10 @@
           <p:cNvPr id="6" name="Group 5">
             <a:extLst>
               <a:ext uri="{FF2B5EF4-FFF2-40B4-BE49-F238E27FC236}">
-                <a16:creationId xmlns:a16="http://schemas.microsoft.com/office/drawing/2014/main" xmlns="" id="{E786F69D-D4FA-4075-A7EC-8D31A184F630}"/>
+                <a16:creationId xmlns:a16="http://schemas.microsoft.com/office/drawing/2014/main" id="{E786F69D-D4FA-4075-A7EC-8D31A184F630}"/>
               </a:ext>
               <a:ext uri="{C183D7F6-B498-43B3-948B-1728B52AA6E4}">
-                <adec:decorative xmlns:adec="http://schemas.microsoft.com/office/drawing/2017/decorative" xmlns="" val="1"/>
+                <adec:decorative xmlns:adec="http://schemas.microsoft.com/office/drawing/2017/decorative" val="1"/>
               </a:ext>
             </a:extLst>
           </p:cNvPr>
@@ -9350,7 +9350,7 @@
             <p:cNvPr id="10" name="Straight Connector 9">
               <a:extLst>
                 <a:ext uri="{FF2B5EF4-FFF2-40B4-BE49-F238E27FC236}">
-                  <a16:creationId xmlns:a16="http://schemas.microsoft.com/office/drawing/2014/main" xmlns="" id="{66988B2D-0240-4256-8268-4B9FF1E72363}"/>
+                  <a16:creationId xmlns:a16="http://schemas.microsoft.com/office/drawing/2014/main" id="{66988B2D-0240-4256-8268-4B9FF1E72363}"/>
                 </a:ext>
               </a:extLst>
             </p:cNvPr>
@@ -9393,7 +9393,7 @@
             <p:cNvPr id="12" name="Straight Connector 11">
               <a:extLst>
                 <a:ext uri="{FF2B5EF4-FFF2-40B4-BE49-F238E27FC236}">
-                  <a16:creationId xmlns:a16="http://schemas.microsoft.com/office/drawing/2014/main" xmlns="" id="{D8EEAAE1-3D04-41C3-B2D2-B3BEF34C3B27}"/>
+                  <a16:creationId xmlns:a16="http://schemas.microsoft.com/office/drawing/2014/main" id="{D8EEAAE1-3D04-41C3-B2D2-B3BEF34C3B27}"/>
                 </a:ext>
               </a:extLst>
             </p:cNvPr>
@@ -9437,7 +9437,7 @@
           <p:cNvPr id="2" name="Title 1">
             <a:extLst>
               <a:ext uri="{FF2B5EF4-FFF2-40B4-BE49-F238E27FC236}">
-                <a16:creationId xmlns:a16="http://schemas.microsoft.com/office/drawing/2014/main" xmlns="" id="{EE5C4E19-B78B-4E39-B661-7E6A2E6C5002}"/>
+                <a16:creationId xmlns:a16="http://schemas.microsoft.com/office/drawing/2014/main" id="{EE5C4E19-B78B-4E39-B661-7E6A2E6C5002}"/>
               </a:ext>
             </a:extLst>
           </p:cNvPr>
@@ -9478,7 +9478,7 @@
           <p:cNvPr id="7" name="SmartArt Placeholder 6">
             <a:extLst>
               <a:ext uri="{FF2B5EF4-FFF2-40B4-BE49-F238E27FC236}">
-                <a16:creationId xmlns:a16="http://schemas.microsoft.com/office/drawing/2014/main" xmlns="" id="{156CA116-0F6E-4EE9-B34F-03BA07161A7A}"/>
+                <a16:creationId xmlns:a16="http://schemas.microsoft.com/office/drawing/2014/main" id="{156CA116-0F6E-4EE9-B34F-03BA07161A7A}"/>
               </a:ext>
             </a:extLst>
           </p:cNvPr>
@@ -9512,7 +9512,7 @@
           <p:cNvPr id="3" name="Date Placeholder 2">
             <a:extLst>
               <a:ext uri="{FF2B5EF4-FFF2-40B4-BE49-F238E27FC236}">
-                <a16:creationId xmlns:a16="http://schemas.microsoft.com/office/drawing/2014/main" xmlns="" id="{7E085D26-FA83-4414-959E-98936A772670}"/>
+                <a16:creationId xmlns:a16="http://schemas.microsoft.com/office/drawing/2014/main" id="{7E085D26-FA83-4414-959E-98936A772670}"/>
               </a:ext>
             </a:extLst>
           </p:cNvPr>
@@ -9544,7 +9544,7 @@
           <p:cNvPr id="4" name="Footer Placeholder 3">
             <a:extLst>
               <a:ext uri="{FF2B5EF4-FFF2-40B4-BE49-F238E27FC236}">
-                <a16:creationId xmlns:a16="http://schemas.microsoft.com/office/drawing/2014/main" xmlns="" id="{1FB52E93-DE4C-4341-8D83-F0230E38B1A1}"/>
+                <a16:creationId xmlns:a16="http://schemas.microsoft.com/office/drawing/2014/main" id="{1FB52E93-DE4C-4341-8D83-F0230E38B1A1}"/>
               </a:ext>
             </a:extLst>
           </p:cNvPr>
@@ -9576,7 +9576,7 @@
           <p:cNvPr id="5" name="Slide Number Placeholder 4">
             <a:extLst>
               <a:ext uri="{FF2B5EF4-FFF2-40B4-BE49-F238E27FC236}">
-                <a16:creationId xmlns:a16="http://schemas.microsoft.com/office/drawing/2014/main" xmlns="" id="{AC467230-4A0F-4B18-8BA9-C3B2FDD59CB0}"/>
+                <a16:creationId xmlns:a16="http://schemas.microsoft.com/office/drawing/2014/main" id="{AC467230-4A0F-4B18-8BA9-C3B2FDD59CB0}"/>
               </a:ext>
             </a:extLst>
           </p:cNvPr>
@@ -9640,10 +9640,10 @@
           <p:cNvPr id="12" name="Graphic 10">
             <a:extLst>
               <a:ext uri="{FF2B5EF4-FFF2-40B4-BE49-F238E27FC236}">
-                <a16:creationId xmlns:a16="http://schemas.microsoft.com/office/drawing/2014/main" xmlns="" id="{9D2AF524-D4B4-4A3A-9CE4-EDAFE1D5A37B}"/>
+                <a16:creationId xmlns:a16="http://schemas.microsoft.com/office/drawing/2014/main" id="{9D2AF524-D4B4-4A3A-9CE4-EDAFE1D5A37B}"/>
               </a:ext>
               <a:ext uri="{C183D7F6-B498-43B3-948B-1728B52AA6E4}">
-                <adec:decorative xmlns:adec="http://schemas.microsoft.com/office/drawing/2017/decorative" xmlns="" val="1"/>
+                <adec:decorative xmlns:adec="http://schemas.microsoft.com/office/drawing/2017/decorative" val="1"/>
               </a:ext>
             </a:extLst>
           </p:cNvPr>
@@ -9723,7 +9723,7 @@
           <p:cNvPr id="2" name="Title 1">
             <a:extLst>
               <a:ext uri="{FF2B5EF4-FFF2-40B4-BE49-F238E27FC236}">
-                <a16:creationId xmlns:a16="http://schemas.microsoft.com/office/drawing/2014/main" xmlns="" id="{6E3987A5-99A6-4B33-BAAF-53159635382E}"/>
+                <a16:creationId xmlns:a16="http://schemas.microsoft.com/office/drawing/2014/main" id="{6E3987A5-99A6-4B33-BAAF-53159635382E}"/>
               </a:ext>
             </a:extLst>
           </p:cNvPr>
@@ -9769,7 +9769,7 @@
           <p:cNvPr id="16" name="Text Placeholder 15">
             <a:extLst>
               <a:ext uri="{FF2B5EF4-FFF2-40B4-BE49-F238E27FC236}">
-                <a16:creationId xmlns:a16="http://schemas.microsoft.com/office/drawing/2014/main" xmlns="" id="{3BABF6CA-407C-4BF0-8234-1321A676E756}"/>
+                <a16:creationId xmlns:a16="http://schemas.microsoft.com/office/drawing/2014/main" id="{3BABF6CA-407C-4BF0-8234-1321A676E756}"/>
               </a:ext>
             </a:extLst>
           </p:cNvPr>
@@ -9810,7 +9810,7 @@
           <p:cNvPr id="17" name="Text Placeholder 15">
             <a:extLst>
               <a:ext uri="{FF2B5EF4-FFF2-40B4-BE49-F238E27FC236}">
-                <a16:creationId xmlns:a16="http://schemas.microsoft.com/office/drawing/2014/main" xmlns="" id="{76D8129B-5B68-421C-968C-3663C86EFC7C}"/>
+                <a16:creationId xmlns:a16="http://schemas.microsoft.com/office/drawing/2014/main" id="{76D8129B-5B68-421C-968C-3663C86EFC7C}"/>
               </a:ext>
             </a:extLst>
           </p:cNvPr>
@@ -9851,7 +9851,7 @@
           <p:cNvPr id="18" name="Text Placeholder 15">
             <a:extLst>
               <a:ext uri="{FF2B5EF4-FFF2-40B4-BE49-F238E27FC236}">
-                <a16:creationId xmlns:a16="http://schemas.microsoft.com/office/drawing/2014/main" xmlns="" id="{6C741DCA-8EBD-44F5-9D38-E938A628ADCD}"/>
+                <a16:creationId xmlns:a16="http://schemas.microsoft.com/office/drawing/2014/main" id="{6C741DCA-8EBD-44F5-9D38-E938A628ADCD}"/>
               </a:ext>
             </a:extLst>
           </p:cNvPr>
@@ -9892,7 +9892,7 @@
           <p:cNvPr id="19" name="Text Placeholder 15">
             <a:extLst>
               <a:ext uri="{FF2B5EF4-FFF2-40B4-BE49-F238E27FC236}">
-                <a16:creationId xmlns:a16="http://schemas.microsoft.com/office/drawing/2014/main" xmlns="" id="{5C43C6B1-A1BD-4A90-8B4B-F361C1BEDD26}"/>
+                <a16:creationId xmlns:a16="http://schemas.microsoft.com/office/drawing/2014/main" id="{5C43C6B1-A1BD-4A90-8B4B-F361C1BEDD26}"/>
               </a:ext>
             </a:extLst>
           </p:cNvPr>
@@ -9933,7 +9933,7 @@
           <p:cNvPr id="34" name="Text Placeholder 15">
             <a:extLst>
               <a:ext uri="{FF2B5EF4-FFF2-40B4-BE49-F238E27FC236}">
-                <a16:creationId xmlns:a16="http://schemas.microsoft.com/office/drawing/2014/main" xmlns="" id="{0C66E1BD-33F0-4B94-BF94-CD4698F85C3D}"/>
+                <a16:creationId xmlns:a16="http://schemas.microsoft.com/office/drawing/2014/main" id="{0C66E1BD-33F0-4B94-BF94-CD4698F85C3D}"/>
               </a:ext>
             </a:extLst>
           </p:cNvPr>
@@ -9977,7 +9977,7 @@
           <p:cNvPr id="35" name="Text Placeholder 15">
             <a:extLst>
               <a:ext uri="{FF2B5EF4-FFF2-40B4-BE49-F238E27FC236}">
-                <a16:creationId xmlns:a16="http://schemas.microsoft.com/office/drawing/2014/main" xmlns="" id="{2D4661B1-6559-407A-9AEC-A46A0570AE8F}"/>
+                <a16:creationId xmlns:a16="http://schemas.microsoft.com/office/drawing/2014/main" id="{2D4661B1-6559-407A-9AEC-A46A0570AE8F}"/>
               </a:ext>
             </a:extLst>
           </p:cNvPr>
@@ -10021,7 +10021,7 @@
           <p:cNvPr id="36" name="Text Placeholder 15">
             <a:extLst>
               <a:ext uri="{FF2B5EF4-FFF2-40B4-BE49-F238E27FC236}">
-                <a16:creationId xmlns:a16="http://schemas.microsoft.com/office/drawing/2014/main" xmlns="" id="{DCC983F7-6A25-42C0-811C-EA32138C5B80}"/>
+                <a16:creationId xmlns:a16="http://schemas.microsoft.com/office/drawing/2014/main" id="{DCC983F7-6A25-42C0-811C-EA32138C5B80}"/>
               </a:ext>
             </a:extLst>
           </p:cNvPr>
@@ -10065,7 +10065,7 @@
           <p:cNvPr id="37" name="Text Placeholder 15">
             <a:extLst>
               <a:ext uri="{FF2B5EF4-FFF2-40B4-BE49-F238E27FC236}">
-                <a16:creationId xmlns:a16="http://schemas.microsoft.com/office/drawing/2014/main" xmlns="" id="{E83DA0EB-27DD-416A-8DA5-4AFDC8587E5C}"/>
+                <a16:creationId xmlns:a16="http://schemas.microsoft.com/office/drawing/2014/main" id="{E83DA0EB-27DD-416A-8DA5-4AFDC8587E5C}"/>
               </a:ext>
             </a:extLst>
           </p:cNvPr>
@@ -10109,7 +10109,7 @@
           <p:cNvPr id="5" name="Date Placeholder 4">
             <a:extLst>
               <a:ext uri="{FF2B5EF4-FFF2-40B4-BE49-F238E27FC236}">
-                <a16:creationId xmlns:a16="http://schemas.microsoft.com/office/drawing/2014/main" xmlns="" id="{874DC36F-5D3E-439D-80B5-32633FC34434}"/>
+                <a16:creationId xmlns:a16="http://schemas.microsoft.com/office/drawing/2014/main" id="{874DC36F-5D3E-439D-80B5-32633FC34434}"/>
               </a:ext>
             </a:extLst>
           </p:cNvPr>
@@ -10145,7 +10145,7 @@
           <p:cNvPr id="6" name="Footer Placeholder 5">
             <a:extLst>
               <a:ext uri="{FF2B5EF4-FFF2-40B4-BE49-F238E27FC236}">
-                <a16:creationId xmlns:a16="http://schemas.microsoft.com/office/drawing/2014/main" xmlns="" id="{6C710A8A-CEC9-4787-A745-C28DD965F7DD}"/>
+                <a16:creationId xmlns:a16="http://schemas.microsoft.com/office/drawing/2014/main" id="{6C710A8A-CEC9-4787-A745-C28DD965F7DD}"/>
               </a:ext>
             </a:extLst>
           </p:cNvPr>
@@ -10182,7 +10182,7 @@
           <p:cNvPr id="7" name="Slide Number Placeholder 6">
             <a:extLst>
               <a:ext uri="{FF2B5EF4-FFF2-40B4-BE49-F238E27FC236}">
-                <a16:creationId xmlns:a16="http://schemas.microsoft.com/office/drawing/2014/main" xmlns="" id="{4162BD04-8F01-472A-9456-4702A2218BB5}"/>
+                <a16:creationId xmlns:a16="http://schemas.microsoft.com/office/drawing/2014/main" id="{4162BD04-8F01-472A-9456-4702A2218BB5}"/>
               </a:ext>
             </a:extLst>
           </p:cNvPr>
@@ -10221,10 +10221,10 @@
           <p:cNvPr id="3" name="Straight Connector 2">
             <a:extLst>
               <a:ext uri="{FF2B5EF4-FFF2-40B4-BE49-F238E27FC236}">
-                <a16:creationId xmlns:a16="http://schemas.microsoft.com/office/drawing/2014/main" xmlns="" id="{D3795F91-C721-4363-956D-756673AE7957}"/>
+                <a16:creationId xmlns:a16="http://schemas.microsoft.com/office/drawing/2014/main" id="{D3795F91-C721-4363-956D-756673AE7957}"/>
               </a:ext>
               <a:ext uri="{C183D7F6-B498-43B3-948B-1728B52AA6E4}">
-                <adec:decorative xmlns:adec="http://schemas.microsoft.com/office/drawing/2017/decorative" xmlns="" val="1"/>
+                <adec:decorative xmlns:adec="http://schemas.microsoft.com/office/drawing/2017/decorative" val="1"/>
               </a:ext>
             </a:extLst>
           </p:cNvPr>
@@ -10267,10 +10267,10 @@
           <p:cNvPr id="4" name="Straight Connector 3">
             <a:extLst>
               <a:ext uri="{FF2B5EF4-FFF2-40B4-BE49-F238E27FC236}">
-                <a16:creationId xmlns:a16="http://schemas.microsoft.com/office/drawing/2014/main" xmlns="" id="{8AC14461-E27D-413D-B31A-47B74646AF25}"/>
+                <a16:creationId xmlns:a16="http://schemas.microsoft.com/office/drawing/2014/main" id="{8AC14461-E27D-413D-B31A-47B74646AF25}"/>
               </a:ext>
               <a:ext uri="{C183D7F6-B498-43B3-948B-1728B52AA6E4}">
-                <adec:decorative xmlns:adec="http://schemas.microsoft.com/office/drawing/2017/decorative" xmlns="" val="1"/>
+                <adec:decorative xmlns:adec="http://schemas.microsoft.com/office/drawing/2017/decorative" val="1"/>
               </a:ext>
             </a:extLst>
           </p:cNvPr>
@@ -10313,10 +10313,10 @@
           <p:cNvPr id="8" name="Straight Connector 7">
             <a:extLst>
               <a:ext uri="{FF2B5EF4-FFF2-40B4-BE49-F238E27FC236}">
-                <a16:creationId xmlns:a16="http://schemas.microsoft.com/office/drawing/2014/main" xmlns="" id="{4D6AEA4C-7710-4829-BA87-8DD77F15932C}"/>
+                <a16:creationId xmlns:a16="http://schemas.microsoft.com/office/drawing/2014/main" id="{4D6AEA4C-7710-4829-BA87-8DD77F15932C}"/>
               </a:ext>
               <a:ext uri="{C183D7F6-B498-43B3-948B-1728B52AA6E4}">
-                <adec:decorative xmlns:adec="http://schemas.microsoft.com/office/drawing/2017/decorative" xmlns="" val="1"/>
+                <adec:decorative xmlns:adec="http://schemas.microsoft.com/office/drawing/2017/decorative" val="1"/>
               </a:ext>
             </a:extLst>
           </p:cNvPr>
@@ -10359,10 +10359,10 @@
           <p:cNvPr id="9" name="Straight Connector 8">
             <a:extLst>
               <a:ext uri="{FF2B5EF4-FFF2-40B4-BE49-F238E27FC236}">
-                <a16:creationId xmlns:a16="http://schemas.microsoft.com/office/drawing/2014/main" xmlns="" id="{E9BD473E-6203-491C-87AC-54AC0AB23333}"/>
+                <a16:creationId xmlns:a16="http://schemas.microsoft.com/office/drawing/2014/main" id="{E9BD473E-6203-491C-87AC-54AC0AB23333}"/>
               </a:ext>
               <a:ext uri="{C183D7F6-B498-43B3-948B-1728B52AA6E4}">
-                <adec:decorative xmlns:adec="http://schemas.microsoft.com/office/drawing/2017/decorative" xmlns="" val="1"/>
+                <adec:decorative xmlns:adec="http://schemas.microsoft.com/office/drawing/2017/decorative" val="1"/>
               </a:ext>
             </a:extLst>
           </p:cNvPr>
@@ -10435,7 +10435,7 @@
           <p:cNvPr id="8" name="Rektangel 16">
             <a:extLst>
               <a:ext uri="{FF2B5EF4-FFF2-40B4-BE49-F238E27FC236}">
-                <a16:creationId xmlns:a16="http://schemas.microsoft.com/office/drawing/2014/main" xmlns="" id="{F881663A-0DEF-0618-D7F8-4F86854339CC}"/>
+                <a16:creationId xmlns:a16="http://schemas.microsoft.com/office/drawing/2014/main" id="{F881663A-0DEF-0618-D7F8-4F86854339CC}"/>
               </a:ext>
             </a:extLst>
           </p:cNvPr>
@@ -10570,7 +10570,7 @@
           <p:cNvPr id="4" name="Platshållare för text 7">
             <a:extLst>
               <a:ext uri="{FF2B5EF4-FFF2-40B4-BE49-F238E27FC236}">
-                <a16:creationId xmlns:a16="http://schemas.microsoft.com/office/drawing/2014/main" xmlns="" id="{2A2A34A1-B5E3-62D8-E009-A5DCA332B9E3}"/>
+                <a16:creationId xmlns:a16="http://schemas.microsoft.com/office/drawing/2014/main" id="{2A2A34A1-B5E3-62D8-E009-A5DCA332B9E3}"/>
               </a:ext>
             </a:extLst>
           </p:cNvPr>
@@ -10629,7 +10629,7 @@
           <p:cNvPr id="5" name="Rubrik 1">
             <a:extLst>
               <a:ext uri="{FF2B5EF4-FFF2-40B4-BE49-F238E27FC236}">
-                <a16:creationId xmlns:a16="http://schemas.microsoft.com/office/drawing/2014/main" xmlns="" id="{4AC8A357-CD1E-F918-1660-D5F6770F07B3}"/>
+                <a16:creationId xmlns:a16="http://schemas.microsoft.com/office/drawing/2014/main" id="{4AC8A357-CD1E-F918-1660-D5F6770F07B3}"/>
               </a:ext>
             </a:extLst>
           </p:cNvPr>
@@ -10675,7 +10675,7 @@
           <p:cNvPr id="6" name="Underrubrik 2">
             <a:extLst>
               <a:ext uri="{FF2B5EF4-FFF2-40B4-BE49-F238E27FC236}">
-                <a16:creationId xmlns:a16="http://schemas.microsoft.com/office/drawing/2014/main" xmlns="" id="{C8F8CFA9-708B-7001-3DD3-8E23344B04F2}"/>
+                <a16:creationId xmlns:a16="http://schemas.microsoft.com/office/drawing/2014/main" id="{C8F8CFA9-708B-7001-3DD3-8E23344B04F2}"/>
               </a:ext>
             </a:extLst>
           </p:cNvPr>
@@ -10759,7 +10759,7 @@
           <p:cNvPr id="9" name="Bildobjekt 8">
             <a:extLst>
               <a:ext uri="{FF2B5EF4-FFF2-40B4-BE49-F238E27FC236}">
-                <a16:creationId xmlns:a16="http://schemas.microsoft.com/office/drawing/2014/main" xmlns="" id="{82F7D53B-F1CC-ED5F-6EA0-26F78961B079}"/>
+                <a16:creationId xmlns:a16="http://schemas.microsoft.com/office/drawing/2014/main" id="{82F7D53B-F1CC-ED5F-6EA0-26F78961B079}"/>
               </a:ext>
             </a:extLst>
           </p:cNvPr>
@@ -10795,7 +10795,7 @@
           <p:cNvPr id="3" name="Platshållare för bild 19">
             <a:extLst>
               <a:ext uri="{FF2B5EF4-FFF2-40B4-BE49-F238E27FC236}">
-                <a16:creationId xmlns:a16="http://schemas.microsoft.com/office/drawing/2014/main" xmlns="" id="{1EAE65AC-4F1E-D6E0-D1CC-5A1DD8977F13}"/>
+                <a16:creationId xmlns:a16="http://schemas.microsoft.com/office/drawing/2014/main" id="{1EAE65AC-4F1E-D6E0-D1CC-5A1DD8977F13}"/>
               </a:ext>
             </a:extLst>
           </p:cNvPr>
@@ -10919,7 +10919,7 @@
           <p:cNvPr id="2" name="Title 1">
             <a:extLst>
               <a:ext uri="{FF2B5EF4-FFF2-40B4-BE49-F238E27FC236}">
-                <a16:creationId xmlns:a16="http://schemas.microsoft.com/office/drawing/2014/main" xmlns="" id="{81CF3B5C-31C4-46BA-9FAD-72DF917A84DA}"/>
+                <a16:creationId xmlns:a16="http://schemas.microsoft.com/office/drawing/2014/main" id="{81CF3B5C-31C4-46BA-9FAD-72DF917A84DA}"/>
               </a:ext>
             </a:extLst>
           </p:cNvPr>
@@ -10965,7 +10965,7 @@
           <p:cNvPr id="3" name="Text Placeholder 2">
             <a:extLst>
               <a:ext uri="{FF2B5EF4-FFF2-40B4-BE49-F238E27FC236}">
-                <a16:creationId xmlns:a16="http://schemas.microsoft.com/office/drawing/2014/main" xmlns="" id="{B659CD1F-9DFB-4048-9B9B-2BD7D4EC6400}"/>
+                <a16:creationId xmlns:a16="http://schemas.microsoft.com/office/drawing/2014/main" id="{B659CD1F-9DFB-4048-9B9B-2BD7D4EC6400}"/>
               </a:ext>
             </a:extLst>
           </p:cNvPr>
@@ -11045,7 +11045,7 @@
           <p:cNvPr id="4" name="Content Placeholder 3">
             <a:extLst>
               <a:ext uri="{FF2B5EF4-FFF2-40B4-BE49-F238E27FC236}">
-                <a16:creationId xmlns:a16="http://schemas.microsoft.com/office/drawing/2014/main" xmlns="" id="{AC9B20CF-6B91-4562-B799-0ABDAEBC0D2A}"/>
+                <a16:creationId xmlns:a16="http://schemas.microsoft.com/office/drawing/2014/main" id="{AC9B20CF-6B91-4562-B799-0ABDAEBC0D2A}"/>
               </a:ext>
             </a:extLst>
           </p:cNvPr>
@@ -11145,7 +11145,7 @@
           <p:cNvPr id="5" name="Text Placeholder 4">
             <a:extLst>
               <a:ext uri="{FF2B5EF4-FFF2-40B4-BE49-F238E27FC236}">
-                <a16:creationId xmlns:a16="http://schemas.microsoft.com/office/drawing/2014/main" xmlns="" id="{B374FC39-67F6-42EA-BCD1-F69AE2F0F22D}"/>
+                <a16:creationId xmlns:a16="http://schemas.microsoft.com/office/drawing/2014/main" id="{B374FC39-67F6-42EA-BCD1-F69AE2F0F22D}"/>
               </a:ext>
             </a:extLst>
           </p:cNvPr>
@@ -11234,7 +11234,7 @@
           <p:cNvPr id="6" name="Content Placeholder 5">
             <a:extLst>
               <a:ext uri="{FF2B5EF4-FFF2-40B4-BE49-F238E27FC236}">
-                <a16:creationId xmlns:a16="http://schemas.microsoft.com/office/drawing/2014/main" xmlns="" id="{B36EE64B-44BF-4634-97BC-5ED74C6DF280}"/>
+                <a16:creationId xmlns:a16="http://schemas.microsoft.com/office/drawing/2014/main" id="{B36EE64B-44BF-4634-97BC-5ED74C6DF280}"/>
               </a:ext>
             </a:extLst>
           </p:cNvPr>
@@ -11334,7 +11334,7 @@
           <p:cNvPr id="7" name="Date Placeholder 6">
             <a:extLst>
               <a:ext uri="{FF2B5EF4-FFF2-40B4-BE49-F238E27FC236}">
-                <a16:creationId xmlns:a16="http://schemas.microsoft.com/office/drawing/2014/main" xmlns="" id="{F255C16C-AA88-4BBF-8040-11ECFED618E0}"/>
+                <a16:creationId xmlns:a16="http://schemas.microsoft.com/office/drawing/2014/main" id="{F255C16C-AA88-4BBF-8040-11ECFED618E0}"/>
               </a:ext>
             </a:extLst>
           </p:cNvPr>
@@ -11366,7 +11366,7 @@
           <p:cNvPr id="8" name="Footer Placeholder 7">
             <a:extLst>
               <a:ext uri="{FF2B5EF4-FFF2-40B4-BE49-F238E27FC236}">
-                <a16:creationId xmlns:a16="http://schemas.microsoft.com/office/drawing/2014/main" xmlns="" id="{CBE560E3-F935-488F-8F0E-191D7B6B54B8}"/>
+                <a16:creationId xmlns:a16="http://schemas.microsoft.com/office/drawing/2014/main" id="{CBE560E3-F935-488F-8F0E-191D7B6B54B8}"/>
               </a:ext>
             </a:extLst>
           </p:cNvPr>
@@ -11398,7 +11398,7 @@
           <p:cNvPr id="9" name="Slide Number Placeholder 8">
             <a:extLst>
               <a:ext uri="{FF2B5EF4-FFF2-40B4-BE49-F238E27FC236}">
-                <a16:creationId xmlns:a16="http://schemas.microsoft.com/office/drawing/2014/main" xmlns="" id="{9B9CD8B2-CC23-467F-B0EE-2CC06D6308BD}"/>
+                <a16:creationId xmlns:a16="http://schemas.microsoft.com/office/drawing/2014/main" id="{9B9CD8B2-CC23-467F-B0EE-2CC06D6308BD}"/>
               </a:ext>
             </a:extLst>
           </p:cNvPr>
@@ -11432,7 +11432,7 @@
           <p:cNvPr id="11" name="Graphic 10">
             <a:extLst>
               <a:ext uri="{FF2B5EF4-FFF2-40B4-BE49-F238E27FC236}">
-                <a16:creationId xmlns:a16="http://schemas.microsoft.com/office/drawing/2014/main" xmlns="" id="{EE24E1DB-1F20-4C28-8069-D9219D1F8BBD}"/>
+                <a16:creationId xmlns:a16="http://schemas.microsoft.com/office/drawing/2014/main" id="{EE24E1DB-1F20-4C28-8069-D9219D1F8BBD}"/>
               </a:ext>
             </a:extLst>
           </p:cNvPr>
@@ -11445,7 +11445,7 @@
           <a:blip r:embed="rId2">
             <a:extLst>
               <a:ext uri="{96DAC541-7B7A-43D3-8B79-37D633B846F1}">
-                <asvg:svgBlip xmlns:asvg="http://schemas.microsoft.com/office/drawing/2016/SVG/main" xmlns="" r:embed="rId3"/>
+                <asvg:svgBlip xmlns:asvg="http://schemas.microsoft.com/office/drawing/2016/SVG/main" r:embed="rId3"/>
               </a:ext>
             </a:extLst>
           </a:blip>
@@ -11502,7 +11502,7 @@
           <p:cNvPr id="2" name="Title 1">
             <a:extLst>
               <a:ext uri="{FF2B5EF4-FFF2-40B4-BE49-F238E27FC236}">
-                <a16:creationId xmlns:a16="http://schemas.microsoft.com/office/drawing/2014/main" xmlns="" id="{81CF3B5C-31C4-46BA-9FAD-72DF917A84DA}"/>
+                <a16:creationId xmlns:a16="http://schemas.microsoft.com/office/drawing/2014/main" id="{81CF3B5C-31C4-46BA-9FAD-72DF917A84DA}"/>
               </a:ext>
             </a:extLst>
           </p:cNvPr>
@@ -11548,7 +11548,7 @@
           <p:cNvPr id="3" name="Text Placeholder 2">
             <a:extLst>
               <a:ext uri="{FF2B5EF4-FFF2-40B4-BE49-F238E27FC236}">
-                <a16:creationId xmlns:a16="http://schemas.microsoft.com/office/drawing/2014/main" xmlns="" id="{B659CD1F-9DFB-4048-9B9B-2BD7D4EC6400}"/>
+                <a16:creationId xmlns:a16="http://schemas.microsoft.com/office/drawing/2014/main" id="{B659CD1F-9DFB-4048-9B9B-2BD7D4EC6400}"/>
               </a:ext>
             </a:extLst>
           </p:cNvPr>
@@ -11628,7 +11628,7 @@
           <p:cNvPr id="4" name="Content Placeholder 3">
             <a:extLst>
               <a:ext uri="{FF2B5EF4-FFF2-40B4-BE49-F238E27FC236}">
-                <a16:creationId xmlns:a16="http://schemas.microsoft.com/office/drawing/2014/main" xmlns="" id="{AC9B20CF-6B91-4562-B799-0ABDAEBC0D2A}"/>
+                <a16:creationId xmlns:a16="http://schemas.microsoft.com/office/drawing/2014/main" id="{AC9B20CF-6B91-4562-B799-0ABDAEBC0D2A}"/>
               </a:ext>
             </a:extLst>
           </p:cNvPr>
@@ -11728,7 +11728,7 @@
           <p:cNvPr id="5" name="Text Placeholder 4">
             <a:extLst>
               <a:ext uri="{FF2B5EF4-FFF2-40B4-BE49-F238E27FC236}">
-                <a16:creationId xmlns:a16="http://schemas.microsoft.com/office/drawing/2014/main" xmlns="" id="{B374FC39-67F6-42EA-BCD1-F69AE2F0F22D}"/>
+                <a16:creationId xmlns:a16="http://schemas.microsoft.com/office/drawing/2014/main" id="{B374FC39-67F6-42EA-BCD1-F69AE2F0F22D}"/>
               </a:ext>
             </a:extLst>
           </p:cNvPr>
@@ -11817,7 +11817,7 @@
           <p:cNvPr id="6" name="Content Placeholder 5">
             <a:extLst>
               <a:ext uri="{FF2B5EF4-FFF2-40B4-BE49-F238E27FC236}">
-                <a16:creationId xmlns:a16="http://schemas.microsoft.com/office/drawing/2014/main" xmlns="" id="{B36EE64B-44BF-4634-97BC-5ED74C6DF280}"/>
+                <a16:creationId xmlns:a16="http://schemas.microsoft.com/office/drawing/2014/main" id="{B36EE64B-44BF-4634-97BC-5ED74C6DF280}"/>
               </a:ext>
             </a:extLst>
           </p:cNvPr>
@@ -11918,7 +11918,7 @@
           <p:cNvPr id="21" name="Text Placeholder 2">
             <a:extLst>
               <a:ext uri="{FF2B5EF4-FFF2-40B4-BE49-F238E27FC236}">
-                <a16:creationId xmlns:a16="http://schemas.microsoft.com/office/drawing/2014/main" xmlns="" id="{1F60A771-8BBC-4565-AB09-402DA7CB2780}"/>
+                <a16:creationId xmlns:a16="http://schemas.microsoft.com/office/drawing/2014/main" id="{1F60A771-8BBC-4565-AB09-402DA7CB2780}"/>
               </a:ext>
             </a:extLst>
           </p:cNvPr>
@@ -11998,7 +11998,7 @@
           <p:cNvPr id="22" name="Content Placeholder 3">
             <a:extLst>
               <a:ext uri="{FF2B5EF4-FFF2-40B4-BE49-F238E27FC236}">
-                <a16:creationId xmlns:a16="http://schemas.microsoft.com/office/drawing/2014/main" xmlns="" id="{C464A9BD-B815-4632-8F54-6EB70E48BAFF}"/>
+                <a16:creationId xmlns:a16="http://schemas.microsoft.com/office/drawing/2014/main" id="{C464A9BD-B815-4632-8F54-6EB70E48BAFF}"/>
               </a:ext>
             </a:extLst>
           </p:cNvPr>
@@ -12098,7 +12098,7 @@
           <p:cNvPr id="7" name="Date Placeholder 6">
             <a:extLst>
               <a:ext uri="{FF2B5EF4-FFF2-40B4-BE49-F238E27FC236}">
-                <a16:creationId xmlns:a16="http://schemas.microsoft.com/office/drawing/2014/main" xmlns="" id="{F255C16C-AA88-4BBF-8040-11ECFED618E0}"/>
+                <a16:creationId xmlns:a16="http://schemas.microsoft.com/office/drawing/2014/main" id="{F255C16C-AA88-4BBF-8040-11ECFED618E0}"/>
               </a:ext>
             </a:extLst>
           </p:cNvPr>
@@ -12130,7 +12130,7 @@
           <p:cNvPr id="8" name="Footer Placeholder 7">
             <a:extLst>
               <a:ext uri="{FF2B5EF4-FFF2-40B4-BE49-F238E27FC236}">
-                <a16:creationId xmlns:a16="http://schemas.microsoft.com/office/drawing/2014/main" xmlns="" id="{CBE560E3-F935-488F-8F0E-191D7B6B54B8}"/>
+                <a16:creationId xmlns:a16="http://schemas.microsoft.com/office/drawing/2014/main" id="{CBE560E3-F935-488F-8F0E-191D7B6B54B8}"/>
               </a:ext>
             </a:extLst>
           </p:cNvPr>
@@ -12162,7 +12162,7 @@
           <p:cNvPr id="9" name="Slide Number Placeholder 8">
             <a:extLst>
               <a:ext uri="{FF2B5EF4-FFF2-40B4-BE49-F238E27FC236}">
-                <a16:creationId xmlns:a16="http://schemas.microsoft.com/office/drawing/2014/main" xmlns="" id="{9B9CD8B2-CC23-467F-B0EE-2CC06D6308BD}"/>
+                <a16:creationId xmlns:a16="http://schemas.microsoft.com/office/drawing/2014/main" id="{9B9CD8B2-CC23-467F-B0EE-2CC06D6308BD}"/>
               </a:ext>
             </a:extLst>
           </p:cNvPr>
@@ -12196,10 +12196,10 @@
           <p:cNvPr id="10" name="Group 9">
             <a:extLst>
               <a:ext uri="{FF2B5EF4-FFF2-40B4-BE49-F238E27FC236}">
-                <a16:creationId xmlns:a16="http://schemas.microsoft.com/office/drawing/2014/main" xmlns="" id="{B2368EF4-1233-48C7-8DB5-75844BFCD594}"/>
+                <a16:creationId xmlns:a16="http://schemas.microsoft.com/office/drawing/2014/main" id="{B2368EF4-1233-48C7-8DB5-75844BFCD594}"/>
               </a:ext>
               <a:ext uri="{C183D7F6-B498-43B3-948B-1728B52AA6E4}">
-                <adec:decorative xmlns:adec="http://schemas.microsoft.com/office/drawing/2017/decorative" xmlns="" val="1"/>
+                <adec:decorative xmlns:adec="http://schemas.microsoft.com/office/drawing/2017/decorative" val="1"/>
               </a:ext>
             </a:extLst>
           </p:cNvPr>
@@ -12219,7 +12219,7 @@
             <p:cNvPr id="16" name="Straight Connector 15">
               <a:extLst>
                 <a:ext uri="{FF2B5EF4-FFF2-40B4-BE49-F238E27FC236}">
-                  <a16:creationId xmlns:a16="http://schemas.microsoft.com/office/drawing/2014/main" xmlns="" id="{463D7850-C2A6-43CE-BBE4-8E81A0A593BF}"/>
+                  <a16:creationId xmlns:a16="http://schemas.microsoft.com/office/drawing/2014/main" id="{463D7850-C2A6-43CE-BBE4-8E81A0A593BF}"/>
                 </a:ext>
               </a:extLst>
             </p:cNvPr>
@@ -12262,7 +12262,7 @@
             <p:cNvPr id="20" name="Straight Connector 19">
               <a:extLst>
                 <a:ext uri="{FF2B5EF4-FFF2-40B4-BE49-F238E27FC236}">
-                  <a16:creationId xmlns:a16="http://schemas.microsoft.com/office/drawing/2014/main" xmlns="" id="{EBAD3E03-2E3B-440C-9105-6F9D33006D66}"/>
+                  <a16:creationId xmlns:a16="http://schemas.microsoft.com/office/drawing/2014/main" id="{EBAD3E03-2E3B-440C-9105-6F9D33006D66}"/>
                 </a:ext>
               </a:extLst>
             </p:cNvPr>
@@ -12336,7 +12336,7 @@
           <p:cNvPr id="2" name="Title 1">
             <a:extLst>
               <a:ext uri="{FF2B5EF4-FFF2-40B4-BE49-F238E27FC236}">
-                <a16:creationId xmlns:a16="http://schemas.microsoft.com/office/drawing/2014/main" xmlns="" id="{23A3821F-4537-4AE7-8829-C2E3AE60F6E1}"/>
+                <a16:creationId xmlns:a16="http://schemas.microsoft.com/office/drawing/2014/main" id="{23A3821F-4537-4AE7-8829-C2E3AE60F6E1}"/>
               </a:ext>
             </a:extLst>
           </p:cNvPr>
@@ -12382,7 +12382,7 @@
           <p:cNvPr id="3" name="Text Placeholder 2">
             <a:extLst>
               <a:ext uri="{FF2B5EF4-FFF2-40B4-BE49-F238E27FC236}">
-                <a16:creationId xmlns:a16="http://schemas.microsoft.com/office/drawing/2014/main" xmlns="" id="{92FD4279-EA62-4397-878A-73F4948DB176}"/>
+                <a16:creationId xmlns:a16="http://schemas.microsoft.com/office/drawing/2014/main" id="{92FD4279-EA62-4397-878A-73F4948DB176}"/>
               </a:ext>
             </a:extLst>
           </p:cNvPr>
@@ -12510,7 +12510,7 @@
           <p:cNvPr id="4" name="Group 3">
             <a:extLst>
               <a:ext uri="{FF2B5EF4-FFF2-40B4-BE49-F238E27FC236}">
-                <a16:creationId xmlns:a16="http://schemas.microsoft.com/office/drawing/2014/main" xmlns="" id="{D74AA03A-263D-4B5F-B05B-7D6923A9A4D3}"/>
+                <a16:creationId xmlns:a16="http://schemas.microsoft.com/office/drawing/2014/main" id="{D74AA03A-263D-4B5F-B05B-7D6923A9A4D3}"/>
               </a:ext>
             </a:extLst>
           </p:cNvPr>
@@ -12530,7 +12530,7 @@
             <p:cNvPr id="23" name="Straight Connector 22">
               <a:extLst>
                 <a:ext uri="{FF2B5EF4-FFF2-40B4-BE49-F238E27FC236}">
-                  <a16:creationId xmlns:a16="http://schemas.microsoft.com/office/drawing/2014/main" xmlns="" id="{D87F08D6-2CA7-4A5A-BE34-07113DCA535D}"/>
+                  <a16:creationId xmlns:a16="http://schemas.microsoft.com/office/drawing/2014/main" id="{D87F08D6-2CA7-4A5A-BE34-07113DCA535D}"/>
                 </a:ext>
               </a:extLst>
             </p:cNvPr>
@@ -12573,7 +12573,7 @@
             <p:cNvPr id="12" name="Straight Connector 11">
               <a:extLst>
                 <a:ext uri="{FF2B5EF4-FFF2-40B4-BE49-F238E27FC236}">
-                  <a16:creationId xmlns:a16="http://schemas.microsoft.com/office/drawing/2014/main" xmlns="" id="{A768C87F-B9C3-4DFF-8454-F3F52CE4346B}"/>
+                  <a16:creationId xmlns:a16="http://schemas.microsoft.com/office/drawing/2014/main" id="{A768C87F-B9C3-4DFF-8454-F3F52CE4346B}"/>
                 </a:ext>
               </a:extLst>
             </p:cNvPr>
@@ -12617,7 +12617,7 @@
           <p:cNvPr id="21" name="Date Placeholder 6">
             <a:extLst>
               <a:ext uri="{FF2B5EF4-FFF2-40B4-BE49-F238E27FC236}">
-                <a16:creationId xmlns:a16="http://schemas.microsoft.com/office/drawing/2014/main" xmlns="" id="{71F34533-9677-48AF-9374-976825F4BB7E}"/>
+                <a16:creationId xmlns:a16="http://schemas.microsoft.com/office/drawing/2014/main" id="{71F34533-9677-48AF-9374-976825F4BB7E}"/>
               </a:ext>
             </a:extLst>
           </p:cNvPr>
@@ -12654,7 +12654,7 @@
           <p:cNvPr id="22" name="Footer Placeholder 7">
             <a:extLst>
               <a:ext uri="{FF2B5EF4-FFF2-40B4-BE49-F238E27FC236}">
-                <a16:creationId xmlns:a16="http://schemas.microsoft.com/office/drawing/2014/main" xmlns="" id="{4FAB8A26-B99E-4F96-8327-A932A14F2C03}"/>
+                <a16:creationId xmlns:a16="http://schemas.microsoft.com/office/drawing/2014/main" id="{4FAB8A26-B99E-4F96-8327-A932A14F2C03}"/>
               </a:ext>
             </a:extLst>
           </p:cNvPr>
@@ -12691,7 +12691,7 @@
           <p:cNvPr id="24" name="Slide Number Placeholder 8">
             <a:extLst>
               <a:ext uri="{FF2B5EF4-FFF2-40B4-BE49-F238E27FC236}">
-                <a16:creationId xmlns:a16="http://schemas.microsoft.com/office/drawing/2014/main" xmlns="" id="{EB0962D2-BCC3-48AB-A769-2A7327D29191}"/>
+                <a16:creationId xmlns:a16="http://schemas.microsoft.com/office/drawing/2014/main" id="{EB0962D2-BCC3-48AB-A769-2A7327D29191}"/>
               </a:ext>
             </a:extLst>
           </p:cNvPr>
@@ -12779,7 +12779,7 @@
           <p:cNvPr id="2" name="Title 1">
             <a:extLst>
               <a:ext uri="{FF2B5EF4-FFF2-40B4-BE49-F238E27FC236}">
-                <a16:creationId xmlns:a16="http://schemas.microsoft.com/office/drawing/2014/main" xmlns="" id="{415B3628-62D7-4A6D-A79F-34DE91DBA31E}"/>
+                <a16:creationId xmlns:a16="http://schemas.microsoft.com/office/drawing/2014/main" id="{415B3628-62D7-4A6D-A79F-34DE91DBA31E}"/>
               </a:ext>
             </a:extLst>
           </p:cNvPr>
@@ -12822,7 +12822,7 @@
           <p:cNvPr id="3" name="Subtitle 2">
             <a:extLst>
               <a:ext uri="{FF2B5EF4-FFF2-40B4-BE49-F238E27FC236}">
-                <a16:creationId xmlns:a16="http://schemas.microsoft.com/office/drawing/2014/main" xmlns="" id="{55457758-A125-4CEA-A3D5-CBD010417BD2}"/>
+                <a16:creationId xmlns:a16="http://schemas.microsoft.com/office/drawing/2014/main" id="{55457758-A125-4CEA-A3D5-CBD010417BD2}"/>
               </a:ext>
             </a:extLst>
           </p:cNvPr>
@@ -12901,7 +12901,7 @@
           <p:cNvPr id="6" name="Graphic 5">
             <a:extLst>
               <a:ext uri="{FF2B5EF4-FFF2-40B4-BE49-F238E27FC236}">
-                <a16:creationId xmlns:a16="http://schemas.microsoft.com/office/drawing/2014/main" xmlns="" id="{ED3361C9-310A-4255-A94E-B77588962DA5}"/>
+                <a16:creationId xmlns:a16="http://schemas.microsoft.com/office/drawing/2014/main" id="{ED3361C9-310A-4255-A94E-B77588962DA5}"/>
               </a:ext>
             </a:extLst>
           </p:cNvPr>
@@ -12914,7 +12914,7 @@
           <a:blip r:embed="rId2">
             <a:extLst>
               <a:ext uri="{96DAC541-7B7A-43D3-8B79-37D633B846F1}">
-                <asvg:svgBlip xmlns:asvg="http://schemas.microsoft.com/office/drawing/2016/SVG/main" xmlns="" r:embed="rId3"/>
+                <asvg:svgBlip xmlns:asvg="http://schemas.microsoft.com/office/drawing/2016/SVG/main" r:embed="rId3"/>
               </a:ext>
             </a:extLst>
           </a:blip>
@@ -12937,7 +12937,7 @@
           <p:cNvPr id="9" name="Date Placeholder 6">
             <a:extLst>
               <a:ext uri="{FF2B5EF4-FFF2-40B4-BE49-F238E27FC236}">
-                <a16:creationId xmlns:a16="http://schemas.microsoft.com/office/drawing/2014/main" xmlns="" id="{BF358517-D7B7-40D0-A9D0-B650C80898AC}"/>
+                <a16:creationId xmlns:a16="http://schemas.microsoft.com/office/drawing/2014/main" id="{BF358517-D7B7-40D0-A9D0-B650C80898AC}"/>
               </a:ext>
             </a:extLst>
           </p:cNvPr>
@@ -12974,7 +12974,7 @@
           <p:cNvPr id="10" name="Footer Placeholder 7">
             <a:extLst>
               <a:ext uri="{FF2B5EF4-FFF2-40B4-BE49-F238E27FC236}">
-                <a16:creationId xmlns:a16="http://schemas.microsoft.com/office/drawing/2014/main" xmlns="" id="{6026D44C-0B39-4DE1-A0FC-5615DDAAE3CE}"/>
+                <a16:creationId xmlns:a16="http://schemas.microsoft.com/office/drawing/2014/main" id="{6026D44C-0B39-4DE1-A0FC-5615DDAAE3CE}"/>
               </a:ext>
             </a:extLst>
           </p:cNvPr>
@@ -13011,7 +13011,7 @@
           <p:cNvPr id="11" name="Slide Number Placeholder 8">
             <a:extLst>
               <a:ext uri="{FF2B5EF4-FFF2-40B4-BE49-F238E27FC236}">
-                <a16:creationId xmlns:a16="http://schemas.microsoft.com/office/drawing/2014/main" xmlns="" id="{0F8222B4-B618-42C4-8BDB-D2E4DF2F22C3}"/>
+                <a16:creationId xmlns:a16="http://schemas.microsoft.com/office/drawing/2014/main" id="{0F8222B4-B618-42C4-8BDB-D2E4DF2F22C3}"/>
               </a:ext>
             </a:extLst>
           </p:cNvPr>
@@ -13080,7 +13080,7 @@
           <p:cNvPr id="2" name="Title 1">
             <a:extLst>
               <a:ext uri="{FF2B5EF4-FFF2-40B4-BE49-F238E27FC236}">
-                <a16:creationId xmlns:a16="http://schemas.microsoft.com/office/drawing/2014/main" xmlns="" id="{33F022B7-1B61-1556-9332-554BE3463D5F}"/>
+                <a16:creationId xmlns:a16="http://schemas.microsoft.com/office/drawing/2014/main" id="{33F022B7-1B61-1556-9332-554BE3463D5F}"/>
               </a:ext>
             </a:extLst>
           </p:cNvPr>
@@ -13108,7 +13108,7 @@
           <p:cNvPr id="3" name="Content Placeholder 2">
             <a:extLst>
               <a:ext uri="{FF2B5EF4-FFF2-40B4-BE49-F238E27FC236}">
-                <a16:creationId xmlns:a16="http://schemas.microsoft.com/office/drawing/2014/main" xmlns="" id="{424E1FE6-B772-0931-E8E3-4290924B66D8}"/>
+                <a16:creationId xmlns:a16="http://schemas.microsoft.com/office/drawing/2014/main" id="{424E1FE6-B772-0931-E8E3-4290924B66D8}"/>
               </a:ext>
             </a:extLst>
           </p:cNvPr>
@@ -13165,7 +13165,7 @@
           <p:cNvPr id="4" name="Date Placeholder 3">
             <a:extLst>
               <a:ext uri="{FF2B5EF4-FFF2-40B4-BE49-F238E27FC236}">
-                <a16:creationId xmlns:a16="http://schemas.microsoft.com/office/drawing/2014/main" xmlns="" id="{A89F716E-BEF3-ABAC-2311-2D9BB33745A4}"/>
+                <a16:creationId xmlns:a16="http://schemas.microsoft.com/office/drawing/2014/main" id="{A89F716E-BEF3-ABAC-2311-2D9BB33745A4}"/>
               </a:ext>
             </a:extLst>
           </p:cNvPr>
@@ -13183,7 +13183,7 @@
           <a:p>
             <a:fld id="{787A3980-9F17-4DF1-B0CE-86F31B480A53}" type="datetimeFigureOut">
               <a:rPr lang="en-US" smtClean="0"/>
-              <a:t>11/27/2023</a:t>
+              <a:t>12/3/2023</a:t>
             </a:fld>
             <a:endParaRPr lang="en-US"/>
           </a:p>
@@ -13194,7 +13194,7 @@
           <p:cNvPr id="5" name="Footer Placeholder 4">
             <a:extLst>
               <a:ext uri="{FF2B5EF4-FFF2-40B4-BE49-F238E27FC236}">
-                <a16:creationId xmlns:a16="http://schemas.microsoft.com/office/drawing/2014/main" xmlns="" id="{7B75F5C3-38C2-7483-848B-2ADF3918CE9C}"/>
+                <a16:creationId xmlns:a16="http://schemas.microsoft.com/office/drawing/2014/main" id="{7B75F5C3-38C2-7483-848B-2ADF3918CE9C}"/>
               </a:ext>
             </a:extLst>
           </p:cNvPr>
@@ -13219,7 +13219,7 @@
           <p:cNvPr id="6" name="Slide Number Placeholder 5">
             <a:extLst>
               <a:ext uri="{FF2B5EF4-FFF2-40B4-BE49-F238E27FC236}">
-                <a16:creationId xmlns:a16="http://schemas.microsoft.com/office/drawing/2014/main" xmlns="" id="{26ABBE71-7345-ACB0-7C13-4BBC069F3093}"/>
+                <a16:creationId xmlns:a16="http://schemas.microsoft.com/office/drawing/2014/main" id="{26ABBE71-7345-ACB0-7C13-4BBC069F3093}"/>
               </a:ext>
             </a:extLst>
           </p:cNvPr>
@@ -13286,7 +13286,7 @@
           <p:cNvPr id="2" name="Rubrik 1">
             <a:extLst>
               <a:ext uri="{FF2B5EF4-FFF2-40B4-BE49-F238E27FC236}">
-                <a16:creationId xmlns:a16="http://schemas.microsoft.com/office/drawing/2014/main" xmlns="" id="{3510689B-740C-4BF0-2264-8DEAA8D292F9}"/>
+                <a16:creationId xmlns:a16="http://schemas.microsoft.com/office/drawing/2014/main" id="{3510689B-740C-4BF0-2264-8DEAA8D292F9}"/>
               </a:ext>
             </a:extLst>
           </p:cNvPr>
@@ -13332,7 +13332,7 @@
           <p:cNvPr id="13" name="Platshållare för text 7">
             <a:extLst>
               <a:ext uri="{FF2B5EF4-FFF2-40B4-BE49-F238E27FC236}">
-                <a16:creationId xmlns:a16="http://schemas.microsoft.com/office/drawing/2014/main" xmlns="" id="{0B9E6B22-CE97-522C-3C2F-83B869AF0DA8}"/>
+                <a16:creationId xmlns:a16="http://schemas.microsoft.com/office/drawing/2014/main" id="{0B9E6B22-CE97-522C-3C2F-83B869AF0DA8}"/>
               </a:ext>
             </a:extLst>
           </p:cNvPr>
@@ -13391,7 +13391,7 @@
           <p:cNvPr id="6" name="Rektangel 5">
             <a:extLst>
               <a:ext uri="{FF2B5EF4-FFF2-40B4-BE49-F238E27FC236}">
-                <a16:creationId xmlns:a16="http://schemas.microsoft.com/office/drawing/2014/main" xmlns="" id="{CDA80BF4-9691-9FBE-C0F8-ADCBB6220AFC}"/>
+                <a16:creationId xmlns:a16="http://schemas.microsoft.com/office/drawing/2014/main" id="{CDA80BF4-9691-9FBE-C0F8-ADCBB6220AFC}"/>
               </a:ext>
             </a:extLst>
           </p:cNvPr>
@@ -13473,7 +13473,7 @@
           <p:cNvPr id="3" name="Rektangel 16">
             <a:extLst>
               <a:ext uri="{FF2B5EF4-FFF2-40B4-BE49-F238E27FC236}">
-                <a16:creationId xmlns:a16="http://schemas.microsoft.com/office/drawing/2014/main" xmlns="" id="{8CF9C5E4-7656-8813-3B1F-B8BF2C344021}"/>
+                <a16:creationId xmlns:a16="http://schemas.microsoft.com/office/drawing/2014/main" id="{8CF9C5E4-7656-8813-3B1F-B8BF2C344021}"/>
               </a:ext>
             </a:extLst>
           </p:cNvPr>
@@ -13608,7 +13608,7 @@
           <p:cNvPr id="2" name="Rubrik 1">
             <a:extLst>
               <a:ext uri="{FF2B5EF4-FFF2-40B4-BE49-F238E27FC236}">
-                <a16:creationId xmlns:a16="http://schemas.microsoft.com/office/drawing/2014/main" xmlns="" id="{6C63892A-29E0-48E7-1989-4986F91E8C10}"/>
+                <a16:creationId xmlns:a16="http://schemas.microsoft.com/office/drawing/2014/main" id="{6C63892A-29E0-48E7-1989-4986F91E8C10}"/>
               </a:ext>
             </a:extLst>
           </p:cNvPr>
@@ -13687,7 +13687,7 @@
           <p:cNvPr id="20" name="Platshållare för bild 19">
             <a:extLst>
               <a:ext uri="{FF2B5EF4-FFF2-40B4-BE49-F238E27FC236}">
-                <a16:creationId xmlns:a16="http://schemas.microsoft.com/office/drawing/2014/main" xmlns="" id="{CA582FED-5BD3-56EA-29AF-D3EE7981EA47}"/>
+                <a16:creationId xmlns:a16="http://schemas.microsoft.com/office/drawing/2014/main" id="{CA582FED-5BD3-56EA-29AF-D3EE7981EA47}"/>
               </a:ext>
             </a:extLst>
           </p:cNvPr>
@@ -13819,7 +13819,7 @@
           <p:cNvPr id="5" name="Rektangel 16">
             <a:extLst>
               <a:ext uri="{FF2B5EF4-FFF2-40B4-BE49-F238E27FC236}">
-                <a16:creationId xmlns:a16="http://schemas.microsoft.com/office/drawing/2014/main" xmlns="" id="{52932134-686F-0D6F-276A-63545A07A782}"/>
+                <a16:creationId xmlns:a16="http://schemas.microsoft.com/office/drawing/2014/main" id="{52932134-686F-0D6F-276A-63545A07A782}"/>
               </a:ext>
             </a:extLst>
           </p:cNvPr>
@@ -13954,7 +13954,7 @@
           <p:cNvPr id="2" name="Rubrik 1">
             <a:extLst>
               <a:ext uri="{FF2B5EF4-FFF2-40B4-BE49-F238E27FC236}">
-                <a16:creationId xmlns:a16="http://schemas.microsoft.com/office/drawing/2014/main" xmlns="" id="{6C63892A-29E0-48E7-1989-4986F91E8C10}"/>
+                <a16:creationId xmlns:a16="http://schemas.microsoft.com/office/drawing/2014/main" id="{6C63892A-29E0-48E7-1989-4986F91E8C10}"/>
               </a:ext>
             </a:extLst>
           </p:cNvPr>
@@ -14033,7 +14033,7 @@
           <p:cNvPr id="4" name="Platshållare för text 7">
             <a:extLst>
               <a:ext uri="{FF2B5EF4-FFF2-40B4-BE49-F238E27FC236}">
-                <a16:creationId xmlns:a16="http://schemas.microsoft.com/office/drawing/2014/main" xmlns="" id="{167579F2-B68B-0163-2FD0-9CC6608052CD}"/>
+                <a16:creationId xmlns:a16="http://schemas.microsoft.com/office/drawing/2014/main" id="{167579F2-B68B-0163-2FD0-9CC6608052CD}"/>
               </a:ext>
             </a:extLst>
           </p:cNvPr>
@@ -14122,7 +14122,7 @@
           <p:cNvPr id="4" name="Platshållare för bild 3">
             <a:extLst>
               <a:ext uri="{FF2B5EF4-FFF2-40B4-BE49-F238E27FC236}">
-                <a16:creationId xmlns:a16="http://schemas.microsoft.com/office/drawing/2014/main" xmlns="" id="{E3541002-6901-FECE-6592-F5F17A359417}"/>
+                <a16:creationId xmlns:a16="http://schemas.microsoft.com/office/drawing/2014/main" id="{E3541002-6901-FECE-6592-F5F17A359417}"/>
               </a:ext>
             </a:extLst>
           </p:cNvPr>
@@ -14182,7 +14182,7 @@
           <p:cNvPr id="3" name="Platshållare för innehåll 2">
             <a:extLst>
               <a:ext uri="{FF2B5EF4-FFF2-40B4-BE49-F238E27FC236}">
-                <a16:creationId xmlns:a16="http://schemas.microsoft.com/office/drawing/2014/main" xmlns="" id="{85BA4CA5-77B2-FB63-8A08-C2E19CBEB9B6}"/>
+                <a16:creationId xmlns:a16="http://schemas.microsoft.com/office/drawing/2014/main" id="{85BA4CA5-77B2-FB63-8A08-C2E19CBEB9B6}"/>
               </a:ext>
             </a:extLst>
           </p:cNvPr>
@@ -14273,7 +14273,7 @@
           <p:cNvPr id="8" name="Platshållare för text 7">
             <a:extLst>
               <a:ext uri="{FF2B5EF4-FFF2-40B4-BE49-F238E27FC236}">
-                <a16:creationId xmlns:a16="http://schemas.microsoft.com/office/drawing/2014/main" xmlns="" id="{EAF389C4-B187-BA2F-2752-1C2412D79217}"/>
+                <a16:creationId xmlns:a16="http://schemas.microsoft.com/office/drawing/2014/main" id="{EAF389C4-B187-BA2F-2752-1C2412D79217}"/>
               </a:ext>
             </a:extLst>
           </p:cNvPr>
@@ -14332,7 +14332,7 @@
           <p:cNvPr id="9" name="Rubrik 8">
             <a:extLst>
               <a:ext uri="{FF2B5EF4-FFF2-40B4-BE49-F238E27FC236}">
-                <a16:creationId xmlns:a16="http://schemas.microsoft.com/office/drawing/2014/main" xmlns="" id="{7484591A-8006-B6C8-67CC-D47A9ACA3DBD}"/>
+                <a16:creationId xmlns:a16="http://schemas.microsoft.com/office/drawing/2014/main" id="{7484591A-8006-B6C8-67CC-D47A9ACA3DBD}"/>
               </a:ext>
             </a:extLst>
           </p:cNvPr>
@@ -14400,7 +14400,7 @@
           <p:cNvPr id="11" name="Platshållare för rubrik 10">
             <a:extLst>
               <a:ext uri="{FF2B5EF4-FFF2-40B4-BE49-F238E27FC236}">
-                <a16:creationId xmlns:a16="http://schemas.microsoft.com/office/drawing/2014/main" xmlns="" id="{2DA5E39D-9902-6522-5FB9-9BC925AA41C0}"/>
+                <a16:creationId xmlns:a16="http://schemas.microsoft.com/office/drawing/2014/main" id="{2DA5E39D-9902-6522-5FB9-9BC925AA41C0}"/>
               </a:ext>
             </a:extLst>
           </p:cNvPr>
@@ -14438,7 +14438,7 @@
           <p:cNvPr id="12" name="Platshållare för text 11">
             <a:extLst>
               <a:ext uri="{FF2B5EF4-FFF2-40B4-BE49-F238E27FC236}">
-                <a16:creationId xmlns:a16="http://schemas.microsoft.com/office/drawing/2014/main" xmlns="" id="{4187EF01-D105-134F-1ED9-E0A472BDA458}"/>
+                <a16:creationId xmlns:a16="http://schemas.microsoft.com/office/drawing/2014/main" id="{4187EF01-D105-134F-1ED9-E0A472BDA458}"/>
               </a:ext>
             </a:extLst>
           </p:cNvPr>
@@ -14840,7 +14840,7 @@
           <p:cNvPr id="11" name="Platshållare för rubrik 10">
             <a:extLst>
               <a:ext uri="{FF2B5EF4-FFF2-40B4-BE49-F238E27FC236}">
-                <a16:creationId xmlns:a16="http://schemas.microsoft.com/office/drawing/2014/main" xmlns="" id="{2DA5E39D-9902-6522-5FB9-9BC925AA41C0}"/>
+                <a16:creationId xmlns:a16="http://schemas.microsoft.com/office/drawing/2014/main" id="{2DA5E39D-9902-6522-5FB9-9BC925AA41C0}"/>
               </a:ext>
             </a:extLst>
           </p:cNvPr>
@@ -14878,7 +14878,7 @@
           <p:cNvPr id="12" name="Platshållare för text 11">
             <a:extLst>
               <a:ext uri="{FF2B5EF4-FFF2-40B4-BE49-F238E27FC236}">
-                <a16:creationId xmlns:a16="http://schemas.microsoft.com/office/drawing/2014/main" xmlns="" id="{4187EF01-D105-134F-1ED9-E0A472BDA458}"/>
+                <a16:creationId xmlns:a16="http://schemas.microsoft.com/office/drawing/2014/main" id="{4187EF01-D105-134F-1ED9-E0A472BDA458}"/>
               </a:ext>
             </a:extLst>
           </p:cNvPr>
@@ -15264,7 +15264,7 @@
           <p:cNvPr id="11" name="Platshållare för rubrik 10">
             <a:extLst>
               <a:ext uri="{FF2B5EF4-FFF2-40B4-BE49-F238E27FC236}">
-                <a16:creationId xmlns:a16="http://schemas.microsoft.com/office/drawing/2014/main" xmlns="" id="{2DA5E39D-9902-6522-5FB9-9BC925AA41C0}"/>
+                <a16:creationId xmlns:a16="http://schemas.microsoft.com/office/drawing/2014/main" id="{2DA5E39D-9902-6522-5FB9-9BC925AA41C0}"/>
               </a:ext>
             </a:extLst>
           </p:cNvPr>
@@ -15302,7 +15302,7 @@
           <p:cNvPr id="12" name="Platshållare för text 11">
             <a:extLst>
               <a:ext uri="{FF2B5EF4-FFF2-40B4-BE49-F238E27FC236}">
-                <a16:creationId xmlns:a16="http://schemas.microsoft.com/office/drawing/2014/main" xmlns="" id="{4187EF01-D105-134F-1ED9-E0A472BDA458}"/>
+                <a16:creationId xmlns:a16="http://schemas.microsoft.com/office/drawing/2014/main" id="{4187EF01-D105-134F-1ED9-E0A472BDA458}"/>
               </a:ext>
             </a:extLst>
           </p:cNvPr>
@@ -15369,7 +15369,7 @@
           <p:cNvPr id="2" name="Rektangel 1">
             <a:extLst>
               <a:ext uri="{FF2B5EF4-FFF2-40B4-BE49-F238E27FC236}">
-                <a16:creationId xmlns:a16="http://schemas.microsoft.com/office/drawing/2014/main" xmlns="" id="{E0B6D620-5D9B-9EC6-5828-582C02E81306}"/>
+                <a16:creationId xmlns:a16="http://schemas.microsoft.com/office/drawing/2014/main" id="{E0B6D620-5D9B-9EC6-5828-582C02E81306}"/>
               </a:ext>
             </a:extLst>
           </p:cNvPr>
@@ -15760,7 +15760,7 @@
           <p:cNvPr id="11" name="Platshållare för rubrik 10">
             <a:extLst>
               <a:ext uri="{FF2B5EF4-FFF2-40B4-BE49-F238E27FC236}">
-                <a16:creationId xmlns:a16="http://schemas.microsoft.com/office/drawing/2014/main" xmlns="" id="{2DA5E39D-9902-6522-5FB9-9BC925AA41C0}"/>
+                <a16:creationId xmlns:a16="http://schemas.microsoft.com/office/drawing/2014/main" id="{2DA5E39D-9902-6522-5FB9-9BC925AA41C0}"/>
               </a:ext>
             </a:extLst>
           </p:cNvPr>
@@ -15798,7 +15798,7 @@
           <p:cNvPr id="12" name="Platshållare för text 11">
             <a:extLst>
               <a:ext uri="{FF2B5EF4-FFF2-40B4-BE49-F238E27FC236}">
-                <a16:creationId xmlns:a16="http://schemas.microsoft.com/office/drawing/2014/main" xmlns="" id="{4187EF01-D105-134F-1ED9-E0A472BDA458}"/>
+                <a16:creationId xmlns:a16="http://schemas.microsoft.com/office/drawing/2014/main" id="{4187EF01-D105-134F-1ED9-E0A472BDA458}"/>
               </a:ext>
             </a:extLst>
           </p:cNvPr>
@@ -15865,7 +15865,7 @@
           <p:cNvPr id="2" name="Rektangel 1">
             <a:extLst>
               <a:ext uri="{FF2B5EF4-FFF2-40B4-BE49-F238E27FC236}">
-                <a16:creationId xmlns:a16="http://schemas.microsoft.com/office/drawing/2014/main" xmlns="" id="{E0B6D620-5D9B-9EC6-5828-582C02E81306}"/>
+                <a16:creationId xmlns:a16="http://schemas.microsoft.com/office/drawing/2014/main" id="{E0B6D620-5D9B-9EC6-5828-582C02E81306}"/>
               </a:ext>
             </a:extLst>
           </p:cNvPr>
@@ -16233,7 +16233,7 @@
           <p:cNvPr id="2" name="Title Placeholder 1">
             <a:extLst>
               <a:ext uri="{FF2B5EF4-FFF2-40B4-BE49-F238E27FC236}">
-                <a16:creationId xmlns:a16="http://schemas.microsoft.com/office/drawing/2014/main" xmlns="" id="{8F4C17E5-24ED-44BC-BA50-02EF903552E1}"/>
+                <a16:creationId xmlns:a16="http://schemas.microsoft.com/office/drawing/2014/main" id="{8F4C17E5-24ED-44BC-BA50-02EF903552E1}"/>
               </a:ext>
             </a:extLst>
           </p:cNvPr>
@@ -16271,7 +16271,7 @@
           <p:cNvPr id="3" name="Text Placeholder 2">
             <a:extLst>
               <a:ext uri="{FF2B5EF4-FFF2-40B4-BE49-F238E27FC236}">
-                <a16:creationId xmlns:a16="http://schemas.microsoft.com/office/drawing/2014/main" xmlns="" id="{4833D101-3AF0-4F06-90ED-B83615C36CE9}"/>
+                <a16:creationId xmlns:a16="http://schemas.microsoft.com/office/drawing/2014/main" id="{4833D101-3AF0-4F06-90ED-B83615C36CE9}"/>
               </a:ext>
             </a:extLst>
           </p:cNvPr>
@@ -16338,7 +16338,7 @@
           <p:cNvPr id="4" name="Date Placeholder 3">
             <a:extLst>
               <a:ext uri="{FF2B5EF4-FFF2-40B4-BE49-F238E27FC236}">
-                <a16:creationId xmlns:a16="http://schemas.microsoft.com/office/drawing/2014/main" xmlns="" id="{C2AE9FDE-AF95-49F8-A927-35A23C9E6532}"/>
+                <a16:creationId xmlns:a16="http://schemas.microsoft.com/office/drawing/2014/main" id="{C2AE9FDE-AF95-49F8-A927-35A23C9E6532}"/>
               </a:ext>
             </a:extLst>
           </p:cNvPr>
@@ -16384,7 +16384,7 @@
           <p:cNvPr id="5" name="Footer Placeholder 4">
             <a:extLst>
               <a:ext uri="{FF2B5EF4-FFF2-40B4-BE49-F238E27FC236}">
-                <a16:creationId xmlns:a16="http://schemas.microsoft.com/office/drawing/2014/main" xmlns="" id="{CC2E900D-8FF9-4E80-860D-89C2D3B4E4E1}"/>
+                <a16:creationId xmlns:a16="http://schemas.microsoft.com/office/drawing/2014/main" id="{CC2E900D-8FF9-4E80-860D-89C2D3B4E4E1}"/>
               </a:ext>
             </a:extLst>
           </p:cNvPr>
@@ -16430,7 +16430,7 @@
           <p:cNvPr id="6" name="Slide Number Placeholder 5">
             <a:extLst>
               <a:ext uri="{FF2B5EF4-FFF2-40B4-BE49-F238E27FC236}">
-                <a16:creationId xmlns:a16="http://schemas.microsoft.com/office/drawing/2014/main" xmlns="" id="{F1A66A0C-1415-46A3-A1FF-BE18C70873E3}"/>
+                <a16:creationId xmlns:a16="http://schemas.microsoft.com/office/drawing/2014/main" id="{F1A66A0C-1415-46A3-A1FF-BE18C70873E3}"/>
               </a:ext>
             </a:extLst>
           </p:cNvPr>
@@ -16803,7 +16803,7 @@
           <p:cNvPr id="2" name="Title 1">
             <a:extLst>
               <a:ext uri="{FF2B5EF4-FFF2-40B4-BE49-F238E27FC236}">
-                <a16:creationId xmlns:a16="http://schemas.microsoft.com/office/drawing/2014/main" xmlns="" id="{D94A2CD4-732A-43E4-BCB9-CBA2055E0AC6}"/>
+                <a16:creationId xmlns:a16="http://schemas.microsoft.com/office/drawing/2014/main" id="{D94A2CD4-732A-43E4-BCB9-CBA2055E0AC6}"/>
               </a:ext>
             </a:extLst>
           </p:cNvPr>
@@ -16859,7 +16859,7 @@
           <p:cNvPr id="3" name="Subtitle 2">
             <a:extLst>
               <a:ext uri="{FF2B5EF4-FFF2-40B4-BE49-F238E27FC236}">
-                <a16:creationId xmlns:a16="http://schemas.microsoft.com/office/drawing/2014/main" xmlns="" id="{45FD0450-A909-4CD9-8912-96A19ACEB7CB}"/>
+                <a16:creationId xmlns:a16="http://schemas.microsoft.com/office/drawing/2014/main" id="{45FD0450-A909-4CD9-8912-96A19ACEB7CB}"/>
               </a:ext>
             </a:extLst>
           </p:cNvPr>
@@ -16892,7 +16892,7 @@
           <p:cNvPr id="5" name="Footer Placeholder 4">
             <a:extLst>
               <a:ext uri="{FF2B5EF4-FFF2-40B4-BE49-F238E27FC236}">
-                <a16:creationId xmlns:a16="http://schemas.microsoft.com/office/drawing/2014/main" xmlns="" id="{3555A49C-96F4-440D-B89E-A0AE94F70108}"/>
+                <a16:creationId xmlns:a16="http://schemas.microsoft.com/office/drawing/2014/main" id="{3555A49C-96F4-440D-B89E-A0AE94F70108}"/>
               </a:ext>
             </a:extLst>
           </p:cNvPr>
@@ -16947,7 +16947,7 @@
                 <a:ea typeface="+mn-ea"/>
                 <a:cs typeface="+mn-cs"/>
               </a:rPr>
-              <a:t>November 2023</a:t>
+              <a:t>December 2023</a:t>
             </a:r>
           </a:p>
         </p:txBody>
@@ -16957,7 +16957,7 @@
           <p:cNvPr id="6" name="Slide Number Placeholder 5">
             <a:extLst>
               <a:ext uri="{FF2B5EF4-FFF2-40B4-BE49-F238E27FC236}">
-                <a16:creationId xmlns:a16="http://schemas.microsoft.com/office/drawing/2014/main" xmlns="" id="{F2A39FA3-9AE3-4689-A469-B7D2DFCCC2D9}"/>
+                <a16:creationId xmlns:a16="http://schemas.microsoft.com/office/drawing/2014/main" id="{F2A39FA3-9AE3-4689-A469-B7D2DFCCC2D9}"/>
               </a:ext>
             </a:extLst>
           </p:cNvPr>
@@ -17060,13 +17060,6 @@
   <p:clrMapOvr>
     <a:masterClrMapping/>
   </p:clrMapOvr>
-  <p:timing>
-    <p:tnLst>
-      <p:par>
-        <p:cTn id="1" dur="indefinite" restart="never" nodeType="tmRoot"/>
-      </p:par>
-    </p:tnLst>
-  </p:timing>
 </p:sld>
 </file>
 
@@ -17092,7 +17085,7 @@
           <p:cNvPr id="2" name="Title 1">
             <a:extLst>
               <a:ext uri="{FF2B5EF4-FFF2-40B4-BE49-F238E27FC236}">
-                <a16:creationId xmlns:a16="http://schemas.microsoft.com/office/drawing/2014/main" xmlns="" id="{7193A936-2F2F-96BC-CE44-52D4AF6D60D3}"/>
+                <a16:creationId xmlns:a16="http://schemas.microsoft.com/office/drawing/2014/main" id="{7193A936-2F2F-96BC-CE44-52D4AF6D60D3}"/>
               </a:ext>
             </a:extLst>
           </p:cNvPr>
@@ -17132,7 +17125,7 @@
           <p:cNvPr id="7" name="Content Placeholder 6">
             <a:extLst>
               <a:ext uri="{FF2B5EF4-FFF2-40B4-BE49-F238E27FC236}">
-                <a16:creationId xmlns:a16="http://schemas.microsoft.com/office/drawing/2014/main" xmlns="" id="{A9956986-3D93-CB62-0694-A7C79DCEE6A3}"/>
+                <a16:creationId xmlns:a16="http://schemas.microsoft.com/office/drawing/2014/main" id="{A9956986-3D93-CB62-0694-A7C79DCEE6A3}"/>
               </a:ext>
             </a:extLst>
           </p:cNvPr>
@@ -17157,7 +17150,7 @@
           <p:cNvPr id="9" name="Picture 8">
             <a:extLst>
               <a:ext uri="{FF2B5EF4-FFF2-40B4-BE49-F238E27FC236}">
-                <a16:creationId xmlns:a16="http://schemas.microsoft.com/office/drawing/2014/main" xmlns="" id="{2A913121-22CB-A59F-152A-C02676F37B5E}"/>
+                <a16:creationId xmlns:a16="http://schemas.microsoft.com/office/drawing/2014/main" id="{2A913121-22CB-A59F-152A-C02676F37B5E}"/>
               </a:ext>
             </a:extLst>
           </p:cNvPr>
@@ -17192,13 +17185,6 @@
   <p:clrMapOvr>
     <a:masterClrMapping/>
   </p:clrMapOvr>
-  <p:timing>
-    <p:tnLst>
-      <p:par>
-        <p:cTn id="1" dur="indefinite" restart="never" nodeType="tmRoot"/>
-      </p:par>
-    </p:tnLst>
-  </p:timing>
 </p:sld>
 </file>
 
@@ -17224,7 +17210,7 @@
           <p:cNvPr id="2" name="Title 1">
             <a:extLst>
               <a:ext uri="{FF2B5EF4-FFF2-40B4-BE49-F238E27FC236}">
-                <a16:creationId xmlns:a16="http://schemas.microsoft.com/office/drawing/2014/main" xmlns="" id="{7193A936-2F2F-96BC-CE44-52D4AF6D60D3}"/>
+                <a16:creationId xmlns:a16="http://schemas.microsoft.com/office/drawing/2014/main" id="{7193A936-2F2F-96BC-CE44-52D4AF6D60D3}"/>
               </a:ext>
             </a:extLst>
           </p:cNvPr>
@@ -17260,7 +17246,7 @@
           <p:cNvPr id="7" name="Content Placeholder 6">
             <a:extLst>
               <a:ext uri="{FF2B5EF4-FFF2-40B4-BE49-F238E27FC236}">
-                <a16:creationId xmlns:a16="http://schemas.microsoft.com/office/drawing/2014/main" xmlns="" id="{9370295D-27D7-A282-B476-2D139AED3FEB}"/>
+                <a16:creationId xmlns:a16="http://schemas.microsoft.com/office/drawing/2014/main" id="{9370295D-27D7-A282-B476-2D139AED3FEB}"/>
               </a:ext>
             </a:extLst>
           </p:cNvPr>
@@ -17294,13 +17280,6 @@
   <p:clrMapOvr>
     <a:masterClrMapping/>
   </p:clrMapOvr>
-  <p:timing>
-    <p:tnLst>
-      <p:par>
-        <p:cTn id="1" dur="indefinite" restart="never" nodeType="tmRoot"/>
-      </p:par>
-    </p:tnLst>
-  </p:timing>
 </p:sld>
 </file>
 
@@ -17326,7 +17305,7 @@
           <p:cNvPr id="2" name="Title 1">
             <a:extLst>
               <a:ext uri="{FF2B5EF4-FFF2-40B4-BE49-F238E27FC236}">
-                <a16:creationId xmlns:a16="http://schemas.microsoft.com/office/drawing/2014/main" xmlns="" id="{EAFEF875-A7E4-5CCE-5AED-7D80496B5A60}"/>
+                <a16:creationId xmlns:a16="http://schemas.microsoft.com/office/drawing/2014/main" id="{EAFEF875-A7E4-5CCE-5AED-7D80496B5A60}"/>
               </a:ext>
             </a:extLst>
           </p:cNvPr>
@@ -17386,7 +17365,7 @@
           <p:cNvPr id="15" name="Content Placeholder 14">
             <a:extLst>
               <a:ext uri="{FF2B5EF4-FFF2-40B4-BE49-F238E27FC236}">
-                <a16:creationId xmlns:a16="http://schemas.microsoft.com/office/drawing/2014/main" xmlns="" id="{7E445325-0473-670D-BEB7-8C5A6518532B}"/>
+                <a16:creationId xmlns:a16="http://schemas.microsoft.com/office/drawing/2014/main" id="{7E445325-0473-670D-BEB7-8C5A6518532B}"/>
               </a:ext>
             </a:extLst>
           </p:cNvPr>
@@ -17415,7 +17394,7 @@
           <p:cNvPr id="17" name="Picture 16">
             <a:extLst>
               <a:ext uri="{FF2B5EF4-FFF2-40B4-BE49-F238E27FC236}">
-                <a16:creationId xmlns:a16="http://schemas.microsoft.com/office/drawing/2014/main" xmlns="" id="{F278BE6F-0192-6E92-2BD9-6D1E76BD3681}"/>
+                <a16:creationId xmlns:a16="http://schemas.microsoft.com/office/drawing/2014/main" id="{F278BE6F-0192-6E92-2BD9-6D1E76BD3681}"/>
               </a:ext>
             </a:extLst>
           </p:cNvPr>
@@ -17445,7 +17424,7 @@
           <p:cNvPr id="21" name="Picture 20">
             <a:extLst>
               <a:ext uri="{FF2B5EF4-FFF2-40B4-BE49-F238E27FC236}">
-                <a16:creationId xmlns:a16="http://schemas.microsoft.com/office/drawing/2014/main" xmlns="" id="{08A3E7A7-636F-C57C-609A-727600B4B0E4}"/>
+                <a16:creationId xmlns:a16="http://schemas.microsoft.com/office/drawing/2014/main" id="{08A3E7A7-636F-C57C-609A-727600B4B0E4}"/>
               </a:ext>
             </a:extLst>
           </p:cNvPr>
@@ -17475,7 +17454,7 @@
           <p:cNvPr id="23" name="Picture 22">
             <a:extLst>
               <a:ext uri="{FF2B5EF4-FFF2-40B4-BE49-F238E27FC236}">
-                <a16:creationId xmlns:a16="http://schemas.microsoft.com/office/drawing/2014/main" xmlns="" id="{42AD77BF-E706-83B8-4D04-6D0154581E72}"/>
+                <a16:creationId xmlns:a16="http://schemas.microsoft.com/office/drawing/2014/main" id="{42AD77BF-E706-83B8-4D04-6D0154581E72}"/>
               </a:ext>
             </a:extLst>
           </p:cNvPr>
@@ -17510,13 +17489,6 @@
   <p:clrMapOvr>
     <a:masterClrMapping/>
   </p:clrMapOvr>
-  <p:timing>
-    <p:tnLst>
-      <p:par>
-        <p:cTn id="1" dur="indefinite" restart="never" nodeType="tmRoot"/>
-      </p:par>
-    </p:tnLst>
-  </p:timing>
 </p:sld>
 </file>
 
@@ -17542,7 +17514,7 @@
           <p:cNvPr id="2" name="Title 1">
             <a:extLst>
               <a:ext uri="{FF2B5EF4-FFF2-40B4-BE49-F238E27FC236}">
-                <a16:creationId xmlns:a16="http://schemas.microsoft.com/office/drawing/2014/main" xmlns="" id="{8F63E509-7D7A-1DE8-E093-8F68C111D4FF}"/>
+                <a16:creationId xmlns:a16="http://schemas.microsoft.com/office/drawing/2014/main" id="{8F63E509-7D7A-1DE8-E093-8F68C111D4FF}"/>
               </a:ext>
             </a:extLst>
           </p:cNvPr>
@@ -17567,21 +17539,8 @@
           <a:p>
             <a:r>
               <a:rPr lang="en-US" sz="2200" b="1" dirty="0"/>
-              <a:t>Data Access Diagram: </a:t>
-            </a:r>
-            <a:r>
-              <a:rPr lang="en-US" sz="2200" b="1" dirty="0" smtClean="0"/>
-              <a:t>the </a:t>
-            </a:r>
-            <a:r>
-              <a:rPr lang="en-US" sz="2200" b="1" dirty="0"/>
-              <a:t>following slide </a:t>
-            </a:r>
-            <a:r>
-              <a:rPr lang="en-US" sz="2200" b="1" dirty="0" smtClean="0"/>
-              <a:t>provides details on data privacy</a:t>
-            </a:r>
-            <a:endParaRPr lang="en-US" sz="2200" b="1" dirty="0"/>
+              <a:t>Data Access Diagram: the following slide provides details on data privacy</a:t>
+            </a:r>
           </a:p>
         </p:txBody>
       </p:sp>
@@ -17624,13 +17583,6 @@
   <p:clrMapOvr>
     <a:masterClrMapping/>
   </p:clrMapOvr>
-  <p:timing>
-    <p:tnLst>
-      <p:par>
-        <p:cTn id="1" dur="indefinite" restart="never" nodeType="tmRoot"/>
-      </p:par>
-    </p:tnLst>
-  </p:timing>
 </p:sld>
 </file>
 
@@ -17669,10 +17621,9 @@
           <a:lstStyle/>
           <a:p>
             <a:r>
-              <a:rPr lang="fi-FI" sz="2200" b="1" dirty="0" smtClean="0"/>
+              <a:rPr lang="fi-FI" sz="2200" b="1" dirty="0"/>
               <a:t>Data Privacy</a:t>
             </a:r>
-            <a:endParaRPr lang="fi-FI" sz="2200" b="1" dirty="0"/>
           </a:p>
         </p:txBody>
       </p:sp>
@@ -17694,7 +17645,7 @@
         </p:spPr>
         <p:txBody>
           <a:bodyPr>
-            <a:normAutofit lnSpcReduction="10000"/>
+            <a:normAutofit fontScale="85000" lnSpcReduction="20000"/>
           </a:bodyPr>
           <a:lstStyle/>
           <a:p>
@@ -17702,32 +17653,12 @@
               <a:buNone/>
             </a:pPr>
             <a:r>
-              <a:rPr lang="fi-FI" dirty="0" smtClean="0"/>
-              <a:t>Azure </a:t>
-            </a:r>
-            <a:r>
               <a:rPr lang="fi-FI" dirty="0"/>
-              <a:t>OpenAI </a:t>
-            </a:r>
-            <a:r>
-              <a:rPr lang="fi-FI" dirty="0" smtClean="0"/>
-              <a:t>Chat </a:t>
-            </a:r>
-            <a:r>
-              <a:rPr lang="en-US" dirty="0" smtClean="0"/>
-              <a:t>web </a:t>
+              <a:t>Azure OpenAI Chat </a:t>
             </a:r>
             <a:r>
               <a:rPr lang="en-US" dirty="0"/>
-              <a:t>part interacts </a:t>
-            </a:r>
-            <a:r>
-              <a:rPr lang="en-US" dirty="0" smtClean="0"/>
-              <a:t>with private</a:t>
-            </a:r>
-            <a:r>
-              <a:rPr lang="en-US" dirty="0"/>
-              <a:t> </a:t>
+              <a:t>web part interacts with private </a:t>
             </a:r>
             <a:r>
               <a:rPr lang="en-US" b="1" dirty="0"/>
@@ -17745,15 +17676,7 @@
           <a:p>
             <a:r>
               <a:rPr lang="en-US" dirty="0"/>
-              <a:t>By default, this setup provides enhanced data privacy. </a:t>
-            </a:r>
-            <a:r>
-              <a:rPr lang="en-US" dirty="0" smtClean="0"/>
-              <a:t>In </a:t>
-            </a:r>
-            <a:r>
-              <a:rPr lang="en-US" dirty="0"/>
-              <a:t>this configuration, requests to AI do not travel outside your Azure tenant.</a:t>
+              <a:t>By default, this setup provides enhanced data privacy. In this configuration, requests to AI do not travel outside your Azure tenant.</a:t>
             </a:r>
           </a:p>
           <a:p>
@@ -17783,24 +17706,64 @@
             </a:r>
             <a:r>
               <a:rPr lang="en-US" dirty="0"/>
-              <a:t>-key does not get exposed in the browser</a:t>
-            </a:r>
-            <a:r>
-              <a:rPr lang="en-US" dirty="0" smtClean="0"/>
-              <a:t>.</a:t>
+              <a:t>-key does not get exposed in the browser.</a:t>
+            </a:r>
+          </a:p>
+          <a:p>
+            <a:pPr algn="l">
+              <a:buFont typeface="Arial" panose="020B0604020202020204" pitchFamily="34" charset="0"/>
+              <a:buChar char="•"/>
+            </a:pPr>
+            <a:r>
+              <a:rPr lang="en-US" b="0" i="0" dirty="0">
+                <a:solidFill>
+                  <a:srgbClr val="1F2328"/>
+                </a:solidFill>
+                <a:effectLst/>
+                <a:latin typeface="-apple-system"/>
+              </a:rPr>
+              <a:t>Chats are private and visible only to their creators. Creators have the option to share their chats when this feature is enabled in the web part settings (disabled by default). </a:t>
+            </a:r>
+            <a:r>
+              <a:rPr lang="en-US" b="0" i="0">
+                <a:solidFill>
+                  <a:srgbClr val="242424"/>
+                </a:solidFill>
+                <a:effectLst/>
+                <a:latin typeface="Segoe UI" panose="020B0502040204020203" pitchFamily="34" charset="0"/>
+              </a:rPr>
+              <a:t>Creators can share their chats with everyone or only with specific people in the company.</a:t>
+            </a:r>
+            <a:endParaRPr lang="en-US" b="0" i="0" dirty="0">
+              <a:solidFill>
+                <a:srgbClr val="1F2328"/>
+              </a:solidFill>
+              <a:effectLst/>
+              <a:latin typeface="-apple-system"/>
+            </a:endParaRPr>
+          </a:p>
+          <a:p>
+            <a:pPr algn="l">
+              <a:buFont typeface="Arial" panose="020B0604020202020204" pitchFamily="34" charset="0"/>
+              <a:buChar char="•"/>
+            </a:pPr>
+            <a:r>
+              <a:rPr lang="en-US" b="0" i="0" dirty="0">
+                <a:solidFill>
+                  <a:srgbClr val="1F2328"/>
+                </a:solidFill>
+                <a:effectLst/>
+                <a:latin typeface="-apple-system"/>
+              </a:rPr>
+              <a:t>The web part incorporates tampering prevention logic to guard against unauthorized access to another user's data by their GUID.</a:t>
             </a:r>
             <a:endParaRPr lang="en-US" dirty="0"/>
           </a:p>
           <a:p>
             <a:r>
               <a:rPr lang="en-US" dirty="0"/>
-              <a:t>In addition to the default configuration, you have the option to publish the Native Open AI endpoint in APIM</a:t>
-            </a:r>
-            <a:r>
-              <a:rPr lang="en-US" dirty="0" smtClean="0"/>
-              <a:t>. You can find instructions in the project documentation.</a:t>
-            </a:r>
-            <a:endParaRPr lang="en-US" dirty="0"/>
+              <a:t>In addition to the default configuration, you have the option to publish the Native Open AI endpoint in APIM. You can find instructions in the project documentation.</a:t>
+            </a:r>
           </a:p>
           <a:p>
             <a:pPr lvl="1"/>
@@ -17841,41 +17804,16 @@
             </a:r>
             <a:r>
               <a:rPr lang="en-US" dirty="0"/>
-              <a:t> endpoint could </a:t>
-            </a:r>
-            <a:r>
-              <a:rPr lang="en-US" dirty="0" smtClean="0"/>
-              <a:t>grant </a:t>
+              <a:t> endpoint could grant you access to the latest language models like GPT-4 Vision and GPT-4 1106 Parallel processing that are not currently available in Azure </a:t>
+            </a:r>
+            <a:r>
+              <a:rPr lang="en-US" dirty="0" err="1"/>
+              <a:t>OpenAI</a:t>
             </a:r>
             <a:r>
               <a:rPr lang="en-US" dirty="0"/>
-              <a:t>you access to the latest language models like </a:t>
-            </a:r>
-            <a:r>
-              <a:rPr lang="en-US" dirty="0" smtClean="0"/>
-              <a:t>GPT-4 Vision </a:t>
-            </a:r>
-            <a:r>
-              <a:rPr lang="en-US" dirty="0"/>
-              <a:t>and </a:t>
-            </a:r>
-            <a:r>
-              <a:rPr lang="en-US" dirty="0" smtClean="0"/>
-              <a:t>GPT-4 1106 Parallel processing </a:t>
-            </a:r>
-            <a:r>
-              <a:rPr lang="en-US" dirty="0"/>
-              <a:t>that are not currently available in Azure </a:t>
-            </a:r>
-            <a:r>
-              <a:rPr lang="en-US" dirty="0" err="1" smtClean="0"/>
-              <a:t>OpenAI</a:t>
-            </a:r>
-            <a:r>
-              <a:rPr lang="en-US" dirty="0" smtClean="0"/>
               <a:t>.</a:t>
             </a:r>
-            <a:endParaRPr lang="en-US" dirty="0"/>
           </a:p>
           <a:p>
             <a:pPr marL="0" indent="0">
@@ -17920,7 +17858,7 @@
           <p:cNvPr id="2" name="Title 1">
             <a:extLst>
               <a:ext uri="{FF2B5EF4-FFF2-40B4-BE49-F238E27FC236}">
-                <a16:creationId xmlns:a16="http://schemas.microsoft.com/office/drawing/2014/main" xmlns="" id="{29AFEAA6-2931-7871-AE0B-44838F77C5FB}"/>
+                <a16:creationId xmlns:a16="http://schemas.microsoft.com/office/drawing/2014/main" id="{29AFEAA6-2931-7871-AE0B-44838F77C5FB}"/>
               </a:ext>
             </a:extLst>
           </p:cNvPr>
@@ -17960,7 +17898,7 @@
           <p:cNvPr id="5" name="Content Placeholder 4" descr="A screenshot of a computer program&#10;&#10;Description automatically generated">
             <a:extLst>
               <a:ext uri="{FF2B5EF4-FFF2-40B4-BE49-F238E27FC236}">
-                <a16:creationId xmlns:a16="http://schemas.microsoft.com/office/drawing/2014/main" xmlns="" id="{064F1820-447F-FDE5-E82A-87C8736A8D35}"/>
+                <a16:creationId xmlns:a16="http://schemas.microsoft.com/office/drawing/2014/main" id="{064F1820-447F-FDE5-E82A-87C8736A8D35}"/>
               </a:ext>
             </a:extLst>
           </p:cNvPr>
@@ -18000,13 +17938,6 @@
   <p:clrMapOvr>
     <a:masterClrMapping/>
   </p:clrMapOvr>
-  <p:timing>
-    <p:tnLst>
-      <p:par>
-        <p:cTn id="1" dur="indefinite" restart="never" nodeType="tmRoot"/>
-      </p:par>
-    </p:tnLst>
-  </p:timing>
 </p:sld>
 </file>
 
@@ -18032,7 +17963,7 @@
           <p:cNvPr id="6" name="Title 1">
             <a:extLst>
               <a:ext uri="{FF2B5EF4-FFF2-40B4-BE49-F238E27FC236}">
-                <a16:creationId xmlns:a16="http://schemas.microsoft.com/office/drawing/2014/main" xmlns="" id="{7FD47860-F6A1-B897-374B-24702BE72B46}"/>
+                <a16:creationId xmlns:a16="http://schemas.microsoft.com/office/drawing/2014/main" id="{7FD47860-F6A1-B897-374B-24702BE72B46}"/>
               </a:ext>
             </a:extLst>
           </p:cNvPr>
@@ -18099,7 +18030,7 @@
           <p:cNvPr id="12" name="Content Placeholder 11">
             <a:extLst>
               <a:ext uri="{FF2B5EF4-FFF2-40B4-BE49-F238E27FC236}">
-                <a16:creationId xmlns:a16="http://schemas.microsoft.com/office/drawing/2014/main" xmlns="" id="{41CA9F10-158E-6A52-3450-7A2B2DA6720A}"/>
+                <a16:creationId xmlns:a16="http://schemas.microsoft.com/office/drawing/2014/main" id="{41CA9F10-158E-6A52-3450-7A2B2DA6720A}"/>
               </a:ext>
             </a:extLst>
           </p:cNvPr>
@@ -18133,13 +18064,6 @@
   <p:clrMapOvr>
     <a:masterClrMapping/>
   </p:clrMapOvr>
-  <p:timing>
-    <p:tnLst>
-      <p:par>
-        <p:cTn id="1" dur="indefinite" restart="never" nodeType="tmRoot"/>
-      </p:par>
-    </p:tnLst>
-  </p:timing>
 </p:sld>
 </file>
 
@@ -18165,7 +18089,7 @@
           <p:cNvPr id="2" name="Title 1">
             <a:extLst>
               <a:ext uri="{FF2B5EF4-FFF2-40B4-BE49-F238E27FC236}">
-                <a16:creationId xmlns:a16="http://schemas.microsoft.com/office/drawing/2014/main" xmlns="" id="{372E33F5-15E4-66F2-F002-5CE98856317A}"/>
+                <a16:creationId xmlns:a16="http://schemas.microsoft.com/office/drawing/2014/main" id="{372E33F5-15E4-66F2-F002-5CE98856317A}"/>
               </a:ext>
             </a:extLst>
           </p:cNvPr>
@@ -18201,7 +18125,7 @@
           <p:cNvPr id="3" name="Content Placeholder 2">
             <a:extLst>
               <a:ext uri="{FF2B5EF4-FFF2-40B4-BE49-F238E27FC236}">
-                <a16:creationId xmlns:a16="http://schemas.microsoft.com/office/drawing/2014/main" xmlns="" id="{960E2D50-8FEA-D3F2-244E-86C96E33367C}"/>
+                <a16:creationId xmlns:a16="http://schemas.microsoft.com/office/drawing/2014/main" id="{960E2D50-8FEA-D3F2-244E-86C96E33367C}"/>
               </a:ext>
             </a:extLst>
           </p:cNvPr>
@@ -18288,84 +18212,47 @@
           </a:p>
           <a:p>
             <a:r>
-              <a:rPr lang="en-US" dirty="0" smtClean="0"/>
-              <a:t>Optional integrations with company data. </a:t>
-            </a:r>
-            <a:r>
               <a:rPr lang="en-US" dirty="0"/>
-              <a:t>For security reasons, these integrations are disabled by default and must be explicitly enabled in the web part settings.</a:t>
+              <a:t>Optional integrations with company data. For security reasons, these integrations are disabled by default and must be explicitly enabled in the web part settings.</a:t>
             </a:r>
           </a:p>
           <a:p>
             <a:pPr lvl="1"/>
             <a:r>
-              <a:rPr lang="en-US" dirty="0" smtClean="0"/>
+              <a:rPr lang="en-US" dirty="0"/>
               <a:t>SharePoint Search</a:t>
             </a:r>
           </a:p>
           <a:p>
             <a:pPr lvl="1"/>
             <a:r>
-              <a:rPr lang="en-US" dirty="0" smtClean="0"/>
+              <a:rPr lang="en-US" dirty="0"/>
               <a:t>Company Users</a:t>
             </a:r>
           </a:p>
           <a:p>
             <a:pPr lvl="1"/>
             <a:r>
-              <a:rPr lang="en-US" dirty="0" smtClean="0"/>
-              <a:t>Local </a:t>
-            </a:r>
-            <a:r>
               <a:rPr lang="en-US" dirty="0"/>
-              <a:t>Date and </a:t>
-            </a:r>
-            <a:r>
-              <a:rPr lang="en-US" dirty="0" smtClean="0"/>
-              <a:t>Time</a:t>
-            </a:r>
-            <a:endParaRPr lang="en-US" dirty="0"/>
+              <a:t>Local Date and Time</a:t>
+            </a:r>
           </a:p>
           <a:p>
             <a:pPr lvl="1"/>
             <a:r>
-              <a:rPr lang="en-US" dirty="0" smtClean="0"/>
-              <a:t>Analysis </a:t>
-            </a:r>
-            <a:r>
               <a:rPr lang="en-US" dirty="0"/>
-              <a:t>of an uploaded PDF and </a:t>
-            </a:r>
-            <a:r>
-              <a:rPr lang="en-US" dirty="0" smtClean="0"/>
-              <a:t>summarization </a:t>
-            </a:r>
+              <a:t>Analysis of an uploaded PDF and summarization of its content</a:t>
+            </a:r>
+          </a:p>
+          <a:p>
+            <a:pPr lvl="1"/>
             <a:r>
               <a:rPr lang="en-US" dirty="0"/>
-              <a:t>of its </a:t>
-            </a:r>
-            <a:r>
-              <a:rPr lang="en-US" dirty="0" smtClean="0"/>
-              <a:t>content</a:t>
-            </a:r>
-          </a:p>
-          <a:p>
-            <a:pPr lvl="1"/>
-            <a:r>
-              <a:rPr lang="en-US" dirty="0" smtClean="0"/>
-              <a:t>Analysis </a:t>
-            </a:r>
-            <a:r>
-              <a:rPr lang="en-US" dirty="0"/>
-              <a:t>of uploaded images and description of their </a:t>
+              <a:t>Analysis of uploaded images and description of their </a:t>
             </a:r>
             <a:r>
               <a:rPr lang="en-US" sz="2100" dirty="0"/>
-              <a:t>content. As of November 2023, Image </a:t>
-            </a:r>
-            <a:r>
-              <a:rPr lang="en-US" sz="2100" dirty="0" smtClean="0"/>
-              <a:t>Analysis </a:t>
+              <a:t>content. As of November 2023, Image Analysis </a:t>
             </a:r>
             <a:r>
               <a:rPr lang="en-US" dirty="0"/>
@@ -18377,22 +18264,13 @@
             </a:r>
             <a:r>
               <a:rPr lang="en-US" dirty="0"/>
-              <a:t> </a:t>
-            </a:r>
-            <a:r>
-              <a:rPr lang="en-US" dirty="0" smtClean="0"/>
-              <a:t>endpoint.</a:t>
-            </a:r>
-            <a:endParaRPr lang="en-US" dirty="0"/>
+              <a:t> endpoint.</a:t>
+            </a:r>
           </a:p>
           <a:p>
             <a:pPr marL="0" indent="0">
               <a:buNone/>
             </a:pPr>
-            <a:r>
-              <a:rPr lang="en-US" b="1" dirty="0"/>
-              <a:t/>
-            </a:r>
             <a:br>
               <a:rPr lang="en-US" b="1" dirty="0"/>
             </a:br>
@@ -18467,13 +18345,6 @@
   <p:clrMapOvr>
     <a:masterClrMapping/>
   </p:clrMapOvr>
-  <p:timing>
-    <p:tnLst>
-      <p:par>
-        <p:cTn id="1" dur="indefinite" restart="never" nodeType="tmRoot"/>
-      </p:par>
-    </p:tnLst>
-  </p:timing>
 </p:sld>
 </file>
 
@@ -18499,7 +18370,7 @@
           <p:cNvPr id="2" name="Title 1">
             <a:extLst>
               <a:ext uri="{FF2B5EF4-FFF2-40B4-BE49-F238E27FC236}">
-                <a16:creationId xmlns:a16="http://schemas.microsoft.com/office/drawing/2014/main" xmlns="" id="{372E33F5-15E4-66F2-F002-5CE98856317A}"/>
+                <a16:creationId xmlns:a16="http://schemas.microsoft.com/office/drawing/2014/main" id="{372E33F5-15E4-66F2-F002-5CE98856317A}"/>
               </a:ext>
             </a:extLst>
           </p:cNvPr>
@@ -18523,12 +18394,8 @@
           <a:lstStyle/>
           <a:p>
             <a:r>
-              <a:rPr lang="fi-FI" sz="2200" b="1" dirty="0" smtClean="0"/>
-              <a:t>Optional Integrations</a:t>
-            </a:r>
-            <a:r>
               <a:rPr lang="fi-FI" sz="2200" b="1" dirty="0"/>
-              <a:t>: SharePoint Search, Company Users, Local Date &amp; Time</a:t>
+              <a:t>Optional Integrations: SharePoint Search, Company Users, Local Date &amp; Time</a:t>
             </a:r>
             <a:endParaRPr lang="en-US" sz="2200" b="1" dirty="0"/>
           </a:p>
@@ -18539,7 +18406,7 @@
           <p:cNvPr id="3" name="Content Placeholder 2">
             <a:extLst>
               <a:ext uri="{FF2B5EF4-FFF2-40B4-BE49-F238E27FC236}">
-                <a16:creationId xmlns:a16="http://schemas.microsoft.com/office/drawing/2014/main" xmlns="" id="{960E2D50-8FEA-D3F2-244E-86C96E33367C}"/>
+                <a16:creationId xmlns:a16="http://schemas.microsoft.com/office/drawing/2014/main" id="{960E2D50-8FEA-D3F2-244E-86C96E33367C}"/>
               </a:ext>
             </a:extLst>
           </p:cNvPr>
@@ -19501,13 +19368,6 @@
   <p:clrMapOvr>
     <a:masterClrMapping/>
   </p:clrMapOvr>
-  <p:timing>
-    <p:tnLst>
-      <p:par>
-        <p:cTn id="1" dur="indefinite" restart="never" nodeType="tmRoot"/>
-      </p:par>
-    </p:tnLst>
-  </p:timing>
 </p:sld>
 </file>
 
@@ -19541,10 +19401,10 @@
           <p:cNvPr id="40" name="Down Arrow 7">
             <a:extLst>
               <a:ext uri="{FF2B5EF4-FFF2-40B4-BE49-F238E27FC236}">
-                <a16:creationId xmlns:a16="http://schemas.microsoft.com/office/drawing/2014/main" xmlns="" id="{D4771268-CB57-404A-9271-370EB28F6090}"/>
+                <a16:creationId xmlns:a16="http://schemas.microsoft.com/office/drawing/2014/main" id="{D4771268-CB57-404A-9271-370EB28F6090}"/>
               </a:ext>
               <a:ext uri="{C183D7F6-B498-43B3-948B-1728B52AA6E4}">
-                <adec:decorative xmlns:adec="http://schemas.microsoft.com/office/drawing/2017/decorative" xmlns="" val="1"/>
+                <adec:decorative xmlns:adec="http://schemas.microsoft.com/office/drawing/2017/decorative" val="1"/>
               </a:ext>
             </a:extLst>
           </p:cNvPr>
@@ -19554,7 +19414,7 @@
           <p:nvPr>
             <p:extLst>
               <p:ext uri="{386F3935-93C4-4BCD-93E2-E3B085C9AB24}">
-                <p16:designElem xmlns:p16="http://schemas.microsoft.com/office/powerpoint/2015/main" xmlns="" val="1"/>
+                <p16:designElem xmlns:p16="http://schemas.microsoft.com/office/powerpoint/2015/main" val="1"/>
               </p:ext>
             </p:extLst>
           </p:nvPr>
@@ -19607,7 +19467,7 @@
           <p:cNvPr id="2" name="Title 1">
             <a:extLst>
               <a:ext uri="{FF2B5EF4-FFF2-40B4-BE49-F238E27FC236}">
-                <a16:creationId xmlns:a16="http://schemas.microsoft.com/office/drawing/2014/main" xmlns="" id="{EAFEF875-A7E4-5CCE-5AED-7D80496B5A60}"/>
+                <a16:creationId xmlns:a16="http://schemas.microsoft.com/office/drawing/2014/main" id="{EAFEF875-A7E4-5CCE-5AED-7D80496B5A60}"/>
               </a:ext>
             </a:extLst>
           </p:cNvPr>
@@ -19636,7 +19496,7 @@
           <a:p>
             <a:pPr algn="ctr"/>
             <a:r>
-              <a:rPr lang="en-US" sz="2500" kern="1200" dirty="0" smtClean="0">
+              <a:rPr lang="en-US" sz="2500" kern="1200" dirty="0">
                 <a:solidFill>
                   <a:srgbClr val="FFFFFF"/>
                 </a:solidFill>
@@ -19646,14 +19506,6 @@
               </a:rPr>
               <a:t>Integrations</a:t>
             </a:r>
-            <a:endParaRPr lang="en-US" sz="2500" kern="1200" dirty="0">
-              <a:solidFill>
-                <a:srgbClr val="FFFFFF"/>
-              </a:solidFill>
-              <a:latin typeface="+mj-lt"/>
-              <a:ea typeface="+mj-ea"/>
-              <a:cs typeface="+mj-cs"/>
-            </a:endParaRPr>
           </a:p>
         </p:txBody>
       </p:sp>
@@ -19662,7 +19514,7 @@
           <p:cNvPr id="27" name="Content Placeholder 26">
             <a:extLst>
               <a:ext uri="{FF2B5EF4-FFF2-40B4-BE49-F238E27FC236}">
-                <a16:creationId xmlns:a16="http://schemas.microsoft.com/office/drawing/2014/main" xmlns="" id="{C589F45A-47BA-AD3F-B6B9-4C25D5583B7B}"/>
+                <a16:creationId xmlns:a16="http://schemas.microsoft.com/office/drawing/2014/main" id="{C589F45A-47BA-AD3F-B6B9-4C25D5583B7B}"/>
               </a:ext>
             </a:extLst>
           </p:cNvPr>
@@ -19699,13 +19551,6 @@
   <p:clrMapOvr>
     <a:masterClrMapping/>
   </p:clrMapOvr>
-  <p:timing>
-    <p:tnLst>
-      <p:par>
-        <p:cTn id="1" dur="indefinite" restart="never" nodeType="tmRoot"/>
-      </p:par>
-    </p:tnLst>
-  </p:timing>
 </p:sld>
 </file>
 
@@ -19739,10 +19584,10 @@
           <p:cNvPr id="40" name="Down Arrow 7">
             <a:extLst>
               <a:ext uri="{FF2B5EF4-FFF2-40B4-BE49-F238E27FC236}">
-                <a16:creationId xmlns:a16="http://schemas.microsoft.com/office/drawing/2014/main" xmlns="" id="{D4771268-CB57-404A-9271-370EB28F6090}"/>
+                <a16:creationId xmlns:a16="http://schemas.microsoft.com/office/drawing/2014/main" id="{D4771268-CB57-404A-9271-370EB28F6090}"/>
               </a:ext>
               <a:ext uri="{C183D7F6-B498-43B3-948B-1728B52AA6E4}">
-                <adec:decorative xmlns:adec="http://schemas.microsoft.com/office/drawing/2017/decorative" xmlns="" val="1"/>
+                <adec:decorative xmlns:adec="http://schemas.microsoft.com/office/drawing/2017/decorative" val="1"/>
               </a:ext>
             </a:extLst>
           </p:cNvPr>
@@ -19752,7 +19597,7 @@
           <p:nvPr>
             <p:extLst>
               <p:ext uri="{386F3935-93C4-4BCD-93E2-E3B085C9AB24}">
-                <p16:designElem xmlns:p16="http://schemas.microsoft.com/office/powerpoint/2015/main" xmlns="" val="1"/>
+                <p16:designElem xmlns:p16="http://schemas.microsoft.com/office/powerpoint/2015/main" val="1"/>
               </p:ext>
             </p:extLst>
           </p:nvPr>
@@ -19805,7 +19650,7 @@
           <p:cNvPr id="2" name="Title 1">
             <a:extLst>
               <a:ext uri="{FF2B5EF4-FFF2-40B4-BE49-F238E27FC236}">
-                <a16:creationId xmlns:a16="http://schemas.microsoft.com/office/drawing/2014/main" xmlns="" id="{EAFEF875-A7E4-5CCE-5AED-7D80496B5A60}"/>
+                <a16:creationId xmlns:a16="http://schemas.microsoft.com/office/drawing/2014/main" id="{EAFEF875-A7E4-5CCE-5AED-7D80496B5A60}"/>
               </a:ext>
             </a:extLst>
           </p:cNvPr>
@@ -19842,29 +19687,7 @@
                 <a:ea typeface="+mj-ea"/>
                 <a:cs typeface="+mj-cs"/>
               </a:rPr>
-              <a:t>Upload and </a:t>
-            </a:r>
-            <a:r>
-              <a:rPr lang="en-US" sz="2500" kern="1200" dirty="0" smtClean="0">
-                <a:solidFill>
-                  <a:srgbClr val="FFFFFF"/>
-                </a:solidFill>
-                <a:latin typeface="+mj-lt"/>
-                <a:ea typeface="+mj-ea"/>
-                <a:cs typeface="+mj-cs"/>
-              </a:rPr>
-              <a:t>Summarize </a:t>
-            </a:r>
-            <a:r>
-              <a:rPr lang="en-US" sz="2500" kern="1200" dirty="0">
-                <a:solidFill>
-                  <a:srgbClr val="FFFFFF"/>
-                </a:solidFill>
-                <a:latin typeface="+mj-lt"/>
-                <a:ea typeface="+mj-ea"/>
-                <a:cs typeface="+mj-cs"/>
-              </a:rPr>
-              <a:t>PDF content</a:t>
+              <a:t>Upload and Summarize PDF content</a:t>
             </a:r>
           </a:p>
         </p:txBody>
@@ -19874,7 +19697,7 @@
           <p:cNvPr id="6" name="Picture 5">
             <a:extLst>
               <a:ext uri="{FF2B5EF4-FFF2-40B4-BE49-F238E27FC236}">
-                <a16:creationId xmlns:a16="http://schemas.microsoft.com/office/drawing/2014/main" xmlns="" id="{13A3744A-9F9C-FBF8-BC2E-266B8A5B5C82}"/>
+                <a16:creationId xmlns:a16="http://schemas.microsoft.com/office/drawing/2014/main" id="{13A3744A-9F9C-FBF8-BC2E-266B8A5B5C82}"/>
               </a:ext>
             </a:extLst>
           </p:cNvPr>
@@ -19909,13 +19732,6 @@
   <p:clrMapOvr>
     <a:masterClrMapping/>
   </p:clrMapOvr>
-  <p:timing>
-    <p:tnLst>
-      <p:par>
-        <p:cTn id="1" dur="indefinite" restart="never" nodeType="tmRoot"/>
-      </p:par>
-    </p:tnLst>
-  </p:timing>
 </p:sld>
 </file>
 

</xml_diff>

<commit_message>
Presentation documents updated with the recently added new features
</commit_message>
<xml_diff>
--- a/docs/azure-openai-chat-web-part-presentation.pptx
+++ b/docs/azure-openai-chat-web-part-presentation.pptx
@@ -9,7 +9,7 @@
     <p:sldMasterId id="2147483778" r:id="rId8"/>
   </p:sldMasterIdLst>
   <p:notesMasterIdLst>
-    <p:notesMasterId r:id="rId21"/>
+    <p:notesMasterId r:id="rId23"/>
   </p:notesMasterIdLst>
   <p:sldIdLst>
     <p:sldId id="268" r:id="rId9"/>
@@ -22,8 +22,10 @@
     <p:sldId id="262" r:id="rId16"/>
     <p:sldId id="269" r:id="rId17"/>
     <p:sldId id="266" r:id="rId18"/>
-    <p:sldId id="267" r:id="rId19"/>
-    <p:sldId id="265" r:id="rId20"/>
+    <p:sldId id="272" r:id="rId19"/>
+    <p:sldId id="271" r:id="rId20"/>
+    <p:sldId id="267" r:id="rId21"/>
+    <p:sldId id="265" r:id="rId22"/>
   </p:sldIdLst>
   <p:sldSz cx="12192000" cy="6858000"/>
   <p:notesSz cx="6858000" cy="9144000"/>
@@ -220,7 +222,7 @@
           <a:p>
             <a:fld id="{36A20F55-E09E-7F42-B5C2-206BEAFB62A2}" type="datetimeFigureOut">
               <a:rPr lang="sv-SE" smtClean="0"/>
-              <a:t>2023-12-03</a:t>
+              <a:t>2023-12-11</a:t>
             </a:fld>
             <a:endParaRPr lang="sv-SE"/>
           </a:p>
@@ -906,7 +908,7 @@
             <a:fld id="{C6F47C66-D121-9A42-BA24-809897433D99}" type="datetimeFigureOut">
               <a:rPr lang="sv-SE" smtClean="0"/>
               <a:pPr/>
-              <a:t>2023-12-03</a:t>
+              <a:t>2023-12-11</a:t>
             </a:fld>
             <a:endParaRPr lang="sv-SE" dirty="0"/>
           </a:p>
@@ -4296,7 +4298,7 @@
             <a:fld id="{C6F47C66-D121-9A42-BA24-809897433D99}" type="datetimeFigureOut">
               <a:rPr lang="sv-SE" smtClean="0"/>
               <a:pPr/>
-              <a:t>2023-12-03</a:t>
+              <a:t>2023-12-11</a:t>
             </a:fld>
             <a:endParaRPr lang="sv-SE" dirty="0"/>
           </a:p>
@@ -13183,7 +13185,7 @@
           <a:p>
             <a:fld id="{787A3980-9F17-4DF1-B0CE-86F31B480A53}" type="datetimeFigureOut">
               <a:rPr lang="en-US" smtClean="0"/>
-              <a:t>12/3/2023</a:t>
+              <a:t>12/11/2023</a:t>
             </a:fld>
             <a:endParaRPr lang="en-US"/>
           </a:p>
@@ -17099,7 +17101,7 @@
         <p:spPr>
           <a:xfrm>
             <a:off x="504825" y="89850"/>
-            <a:ext cx="10515600" cy="633600"/>
+            <a:ext cx="10248900" cy="367350"/>
           </a:xfrm>
         </p:spPr>
         <p:txBody>
@@ -17109,48 +17111,75 @@
           <a:lstStyle/>
           <a:p>
             <a:r>
-              <a:rPr lang="fi-FI" sz="2200" b="1" dirty="0"/>
-              <a:t>Using GPT-4 Vision for Image Analysis: a Technical </a:t>
-            </a:r>
-            <a:r>
-              <a:rPr lang="fi-FI" sz="2200" b="1" dirty="0" err="1"/>
-              <a:t>Diagram</a:t>
-            </a:r>
-            <a:endParaRPr lang="en-US" sz="2200" b="1" dirty="0"/>
-          </a:p>
-        </p:txBody>
-      </p:sp>
-      <p:sp>
-        <p:nvSpPr>
-          <p:cNvPr id="7" name="Content Placeholder 6">
-            <a:extLst>
-              <a:ext uri="{FF2B5EF4-FFF2-40B4-BE49-F238E27FC236}">
-                <a16:creationId xmlns:a16="http://schemas.microsoft.com/office/drawing/2014/main" id="{A9956986-3D93-CB62-0694-A7C79DCEE6A3}"/>
-              </a:ext>
-            </a:extLst>
-          </p:cNvPr>
-          <p:cNvSpPr>
-            <a:spLocks noGrp="1"/>
-          </p:cNvSpPr>
-          <p:nvPr>
-            <p:ph idx="1"/>
-          </p:nvPr>
-        </p:nvSpPr>
-        <p:spPr/>
-        <p:txBody>
-          <a:bodyPr/>
-          <a:lstStyle/>
-          <a:p>
-            <a:endParaRPr lang="en-US"/>
+              <a:rPr lang="fi-FI" sz="1800" b="1" dirty="0" err="1"/>
+              <a:t>Optional</a:t>
+            </a:r>
+            <a:r>
+              <a:rPr lang="fi-FI" sz="1800" b="1" dirty="0"/>
+              <a:t> </a:t>
+            </a:r>
+            <a:r>
+              <a:rPr lang="fi-FI" sz="1800" b="1" dirty="0" err="1"/>
+              <a:t>integrations</a:t>
+            </a:r>
+            <a:r>
+              <a:rPr lang="fi-FI" sz="1800" b="1" dirty="0"/>
+              <a:t>: </a:t>
+            </a:r>
+            <a:r>
+              <a:rPr lang="fi-FI" sz="1800" b="1" dirty="0" err="1"/>
+              <a:t>Search</a:t>
+            </a:r>
+            <a:r>
+              <a:rPr lang="fi-FI" sz="1800" b="1" dirty="0"/>
+              <a:t> on </a:t>
+            </a:r>
+            <a:r>
+              <a:rPr lang="fi-FI" sz="1800" b="1" dirty="0" err="1"/>
+              <a:t>the</a:t>
+            </a:r>
+            <a:r>
+              <a:rPr lang="fi-FI" sz="1800" b="1" dirty="0"/>
+              <a:t> Internet </a:t>
+            </a:r>
+            <a:r>
+              <a:rPr lang="fi-FI" sz="1800" b="1" dirty="0" err="1"/>
+              <a:t>with</a:t>
+            </a:r>
+            <a:r>
+              <a:rPr lang="fi-FI" sz="1800" b="1" dirty="0"/>
+              <a:t> </a:t>
+            </a:r>
+            <a:r>
+              <a:rPr lang="fi-FI" sz="1800" b="1" dirty="0" err="1"/>
+              <a:t>the</a:t>
+            </a:r>
+            <a:r>
+              <a:rPr lang="fi-FI" sz="1800" b="1" dirty="0"/>
+              <a:t> </a:t>
+            </a:r>
+            <a:r>
+              <a:rPr lang="fi-FI" sz="1800" b="1" dirty="0" err="1"/>
+              <a:t>summary</a:t>
+            </a:r>
+            <a:r>
+              <a:rPr lang="fi-FI" sz="1800" b="1" dirty="0"/>
+              <a:t> for Bing and Google </a:t>
+            </a:r>
+            <a:r>
+              <a:rPr lang="fi-FI" sz="1800" b="1" dirty="0" err="1"/>
+              <a:t>results</a:t>
+            </a:r>
+            <a:endParaRPr lang="en-US" sz="1800" b="1" dirty="0"/>
           </a:p>
         </p:txBody>
       </p:sp>
       <p:pic>
         <p:nvPicPr>
-          <p:cNvPr id="9" name="Picture 8">
-            <a:extLst>
-              <a:ext uri="{FF2B5EF4-FFF2-40B4-BE49-F238E27FC236}">
-                <a16:creationId xmlns:a16="http://schemas.microsoft.com/office/drawing/2014/main" id="{2A913121-22CB-A59F-152A-C02676F37B5E}"/>
+          <p:cNvPr id="6" name="Picture 5">
+            <a:extLst>
+              <a:ext uri="{FF2B5EF4-FFF2-40B4-BE49-F238E27FC236}">
+                <a16:creationId xmlns:a16="http://schemas.microsoft.com/office/drawing/2014/main" id="{14F35C15-B612-A23D-D19B-4752C8B25D28}"/>
               </a:ext>
             </a:extLst>
           </p:cNvPr>
@@ -17167,8 +17196,8 @@
         </p:blipFill>
         <p:spPr>
           <a:xfrm>
-            <a:off x="542925" y="856800"/>
-            <a:ext cx="11353800" cy="5702260"/>
+            <a:off x="0" y="520708"/>
+            <a:ext cx="12192000" cy="5816584"/>
           </a:xfrm>
           <a:prstGeom prst="rect">
             <a:avLst/>
@@ -17223,19 +17252,27 @@
         </p:nvSpPr>
         <p:spPr>
           <a:xfrm>
-            <a:off x="838200" y="223200"/>
-            <a:ext cx="10515600" cy="633600"/>
+            <a:off x="504825" y="89850"/>
+            <a:ext cx="10248900" cy="367350"/>
           </a:xfrm>
         </p:spPr>
         <p:txBody>
           <a:bodyPr>
-            <a:normAutofit/>
+            <a:normAutofit fontScale="90000"/>
           </a:bodyPr>
           <a:lstStyle/>
           <a:p>
             <a:r>
               <a:rPr lang="fi-FI" sz="2200" b="1" dirty="0"/>
-              <a:t>Using GPT-4 Vision for Image Analysis: a Photo</a:t>
+              <a:t>Image </a:t>
+            </a:r>
+            <a:r>
+              <a:rPr lang="fi-FI" sz="2200" b="1" dirty="0" err="1"/>
+              <a:t>Generations</a:t>
+            </a:r>
+            <a:r>
+              <a:rPr lang="fi-FI" sz="2200" b="1" dirty="0"/>
+              <a:t>: Dalle-3</a:t>
             </a:r>
             <a:endParaRPr lang="en-US" sz="2200" b="1" dirty="0"/>
           </a:p>
@@ -17243,19 +17280,17 @@
       </p:sp>
       <p:pic>
         <p:nvPicPr>
-          <p:cNvPr id="7" name="Content Placeholder 6">
-            <a:extLst>
-              <a:ext uri="{FF2B5EF4-FFF2-40B4-BE49-F238E27FC236}">
-                <a16:creationId xmlns:a16="http://schemas.microsoft.com/office/drawing/2014/main" id="{9370295D-27D7-A282-B476-2D139AED3FEB}"/>
+          <p:cNvPr id="4" name="Picture 3">
+            <a:extLst>
+              <a:ext uri="{FF2B5EF4-FFF2-40B4-BE49-F238E27FC236}">
+                <a16:creationId xmlns:a16="http://schemas.microsoft.com/office/drawing/2014/main" id="{6CA54F19-0F1F-A1D5-93FE-EEB1EACBB84E}"/>
               </a:ext>
             </a:extLst>
           </p:cNvPr>
           <p:cNvPicPr>
-            <a:picLocks noGrp="1" noChangeAspect="1"/>
+            <a:picLocks noChangeAspect="1"/>
           </p:cNvPicPr>
-          <p:nvPr>
-            <p:ph idx="1"/>
-          </p:nvPr>
+          <p:nvPr/>
         </p:nvPicPr>
         <p:blipFill>
           <a:blip r:embed="rId2"/>
@@ -17265,15 +17300,18 @@
         </p:blipFill>
         <p:spPr>
           <a:xfrm>
-            <a:off x="838200" y="788542"/>
-            <a:ext cx="10028483" cy="5846258"/>
-          </a:xfrm>
+            <a:off x="597801" y="565638"/>
+            <a:ext cx="7688949" cy="6093758"/>
+          </a:xfrm>
+          <a:prstGeom prst="rect">
+            <a:avLst/>
+          </a:prstGeom>
         </p:spPr>
       </p:pic>
     </p:spTree>
     <p:extLst>
       <p:ext uri="{BB962C8B-B14F-4D97-AF65-F5344CB8AC3E}">
-        <p14:creationId xmlns:p14="http://schemas.microsoft.com/office/powerpoint/2010/main" val="3622457941"/>
+        <p14:creationId xmlns:p14="http://schemas.microsoft.com/office/powerpoint/2010/main" val="766200924"/>
       </p:ext>
     </p:extLst>
   </p:cSld>
@@ -17305,6 +17343,226 @@
           <p:cNvPr id="2" name="Title 1">
             <a:extLst>
               <a:ext uri="{FF2B5EF4-FFF2-40B4-BE49-F238E27FC236}">
+                <a16:creationId xmlns:a16="http://schemas.microsoft.com/office/drawing/2014/main" id="{7193A936-2F2F-96BC-CE44-52D4AF6D60D3}"/>
+              </a:ext>
+            </a:extLst>
+          </p:cNvPr>
+          <p:cNvSpPr>
+            <a:spLocks noGrp="1"/>
+          </p:cNvSpPr>
+          <p:nvPr>
+            <p:ph type="title"/>
+          </p:nvPr>
+        </p:nvSpPr>
+        <p:spPr>
+          <a:xfrm>
+            <a:off x="504825" y="89850"/>
+            <a:ext cx="10515600" cy="633600"/>
+          </a:xfrm>
+        </p:spPr>
+        <p:txBody>
+          <a:bodyPr>
+            <a:normAutofit/>
+          </a:bodyPr>
+          <a:lstStyle/>
+          <a:p>
+            <a:r>
+              <a:rPr lang="fi-FI" sz="2200" b="1" dirty="0"/>
+              <a:t>Using GPT-4 Vision for Image Analysis: a Technical </a:t>
+            </a:r>
+            <a:r>
+              <a:rPr lang="fi-FI" sz="2200" b="1" dirty="0" err="1"/>
+              <a:t>Diagram</a:t>
+            </a:r>
+            <a:endParaRPr lang="en-US" sz="2200" b="1" dirty="0"/>
+          </a:p>
+        </p:txBody>
+      </p:sp>
+      <p:sp>
+        <p:nvSpPr>
+          <p:cNvPr id="7" name="Content Placeholder 6">
+            <a:extLst>
+              <a:ext uri="{FF2B5EF4-FFF2-40B4-BE49-F238E27FC236}">
+                <a16:creationId xmlns:a16="http://schemas.microsoft.com/office/drawing/2014/main" id="{A9956986-3D93-CB62-0694-A7C79DCEE6A3}"/>
+              </a:ext>
+            </a:extLst>
+          </p:cNvPr>
+          <p:cNvSpPr>
+            <a:spLocks noGrp="1"/>
+          </p:cNvSpPr>
+          <p:nvPr>
+            <p:ph idx="1"/>
+          </p:nvPr>
+        </p:nvSpPr>
+        <p:spPr/>
+        <p:txBody>
+          <a:bodyPr/>
+          <a:lstStyle/>
+          <a:p>
+            <a:endParaRPr lang="en-US"/>
+          </a:p>
+        </p:txBody>
+      </p:sp>
+      <p:pic>
+        <p:nvPicPr>
+          <p:cNvPr id="9" name="Picture 8">
+            <a:extLst>
+              <a:ext uri="{FF2B5EF4-FFF2-40B4-BE49-F238E27FC236}">
+                <a16:creationId xmlns:a16="http://schemas.microsoft.com/office/drawing/2014/main" id="{2A913121-22CB-A59F-152A-C02676F37B5E}"/>
+              </a:ext>
+            </a:extLst>
+          </p:cNvPr>
+          <p:cNvPicPr>
+            <a:picLocks noChangeAspect="1"/>
+          </p:cNvPicPr>
+          <p:nvPr/>
+        </p:nvPicPr>
+        <p:blipFill>
+          <a:blip r:embed="rId2"/>
+          <a:stretch>
+            <a:fillRect/>
+          </a:stretch>
+        </p:blipFill>
+        <p:spPr>
+          <a:xfrm>
+            <a:off x="542925" y="856800"/>
+            <a:ext cx="11353800" cy="5702260"/>
+          </a:xfrm>
+          <a:prstGeom prst="rect">
+            <a:avLst/>
+          </a:prstGeom>
+        </p:spPr>
+      </p:pic>
+    </p:spTree>
+    <p:extLst>
+      <p:ext uri="{BB962C8B-B14F-4D97-AF65-F5344CB8AC3E}">
+        <p14:creationId xmlns:p14="http://schemas.microsoft.com/office/powerpoint/2010/main" val="3581684529"/>
+      </p:ext>
+    </p:extLst>
+  </p:cSld>
+  <p:clrMapOvr>
+    <a:masterClrMapping/>
+  </p:clrMapOvr>
+</p:sld>
+</file>
+
+<file path=ppt/slides/slide13.xml><?xml version="1.0" encoding="utf-8"?>
+<p:sld xmlns:a="http://schemas.openxmlformats.org/drawingml/2006/main" xmlns:r="http://schemas.openxmlformats.org/officeDocument/2006/relationships" xmlns:p="http://schemas.openxmlformats.org/presentationml/2006/main">
+  <p:cSld>
+    <p:spTree>
+      <p:nvGrpSpPr>
+        <p:cNvPr id="1" name=""/>
+        <p:cNvGrpSpPr/>
+        <p:nvPr/>
+      </p:nvGrpSpPr>
+      <p:grpSpPr>
+        <a:xfrm>
+          <a:off x="0" y="0"/>
+          <a:ext cx="0" cy="0"/>
+          <a:chOff x="0" y="0"/>
+          <a:chExt cx="0" cy="0"/>
+        </a:xfrm>
+      </p:grpSpPr>
+      <p:sp>
+        <p:nvSpPr>
+          <p:cNvPr id="2" name="Title 1">
+            <a:extLst>
+              <a:ext uri="{FF2B5EF4-FFF2-40B4-BE49-F238E27FC236}">
+                <a16:creationId xmlns:a16="http://schemas.microsoft.com/office/drawing/2014/main" id="{7193A936-2F2F-96BC-CE44-52D4AF6D60D3}"/>
+              </a:ext>
+            </a:extLst>
+          </p:cNvPr>
+          <p:cNvSpPr>
+            <a:spLocks noGrp="1"/>
+          </p:cNvSpPr>
+          <p:nvPr>
+            <p:ph type="title"/>
+          </p:nvPr>
+        </p:nvSpPr>
+        <p:spPr>
+          <a:xfrm>
+            <a:off x="838200" y="223200"/>
+            <a:ext cx="10515600" cy="633600"/>
+          </a:xfrm>
+        </p:spPr>
+        <p:txBody>
+          <a:bodyPr>
+            <a:normAutofit/>
+          </a:bodyPr>
+          <a:lstStyle/>
+          <a:p>
+            <a:r>
+              <a:rPr lang="fi-FI" sz="2200" b="1" dirty="0"/>
+              <a:t>Using GPT-4 Vision for Image Analysis: a Photo</a:t>
+            </a:r>
+            <a:endParaRPr lang="en-US" sz="2200" b="1" dirty="0"/>
+          </a:p>
+        </p:txBody>
+      </p:sp>
+      <p:pic>
+        <p:nvPicPr>
+          <p:cNvPr id="7" name="Content Placeholder 6">
+            <a:extLst>
+              <a:ext uri="{FF2B5EF4-FFF2-40B4-BE49-F238E27FC236}">
+                <a16:creationId xmlns:a16="http://schemas.microsoft.com/office/drawing/2014/main" id="{9370295D-27D7-A282-B476-2D139AED3FEB}"/>
+              </a:ext>
+            </a:extLst>
+          </p:cNvPr>
+          <p:cNvPicPr>
+            <a:picLocks noGrp="1" noChangeAspect="1"/>
+          </p:cNvPicPr>
+          <p:nvPr>
+            <p:ph idx="1"/>
+          </p:nvPr>
+        </p:nvPicPr>
+        <p:blipFill>
+          <a:blip r:embed="rId2"/>
+          <a:stretch>
+            <a:fillRect/>
+          </a:stretch>
+        </p:blipFill>
+        <p:spPr>
+          <a:xfrm>
+            <a:off x="838200" y="788542"/>
+            <a:ext cx="10028483" cy="5846258"/>
+          </a:xfrm>
+        </p:spPr>
+      </p:pic>
+    </p:spTree>
+    <p:extLst>
+      <p:ext uri="{BB962C8B-B14F-4D97-AF65-F5344CB8AC3E}">
+        <p14:creationId xmlns:p14="http://schemas.microsoft.com/office/powerpoint/2010/main" val="3622457941"/>
+      </p:ext>
+    </p:extLst>
+  </p:cSld>
+  <p:clrMapOvr>
+    <a:masterClrMapping/>
+  </p:clrMapOvr>
+</p:sld>
+</file>
+
+<file path=ppt/slides/slide14.xml><?xml version="1.0" encoding="utf-8"?>
+<p:sld xmlns:a="http://schemas.openxmlformats.org/drawingml/2006/main" xmlns:r="http://schemas.openxmlformats.org/officeDocument/2006/relationships" xmlns:p="http://schemas.openxmlformats.org/presentationml/2006/main">
+  <p:cSld>
+    <p:spTree>
+      <p:nvGrpSpPr>
+        <p:cNvPr id="1" name=""/>
+        <p:cNvGrpSpPr/>
+        <p:nvPr/>
+      </p:nvGrpSpPr>
+      <p:grpSpPr>
+        <a:xfrm>
+          <a:off x="0" y="0"/>
+          <a:ext cx="0" cy="0"/>
+          <a:chOff x="0" y="0"/>
+          <a:chExt cx="0" cy="0"/>
+        </a:xfrm>
+      </p:grpSpPr>
+      <p:sp>
+        <p:nvSpPr>
+          <p:cNvPr id="2" name="Title 1">
+            <a:extLst>
+              <a:ext uri="{FF2B5EF4-FFF2-40B4-BE49-F238E27FC236}">
                 <a16:creationId xmlns:a16="http://schemas.microsoft.com/office/drawing/2014/main" id="{EAFEF875-A7E4-5CCE-5AED-7D80496B5A60}"/>
               </a:ext>
             </a:extLst>
@@ -17473,6 +17731,36 @@
           <a:xfrm>
             <a:off x="7323905" y="824138"/>
             <a:ext cx="1827626" cy="5747657"/>
+          </a:xfrm>
+          <a:prstGeom prst="rect">
+            <a:avLst/>
+          </a:prstGeom>
+        </p:spPr>
+      </p:pic>
+      <p:pic>
+        <p:nvPicPr>
+          <p:cNvPr id="8" name="Picture 7">
+            <a:extLst>
+              <a:ext uri="{FF2B5EF4-FFF2-40B4-BE49-F238E27FC236}">
+                <a16:creationId xmlns:a16="http://schemas.microsoft.com/office/drawing/2014/main" id="{D19D1FDD-4F34-7C9A-4736-B6D9BC87E8F4}"/>
+              </a:ext>
+            </a:extLst>
+          </p:cNvPr>
+          <p:cNvPicPr>
+            <a:picLocks noChangeAspect="1"/>
+          </p:cNvPicPr>
+          <p:nvPr/>
+        </p:nvPicPr>
+        <p:blipFill>
+          <a:blip r:embed="rId6"/>
+          <a:stretch>
+            <a:fillRect/>
+          </a:stretch>
+        </p:blipFill>
+        <p:spPr>
+          <a:xfrm>
+            <a:off x="9663086" y="824138"/>
+            <a:ext cx="2115502" cy="5747657"/>
           </a:xfrm>
           <a:prstGeom prst="rect">
             <a:avLst/>
@@ -17546,31 +17834,32 @@
       </p:sp>
       <p:pic>
         <p:nvPicPr>
-          <p:cNvPr id="4" name="Content Placeholder 3"/>
+          <p:cNvPr id="7" name="Picture 6" descr="A screenshot of a computer&#10;&#10;Description automatically generated">
+            <a:extLst>
+              <a:ext uri="{FF2B5EF4-FFF2-40B4-BE49-F238E27FC236}">
+                <a16:creationId xmlns:a16="http://schemas.microsoft.com/office/drawing/2014/main" id="{5DD7AA24-E70F-7352-C9FE-FAF9CB083B5F}"/>
+              </a:ext>
+            </a:extLst>
+          </p:cNvPr>
           <p:cNvPicPr>
-            <a:picLocks noGrp="1" noChangeAspect="1"/>
+            <a:picLocks noChangeAspect="1"/>
           </p:cNvPicPr>
-          <p:nvPr>
-            <p:ph idx="1"/>
-          </p:nvPr>
+          <p:nvPr/>
         </p:nvPicPr>
         <p:blipFill>
-          <a:blip r:embed="rId3">
-            <a:extLst>
-              <a:ext uri="{28A0092B-C50C-407E-A947-70E740481C1C}">
-                <a14:useLocalDpi xmlns:a14="http://schemas.microsoft.com/office/drawing/2010/main" val="0"/>
-              </a:ext>
-            </a:extLst>
-          </a:blip>
+          <a:blip r:embed="rId3"/>
           <a:stretch>
             <a:fillRect/>
           </a:stretch>
         </p:blipFill>
         <p:spPr>
           <a:xfrm>
-            <a:off x="875712" y="701970"/>
-            <a:ext cx="10572684" cy="5754248"/>
-          </a:xfrm>
+            <a:off x="970850" y="647311"/>
+            <a:ext cx="10573450" cy="5869671"/>
+          </a:xfrm>
+          <a:prstGeom prst="rect">
+            <a:avLst/>
+          </a:prstGeom>
         </p:spPr>
       </p:pic>
     </p:spTree>
@@ -17725,7 +18014,7 @@
               <a:t>Chats are private and visible only to their creators. Creators have the option to share their chats when this feature is enabled in the web part settings (disabled by default). </a:t>
             </a:r>
             <a:r>
-              <a:rPr lang="en-US" b="0" i="0">
+              <a:rPr lang="en-US" b="0" i="0" dirty="0">
                 <a:solidFill>
                   <a:srgbClr val="242424"/>
                 </a:solidFill>
@@ -17796,23 +18085,7 @@
             </a:r>
             <a:r>
               <a:rPr lang="en-US" dirty="0"/>
-              <a:t>: Using the Native </a:t>
-            </a:r>
-            <a:r>
-              <a:rPr lang="en-US" dirty="0" err="1"/>
-              <a:t>OpenAI</a:t>
-            </a:r>
-            <a:r>
-              <a:rPr lang="en-US" dirty="0"/>
-              <a:t> endpoint could grant you access to the latest language models like GPT-4 Vision and GPT-4 1106 Parallel processing that are not currently available in Azure </a:t>
-            </a:r>
-            <a:r>
-              <a:rPr lang="en-US" dirty="0" err="1"/>
-              <a:t>OpenAI</a:t>
-            </a:r>
-            <a:r>
-              <a:rPr lang="en-US" dirty="0"/>
-              <a:t>.</a:t>
+              <a:t>: Using the Native OpenAI endpoint could grant you access to the latest language models like GPT-4 Vision and GPT-4 Turbo 128k (1106 Preview).</a:t>
             </a:r>
           </a:p>
           <a:p>
@@ -17895,37 +18168,32 @@
       </p:sp>
       <p:pic>
         <p:nvPicPr>
-          <p:cNvPr id="5" name="Content Placeholder 4" descr="A screenshot of a computer program&#10;&#10;Description automatically generated">
-            <a:extLst>
-              <a:ext uri="{FF2B5EF4-FFF2-40B4-BE49-F238E27FC236}">
-                <a16:creationId xmlns:a16="http://schemas.microsoft.com/office/drawing/2014/main" id="{064F1820-447F-FDE5-E82A-87C8736A8D35}"/>
+          <p:cNvPr id="9" name="Picture 8">
+            <a:extLst>
+              <a:ext uri="{FF2B5EF4-FFF2-40B4-BE49-F238E27FC236}">
+                <a16:creationId xmlns:a16="http://schemas.microsoft.com/office/drawing/2014/main" id="{272BC01E-7E7D-21FE-6E4B-A910B1BA4C12}"/>
               </a:ext>
             </a:extLst>
           </p:cNvPr>
           <p:cNvPicPr>
-            <a:picLocks noGrp="1" noChangeAspect="1"/>
+            <a:picLocks noChangeAspect="1"/>
           </p:cNvPicPr>
-          <p:nvPr>
-            <p:ph idx="1"/>
-          </p:nvPr>
+          <p:nvPr/>
         </p:nvPicPr>
         <p:blipFill>
-          <a:blip r:embed="rId2">
-            <a:extLst>
-              <a:ext uri="{28A0092B-C50C-407E-A947-70E740481C1C}">
-                <a14:useLocalDpi xmlns:a14="http://schemas.microsoft.com/office/drawing/2010/main" val="0"/>
-              </a:ext>
-            </a:extLst>
-          </a:blip>
+          <a:blip r:embed="rId2"/>
           <a:stretch>
             <a:fillRect/>
           </a:stretch>
         </p:blipFill>
         <p:spPr>
           <a:xfrm>
-            <a:off x="838199" y="1032094"/>
-            <a:ext cx="10216081" cy="5743633"/>
-          </a:xfrm>
+            <a:off x="876299" y="871537"/>
+            <a:ext cx="10500247" cy="5862638"/>
+          </a:xfrm>
+          <a:prstGeom prst="rect">
+            <a:avLst/>
+          </a:prstGeom>
         </p:spPr>
       </p:pic>
     </p:spTree>
@@ -18144,7 +18412,7 @@
         </p:spPr>
         <p:txBody>
           <a:bodyPr>
-            <a:normAutofit fontScale="55000" lnSpcReduction="20000"/>
+            <a:normAutofit fontScale="47500" lnSpcReduction="20000"/>
           </a:bodyPr>
           <a:lstStyle/>
           <a:p>
@@ -18159,25 +18427,25 @@
           <a:p>
             <a:r>
               <a:rPr lang="en-US" dirty="0"/>
-              <a:t>Support for the latest text language models provided by Microsoft and Native OpenAI: GPT-4 32k, GPT 3.5 16k, GPT-4 Vision, GPT-4 1106, GPT-3.5 1106</a:t>
+              <a:t>Support for the latest text language models provided by Microsoft and Native OpenAI: GPT-4 32k, GPT 3.5 16k, GPT-4 Vision, GPT-4 Turbo (1106)</a:t>
             </a:r>
           </a:p>
           <a:p>
             <a:r>
               <a:rPr lang="en-US" dirty="0"/>
-              <a:t>Unlimited Chats and Unlimited Chat History Length</a:t>
+              <a:t>Unlimited Chats per user and the option to support Unlimited Chat History Length</a:t>
             </a:r>
           </a:p>
           <a:p>
             <a:r>
               <a:rPr lang="en-US" dirty="0"/>
-              <a:t>Chat Sharing: Unlimited for Everyone and Private for a limited number of Members</a:t>
+              <a:t>Chat Sharing: Public sharing with Everyone in the company and Private sharing for a limited number of company users</a:t>
             </a:r>
           </a:p>
           <a:p>
             <a:r>
               <a:rPr lang="en-US" dirty="0"/>
-              <a:t>Support for Full-Screen Mode. Support for Regular and Full-Width Site Page Sections</a:t>
+              <a:t>Support for the Full-Screen Mode. Support for Regular and Full-Width Site Page Sections</a:t>
             </a:r>
           </a:p>
           <a:p>
@@ -18220,6 +18488,20 @@
             <a:pPr lvl="1"/>
             <a:r>
               <a:rPr lang="en-US" dirty="0"/>
+              <a:t>AI-Image generations with Dalle3. High-definition images available out-of-the-box</a:t>
+            </a:r>
+          </a:p>
+          <a:p>
+            <a:pPr lvl="1"/>
+            <a:r>
+              <a:rPr lang="en-US" dirty="0"/>
+              <a:t>Search on the Internet with Bing and Google</a:t>
+            </a:r>
+          </a:p>
+          <a:p>
+            <a:pPr lvl="1"/>
+            <a:r>
+              <a:rPr lang="en-US" dirty="0"/>
               <a:t>SharePoint Search</a:t>
             </a:r>
           </a:p>
@@ -18252,19 +18534,18 @@
             </a:r>
             <a:r>
               <a:rPr lang="en-US" sz="2100" dirty="0"/>
-              <a:t>content. As of November 2023, Image Analysis </a:t>
+              <a:t>content. As of December 2023, Image Analysis </a:t>
             </a:r>
             <a:r>
               <a:rPr lang="en-US" dirty="0"/>
-              <a:t>is only available with the Native </a:t>
-            </a:r>
-            <a:r>
-              <a:rPr lang="en-US" dirty="0" err="1"/>
-              <a:t>OpenAI</a:t>
-            </a:r>
+              <a:t>is only available with the Native OpenAI endpoint</a:t>
+            </a:r>
+          </a:p>
+          <a:p>
+            <a:pPr lvl="1"/>
             <a:r>
               <a:rPr lang="en-US" dirty="0"/>
-              <a:t> endpoint.</a:t>
+              <a:t>Voice input and examples for prompt texts</a:t>
             </a:r>
           </a:p>
           <a:p>
@@ -18303,7 +18584,7 @@
           <a:p>
             <a:r>
               <a:rPr lang="en-US" dirty="0"/>
-              <a:t>Seamless support for Azure OpenAI and Native OpenAI API</a:t>
+              <a:t>Default support for Azure OpenAI and Native OpenAI API</a:t>
             </a:r>
           </a:p>
           <a:p>
@@ -18323,7 +18604,7 @@
             <a:pPr lvl="1"/>
             <a:r>
               <a:rPr lang="en-US" dirty="0"/>
-              <a:t>Azure SQL Database: Provides Enterprise-grade performance, Tested on 1 Million+ Chat records</a:t>
+              <a:t>Azure SQL Database: Provides more advanced storage capabilities tested on 1 Million+ Chat records</a:t>
             </a:r>
           </a:p>
           <a:p>
@@ -21465,6 +21746,40 @@
 </file>
 
 <file path=customXml/item1.xml><?xml version="1.0" encoding="utf-8"?>
+<p:properties xmlns:p="http://schemas.microsoft.com/office/2006/metadata/properties" xmlns:xsi="http://www.w3.org/2001/XMLSchema-instance" xmlns:pc="http://schemas.microsoft.com/office/infopath/2007/PartnerControls">
+  <documentManagement>
+    <SharedWithUsers xmlns="c798f8e1-d94f-43b6-bccc-367c41141139">
+      <UserInfo>
+        <DisplayName>Mikko Niemi</DisplayName>
+        <AccountId>737</AccountId>
+        <AccountType/>
+      </UserInfo>
+      <UserInfo>
+        <DisplayName>Paul Borisov</DisplayName>
+        <AccountId>877</AccountId>
+        <AccountType/>
+      </UserInfo>
+    </SharedWithUsers>
+    <Active xmlns="392cedaa-eab3-47fe-9a6e-9ea878a2bb54">true</Active>
+    <lcf76f155ced4ddcb4097134ff3c332f xmlns="392cedaa-eab3-47fe-9a6e-9ea878a2bb54">
+      <Terms xmlns="http://schemas.microsoft.com/office/infopath/2007/PartnerControls"/>
+    </lcf76f155ced4ddcb4097134ff3c332f>
+    <TaxCatchAll xmlns="c798f8e1-d94f-43b6-bccc-367c41141139" xsi:nil="true"/>
+    <_Flow_SignoffStatus xmlns="392cedaa-eab3-47fe-9a6e-9ea878a2bb54" xsi:nil="true"/>
+  </documentManagement>
+</p:properties>
+</file>
+
+<file path=customXml/item2.xml><?xml version="1.0" encoding="utf-8"?>
+<?mso-contentType ?>
+<FormTemplates xmlns="http://schemas.microsoft.com/sharepoint/v3/contenttype/forms">
+  <Display>DocumentLibraryForm</Display>
+  <Edit>DocumentLibraryForm</Edit>
+  <New>DocumentLibraryForm</New>
+</FormTemplates>
+</file>
+
+<file path=customXml/item3.xml><?xml version="1.0" encoding="utf-8"?>
 <ct:contentTypeSchema xmlns:ct="http://schemas.microsoft.com/office/2006/metadata/contentType" xmlns:ma="http://schemas.microsoft.com/office/2006/metadata/properties/metaAttributes" ct:_="" ma:_="" ma:contentTypeName="Document" ma:contentTypeID="0x0101008D2B64339E820D49817C0EC2C570556A" ma:contentTypeVersion="20" ma:contentTypeDescription="Create a new document." ma:contentTypeScope="" ma:versionID="a73d3dbd2a54abdd6f0b69909c857179">
   <xsd:schema xmlns:xsd="http://www.w3.org/2001/XMLSchema" xmlns:xs="http://www.w3.org/2001/XMLSchema" xmlns:p="http://schemas.microsoft.com/office/2006/metadata/properties" xmlns:ns2="392cedaa-eab3-47fe-9a6e-9ea878a2bb54" xmlns:ns3="c798f8e1-d94f-43b6-bccc-367c41141139" targetNamespace="http://schemas.microsoft.com/office/2006/metadata/properties" ma:root="true" ma:fieldsID="9b05d43af1f1fef90c53f865b6e9612b" ns2:_="" ns3:_="">
     <xsd:import namespace="392cedaa-eab3-47fe-9a6e-9ea878a2bb54"/>
@@ -21725,41 +22040,32 @@
 </ct:contentTypeSchema>
 </file>
 
-<file path=customXml/item2.xml><?xml version="1.0" encoding="utf-8"?>
-<?mso-contentType ?>
-<FormTemplates xmlns="http://schemas.microsoft.com/sharepoint/v3/contenttype/forms">
-  <Display>DocumentLibraryForm</Display>
-  <Edit>DocumentLibraryForm</Edit>
-  <New>DocumentLibraryForm</New>
-</FormTemplates>
+<file path=customXml/itemProps1.xml><?xml version="1.0" encoding="utf-8"?>
+<ds:datastoreItem xmlns:ds="http://schemas.openxmlformats.org/officeDocument/2006/customXml" ds:itemID="{F046CC52-5A97-4F3F-A94E-EB63C63EC836}">
+  <ds:schemaRefs>
+    <ds:schemaRef ds:uri="http://purl.org/dc/dcmitype/"/>
+    <ds:schemaRef ds:uri="392cedaa-eab3-47fe-9a6e-9ea878a2bb54"/>
+    <ds:schemaRef ds:uri="http://purl.org/dc/elements/1.1/"/>
+    <ds:schemaRef ds:uri="c798f8e1-d94f-43b6-bccc-367c41141139"/>
+    <ds:schemaRef ds:uri="http://www.w3.org/XML/1998/namespace"/>
+    <ds:schemaRef ds:uri="http://schemas.microsoft.com/office/2006/metadata/properties"/>
+    <ds:schemaRef ds:uri="http://schemas.openxmlformats.org/package/2006/metadata/core-properties"/>
+    <ds:schemaRef ds:uri="http://purl.org/dc/terms/"/>
+    <ds:schemaRef ds:uri="http://schemas.microsoft.com/office/2006/documentManagement/types"/>
+    <ds:schemaRef ds:uri="http://schemas.microsoft.com/office/infopath/2007/PartnerControls"/>
+  </ds:schemaRefs>
+</ds:datastoreItem>
 </file>
 
-<file path=customXml/item3.xml><?xml version="1.0" encoding="utf-8"?>
-<p:properties xmlns:p="http://schemas.microsoft.com/office/2006/metadata/properties" xmlns:xsi="http://www.w3.org/2001/XMLSchema-instance" xmlns:pc="http://schemas.microsoft.com/office/infopath/2007/PartnerControls">
-  <documentManagement>
-    <SharedWithUsers xmlns="c798f8e1-d94f-43b6-bccc-367c41141139">
-      <UserInfo>
-        <DisplayName>Mikko Niemi</DisplayName>
-        <AccountId>737</AccountId>
-        <AccountType/>
-      </UserInfo>
-      <UserInfo>
-        <DisplayName>Paul Borisov</DisplayName>
-        <AccountId>877</AccountId>
-        <AccountType/>
-      </UserInfo>
-    </SharedWithUsers>
-    <Active xmlns="392cedaa-eab3-47fe-9a6e-9ea878a2bb54">true</Active>
-    <lcf76f155ced4ddcb4097134ff3c332f xmlns="392cedaa-eab3-47fe-9a6e-9ea878a2bb54">
-      <Terms xmlns="http://schemas.microsoft.com/office/infopath/2007/PartnerControls"/>
-    </lcf76f155ced4ddcb4097134ff3c332f>
-    <TaxCatchAll xmlns="c798f8e1-d94f-43b6-bccc-367c41141139" xsi:nil="true"/>
-    <_Flow_SignoffStatus xmlns="392cedaa-eab3-47fe-9a6e-9ea878a2bb54" xsi:nil="true"/>
-  </documentManagement>
-</p:properties>
+<file path=customXml/itemProps2.xml><?xml version="1.0" encoding="utf-8"?>
+<ds:datastoreItem xmlns:ds="http://schemas.openxmlformats.org/officeDocument/2006/customXml" ds:itemID="{57BC327B-C3C1-4E06-92DC-7EC1EA012C4A}">
+  <ds:schemaRefs>
+    <ds:schemaRef ds:uri="http://schemas.microsoft.com/sharepoint/v3/contenttype/forms"/>
+  </ds:schemaRefs>
+</ds:datastoreItem>
 </file>
 
-<file path=customXml/itemProps1.xml><?xml version="1.0" encoding="utf-8"?>
+<file path=customXml/itemProps3.xml><?xml version="1.0" encoding="utf-8"?>
 <ds:datastoreItem xmlns:ds="http://schemas.openxmlformats.org/officeDocument/2006/customXml" ds:itemID="{B8C4BC3E-5712-4D8B-9BE3-2381F7BB3389}">
   <ds:schemaRefs>
     <ds:schemaRef ds:uri="http://schemas.microsoft.com/office/2006/metadata/contentType"/>
@@ -21778,31 +22084,6 @@
 </ds:datastoreItem>
 </file>
 
-<file path=customXml/itemProps2.xml><?xml version="1.0" encoding="utf-8"?>
-<ds:datastoreItem xmlns:ds="http://schemas.openxmlformats.org/officeDocument/2006/customXml" ds:itemID="{57BC327B-C3C1-4E06-92DC-7EC1EA012C4A}">
-  <ds:schemaRefs>
-    <ds:schemaRef ds:uri="http://schemas.microsoft.com/sharepoint/v3/contenttype/forms"/>
-  </ds:schemaRefs>
-</ds:datastoreItem>
-</file>
-
-<file path=customXml/itemProps3.xml><?xml version="1.0" encoding="utf-8"?>
-<ds:datastoreItem xmlns:ds="http://schemas.openxmlformats.org/officeDocument/2006/customXml" ds:itemID="{F046CC52-5A97-4F3F-A94E-EB63C63EC836}">
-  <ds:schemaRefs>
-    <ds:schemaRef ds:uri="http://purl.org/dc/dcmitype/"/>
-    <ds:schemaRef ds:uri="392cedaa-eab3-47fe-9a6e-9ea878a2bb54"/>
-    <ds:schemaRef ds:uri="http://purl.org/dc/elements/1.1/"/>
-    <ds:schemaRef ds:uri="c798f8e1-d94f-43b6-bccc-367c41141139"/>
-    <ds:schemaRef ds:uri="http://www.w3.org/XML/1998/namespace"/>
-    <ds:schemaRef ds:uri="http://schemas.microsoft.com/office/2006/metadata/properties"/>
-    <ds:schemaRef ds:uri="http://schemas.openxmlformats.org/package/2006/metadata/core-properties"/>
-    <ds:schemaRef ds:uri="http://purl.org/dc/terms/"/>
-    <ds:schemaRef ds:uri="http://schemas.microsoft.com/office/2006/documentManagement/types"/>
-    <ds:schemaRef ds:uri="http://schemas.microsoft.com/office/infopath/2007/PartnerControls"/>
-  </ds:schemaRefs>
-</ds:datastoreItem>
-</file>
-
 <file path=docMetadata/LabelInfo.xml><?xml version="1.0" encoding="utf-8"?>
 <clbl:labelList xmlns:clbl="http://schemas.microsoft.com/office/2020/mipLabelMetadata">
   <clbl:label id="{70d22a8d-923a-445e-82d4-32329da21746}" enabled="0" method="" siteId="{70d22a8d-923a-445e-82d4-32329da21746}" removed="1"/>

</xml_diff>

<commit_message>
Beta 1.2: added APIM support for GPT-4 Vision, optimized image saving on analysis (saved to ChatImages if it exists otherwise compressed to JPEG), added a separate checkbox to enable Vision model.
</commit_message>
<xml_diff>
--- a/docs/azure-openai-chat-web-part-presentation.pptx
+++ b/docs/azure-openai-chat-web-part-presentation.pptx
@@ -222,7 +222,7 @@
           <a:p>
             <a:fld id="{36A20F55-E09E-7F42-B5C2-206BEAFB62A2}" type="datetimeFigureOut">
               <a:rPr lang="sv-SE" smtClean="0"/>
-              <a:t>2023-12-11</a:t>
+              <a:t>2023-12-13</a:t>
             </a:fld>
             <a:endParaRPr lang="sv-SE"/>
           </a:p>
@@ -908,7 +908,7 @@
             <a:fld id="{C6F47C66-D121-9A42-BA24-809897433D99}" type="datetimeFigureOut">
               <a:rPr lang="sv-SE" smtClean="0"/>
               <a:pPr/>
-              <a:t>2023-12-11</a:t>
+              <a:t>2023-12-13</a:t>
             </a:fld>
             <a:endParaRPr lang="sv-SE" dirty="0"/>
           </a:p>
@@ -4298,7 +4298,7 @@
             <a:fld id="{C6F47C66-D121-9A42-BA24-809897433D99}" type="datetimeFigureOut">
               <a:rPr lang="sv-SE" smtClean="0"/>
               <a:pPr/>
-              <a:t>2023-12-11</a:t>
+              <a:t>2023-12-13</a:t>
             </a:fld>
             <a:endParaRPr lang="sv-SE" dirty="0"/>
           </a:p>
@@ -13185,7 +13185,7 @@
           <a:p>
             <a:fld id="{787A3980-9F17-4DF1-B0CE-86F31B480A53}" type="datetimeFigureOut">
               <a:rPr lang="en-US" smtClean="0"/>
-              <a:t>12/11/2023</a:t>
+              <a:t>12/13/2023</a:t>
             </a:fld>
             <a:endParaRPr lang="en-US"/>
           </a:p>
@@ -17739,10 +17739,10 @@
       </p:pic>
       <p:pic>
         <p:nvPicPr>
-          <p:cNvPr id="8" name="Picture 7">
-            <a:extLst>
-              <a:ext uri="{FF2B5EF4-FFF2-40B4-BE49-F238E27FC236}">
-                <a16:creationId xmlns:a16="http://schemas.microsoft.com/office/drawing/2014/main" id="{D19D1FDD-4F34-7C9A-4736-B6D9BC87E8F4}"/>
+          <p:cNvPr id="4" name="Picture 3">
+            <a:extLst>
+              <a:ext uri="{FF2B5EF4-FFF2-40B4-BE49-F238E27FC236}">
+                <a16:creationId xmlns:a16="http://schemas.microsoft.com/office/drawing/2014/main" id="{002F5C68-4223-2106-1D8E-28AC1425264E}"/>
               </a:ext>
             </a:extLst>
           </p:cNvPr>
@@ -17759,8 +17759,8 @@
         </p:blipFill>
         <p:spPr>
           <a:xfrm>
-            <a:off x="9663086" y="824138"/>
-            <a:ext cx="2115502" cy="5747657"/>
+            <a:off x="9690597" y="824137"/>
+            <a:ext cx="2021502" cy="5747657"/>
           </a:xfrm>
           <a:prstGeom prst="rect">
             <a:avLst/>
@@ -17834,10 +17834,10 @@
       </p:sp>
       <p:pic>
         <p:nvPicPr>
-          <p:cNvPr id="7" name="Picture 6" descr="A screenshot of a computer&#10;&#10;Description automatically generated">
-            <a:extLst>
-              <a:ext uri="{FF2B5EF4-FFF2-40B4-BE49-F238E27FC236}">
-                <a16:creationId xmlns:a16="http://schemas.microsoft.com/office/drawing/2014/main" id="{5DD7AA24-E70F-7352-C9FE-FAF9CB083B5F}"/>
+          <p:cNvPr id="4" name="Picture 3" descr="A diagram of a cloud computing system&#10;&#10;Description automatically generated with medium confidence">
+            <a:extLst>
+              <a:ext uri="{FF2B5EF4-FFF2-40B4-BE49-F238E27FC236}">
+                <a16:creationId xmlns:a16="http://schemas.microsoft.com/office/drawing/2014/main" id="{502193B8-1CDB-FFAB-6E00-B2968AF33970}"/>
               </a:ext>
             </a:extLst>
           </p:cNvPr>
@@ -17854,8 +17854,8 @@
         </p:blipFill>
         <p:spPr>
           <a:xfrm>
-            <a:off x="970850" y="647311"/>
-            <a:ext cx="10573450" cy="5869671"/>
+            <a:off x="838199" y="642547"/>
+            <a:ext cx="11069060" cy="6091628"/>
           </a:xfrm>
           <a:prstGeom prst="rect">
             <a:avLst/>
@@ -18085,7 +18085,7 @@
             </a:r>
             <a:r>
               <a:rPr lang="en-US" dirty="0"/>
-              <a:t>: Using the Native OpenAI endpoint could grant you access to the latest language models like GPT-4 Vision and GPT-4 Turbo 128k (1106 Preview).</a:t>
+              <a:t>: Using the Native OpenAI endpoint could grant you access to the newly released language models that are not yet available in Azure OpenAI.</a:t>
             </a:r>
           </a:p>
           <a:p>
@@ -18427,7 +18427,7 @@
           <a:p>
             <a:r>
               <a:rPr lang="en-US" dirty="0"/>
-              <a:t>Support for the latest text language models provided by Microsoft and Native OpenAI: GPT-4 32k, GPT 3.5 16k, GPT-4 Vision, GPT-4 Turbo (1106)</a:t>
+              <a:t>Support for the latest text language models provided by Microsoft and Native OpenAI: GPT-4 32k, GPT 3.5 16k, GPT-4 Vision, GPT-4 Turbo (1106, 128k)</a:t>
             </a:r>
           </a:p>
           <a:p>
@@ -18534,12 +18534,9 @@
             </a:r>
             <a:r>
               <a:rPr lang="en-US" sz="2100" dirty="0"/>
-              <a:t>content. As of December 2023, Image Analysis </a:t>
-            </a:r>
-            <a:r>
-              <a:rPr lang="en-US" dirty="0"/>
-              <a:t>is only available with the Native OpenAI endpoint</a:t>
-            </a:r>
+              <a:t>content</a:t>
+            </a:r>
+            <a:endParaRPr lang="en-US" dirty="0"/>
           </a:p>
           <a:p>
             <a:pPr lvl="1"/>
@@ -21746,40 +21743,6 @@
 </file>
 
 <file path=customXml/item1.xml><?xml version="1.0" encoding="utf-8"?>
-<p:properties xmlns:p="http://schemas.microsoft.com/office/2006/metadata/properties" xmlns:xsi="http://www.w3.org/2001/XMLSchema-instance" xmlns:pc="http://schemas.microsoft.com/office/infopath/2007/PartnerControls">
-  <documentManagement>
-    <SharedWithUsers xmlns="c798f8e1-d94f-43b6-bccc-367c41141139">
-      <UserInfo>
-        <DisplayName>Mikko Niemi</DisplayName>
-        <AccountId>737</AccountId>
-        <AccountType/>
-      </UserInfo>
-      <UserInfo>
-        <DisplayName>Paul Borisov</DisplayName>
-        <AccountId>877</AccountId>
-        <AccountType/>
-      </UserInfo>
-    </SharedWithUsers>
-    <Active xmlns="392cedaa-eab3-47fe-9a6e-9ea878a2bb54">true</Active>
-    <lcf76f155ced4ddcb4097134ff3c332f xmlns="392cedaa-eab3-47fe-9a6e-9ea878a2bb54">
-      <Terms xmlns="http://schemas.microsoft.com/office/infopath/2007/PartnerControls"/>
-    </lcf76f155ced4ddcb4097134ff3c332f>
-    <TaxCatchAll xmlns="c798f8e1-d94f-43b6-bccc-367c41141139" xsi:nil="true"/>
-    <_Flow_SignoffStatus xmlns="392cedaa-eab3-47fe-9a6e-9ea878a2bb54" xsi:nil="true"/>
-  </documentManagement>
-</p:properties>
-</file>
-
-<file path=customXml/item2.xml><?xml version="1.0" encoding="utf-8"?>
-<?mso-contentType ?>
-<FormTemplates xmlns="http://schemas.microsoft.com/sharepoint/v3/contenttype/forms">
-  <Display>DocumentLibraryForm</Display>
-  <Edit>DocumentLibraryForm</Edit>
-  <New>DocumentLibraryForm</New>
-</FormTemplates>
-</file>
-
-<file path=customXml/item3.xml><?xml version="1.0" encoding="utf-8"?>
 <ct:contentTypeSchema xmlns:ct="http://schemas.microsoft.com/office/2006/metadata/contentType" xmlns:ma="http://schemas.microsoft.com/office/2006/metadata/properties/metaAttributes" ct:_="" ma:_="" ma:contentTypeName="Document" ma:contentTypeID="0x0101008D2B64339E820D49817C0EC2C570556A" ma:contentTypeVersion="20" ma:contentTypeDescription="Create a new document." ma:contentTypeScope="" ma:versionID="a73d3dbd2a54abdd6f0b69909c857179">
   <xsd:schema xmlns:xsd="http://www.w3.org/2001/XMLSchema" xmlns:xs="http://www.w3.org/2001/XMLSchema" xmlns:p="http://schemas.microsoft.com/office/2006/metadata/properties" xmlns:ns2="392cedaa-eab3-47fe-9a6e-9ea878a2bb54" xmlns:ns3="c798f8e1-d94f-43b6-bccc-367c41141139" targetNamespace="http://schemas.microsoft.com/office/2006/metadata/properties" ma:root="true" ma:fieldsID="9b05d43af1f1fef90c53f865b6e9612b" ns2:_="" ns3:_="">
     <xsd:import namespace="392cedaa-eab3-47fe-9a6e-9ea878a2bb54"/>
@@ -22040,32 +22003,41 @@
 </ct:contentTypeSchema>
 </file>
 
-<file path=customXml/itemProps1.xml><?xml version="1.0" encoding="utf-8"?>
-<ds:datastoreItem xmlns:ds="http://schemas.openxmlformats.org/officeDocument/2006/customXml" ds:itemID="{F046CC52-5A97-4F3F-A94E-EB63C63EC836}">
-  <ds:schemaRefs>
-    <ds:schemaRef ds:uri="http://purl.org/dc/dcmitype/"/>
-    <ds:schemaRef ds:uri="392cedaa-eab3-47fe-9a6e-9ea878a2bb54"/>
-    <ds:schemaRef ds:uri="http://purl.org/dc/elements/1.1/"/>
-    <ds:schemaRef ds:uri="c798f8e1-d94f-43b6-bccc-367c41141139"/>
-    <ds:schemaRef ds:uri="http://www.w3.org/XML/1998/namespace"/>
-    <ds:schemaRef ds:uri="http://schemas.microsoft.com/office/2006/metadata/properties"/>
-    <ds:schemaRef ds:uri="http://schemas.openxmlformats.org/package/2006/metadata/core-properties"/>
-    <ds:schemaRef ds:uri="http://purl.org/dc/terms/"/>
-    <ds:schemaRef ds:uri="http://schemas.microsoft.com/office/2006/documentManagement/types"/>
-    <ds:schemaRef ds:uri="http://schemas.microsoft.com/office/infopath/2007/PartnerControls"/>
-  </ds:schemaRefs>
-</ds:datastoreItem>
+<file path=customXml/item2.xml><?xml version="1.0" encoding="utf-8"?>
+<?mso-contentType ?>
+<FormTemplates xmlns="http://schemas.microsoft.com/sharepoint/v3/contenttype/forms">
+  <Display>DocumentLibraryForm</Display>
+  <Edit>DocumentLibraryForm</Edit>
+  <New>DocumentLibraryForm</New>
+</FormTemplates>
 </file>
 
-<file path=customXml/itemProps2.xml><?xml version="1.0" encoding="utf-8"?>
-<ds:datastoreItem xmlns:ds="http://schemas.openxmlformats.org/officeDocument/2006/customXml" ds:itemID="{57BC327B-C3C1-4E06-92DC-7EC1EA012C4A}">
-  <ds:schemaRefs>
-    <ds:schemaRef ds:uri="http://schemas.microsoft.com/sharepoint/v3/contenttype/forms"/>
-  </ds:schemaRefs>
-</ds:datastoreItem>
+<file path=customXml/item3.xml><?xml version="1.0" encoding="utf-8"?>
+<p:properties xmlns:p="http://schemas.microsoft.com/office/2006/metadata/properties" xmlns:xsi="http://www.w3.org/2001/XMLSchema-instance" xmlns:pc="http://schemas.microsoft.com/office/infopath/2007/PartnerControls">
+  <documentManagement>
+    <SharedWithUsers xmlns="c798f8e1-d94f-43b6-bccc-367c41141139">
+      <UserInfo>
+        <DisplayName>Mikko Niemi</DisplayName>
+        <AccountId>737</AccountId>
+        <AccountType/>
+      </UserInfo>
+      <UserInfo>
+        <DisplayName>Paul Borisov</DisplayName>
+        <AccountId>877</AccountId>
+        <AccountType/>
+      </UserInfo>
+    </SharedWithUsers>
+    <Active xmlns="392cedaa-eab3-47fe-9a6e-9ea878a2bb54">true</Active>
+    <lcf76f155ced4ddcb4097134ff3c332f xmlns="392cedaa-eab3-47fe-9a6e-9ea878a2bb54">
+      <Terms xmlns="http://schemas.microsoft.com/office/infopath/2007/PartnerControls"/>
+    </lcf76f155ced4ddcb4097134ff3c332f>
+    <TaxCatchAll xmlns="c798f8e1-d94f-43b6-bccc-367c41141139" xsi:nil="true"/>
+    <_Flow_SignoffStatus xmlns="392cedaa-eab3-47fe-9a6e-9ea878a2bb54" xsi:nil="true"/>
+  </documentManagement>
+</p:properties>
 </file>
 
-<file path=customXml/itemProps3.xml><?xml version="1.0" encoding="utf-8"?>
+<file path=customXml/itemProps1.xml><?xml version="1.0" encoding="utf-8"?>
 <ds:datastoreItem xmlns:ds="http://schemas.openxmlformats.org/officeDocument/2006/customXml" ds:itemID="{B8C4BC3E-5712-4D8B-9BE3-2381F7BB3389}">
   <ds:schemaRefs>
     <ds:schemaRef ds:uri="http://schemas.microsoft.com/office/2006/metadata/contentType"/>
@@ -22084,6 +22056,31 @@
 </ds:datastoreItem>
 </file>
 
+<file path=customXml/itemProps2.xml><?xml version="1.0" encoding="utf-8"?>
+<ds:datastoreItem xmlns:ds="http://schemas.openxmlformats.org/officeDocument/2006/customXml" ds:itemID="{57BC327B-C3C1-4E06-92DC-7EC1EA012C4A}">
+  <ds:schemaRefs>
+    <ds:schemaRef ds:uri="http://schemas.microsoft.com/sharepoint/v3/contenttype/forms"/>
+  </ds:schemaRefs>
+</ds:datastoreItem>
+</file>
+
+<file path=customXml/itemProps3.xml><?xml version="1.0" encoding="utf-8"?>
+<ds:datastoreItem xmlns:ds="http://schemas.openxmlformats.org/officeDocument/2006/customXml" ds:itemID="{F046CC52-5A97-4F3F-A94E-EB63C63EC836}">
+  <ds:schemaRefs>
+    <ds:schemaRef ds:uri="http://purl.org/dc/dcmitype/"/>
+    <ds:schemaRef ds:uri="392cedaa-eab3-47fe-9a6e-9ea878a2bb54"/>
+    <ds:schemaRef ds:uri="http://purl.org/dc/elements/1.1/"/>
+    <ds:schemaRef ds:uri="c798f8e1-d94f-43b6-bccc-367c41141139"/>
+    <ds:schemaRef ds:uri="http://www.w3.org/XML/1998/namespace"/>
+    <ds:schemaRef ds:uri="http://schemas.microsoft.com/office/2006/metadata/properties"/>
+    <ds:schemaRef ds:uri="http://schemas.openxmlformats.org/package/2006/metadata/core-properties"/>
+    <ds:schemaRef ds:uri="http://purl.org/dc/terms/"/>
+    <ds:schemaRef ds:uri="http://schemas.microsoft.com/office/2006/documentManagement/types"/>
+    <ds:schemaRef ds:uri="http://schemas.microsoft.com/office/infopath/2007/PartnerControls"/>
+  </ds:schemaRefs>
+</ds:datastoreItem>
+</file>
+
 <file path=docMetadata/LabelInfo.xml><?xml version="1.0" encoding="utf-8"?>
 <clbl:labelList xmlns:clbl="http://schemas.microsoft.com/office/2020/mipLabelMetadata">
   <clbl:label id="{70d22a8d-923a-445e-82d4-32329da21746}" enabled="0" method="" siteId="{70d22a8d-923a-445e-82d4-32329da21746}" removed="1"/>

</xml_diff>

<commit_message>
Version 1.2: revised documentation and the latest package
</commit_message>
<xml_diff>
--- a/docs/azure-openai-chat-web-part-presentation.pptx
+++ b/docs/azure-openai-chat-web-part-presentation.pptx
@@ -9,7 +9,7 @@
     <p:sldMasterId id="2147483778" r:id="rId8"/>
   </p:sldMasterIdLst>
   <p:notesMasterIdLst>
-    <p:notesMasterId r:id="rId23"/>
+    <p:notesMasterId r:id="rId24"/>
   </p:notesMasterIdLst>
   <p:sldIdLst>
     <p:sldId id="268" r:id="rId9"/>
@@ -18,14 +18,15 @@
     <p:sldId id="259" r:id="rId12"/>
     <p:sldId id="261" r:id="rId13"/>
     <p:sldId id="260" r:id="rId14"/>
-    <p:sldId id="264" r:id="rId15"/>
-    <p:sldId id="262" r:id="rId16"/>
-    <p:sldId id="269" r:id="rId17"/>
-    <p:sldId id="266" r:id="rId18"/>
-    <p:sldId id="272" r:id="rId19"/>
-    <p:sldId id="271" r:id="rId20"/>
-    <p:sldId id="267" r:id="rId21"/>
-    <p:sldId id="265" r:id="rId22"/>
+    <p:sldId id="273" r:id="rId15"/>
+    <p:sldId id="264" r:id="rId16"/>
+    <p:sldId id="262" r:id="rId17"/>
+    <p:sldId id="269" r:id="rId18"/>
+    <p:sldId id="266" r:id="rId19"/>
+    <p:sldId id="272" r:id="rId20"/>
+    <p:sldId id="271" r:id="rId21"/>
+    <p:sldId id="267" r:id="rId22"/>
+    <p:sldId id="265" r:id="rId23"/>
   </p:sldIdLst>
   <p:sldSz cx="12192000" cy="6858000"/>
   <p:notesSz cx="6858000" cy="9144000"/>
@@ -222,7 +223,7 @@
           <a:p>
             <a:fld id="{36A20F55-E09E-7F42-B5C2-206BEAFB62A2}" type="datetimeFigureOut">
               <a:rPr lang="sv-SE" smtClean="0"/>
-              <a:t>2023-12-13</a:t>
+              <a:t>2023-12-23</a:t>
             </a:fld>
             <a:endParaRPr lang="sv-SE"/>
           </a:p>
@@ -908,7 +909,7 @@
             <a:fld id="{C6F47C66-D121-9A42-BA24-809897433D99}" type="datetimeFigureOut">
               <a:rPr lang="sv-SE" smtClean="0"/>
               <a:pPr/>
-              <a:t>2023-12-13</a:t>
+              <a:t>2023-12-23</a:t>
             </a:fld>
             <a:endParaRPr lang="sv-SE" dirty="0"/>
           </a:p>
@@ -4298,7 +4299,7 @@
             <a:fld id="{C6F47C66-D121-9A42-BA24-809897433D99}" type="datetimeFigureOut">
               <a:rPr lang="sv-SE" smtClean="0"/>
               <a:pPr/>
-              <a:t>2023-12-13</a:t>
+              <a:t>2023-12-23</a:t>
             </a:fld>
             <a:endParaRPr lang="sv-SE" dirty="0"/>
           </a:p>
@@ -13185,7 +13186,7 @@
           <a:p>
             <a:fld id="{787A3980-9F17-4DF1-B0CE-86F31B480A53}" type="datetimeFigureOut">
               <a:rPr lang="en-US" smtClean="0"/>
-              <a:t>12/13/2023</a:t>
+              <a:t>12/23/2023</a:t>
             </a:fld>
             <a:endParaRPr lang="en-US"/>
           </a:p>
@@ -16851,8 +16852,13 @@
             </a:br>
             <a:r>
               <a:rPr lang="en-US" dirty="0"/>
-              <a:t>for SharePoint Online</a:t>
-            </a:r>
+              <a:t>for </a:t>
+            </a:r>
+            <a:r>
+              <a:rPr lang="en-US"/>
+              <a:t>SharePoint Online</a:t>
+            </a:r>
+            <a:endParaRPr lang="en-US" dirty="0"/>
           </a:p>
         </p:txBody>
       </p:sp>
@@ -17068,6 +17074,14 @@
 <file path=ppt/slides/slide10.xml><?xml version="1.0" encoding="utf-8"?>
 <p:sld xmlns:a="http://schemas.openxmlformats.org/drawingml/2006/main" xmlns:r="http://schemas.openxmlformats.org/officeDocument/2006/relationships" xmlns:p="http://schemas.openxmlformats.org/presentationml/2006/main">
   <p:cSld>
+    <p:bg>
+      <p:bgPr>
+        <a:solidFill>
+          <a:schemeClr val="bg1"/>
+        </a:solidFill>
+        <a:effectLst/>
+      </p:bgPr>
+    </p:bg>
     <p:spTree>
       <p:nvGrpSpPr>
         <p:cNvPr id="1" name=""/>
@@ -17084,10 +17098,76 @@
       </p:grpSpPr>
       <p:sp>
         <p:nvSpPr>
+          <p:cNvPr id="40" name="Down Arrow 7">
+            <a:extLst>
+              <a:ext uri="{FF2B5EF4-FFF2-40B4-BE49-F238E27FC236}">
+                <a16:creationId xmlns:a16="http://schemas.microsoft.com/office/drawing/2014/main" id="{D4771268-CB57-404A-9271-370EB28F6090}"/>
+              </a:ext>
+              <a:ext uri="{C183D7F6-B498-43B3-948B-1728B52AA6E4}">
+                <adec:decorative xmlns:adec="http://schemas.microsoft.com/office/drawing/2017/decorative" val="1"/>
+              </a:ext>
+            </a:extLst>
+          </p:cNvPr>
+          <p:cNvSpPr>
+            <a:spLocks noGrp="1" noRot="1" noChangeAspect="1" noMove="1" noResize="1" noEditPoints="1" noAdjustHandles="1" noChangeArrowheads="1" noChangeShapeType="1" noTextEdit="1"/>
+          </p:cNvSpPr>
+          <p:nvPr>
+            <p:extLst>
+              <p:ext uri="{386F3935-93C4-4BCD-93E2-E3B085C9AB24}">
+                <p16:designElem xmlns:p16="http://schemas.microsoft.com/office/powerpoint/2015/main" val="1"/>
+              </p:ext>
+            </p:extLst>
+          </p:nvPr>
+        </p:nvSpPr>
+        <p:spPr>
+          <a:xfrm rot="16200000">
+            <a:off x="800100" y="1491343"/>
+            <a:ext cx="3333749" cy="3499103"/>
+          </a:xfrm>
+          <a:prstGeom prst="downArrow">
+            <a:avLst>
+              <a:gd name="adj1" fmla="val 100000"/>
+              <a:gd name="adj2" fmla="val 15788"/>
+            </a:avLst>
+          </a:prstGeom>
+          <a:solidFill>
+            <a:srgbClr val="404040"/>
+          </a:solidFill>
+          <a:ln w="53975">
+            <a:noFill/>
+          </a:ln>
+        </p:spPr>
+        <p:style>
+          <a:lnRef idx="2">
+            <a:schemeClr val="accent1">
+              <a:shade val="50000"/>
+            </a:schemeClr>
+          </a:lnRef>
+          <a:fillRef idx="1">
+            <a:schemeClr val="accent1"/>
+          </a:fillRef>
+          <a:effectRef idx="0">
+            <a:schemeClr val="accent1"/>
+          </a:effectRef>
+          <a:fontRef idx="minor">
+            <a:schemeClr val="lt1"/>
+          </a:fontRef>
+        </p:style>
+        <p:txBody>
+          <a:bodyPr rtlCol="0" anchor="ctr"/>
+          <a:lstStyle/>
+          <a:p>
+            <a:pPr algn="ctr"/>
+            <a:endParaRPr lang="en-US"/>
+          </a:p>
+        </p:txBody>
+      </p:sp>
+      <p:sp>
+        <p:nvSpPr>
           <p:cNvPr id="2" name="Title 1">
             <a:extLst>
               <a:ext uri="{FF2B5EF4-FFF2-40B4-BE49-F238E27FC236}">
-                <a16:creationId xmlns:a16="http://schemas.microsoft.com/office/drawing/2014/main" id="{7193A936-2F2F-96BC-CE44-52D4AF6D60D3}"/>
+                <a16:creationId xmlns:a16="http://schemas.microsoft.com/office/drawing/2014/main" id="{EAFEF875-A7E4-5CCE-5AED-7D80496B5A60}"/>
               </a:ext>
             </a:extLst>
           </p:cNvPr>
@@ -17100,77 +17180,32 @@
         </p:nvSpPr>
         <p:spPr>
           <a:xfrm>
-            <a:off x="504825" y="89850"/>
-            <a:ext cx="10248900" cy="367350"/>
-          </a:xfrm>
-        </p:spPr>
-        <p:txBody>
-          <a:bodyPr>
+            <a:off x="1028700" y="1967266"/>
+            <a:ext cx="2628900" cy="2547257"/>
+          </a:xfrm>
+          <a:prstGeom prst="ellipse">
+            <a:avLst/>
+          </a:prstGeom>
+          <a:noFill/>
+        </p:spPr>
+        <p:txBody>
+          <a:bodyPr vert="horz" lIns="91440" tIns="45720" rIns="91440" bIns="45720" rtlCol="0" anchor="ctr">
             <a:normAutofit/>
           </a:bodyPr>
           <a:lstStyle/>
           <a:p>
-            <a:r>
-              <a:rPr lang="fi-FI" sz="1800" b="1" dirty="0" err="1"/>
-              <a:t>Optional</a:t>
-            </a:r>
-            <a:r>
-              <a:rPr lang="fi-FI" sz="1800" b="1" dirty="0"/>
-              <a:t> </a:t>
-            </a:r>
-            <a:r>
-              <a:rPr lang="fi-FI" sz="1800" b="1" dirty="0" err="1"/>
-              <a:t>integrations</a:t>
-            </a:r>
-            <a:r>
-              <a:rPr lang="fi-FI" sz="1800" b="1" dirty="0"/>
-              <a:t>: </a:t>
-            </a:r>
-            <a:r>
-              <a:rPr lang="fi-FI" sz="1800" b="1" dirty="0" err="1"/>
-              <a:t>Search</a:t>
-            </a:r>
-            <a:r>
-              <a:rPr lang="fi-FI" sz="1800" b="1" dirty="0"/>
-              <a:t> on </a:t>
-            </a:r>
-            <a:r>
-              <a:rPr lang="fi-FI" sz="1800" b="1" dirty="0" err="1"/>
-              <a:t>the</a:t>
-            </a:r>
-            <a:r>
-              <a:rPr lang="fi-FI" sz="1800" b="1" dirty="0"/>
-              <a:t> Internet </a:t>
-            </a:r>
-            <a:r>
-              <a:rPr lang="fi-FI" sz="1800" b="1" dirty="0" err="1"/>
-              <a:t>with</a:t>
-            </a:r>
-            <a:r>
-              <a:rPr lang="fi-FI" sz="1800" b="1" dirty="0"/>
-              <a:t> </a:t>
-            </a:r>
-            <a:r>
-              <a:rPr lang="fi-FI" sz="1800" b="1" dirty="0" err="1"/>
-              <a:t>the</a:t>
-            </a:r>
-            <a:r>
-              <a:rPr lang="fi-FI" sz="1800" b="1" dirty="0"/>
-              <a:t> </a:t>
-            </a:r>
-            <a:r>
-              <a:rPr lang="fi-FI" sz="1800" b="1" dirty="0" err="1"/>
-              <a:t>summary</a:t>
-            </a:r>
-            <a:r>
-              <a:rPr lang="fi-FI" sz="1800" b="1" dirty="0"/>
-              <a:t> for Bing and Google </a:t>
-            </a:r>
-            <a:r>
-              <a:rPr lang="fi-FI" sz="1800" b="1" dirty="0" err="1"/>
-              <a:t>results</a:t>
-            </a:r>
-            <a:endParaRPr lang="en-US" sz="1800" b="1" dirty="0"/>
+            <a:pPr algn="ctr"/>
+            <a:r>
+              <a:rPr lang="en-US" sz="2500" kern="1200" dirty="0">
+                <a:solidFill>
+                  <a:srgbClr val="FFFFFF"/>
+                </a:solidFill>
+                <a:latin typeface="+mj-lt"/>
+                <a:ea typeface="+mj-ea"/>
+                <a:cs typeface="+mj-cs"/>
+              </a:rPr>
+              <a:t>Upload and Summarize PDF content</a:t>
+            </a:r>
           </a:p>
         </p:txBody>
       </p:sp>
@@ -17179,7 +17214,7 @@
           <p:cNvPr id="6" name="Picture 5">
             <a:extLst>
               <a:ext uri="{FF2B5EF4-FFF2-40B4-BE49-F238E27FC236}">
-                <a16:creationId xmlns:a16="http://schemas.microsoft.com/office/drawing/2014/main" id="{14F35C15-B612-A23D-D19B-4752C8B25D28}"/>
+                <a16:creationId xmlns:a16="http://schemas.microsoft.com/office/drawing/2014/main" id="{13A3744A-9F9C-FBF8-BC2E-266B8A5B5C82}"/>
               </a:ext>
             </a:extLst>
           </p:cNvPr>
@@ -17196,8 +17231,8 @@
         </p:blipFill>
         <p:spPr>
           <a:xfrm>
-            <a:off x="0" y="520708"/>
-            <a:ext cx="12192000" cy="5816584"/>
+            <a:off x="4311775" y="1557338"/>
+            <a:ext cx="7741186" cy="3776662"/>
           </a:xfrm>
           <a:prstGeom prst="rect">
             <a:avLst/>
@@ -17207,7 +17242,7 @@
     </p:spTree>
     <p:extLst>
       <p:ext uri="{BB962C8B-B14F-4D97-AF65-F5344CB8AC3E}">
-        <p14:creationId xmlns:p14="http://schemas.microsoft.com/office/powerpoint/2010/main" val="43961023"/>
+        <p14:creationId xmlns:p14="http://schemas.microsoft.com/office/powerpoint/2010/main" val="3216709208"/>
       </p:ext>
     </p:extLst>
   </p:cSld>
@@ -17258,32 +17293,80 @@
         </p:spPr>
         <p:txBody>
           <a:bodyPr>
-            <a:normAutofit fontScale="90000"/>
+            <a:normAutofit/>
           </a:bodyPr>
           <a:lstStyle/>
           <a:p>
             <a:r>
-              <a:rPr lang="fi-FI" sz="2200" b="1" dirty="0"/>
-              <a:t>Image </a:t>
-            </a:r>
-            <a:r>
-              <a:rPr lang="fi-FI" sz="2200" b="1" dirty="0" err="1"/>
-              <a:t>Generations</a:t>
-            </a:r>
-            <a:r>
-              <a:rPr lang="fi-FI" sz="2200" b="1" dirty="0"/>
-              <a:t>: Dalle-3</a:t>
-            </a:r>
-            <a:endParaRPr lang="en-US" sz="2200" b="1" dirty="0"/>
+              <a:rPr lang="fi-FI" sz="1800" b="1" dirty="0" err="1"/>
+              <a:t>Optional</a:t>
+            </a:r>
+            <a:r>
+              <a:rPr lang="fi-FI" sz="1800" b="1" dirty="0"/>
+              <a:t> </a:t>
+            </a:r>
+            <a:r>
+              <a:rPr lang="fi-FI" sz="1800" b="1" dirty="0" err="1"/>
+              <a:t>integrations</a:t>
+            </a:r>
+            <a:r>
+              <a:rPr lang="fi-FI" sz="1800" b="1" dirty="0"/>
+              <a:t>: </a:t>
+            </a:r>
+            <a:r>
+              <a:rPr lang="fi-FI" sz="1800" b="1" dirty="0" err="1"/>
+              <a:t>Search</a:t>
+            </a:r>
+            <a:r>
+              <a:rPr lang="fi-FI" sz="1800" b="1" dirty="0"/>
+              <a:t> on </a:t>
+            </a:r>
+            <a:r>
+              <a:rPr lang="fi-FI" sz="1800" b="1" dirty="0" err="1"/>
+              <a:t>the</a:t>
+            </a:r>
+            <a:r>
+              <a:rPr lang="fi-FI" sz="1800" b="1" dirty="0"/>
+              <a:t> Internet </a:t>
+            </a:r>
+            <a:r>
+              <a:rPr lang="fi-FI" sz="1800" b="1" dirty="0" err="1"/>
+              <a:t>with</a:t>
+            </a:r>
+            <a:r>
+              <a:rPr lang="fi-FI" sz="1800" b="1" dirty="0"/>
+              <a:t> </a:t>
+            </a:r>
+            <a:r>
+              <a:rPr lang="fi-FI" sz="1800" b="1" dirty="0" err="1"/>
+              <a:t>the</a:t>
+            </a:r>
+            <a:r>
+              <a:rPr lang="fi-FI" sz="1800" b="1" dirty="0"/>
+              <a:t> </a:t>
+            </a:r>
+            <a:r>
+              <a:rPr lang="fi-FI" sz="1800" b="1" dirty="0" err="1"/>
+              <a:t>summary</a:t>
+            </a:r>
+            <a:r>
+              <a:rPr lang="fi-FI" sz="1800" b="1" dirty="0"/>
+              <a:t> for Bing and Google </a:t>
+            </a:r>
+            <a:r>
+              <a:rPr lang="fi-FI" sz="1800" b="1" dirty="0" err="1"/>
+              <a:t>results</a:t>
+            </a:r>
+            <a:endParaRPr lang="en-US" sz="1800" b="1" dirty="0"/>
           </a:p>
         </p:txBody>
       </p:sp>
       <p:pic>
         <p:nvPicPr>
-          <p:cNvPr id="4" name="Picture 3">
-            <a:extLst>
-              <a:ext uri="{FF2B5EF4-FFF2-40B4-BE49-F238E27FC236}">
-                <a16:creationId xmlns:a16="http://schemas.microsoft.com/office/drawing/2014/main" id="{6CA54F19-0F1F-A1D5-93FE-EEB1EACBB84E}"/>
+          <p:cNvPr id="6" name="Picture 5">
+            <a:extLst>
+              <a:ext uri="{FF2B5EF4-FFF2-40B4-BE49-F238E27FC236}">
+                <a16:creationId xmlns:a16="http://schemas.microsoft.com/office/drawing/2014/main" id="{14F35C15-B612-A23D-D19B-4752C8B25D28}"/>
               </a:ext>
             </a:extLst>
           </p:cNvPr>
@@ -17300,8 +17383,8 @@
         </p:blipFill>
         <p:spPr>
           <a:xfrm>
-            <a:off x="597801" y="565638"/>
-            <a:ext cx="7688949" cy="6093758"/>
+            <a:off x="0" y="520708"/>
+            <a:ext cx="12192000" cy="5816584"/>
           </a:xfrm>
           <a:prstGeom prst="rect">
             <a:avLst/>
@@ -17311,7 +17394,7 @@
     </p:spTree>
     <p:extLst>
       <p:ext uri="{BB962C8B-B14F-4D97-AF65-F5344CB8AC3E}">
-        <p14:creationId xmlns:p14="http://schemas.microsoft.com/office/powerpoint/2010/main" val="766200924"/>
+        <p14:creationId xmlns:p14="http://schemas.microsoft.com/office/powerpoint/2010/main" val="43961023"/>
       </p:ext>
     </p:extLst>
   </p:cSld>
@@ -17357,58 +17440,37 @@
         <p:spPr>
           <a:xfrm>
             <a:off x="504825" y="89850"/>
-            <a:ext cx="10515600" cy="633600"/>
+            <a:ext cx="10248900" cy="367350"/>
           </a:xfrm>
         </p:spPr>
         <p:txBody>
           <a:bodyPr>
-            <a:normAutofit/>
+            <a:normAutofit fontScale="90000"/>
           </a:bodyPr>
           <a:lstStyle/>
           <a:p>
             <a:r>
               <a:rPr lang="fi-FI" sz="2200" b="1" dirty="0"/>
-              <a:t>Using GPT-4 Vision for Image Analysis: a Technical </a:t>
+              <a:t>Image </a:t>
             </a:r>
             <a:r>
               <a:rPr lang="fi-FI" sz="2200" b="1" dirty="0" err="1"/>
-              <a:t>Diagram</a:t>
+              <a:t>Generations</a:t>
+            </a:r>
+            <a:r>
+              <a:rPr lang="fi-FI" sz="2200" b="1" dirty="0"/>
+              <a:t>: Dalle-3</a:t>
             </a:r>
             <a:endParaRPr lang="en-US" sz="2200" b="1" dirty="0"/>
-          </a:p>
-        </p:txBody>
-      </p:sp>
-      <p:sp>
-        <p:nvSpPr>
-          <p:cNvPr id="7" name="Content Placeholder 6">
-            <a:extLst>
-              <a:ext uri="{FF2B5EF4-FFF2-40B4-BE49-F238E27FC236}">
-                <a16:creationId xmlns:a16="http://schemas.microsoft.com/office/drawing/2014/main" id="{A9956986-3D93-CB62-0694-A7C79DCEE6A3}"/>
-              </a:ext>
-            </a:extLst>
-          </p:cNvPr>
-          <p:cNvSpPr>
-            <a:spLocks noGrp="1"/>
-          </p:cNvSpPr>
-          <p:nvPr>
-            <p:ph idx="1"/>
-          </p:nvPr>
-        </p:nvSpPr>
-        <p:spPr/>
-        <p:txBody>
-          <a:bodyPr/>
-          <a:lstStyle/>
-          <a:p>
-            <a:endParaRPr lang="en-US"/>
           </a:p>
         </p:txBody>
       </p:sp>
       <p:pic>
         <p:nvPicPr>
-          <p:cNvPr id="9" name="Picture 8">
-            <a:extLst>
-              <a:ext uri="{FF2B5EF4-FFF2-40B4-BE49-F238E27FC236}">
-                <a16:creationId xmlns:a16="http://schemas.microsoft.com/office/drawing/2014/main" id="{2A913121-22CB-A59F-152A-C02676F37B5E}"/>
+          <p:cNvPr id="4" name="Picture 3">
+            <a:extLst>
+              <a:ext uri="{FF2B5EF4-FFF2-40B4-BE49-F238E27FC236}">
+                <a16:creationId xmlns:a16="http://schemas.microsoft.com/office/drawing/2014/main" id="{6CA54F19-0F1F-A1D5-93FE-EEB1EACBB84E}"/>
               </a:ext>
             </a:extLst>
           </p:cNvPr>
@@ -17425,8 +17487,8 @@
         </p:blipFill>
         <p:spPr>
           <a:xfrm>
-            <a:off x="542925" y="856800"/>
-            <a:ext cx="11353800" cy="5702260"/>
+            <a:off x="597801" y="565638"/>
+            <a:ext cx="7688949" cy="6093758"/>
           </a:xfrm>
           <a:prstGeom prst="rect">
             <a:avLst/>
@@ -17436,7 +17498,7 @@
     </p:spTree>
     <p:extLst>
       <p:ext uri="{BB962C8B-B14F-4D97-AF65-F5344CB8AC3E}">
-        <p14:creationId xmlns:p14="http://schemas.microsoft.com/office/powerpoint/2010/main" val="3581684529"/>
+        <p14:creationId xmlns:p14="http://schemas.microsoft.com/office/powerpoint/2010/main" val="766200924"/>
       </p:ext>
     </p:extLst>
   </p:cSld>
@@ -17481,6 +17543,131 @@
         </p:nvSpPr>
         <p:spPr>
           <a:xfrm>
+            <a:off x="504825" y="89850"/>
+            <a:ext cx="10515600" cy="633600"/>
+          </a:xfrm>
+        </p:spPr>
+        <p:txBody>
+          <a:bodyPr>
+            <a:normAutofit/>
+          </a:bodyPr>
+          <a:lstStyle/>
+          <a:p>
+            <a:r>
+              <a:rPr lang="fi-FI" sz="2200" b="1" dirty="0"/>
+              <a:t>Using GPT-4 Vision for Image Analysis: a Technical </a:t>
+            </a:r>
+            <a:r>
+              <a:rPr lang="fi-FI" sz="2200" b="1" dirty="0" err="1"/>
+              <a:t>Diagram</a:t>
+            </a:r>
+            <a:endParaRPr lang="en-US" sz="2200" b="1" dirty="0"/>
+          </a:p>
+        </p:txBody>
+      </p:sp>
+      <p:sp>
+        <p:nvSpPr>
+          <p:cNvPr id="7" name="Content Placeholder 6">
+            <a:extLst>
+              <a:ext uri="{FF2B5EF4-FFF2-40B4-BE49-F238E27FC236}">
+                <a16:creationId xmlns:a16="http://schemas.microsoft.com/office/drawing/2014/main" id="{A9956986-3D93-CB62-0694-A7C79DCEE6A3}"/>
+              </a:ext>
+            </a:extLst>
+          </p:cNvPr>
+          <p:cNvSpPr>
+            <a:spLocks noGrp="1"/>
+          </p:cNvSpPr>
+          <p:nvPr>
+            <p:ph idx="1"/>
+          </p:nvPr>
+        </p:nvSpPr>
+        <p:spPr/>
+        <p:txBody>
+          <a:bodyPr/>
+          <a:lstStyle/>
+          <a:p>
+            <a:endParaRPr lang="en-US"/>
+          </a:p>
+        </p:txBody>
+      </p:sp>
+      <p:pic>
+        <p:nvPicPr>
+          <p:cNvPr id="9" name="Picture 8">
+            <a:extLst>
+              <a:ext uri="{FF2B5EF4-FFF2-40B4-BE49-F238E27FC236}">
+                <a16:creationId xmlns:a16="http://schemas.microsoft.com/office/drawing/2014/main" id="{2A913121-22CB-A59F-152A-C02676F37B5E}"/>
+              </a:ext>
+            </a:extLst>
+          </p:cNvPr>
+          <p:cNvPicPr>
+            <a:picLocks noChangeAspect="1"/>
+          </p:cNvPicPr>
+          <p:nvPr/>
+        </p:nvPicPr>
+        <p:blipFill>
+          <a:blip r:embed="rId2"/>
+          <a:stretch>
+            <a:fillRect/>
+          </a:stretch>
+        </p:blipFill>
+        <p:spPr>
+          <a:xfrm>
+            <a:off x="542925" y="856800"/>
+            <a:ext cx="11353800" cy="5702260"/>
+          </a:xfrm>
+          <a:prstGeom prst="rect">
+            <a:avLst/>
+          </a:prstGeom>
+        </p:spPr>
+      </p:pic>
+    </p:spTree>
+    <p:extLst>
+      <p:ext uri="{BB962C8B-B14F-4D97-AF65-F5344CB8AC3E}">
+        <p14:creationId xmlns:p14="http://schemas.microsoft.com/office/powerpoint/2010/main" val="3581684529"/>
+      </p:ext>
+    </p:extLst>
+  </p:cSld>
+  <p:clrMapOvr>
+    <a:masterClrMapping/>
+  </p:clrMapOvr>
+</p:sld>
+</file>
+
+<file path=ppt/slides/slide14.xml><?xml version="1.0" encoding="utf-8"?>
+<p:sld xmlns:a="http://schemas.openxmlformats.org/drawingml/2006/main" xmlns:r="http://schemas.openxmlformats.org/officeDocument/2006/relationships" xmlns:p="http://schemas.openxmlformats.org/presentationml/2006/main">
+  <p:cSld>
+    <p:spTree>
+      <p:nvGrpSpPr>
+        <p:cNvPr id="1" name=""/>
+        <p:cNvGrpSpPr/>
+        <p:nvPr/>
+      </p:nvGrpSpPr>
+      <p:grpSpPr>
+        <a:xfrm>
+          <a:off x="0" y="0"/>
+          <a:ext cx="0" cy="0"/>
+          <a:chOff x="0" y="0"/>
+          <a:chExt cx="0" cy="0"/>
+        </a:xfrm>
+      </p:grpSpPr>
+      <p:sp>
+        <p:nvSpPr>
+          <p:cNvPr id="2" name="Title 1">
+            <a:extLst>
+              <a:ext uri="{FF2B5EF4-FFF2-40B4-BE49-F238E27FC236}">
+                <a16:creationId xmlns:a16="http://schemas.microsoft.com/office/drawing/2014/main" id="{7193A936-2F2F-96BC-CE44-52D4AF6D60D3}"/>
+              </a:ext>
+            </a:extLst>
+          </p:cNvPr>
+          <p:cNvSpPr>
+            <a:spLocks noGrp="1"/>
+          </p:cNvSpPr>
+          <p:nvPr>
+            <p:ph type="title"/>
+          </p:nvPr>
+        </p:nvSpPr>
+        <p:spPr>
+          <a:xfrm>
             <a:off x="838200" y="223200"/>
             <a:ext cx="10515600" cy="633600"/>
           </a:xfrm>
@@ -17541,7 +17728,7 @@
 </p:sld>
 </file>
 
-<file path=ppt/slides/slide14.xml><?xml version="1.0" encoding="utf-8"?>
+<file path=ppt/slides/slide15.xml><?xml version="1.0" encoding="utf-8"?>
 <p:sld xmlns:a="http://schemas.openxmlformats.org/drawingml/2006/main" xmlns:r="http://schemas.openxmlformats.org/officeDocument/2006/relationships" xmlns:p="http://schemas.openxmlformats.org/presentationml/2006/main">
   <p:cSld>
     <p:spTree>
@@ -17834,10 +18021,10 @@
       </p:sp>
       <p:pic>
         <p:nvPicPr>
-          <p:cNvPr id="4" name="Picture 3" descr="A diagram of a cloud computing system&#10;&#10;Description automatically generated with medium confidence">
-            <a:extLst>
-              <a:ext uri="{FF2B5EF4-FFF2-40B4-BE49-F238E27FC236}">
-                <a16:creationId xmlns:a16="http://schemas.microsoft.com/office/drawing/2014/main" id="{502193B8-1CDB-FFAB-6E00-B2968AF33970}"/>
+          <p:cNvPr id="5" name="Picture 4">
+            <a:extLst>
+              <a:ext uri="{FF2B5EF4-FFF2-40B4-BE49-F238E27FC236}">
+                <a16:creationId xmlns:a16="http://schemas.microsoft.com/office/drawing/2014/main" id="{E6B26F55-27D3-CC56-D259-B29EBBC498A4}"/>
               </a:ext>
             </a:extLst>
           </p:cNvPr>
@@ -17854,8 +18041,8 @@
         </p:blipFill>
         <p:spPr>
           <a:xfrm>
-            <a:off x="838199" y="642547"/>
-            <a:ext cx="11069060" cy="6091628"/>
+            <a:off x="838199" y="642548"/>
+            <a:ext cx="10868705" cy="5981367"/>
           </a:xfrm>
           <a:prstGeom prst="rect">
             <a:avLst/>
@@ -17934,7 +18121,7 @@
         </p:spPr>
         <p:txBody>
           <a:bodyPr>
-            <a:normAutofit fontScale="85000" lnSpcReduction="20000"/>
+            <a:normAutofit fontScale="70000" lnSpcReduction="20000"/>
           </a:bodyPr>
           <a:lstStyle/>
           <a:p>
@@ -17942,8 +18129,61 @@
               <a:buNone/>
             </a:pPr>
             <a:r>
+              <a:rPr lang="en-US" b="0" i="0" dirty="0">
+                <a:solidFill>
+                  <a:srgbClr val="1F2328"/>
+                </a:solidFill>
+                <a:effectLst/>
+                <a:latin typeface="-apple-system"/>
+              </a:rPr>
+              <a:t>Azure OpenAI is the private GDPR-compliant service developed by Microsoft and deployable to your Azure tenant. Data provided to endpoints of Azure OpenAI is kept inside the boundaries of your tenant.</a:t>
+            </a:r>
+          </a:p>
+          <a:p>
+            <a:r>
+              <a:rPr lang="en-US" b="0" i="0" dirty="0">
+                <a:solidFill>
+                  <a:srgbClr val="1F2328"/>
+                </a:solidFill>
+                <a:effectLst/>
+                <a:latin typeface="-apple-system"/>
+              </a:rPr>
+              <a:t>Native OpenAI is a public service, which provides access to its optional API by paid subscriptions. Any data provided to endpoints of Native OpenAI goes outside the boundaries of your tenant. As of December 2023, Native OpenAI is </a:t>
+            </a:r>
+            <a:r>
+              <a:rPr lang="en-US" b="0" i="0" u="sng" dirty="0">
+                <a:effectLst/>
+                <a:latin typeface="-apple-system"/>
+                <a:hlinkClick r:id="rId2"/>
+              </a:rPr>
+              <a:t>GDPR-compliant</a:t>
+            </a:r>
+            <a:r>
+              <a:rPr lang="en-US" b="0" i="0" dirty="0">
+                <a:solidFill>
+                  <a:srgbClr val="1F2328"/>
+                </a:solidFill>
+                <a:effectLst/>
+                <a:latin typeface="-apple-system"/>
+              </a:rPr>
+              <a:t>.</a:t>
+            </a:r>
+            <a:endParaRPr lang="fi-FI" dirty="0"/>
+          </a:p>
+          <a:p>
+            <a:pPr marL="0" indent="0">
+              <a:buNone/>
+            </a:pPr>
+            <a:br>
               <a:rPr lang="fi-FI" dirty="0"/>
-              <a:t>Azure OpenAI Chat </a:t>
+            </a:br>
+            <a:r>
+              <a:rPr lang="fi-FI" dirty="0" err="1"/>
+              <a:t>Azure</a:t>
+            </a:r>
+            <a:r>
+              <a:rPr lang="fi-FI" dirty="0"/>
+              <a:t> OpenAI Chat </a:t>
             </a:r>
             <a:r>
               <a:rPr lang="en-US" dirty="0"/>
@@ -18168,10 +18408,10 @@
       </p:sp>
       <p:pic>
         <p:nvPicPr>
-          <p:cNvPr id="9" name="Picture 8">
-            <a:extLst>
-              <a:ext uri="{FF2B5EF4-FFF2-40B4-BE49-F238E27FC236}">
-                <a16:creationId xmlns:a16="http://schemas.microsoft.com/office/drawing/2014/main" id="{272BC01E-7E7D-21FE-6E4B-A910B1BA4C12}"/>
+          <p:cNvPr id="4" name="Picture 3">
+            <a:extLst>
+              <a:ext uri="{FF2B5EF4-FFF2-40B4-BE49-F238E27FC236}">
+                <a16:creationId xmlns:a16="http://schemas.microsoft.com/office/drawing/2014/main" id="{B91501B0-EB55-FE6F-AC2B-D763F70A8014}"/>
               </a:ext>
             </a:extLst>
           </p:cNvPr>
@@ -18188,8 +18428,8 @@
         </p:blipFill>
         <p:spPr>
           <a:xfrm>
-            <a:off x="876299" y="871537"/>
-            <a:ext cx="10500247" cy="5862638"/>
+            <a:off x="756555" y="881042"/>
+            <a:ext cx="10471026" cy="5853133"/>
           </a:xfrm>
           <a:prstGeom prst="rect">
             <a:avLst/>
@@ -18381,8 +18621,12 @@
           <a:lstStyle/>
           <a:p>
             <a:r>
+              <a:rPr lang="fi-FI" sz="2200" b="1" dirty="0"/>
+              <a:t>Key </a:t>
+            </a:r>
+            <a:r>
               <a:rPr lang="fi-FI" sz="2200" b="1" dirty="0" err="1"/>
-              <a:t>Features</a:t>
+              <a:t>features</a:t>
             </a:r>
             <a:endParaRPr lang="en-US" sz="2200" b="1" dirty="0"/>
           </a:p>
@@ -18412,19 +18656,10 @@
         </p:spPr>
         <p:txBody>
           <a:bodyPr>
-            <a:normAutofit fontScale="47500" lnSpcReduction="20000"/>
+            <a:normAutofit fontScale="70000" lnSpcReduction="20000"/>
           </a:bodyPr>
           <a:lstStyle/>
           <a:p>
-            <a:pPr marL="0" indent="0">
-              <a:buNone/>
-            </a:pPr>
-            <a:r>
-              <a:rPr lang="en-US" b="1" dirty="0"/>
-              <a:t>Key features</a:t>
-            </a:r>
-          </a:p>
-          <a:p>
             <a:r>
               <a:rPr lang="en-US" dirty="0"/>
               <a:t>Support for the latest text language models provided by Microsoft and Native OpenAI: GPT-4 32k, GPT 3.5 16k, GPT-4 Vision, GPT-4 Turbo (1106, 128k)</a:t>
@@ -18433,13 +18668,13 @@
           <a:p>
             <a:r>
               <a:rPr lang="en-US" dirty="0"/>
-              <a:t>Unlimited Chats per user and the option to support Unlimited Chat History Length</a:t>
+              <a:t>Storage data encryption supported for all storage types and the sharing option</a:t>
             </a:r>
           </a:p>
           <a:p>
             <a:r>
               <a:rPr lang="en-US" dirty="0"/>
-              <a:t>Chat Sharing: Public sharing with Everyone in the company and Private sharing for a limited number of company users</a:t>
+              <a:t>Chat Sharing: Private sharing of personal Chats  for a limited number of company users and Global sharing with Everyone in the company</a:t>
             </a:r>
           </a:p>
           <a:p>
@@ -18502,7 +18737,7 @@
             <a:pPr lvl="1"/>
             <a:r>
               <a:rPr lang="en-US" dirty="0"/>
-              <a:t>SharePoint Search</a:t>
+              <a:t>SharePoint Search, which works under the current user identity and permissions</a:t>
             </a:r>
           </a:p>
           <a:p>
@@ -18546,69 +18781,15 @@
             </a:r>
           </a:p>
           <a:p>
-            <a:pPr marL="0" indent="0">
-              <a:buNone/>
-            </a:pPr>
-            <a:br>
-              <a:rPr lang="en-US" b="1" dirty="0"/>
-            </a:br>
-            <a:r>
-              <a:rPr lang="en-US" b="1" dirty="0"/>
-              <a:t>Advanced features</a:t>
-            </a:r>
-          </a:p>
-          <a:p>
             <a:r>
               <a:rPr lang="en-US" dirty="0"/>
-              <a:t>Built-in integration with API Management Service.</a:t>
-            </a:r>
-          </a:p>
-          <a:p>
-            <a:pPr lvl="1"/>
+              <a:t>Voice input and Speech output for reading out AI-generated texts</a:t>
+            </a:r>
+          </a:p>
+          <a:p>
             <a:r>
               <a:rPr lang="en-US" dirty="0"/>
-              <a:t>For customers that do not have it, the web part also supports direct queries to API with an </a:t>
-            </a:r>
-            <a:r>
-              <a:rPr lang="en-US" dirty="0" err="1"/>
-              <a:t>api</a:t>
-            </a:r>
-            <a:r>
-              <a:rPr lang="en-US" dirty="0"/>
-              <a:t>-key (configurable)</a:t>
-            </a:r>
-          </a:p>
-          <a:p>
-            <a:r>
-              <a:rPr lang="en-US" dirty="0"/>
-              <a:t>Default support for Azure OpenAI and Native OpenAI API</a:t>
-            </a:r>
-          </a:p>
-          <a:p>
-            <a:r>
-              <a:rPr lang="en-US" dirty="0"/>
-              <a:t>Alternative storage types to manage Chat History</a:t>
-            </a:r>
-          </a:p>
-          <a:p>
-            <a:pPr lvl="1"/>
-            <a:r>
-              <a:rPr lang="en-US" dirty="0"/>
-              <a:t>SharePoint List: Supports up to 5000 Chats, Built-in “One-Click” list provisioning, Chat Privacy and Security Trimming for SharePoint Search</a:t>
-            </a:r>
-          </a:p>
-          <a:p>
-            <a:pPr lvl="1"/>
-            <a:r>
-              <a:rPr lang="en-US" dirty="0"/>
-              <a:t>Azure SQL Database: Provides more advanced storage capabilities tested on 1 Million+ Chat records</a:t>
-            </a:r>
-          </a:p>
-          <a:p>
-            <a:pPr lvl="1"/>
-            <a:r>
-              <a:rPr lang="en-US" dirty="0"/>
-              <a:t>Local Storage: it can be used to provide quick demo without long-time configurations</a:t>
+              <a:t>Unlimited Chats per user and the option to support Unlimited Chat History Length</a:t>
             </a:r>
           </a:p>
         </p:txBody>
@@ -18661,7 +18842,7 @@
         </p:nvSpPr>
         <p:spPr>
           <a:xfrm>
-            <a:off x="838199" y="203201"/>
+            <a:off x="838199" y="365126"/>
             <a:ext cx="10613571" cy="567382"/>
           </a:xfrm>
         </p:spPr>
@@ -18673,7 +18854,11 @@
           <a:p>
             <a:r>
               <a:rPr lang="fi-FI" sz="2200" b="1" dirty="0"/>
-              <a:t>Optional Integrations: SharePoint Search, Company Users, Local Date &amp; Time</a:t>
+              <a:t>Advanced </a:t>
+            </a:r>
+            <a:r>
+              <a:rPr lang="fi-FI" sz="2200" b="1" dirty="0" err="1"/>
+              <a:t>features</a:t>
             </a:r>
             <a:endParaRPr lang="en-US" sz="2200" b="1" dirty="0"/>
           </a:p>
@@ -18697,949 +18882,75 @@
         </p:nvSpPr>
         <p:spPr>
           <a:xfrm>
-            <a:off x="847253" y="917890"/>
-            <a:ext cx="10515600" cy="5349560"/>
+            <a:off x="847253" y="932508"/>
+            <a:ext cx="10515600" cy="5634547"/>
           </a:xfrm>
         </p:spPr>
         <p:txBody>
           <a:bodyPr>
-            <a:normAutofit fontScale="55000" lnSpcReduction="20000"/>
+            <a:normAutofit/>
           </a:bodyPr>
           <a:lstStyle/>
           <a:p>
-            <a:pPr marL="0" indent="0">
-              <a:buNone/>
-            </a:pPr>
-            <a:r>
-              <a:rPr lang="en-US" sz="3600" b="1" dirty="0"/>
-              <a:t>How it works</a:t>
-            </a:r>
-          </a:p>
-          <a:p>
-            <a:pPr marL="0" indent="0">
-              <a:buNone/>
-            </a:pPr>
             <a:r>
               <a:rPr lang="en-US" dirty="0"/>
-              <a:t>The Function Calling feature is available in both Azure OpenAI and Native OpenAI (more advanced version). The flow for using this feature typically looks like:</a:t>
-            </a:r>
-          </a:p>
-          <a:p>
-            <a:pPr marL="457200" indent="-457200">
-              <a:buFont typeface="+mj-lt"/>
-              <a:buAutoNum type="arabicPeriod"/>
-            </a:pPr>
+              <a:t>Built-in integration with API Management Service.</a:t>
+            </a:r>
+          </a:p>
+          <a:p>
+            <a:pPr lvl="1"/>
             <a:r>
               <a:rPr lang="en-US" dirty="0"/>
-              <a:t>In the process of interacting with OpenAI, you can send a request with options to call available integration functions that you have provided. </a:t>
-            </a:r>
-          </a:p>
-          <a:p>
-            <a:pPr marL="457200" indent="-457200">
-              <a:buFont typeface="+mj-lt"/>
-              <a:buAutoNum type="arabicPeriod"/>
-            </a:pPr>
+              <a:t>For customers that do not have it, the web part also supports direct queries to API with an </a:t>
+            </a:r>
+            <a:r>
+              <a:rPr lang="en-US" dirty="0" err="1"/>
+              <a:t>api</a:t>
+            </a:r>
             <a:r>
               <a:rPr lang="en-US" dirty="0"/>
-              <a:t>If OpenAI determines that it requires specific data, it will request to call a function with parameters that it deems suitable.</a:t>
-            </a:r>
-          </a:p>
-          <a:p>
-            <a:pPr marL="457200" indent="-457200">
-              <a:buFont typeface="+mj-lt"/>
-              <a:buAutoNum type="arabicPeriod"/>
-            </a:pPr>
+              <a:t>-key (configurable)</a:t>
+            </a:r>
+          </a:p>
+          <a:p>
             <a:r>
               <a:rPr lang="en-US" dirty="0"/>
-              <a:t>To meet OpenAI's demand, you can call the function with the proposed parameters on behalf of OpenAI. This allows you to obtain raw results locally, which you can then submit to OpenAI. You have control over what data you submit.</a:t>
-            </a:r>
-          </a:p>
-          <a:p>
-            <a:pPr marL="457200" indent="-457200">
-              <a:buFont typeface="+mj-lt"/>
-              <a:buAutoNum type="arabicPeriod"/>
-            </a:pPr>
+              <a:t>Default support for Azure OpenAI and Native OpenAI API</a:t>
+            </a:r>
+          </a:p>
+          <a:p>
             <a:r>
               <a:rPr lang="en-US" dirty="0"/>
-              <a:t>If OpenAI determines that it needs more information, it may demand calling another function, and this process can continue as necessary.</a:t>
-            </a:r>
-          </a:p>
-          <a:p>
-            <a:pPr marL="457200" indent="-457200">
-              <a:buFont typeface="+mj-lt"/>
-              <a:buAutoNum type="arabicPeriod"/>
-            </a:pPr>
+              <a:t>Alternative storage types to manage Chat History</a:t>
+            </a:r>
+          </a:p>
+          <a:p>
+            <a:pPr lvl="1"/>
             <a:r>
               <a:rPr lang="en-US" dirty="0"/>
-              <a:t>OpenAI handles the received data and transforms it as you have requested. The final response from OpenAI will include the results based on the processed data.</a:t>
-            </a:r>
-          </a:p>
-          <a:p>
-            <a:pPr marL="0" indent="0">
-              <a:buNone/>
-            </a:pPr>
-            <a:r>
-              <a:rPr lang="en-US" sz="2100" dirty="0">
-                <a:solidFill>
-                  <a:srgbClr val="6A9955"/>
-                </a:solidFill>
-                <a:latin typeface="Consolas" panose="020B0609020204030204" pitchFamily="49" charset="0"/>
-              </a:rPr>
-              <a:t>// 3 show cases available in the web part:</a:t>
-            </a:r>
-          </a:p>
-          <a:p>
-            <a:pPr marL="0" indent="0">
-              <a:buNone/>
-            </a:pPr>
-            <a:r>
-              <a:rPr lang="en-US" sz="2100" dirty="0">
-                <a:solidFill>
-                  <a:srgbClr val="6A9955"/>
-                </a:solidFill>
-                <a:latin typeface="Consolas" panose="020B0609020204030204" pitchFamily="49" charset="0"/>
-              </a:rPr>
-              <a:t>// Search in SharePoint for “your text“. Format the results as an HTML table.</a:t>
-            </a:r>
-          </a:p>
-          <a:p>
-            <a:pPr marL="0" indent="0">
-              <a:buNone/>
-            </a:pPr>
-            <a:r>
-              <a:rPr lang="en-US" sz="2100" dirty="0">
-                <a:solidFill>
-                  <a:srgbClr val="6A9955"/>
-                </a:solidFill>
-                <a:latin typeface="Consolas" panose="020B0609020204030204" pitchFamily="49" charset="0"/>
-              </a:rPr>
-              <a:t>// Get company users that have names starting with P. Format the results as an HTML table.</a:t>
-            </a:r>
-          </a:p>
-          <a:p>
-            <a:pPr marL="0" indent="0">
-              <a:buNone/>
-            </a:pPr>
-            <a:r>
-              <a:rPr lang="en-US" sz="2100" dirty="0">
-                <a:solidFill>
-                  <a:srgbClr val="6A9955"/>
-                </a:solidFill>
-                <a:latin typeface="Consolas" panose="020B0609020204030204" pitchFamily="49" charset="0"/>
-              </a:rPr>
-              <a:t>// Date, Time, Date and time.</a:t>
-            </a:r>
-          </a:p>
-          <a:p>
-            <a:pPr marL="0" indent="0">
-              <a:buNone/>
-            </a:pPr>
-            <a:r>
-              <a:rPr lang="en-US" b="1" dirty="0">
-                <a:solidFill>
-                  <a:srgbClr val="C586C0"/>
-                </a:solidFill>
-                <a:effectLst/>
-                <a:latin typeface="Arial" panose="020B0604020202020204" pitchFamily="34" charset="0"/>
-                <a:cs typeface="Arial" panose="020B0604020202020204" pitchFamily="34" charset="0"/>
-              </a:rPr>
-              <a:t>export</a:t>
-            </a:r>
-            <a:r>
-              <a:rPr lang="en-US" b="1" dirty="0">
-                <a:solidFill>
-                  <a:srgbClr val="CCCCCC"/>
-                </a:solidFill>
-                <a:effectLst/>
-                <a:latin typeface="Arial" panose="020B0604020202020204" pitchFamily="34" charset="0"/>
-                <a:cs typeface="Arial" panose="020B0604020202020204" pitchFamily="34" charset="0"/>
-              </a:rPr>
-              <a:t> </a:t>
-            </a:r>
-            <a:r>
-              <a:rPr lang="en-US" b="1" dirty="0">
-                <a:solidFill>
-                  <a:srgbClr val="C586C0"/>
-                </a:solidFill>
-                <a:effectLst/>
-                <a:latin typeface="Arial" panose="020B0604020202020204" pitchFamily="34" charset="0"/>
-                <a:cs typeface="Arial" panose="020B0604020202020204" pitchFamily="34" charset="0"/>
-              </a:rPr>
-              <a:t>default</a:t>
-            </a:r>
-            <a:r>
-              <a:rPr lang="en-US" b="1" dirty="0">
-                <a:solidFill>
-                  <a:srgbClr val="CCCCCC"/>
-                </a:solidFill>
-                <a:effectLst/>
-                <a:latin typeface="Arial" panose="020B0604020202020204" pitchFamily="34" charset="0"/>
-                <a:cs typeface="Arial" panose="020B0604020202020204" pitchFamily="34" charset="0"/>
-              </a:rPr>
-              <a:t> </a:t>
-            </a:r>
-            <a:r>
-              <a:rPr lang="en-US" b="1" dirty="0">
-                <a:solidFill>
-                  <a:srgbClr val="569CD6"/>
-                </a:solidFill>
-                <a:effectLst/>
-                <a:latin typeface="Arial" panose="020B0604020202020204" pitchFamily="34" charset="0"/>
-                <a:cs typeface="Arial" panose="020B0604020202020204" pitchFamily="34" charset="0"/>
-              </a:rPr>
-              <a:t>class</a:t>
-            </a:r>
-            <a:r>
-              <a:rPr lang="en-US" b="1" dirty="0">
-                <a:solidFill>
-                  <a:srgbClr val="CCCCCC"/>
-                </a:solidFill>
-                <a:effectLst/>
-                <a:latin typeface="Arial" panose="020B0604020202020204" pitchFamily="34" charset="0"/>
-                <a:cs typeface="Arial" panose="020B0604020202020204" pitchFamily="34" charset="0"/>
-              </a:rPr>
-              <a:t> </a:t>
-            </a:r>
-            <a:r>
-              <a:rPr lang="en-US" b="1" dirty="0" err="1">
-                <a:solidFill>
-                  <a:srgbClr val="4EC9B0"/>
-                </a:solidFill>
-                <a:effectLst/>
-                <a:latin typeface="Arial" panose="020B0604020202020204" pitchFamily="34" charset="0"/>
-                <a:cs typeface="Arial" panose="020B0604020202020204" pitchFamily="34" charset="0"/>
-              </a:rPr>
-              <a:t>FunctionHelper</a:t>
-            </a:r>
-            <a:r>
-              <a:rPr lang="en-US" b="1" dirty="0">
-                <a:solidFill>
-                  <a:srgbClr val="CCCCCC"/>
-                </a:solidFill>
-                <a:effectLst/>
-                <a:latin typeface="Arial" panose="020B0604020202020204" pitchFamily="34" charset="0"/>
-                <a:cs typeface="Arial" panose="020B0604020202020204" pitchFamily="34" charset="0"/>
-              </a:rPr>
-              <a:t> {</a:t>
-            </a:r>
-          </a:p>
-          <a:p>
-            <a:pPr marL="0" indent="0">
-              <a:buNone/>
-            </a:pPr>
-            <a:r>
-              <a:rPr lang="en-US" b="1" dirty="0">
-                <a:solidFill>
-                  <a:srgbClr val="CCCCCC"/>
-                </a:solidFill>
-                <a:effectLst/>
-                <a:latin typeface="Arial" panose="020B0604020202020204" pitchFamily="34" charset="0"/>
-                <a:cs typeface="Arial" panose="020B0604020202020204" pitchFamily="34" charset="0"/>
-              </a:rPr>
-              <a:t>  </a:t>
-            </a:r>
-            <a:r>
-              <a:rPr lang="en-US" b="1" dirty="0">
-                <a:solidFill>
-                  <a:srgbClr val="569CD6"/>
-                </a:solidFill>
-                <a:effectLst/>
-                <a:latin typeface="Arial" panose="020B0604020202020204" pitchFamily="34" charset="0"/>
-                <a:cs typeface="Arial" panose="020B0604020202020204" pitchFamily="34" charset="0"/>
-              </a:rPr>
-              <a:t>private</a:t>
-            </a:r>
-            <a:r>
-              <a:rPr lang="en-US" b="1" dirty="0">
-                <a:solidFill>
-                  <a:srgbClr val="CCCCCC"/>
-                </a:solidFill>
-                <a:effectLst/>
-                <a:latin typeface="Arial" panose="020B0604020202020204" pitchFamily="34" charset="0"/>
-                <a:cs typeface="Arial" panose="020B0604020202020204" pitchFamily="34" charset="0"/>
-              </a:rPr>
-              <a:t> </a:t>
-            </a:r>
-            <a:r>
-              <a:rPr lang="en-US" b="1" dirty="0">
-                <a:solidFill>
-                  <a:srgbClr val="569CD6"/>
-                </a:solidFill>
-                <a:effectLst/>
-                <a:latin typeface="Arial" panose="020B0604020202020204" pitchFamily="34" charset="0"/>
-                <a:cs typeface="Arial" panose="020B0604020202020204" pitchFamily="34" charset="0"/>
-              </a:rPr>
-              <a:t>static</a:t>
-            </a:r>
-            <a:r>
-              <a:rPr lang="en-US" b="1" dirty="0">
-                <a:solidFill>
-                  <a:srgbClr val="CCCCCC"/>
-                </a:solidFill>
-                <a:effectLst/>
-                <a:latin typeface="Arial" panose="020B0604020202020204" pitchFamily="34" charset="0"/>
-                <a:cs typeface="Arial" panose="020B0604020202020204" pitchFamily="34" charset="0"/>
-              </a:rPr>
-              <a:t> </a:t>
-            </a:r>
-            <a:r>
-              <a:rPr lang="en-US" b="1" dirty="0">
-                <a:solidFill>
-                  <a:srgbClr val="9CDCFE"/>
-                </a:solidFill>
-                <a:effectLst/>
-                <a:latin typeface="Arial" panose="020B0604020202020204" pitchFamily="34" charset="0"/>
-                <a:cs typeface="Arial" panose="020B0604020202020204" pitchFamily="34" charset="0"/>
-              </a:rPr>
-              <a:t>available</a:t>
-            </a:r>
-            <a:r>
-              <a:rPr lang="en-US" b="1" dirty="0">
-                <a:solidFill>
-                  <a:srgbClr val="D4D4D4"/>
-                </a:solidFill>
-                <a:effectLst/>
-                <a:latin typeface="Arial" panose="020B0604020202020204" pitchFamily="34" charset="0"/>
-                <a:cs typeface="Arial" panose="020B0604020202020204" pitchFamily="34" charset="0"/>
-              </a:rPr>
-              <a:t>:</a:t>
-            </a:r>
-            <a:r>
-              <a:rPr lang="en-US" b="1" dirty="0">
-                <a:solidFill>
-                  <a:srgbClr val="CCCCCC"/>
-                </a:solidFill>
-                <a:effectLst/>
-                <a:latin typeface="Arial" panose="020B0604020202020204" pitchFamily="34" charset="0"/>
-                <a:cs typeface="Arial" panose="020B0604020202020204" pitchFamily="34" charset="0"/>
-              </a:rPr>
-              <a:t> { [</a:t>
-            </a:r>
-            <a:r>
-              <a:rPr lang="en-US" b="1" dirty="0">
-                <a:solidFill>
-                  <a:srgbClr val="9CDCFE"/>
-                </a:solidFill>
-                <a:effectLst/>
-                <a:latin typeface="Arial" panose="020B0604020202020204" pitchFamily="34" charset="0"/>
-                <a:cs typeface="Arial" panose="020B0604020202020204" pitchFamily="34" charset="0"/>
-              </a:rPr>
-              <a:t>key</a:t>
-            </a:r>
-            <a:r>
-              <a:rPr lang="en-US" b="1" dirty="0">
-                <a:solidFill>
-                  <a:srgbClr val="D4D4D4"/>
-                </a:solidFill>
-                <a:effectLst/>
-                <a:latin typeface="Arial" panose="020B0604020202020204" pitchFamily="34" charset="0"/>
-                <a:cs typeface="Arial" panose="020B0604020202020204" pitchFamily="34" charset="0"/>
-              </a:rPr>
-              <a:t>:</a:t>
-            </a:r>
-            <a:r>
-              <a:rPr lang="en-US" b="1" dirty="0">
-                <a:solidFill>
-                  <a:srgbClr val="CCCCCC"/>
-                </a:solidFill>
-                <a:effectLst/>
-                <a:latin typeface="Arial" panose="020B0604020202020204" pitchFamily="34" charset="0"/>
-                <a:cs typeface="Arial" panose="020B0604020202020204" pitchFamily="34" charset="0"/>
-              </a:rPr>
-              <a:t> </a:t>
-            </a:r>
-            <a:r>
-              <a:rPr lang="en-US" b="1" dirty="0">
-                <a:solidFill>
-                  <a:srgbClr val="4EC9B0"/>
-                </a:solidFill>
-                <a:effectLst/>
-                <a:latin typeface="Arial" panose="020B0604020202020204" pitchFamily="34" charset="0"/>
-                <a:cs typeface="Arial" panose="020B0604020202020204" pitchFamily="34" charset="0"/>
-              </a:rPr>
-              <a:t>string</a:t>
-            </a:r>
-            <a:r>
-              <a:rPr lang="en-US" b="1" dirty="0">
-                <a:solidFill>
-                  <a:srgbClr val="CCCCCC"/>
-                </a:solidFill>
-                <a:effectLst/>
-                <a:latin typeface="Arial" panose="020B0604020202020204" pitchFamily="34" charset="0"/>
-                <a:cs typeface="Arial" panose="020B0604020202020204" pitchFamily="34" charset="0"/>
-              </a:rPr>
-              <a:t>]</a:t>
-            </a:r>
-            <a:r>
-              <a:rPr lang="en-US" b="1" dirty="0">
-                <a:solidFill>
-                  <a:srgbClr val="D4D4D4"/>
-                </a:solidFill>
-                <a:effectLst/>
-                <a:latin typeface="Arial" panose="020B0604020202020204" pitchFamily="34" charset="0"/>
-                <a:cs typeface="Arial" panose="020B0604020202020204" pitchFamily="34" charset="0"/>
-              </a:rPr>
-              <a:t>:</a:t>
-            </a:r>
-            <a:r>
-              <a:rPr lang="en-US" b="1" dirty="0">
-                <a:solidFill>
-                  <a:srgbClr val="CCCCCC"/>
-                </a:solidFill>
-                <a:effectLst/>
-                <a:latin typeface="Arial" panose="020B0604020202020204" pitchFamily="34" charset="0"/>
-                <a:cs typeface="Arial" panose="020B0604020202020204" pitchFamily="34" charset="0"/>
-              </a:rPr>
-              <a:t> </a:t>
-            </a:r>
-            <a:r>
-              <a:rPr lang="en-US" b="1" dirty="0">
-                <a:solidFill>
-                  <a:srgbClr val="4EC9B0"/>
-                </a:solidFill>
-                <a:effectLst/>
-                <a:latin typeface="Arial" panose="020B0604020202020204" pitchFamily="34" charset="0"/>
-                <a:cs typeface="Arial" panose="020B0604020202020204" pitchFamily="34" charset="0"/>
-              </a:rPr>
-              <a:t>any</a:t>
-            </a:r>
-            <a:r>
-              <a:rPr lang="en-US" b="1" dirty="0">
-                <a:solidFill>
-                  <a:srgbClr val="CCCCCC"/>
-                </a:solidFill>
-                <a:effectLst/>
-                <a:latin typeface="Arial" panose="020B0604020202020204" pitchFamily="34" charset="0"/>
-                <a:cs typeface="Arial" panose="020B0604020202020204" pitchFamily="34" charset="0"/>
-              </a:rPr>
-              <a:t> } </a:t>
-            </a:r>
-            <a:r>
-              <a:rPr lang="en-US" b="1" dirty="0">
-                <a:solidFill>
-                  <a:srgbClr val="D4D4D4"/>
-                </a:solidFill>
-                <a:effectLst/>
-                <a:latin typeface="Arial" panose="020B0604020202020204" pitchFamily="34" charset="0"/>
-                <a:cs typeface="Arial" panose="020B0604020202020204" pitchFamily="34" charset="0"/>
-              </a:rPr>
-              <a:t>=</a:t>
-            </a:r>
-            <a:r>
-              <a:rPr lang="en-US" b="1" dirty="0">
-                <a:solidFill>
-                  <a:srgbClr val="CCCCCC"/>
-                </a:solidFill>
-                <a:effectLst/>
-                <a:latin typeface="Arial" panose="020B0604020202020204" pitchFamily="34" charset="0"/>
-                <a:cs typeface="Arial" panose="020B0604020202020204" pitchFamily="34" charset="0"/>
-              </a:rPr>
-              <a:t> {</a:t>
-            </a:r>
-          </a:p>
-          <a:p>
-            <a:pPr marL="0" indent="0">
-              <a:buNone/>
-            </a:pPr>
-            <a:r>
-              <a:rPr lang="en-US" b="1" dirty="0">
-                <a:solidFill>
-                  <a:srgbClr val="CCCCCC"/>
-                </a:solidFill>
-                <a:effectLst/>
-                <a:latin typeface="Arial" panose="020B0604020202020204" pitchFamily="34" charset="0"/>
-                <a:cs typeface="Arial" panose="020B0604020202020204" pitchFamily="34" charset="0"/>
-              </a:rPr>
-              <a:t>      </a:t>
-            </a:r>
-            <a:r>
-              <a:rPr lang="en-US" b="1" dirty="0" err="1">
-                <a:solidFill>
-                  <a:srgbClr val="DCDCAA"/>
-                </a:solidFill>
-                <a:effectLst/>
-                <a:latin typeface="Arial" panose="020B0604020202020204" pitchFamily="34" charset="0"/>
-                <a:cs typeface="Arial" panose="020B0604020202020204" pitchFamily="34" charset="0"/>
-              </a:rPr>
-              <a:t>companyUsers</a:t>
-            </a:r>
-            <a:r>
-              <a:rPr lang="en-US" b="1" dirty="0">
-                <a:solidFill>
-                  <a:srgbClr val="9CDCFE"/>
-                </a:solidFill>
-                <a:effectLst/>
-                <a:latin typeface="Arial" panose="020B0604020202020204" pitchFamily="34" charset="0"/>
-                <a:cs typeface="Arial" panose="020B0604020202020204" pitchFamily="34" charset="0"/>
-              </a:rPr>
-              <a:t>:</a:t>
-            </a:r>
-            <a:r>
-              <a:rPr lang="en-US" b="1" dirty="0">
-                <a:solidFill>
-                  <a:srgbClr val="CCCCCC"/>
-                </a:solidFill>
-                <a:effectLst/>
-                <a:latin typeface="Arial" panose="020B0604020202020204" pitchFamily="34" charset="0"/>
-                <a:cs typeface="Arial" panose="020B0604020202020204" pitchFamily="34" charset="0"/>
-              </a:rPr>
-              <a:t> </a:t>
-            </a:r>
-            <a:r>
-              <a:rPr lang="en-US" b="1" dirty="0" err="1">
-                <a:solidFill>
-                  <a:srgbClr val="569CD6"/>
-                </a:solidFill>
-                <a:effectLst/>
-                <a:latin typeface="Arial" panose="020B0604020202020204" pitchFamily="34" charset="0"/>
-                <a:cs typeface="Arial" panose="020B0604020202020204" pitchFamily="34" charset="0"/>
-              </a:rPr>
-              <a:t>this</a:t>
-            </a:r>
-            <a:r>
-              <a:rPr lang="en-US" b="1" dirty="0" err="1">
-                <a:solidFill>
-                  <a:srgbClr val="CCCCCC"/>
-                </a:solidFill>
-                <a:effectLst/>
-                <a:latin typeface="Arial" panose="020B0604020202020204" pitchFamily="34" charset="0"/>
-                <a:cs typeface="Arial" panose="020B0604020202020204" pitchFamily="34" charset="0"/>
-              </a:rPr>
-              <a:t>.</a:t>
-            </a:r>
-            <a:r>
-              <a:rPr lang="en-US" b="1" dirty="0" err="1">
-                <a:solidFill>
-                  <a:srgbClr val="DCDCAA"/>
-                </a:solidFill>
-                <a:effectLst/>
-                <a:latin typeface="Arial" panose="020B0604020202020204" pitchFamily="34" charset="0"/>
-                <a:cs typeface="Arial" panose="020B0604020202020204" pitchFamily="34" charset="0"/>
-              </a:rPr>
-              <a:t>companyUsers</a:t>
-            </a:r>
-            <a:r>
-              <a:rPr lang="en-US" b="1" dirty="0">
-                <a:solidFill>
-                  <a:srgbClr val="CCCCCC"/>
-                </a:solidFill>
-                <a:effectLst/>
-                <a:latin typeface="Arial" panose="020B0604020202020204" pitchFamily="34" charset="0"/>
-                <a:cs typeface="Arial" panose="020B0604020202020204" pitchFamily="34" charset="0"/>
-              </a:rPr>
-              <a:t>,</a:t>
-            </a:r>
-          </a:p>
-          <a:p>
-            <a:pPr marL="0" indent="0">
-              <a:buNone/>
-            </a:pPr>
-            <a:r>
-              <a:rPr lang="en-US" b="1" dirty="0">
-                <a:solidFill>
-                  <a:srgbClr val="CCCCCC"/>
-                </a:solidFill>
-                <a:effectLst/>
-                <a:latin typeface="Arial" panose="020B0604020202020204" pitchFamily="34" charset="0"/>
-                <a:cs typeface="Arial" panose="020B0604020202020204" pitchFamily="34" charset="0"/>
-              </a:rPr>
-              <a:t>      </a:t>
-            </a:r>
-            <a:r>
-              <a:rPr lang="en-US" b="1" dirty="0" err="1">
-                <a:solidFill>
-                  <a:srgbClr val="DCDCAA"/>
-                </a:solidFill>
-                <a:effectLst/>
-                <a:latin typeface="Arial" panose="020B0604020202020204" pitchFamily="34" charset="0"/>
-                <a:cs typeface="Arial" panose="020B0604020202020204" pitchFamily="34" charset="0"/>
-              </a:rPr>
-              <a:t>currentDateOrTime</a:t>
-            </a:r>
-            <a:r>
-              <a:rPr lang="en-US" b="1" dirty="0">
-                <a:solidFill>
-                  <a:srgbClr val="9CDCFE"/>
-                </a:solidFill>
-                <a:effectLst/>
-                <a:latin typeface="Arial" panose="020B0604020202020204" pitchFamily="34" charset="0"/>
-                <a:cs typeface="Arial" panose="020B0604020202020204" pitchFamily="34" charset="0"/>
-              </a:rPr>
-              <a:t>:</a:t>
-            </a:r>
-            <a:r>
-              <a:rPr lang="en-US" b="1" dirty="0">
-                <a:solidFill>
-                  <a:srgbClr val="CCCCCC"/>
-                </a:solidFill>
-                <a:effectLst/>
-                <a:latin typeface="Arial" panose="020B0604020202020204" pitchFamily="34" charset="0"/>
-                <a:cs typeface="Arial" panose="020B0604020202020204" pitchFamily="34" charset="0"/>
-              </a:rPr>
-              <a:t> </a:t>
-            </a:r>
-            <a:r>
-              <a:rPr lang="en-US" b="1" dirty="0" err="1">
-                <a:solidFill>
-                  <a:srgbClr val="569CD6"/>
-                </a:solidFill>
-                <a:effectLst/>
-                <a:latin typeface="Arial" panose="020B0604020202020204" pitchFamily="34" charset="0"/>
-                <a:cs typeface="Arial" panose="020B0604020202020204" pitchFamily="34" charset="0"/>
-              </a:rPr>
-              <a:t>this</a:t>
-            </a:r>
-            <a:r>
-              <a:rPr lang="en-US" b="1" dirty="0" err="1">
-                <a:solidFill>
-                  <a:srgbClr val="CCCCCC"/>
-                </a:solidFill>
-                <a:effectLst/>
-                <a:latin typeface="Arial" panose="020B0604020202020204" pitchFamily="34" charset="0"/>
-                <a:cs typeface="Arial" panose="020B0604020202020204" pitchFamily="34" charset="0"/>
-              </a:rPr>
-              <a:t>.</a:t>
-            </a:r>
-            <a:r>
-              <a:rPr lang="en-US" b="1" dirty="0" err="1">
-                <a:solidFill>
-                  <a:srgbClr val="DCDCAA"/>
-                </a:solidFill>
-                <a:effectLst/>
-                <a:latin typeface="Arial" panose="020B0604020202020204" pitchFamily="34" charset="0"/>
-                <a:cs typeface="Arial" panose="020B0604020202020204" pitchFamily="34" charset="0"/>
-              </a:rPr>
-              <a:t>currentDateOrTime</a:t>
-            </a:r>
-            <a:r>
-              <a:rPr lang="en-US" b="1" dirty="0">
-                <a:solidFill>
-                  <a:srgbClr val="CCCCCC"/>
-                </a:solidFill>
-                <a:effectLst/>
-                <a:latin typeface="Arial" panose="020B0604020202020204" pitchFamily="34" charset="0"/>
-                <a:cs typeface="Arial" panose="020B0604020202020204" pitchFamily="34" charset="0"/>
-              </a:rPr>
-              <a:t>,</a:t>
-            </a:r>
-          </a:p>
-          <a:p>
-            <a:pPr marL="0" indent="0">
-              <a:buNone/>
-            </a:pPr>
-            <a:r>
-              <a:rPr lang="en-US" b="1" dirty="0">
-                <a:solidFill>
-                  <a:srgbClr val="DCDCAA"/>
-                </a:solidFill>
-                <a:effectLst/>
-                <a:latin typeface="Arial" panose="020B0604020202020204" pitchFamily="34" charset="0"/>
-                <a:cs typeface="Arial" panose="020B0604020202020204" pitchFamily="34" charset="0"/>
-              </a:rPr>
-              <a:t>      </a:t>
-            </a:r>
-            <a:r>
-              <a:rPr lang="en-US" b="1" dirty="0" err="1">
-                <a:solidFill>
-                  <a:srgbClr val="DCDCAA"/>
-                </a:solidFill>
-                <a:effectLst/>
-                <a:latin typeface="Arial" panose="020B0604020202020204" pitchFamily="34" charset="0"/>
-                <a:cs typeface="Arial" panose="020B0604020202020204" pitchFamily="34" charset="0"/>
-              </a:rPr>
-              <a:t>currentDateAndTime</a:t>
-            </a:r>
-            <a:r>
-              <a:rPr lang="en-US" b="1" dirty="0">
-                <a:solidFill>
-                  <a:srgbClr val="9CDCFE"/>
-                </a:solidFill>
-                <a:effectLst/>
-                <a:latin typeface="Arial" panose="020B0604020202020204" pitchFamily="34" charset="0"/>
-                <a:cs typeface="Arial" panose="020B0604020202020204" pitchFamily="34" charset="0"/>
-              </a:rPr>
-              <a:t>:</a:t>
-            </a:r>
-            <a:r>
-              <a:rPr lang="en-US" b="1" dirty="0">
-                <a:solidFill>
-                  <a:srgbClr val="CCCCCC"/>
-                </a:solidFill>
-                <a:effectLst/>
-                <a:latin typeface="Arial" panose="020B0604020202020204" pitchFamily="34" charset="0"/>
-                <a:cs typeface="Arial" panose="020B0604020202020204" pitchFamily="34" charset="0"/>
-              </a:rPr>
-              <a:t> </a:t>
-            </a:r>
-            <a:r>
-              <a:rPr lang="en-US" b="1" dirty="0" err="1">
-                <a:solidFill>
-                  <a:srgbClr val="569CD6"/>
-                </a:solidFill>
-                <a:effectLst/>
-                <a:latin typeface="Arial" panose="020B0604020202020204" pitchFamily="34" charset="0"/>
-                <a:cs typeface="Arial" panose="020B0604020202020204" pitchFamily="34" charset="0"/>
-              </a:rPr>
-              <a:t>this</a:t>
-            </a:r>
-            <a:r>
-              <a:rPr lang="en-US" b="1" dirty="0" err="1">
-                <a:solidFill>
-                  <a:srgbClr val="CCCCCC"/>
-                </a:solidFill>
-                <a:effectLst/>
-                <a:latin typeface="Arial" panose="020B0604020202020204" pitchFamily="34" charset="0"/>
-                <a:cs typeface="Arial" panose="020B0604020202020204" pitchFamily="34" charset="0"/>
-              </a:rPr>
-              <a:t>.</a:t>
-            </a:r>
-            <a:r>
-              <a:rPr lang="en-US" b="1" dirty="0" err="1">
-                <a:solidFill>
-                  <a:srgbClr val="DCDCAA"/>
-                </a:solidFill>
-                <a:effectLst/>
-                <a:latin typeface="Arial" panose="020B0604020202020204" pitchFamily="34" charset="0"/>
-                <a:cs typeface="Arial" panose="020B0604020202020204" pitchFamily="34" charset="0"/>
-              </a:rPr>
-              <a:t>currentDateAndTime</a:t>
-            </a:r>
-            <a:r>
-              <a:rPr lang="en-US" b="1" dirty="0">
-                <a:solidFill>
-                  <a:srgbClr val="CCCCCC"/>
-                </a:solidFill>
-                <a:effectLst/>
-                <a:latin typeface="Arial" panose="020B0604020202020204" pitchFamily="34" charset="0"/>
-                <a:cs typeface="Arial" panose="020B0604020202020204" pitchFamily="34" charset="0"/>
-              </a:rPr>
-              <a:t>,</a:t>
-            </a:r>
-          </a:p>
-          <a:p>
-            <a:pPr marL="0" indent="0">
-              <a:buNone/>
-            </a:pPr>
-            <a:r>
-              <a:rPr lang="en-US" b="1" dirty="0">
-                <a:solidFill>
-                  <a:srgbClr val="CCCCCC"/>
-                </a:solidFill>
-                <a:effectLst/>
-                <a:latin typeface="Arial" panose="020B0604020202020204" pitchFamily="34" charset="0"/>
-                <a:cs typeface="Arial" panose="020B0604020202020204" pitchFamily="34" charset="0"/>
-              </a:rPr>
-              <a:t>      </a:t>
-            </a:r>
-            <a:r>
-              <a:rPr lang="en-US" b="1" dirty="0" err="1">
-                <a:solidFill>
-                  <a:srgbClr val="DCDCAA"/>
-                </a:solidFill>
-                <a:effectLst/>
-                <a:latin typeface="Arial" panose="020B0604020202020204" pitchFamily="34" charset="0"/>
-                <a:cs typeface="Arial" panose="020B0604020202020204" pitchFamily="34" charset="0"/>
-              </a:rPr>
-              <a:t>peopleSearch</a:t>
-            </a:r>
-            <a:r>
-              <a:rPr lang="en-US" b="1" dirty="0">
-                <a:solidFill>
-                  <a:srgbClr val="9CDCFE"/>
-                </a:solidFill>
-                <a:effectLst/>
-                <a:latin typeface="Arial" panose="020B0604020202020204" pitchFamily="34" charset="0"/>
-                <a:cs typeface="Arial" panose="020B0604020202020204" pitchFamily="34" charset="0"/>
-              </a:rPr>
-              <a:t>:</a:t>
-            </a:r>
-            <a:r>
-              <a:rPr lang="en-US" b="1" dirty="0">
-                <a:solidFill>
-                  <a:srgbClr val="CCCCCC"/>
-                </a:solidFill>
-                <a:effectLst/>
-                <a:latin typeface="Arial" panose="020B0604020202020204" pitchFamily="34" charset="0"/>
-                <a:cs typeface="Arial" panose="020B0604020202020204" pitchFamily="34" charset="0"/>
-              </a:rPr>
-              <a:t> </a:t>
-            </a:r>
-            <a:r>
-              <a:rPr lang="en-US" b="1" dirty="0" err="1">
-                <a:solidFill>
-                  <a:srgbClr val="569CD6"/>
-                </a:solidFill>
-                <a:effectLst/>
-                <a:latin typeface="Arial" panose="020B0604020202020204" pitchFamily="34" charset="0"/>
-                <a:cs typeface="Arial" panose="020B0604020202020204" pitchFamily="34" charset="0"/>
-              </a:rPr>
-              <a:t>this</a:t>
-            </a:r>
-            <a:r>
-              <a:rPr lang="en-US" b="1" dirty="0" err="1">
-                <a:solidFill>
-                  <a:srgbClr val="CCCCCC"/>
-                </a:solidFill>
-                <a:effectLst/>
-                <a:latin typeface="Arial" panose="020B0604020202020204" pitchFamily="34" charset="0"/>
-                <a:cs typeface="Arial" panose="020B0604020202020204" pitchFamily="34" charset="0"/>
-              </a:rPr>
-              <a:t>.</a:t>
-            </a:r>
-            <a:r>
-              <a:rPr lang="en-US" b="1" dirty="0" err="1">
-                <a:solidFill>
-                  <a:srgbClr val="DCDCAA"/>
-                </a:solidFill>
-                <a:effectLst/>
-                <a:latin typeface="Arial" panose="020B0604020202020204" pitchFamily="34" charset="0"/>
-                <a:cs typeface="Arial" panose="020B0604020202020204" pitchFamily="34" charset="0"/>
-              </a:rPr>
-              <a:t>companyUsers</a:t>
-            </a:r>
-            <a:r>
-              <a:rPr lang="en-US" b="1" dirty="0">
-                <a:solidFill>
-                  <a:srgbClr val="CCCCCC"/>
-                </a:solidFill>
-                <a:effectLst/>
-                <a:latin typeface="Arial" panose="020B0604020202020204" pitchFamily="34" charset="0"/>
-                <a:cs typeface="Arial" panose="020B0604020202020204" pitchFamily="34" charset="0"/>
-              </a:rPr>
-              <a:t>,</a:t>
-            </a:r>
-          </a:p>
-          <a:p>
-            <a:pPr marL="0" indent="0">
-              <a:buNone/>
-            </a:pPr>
-            <a:r>
-              <a:rPr lang="en-US" b="1" dirty="0">
-                <a:solidFill>
-                  <a:srgbClr val="CCCCCC"/>
-                </a:solidFill>
-                <a:effectLst/>
-                <a:latin typeface="Arial" panose="020B0604020202020204" pitchFamily="34" charset="0"/>
-                <a:cs typeface="Arial" panose="020B0604020202020204" pitchFamily="34" charset="0"/>
-              </a:rPr>
-              <a:t>      </a:t>
-            </a:r>
-            <a:r>
-              <a:rPr lang="en-US" b="1" dirty="0" err="1">
-                <a:solidFill>
-                  <a:srgbClr val="DCDCAA"/>
-                </a:solidFill>
-                <a:effectLst/>
-                <a:latin typeface="Arial" panose="020B0604020202020204" pitchFamily="34" charset="0"/>
-                <a:cs typeface="Arial" panose="020B0604020202020204" pitchFamily="34" charset="0"/>
-              </a:rPr>
-              <a:t>searchSharepoint</a:t>
-            </a:r>
-            <a:r>
-              <a:rPr lang="en-US" b="1" dirty="0">
-                <a:solidFill>
-                  <a:srgbClr val="9CDCFE"/>
-                </a:solidFill>
-                <a:effectLst/>
-                <a:latin typeface="Arial" panose="020B0604020202020204" pitchFamily="34" charset="0"/>
-                <a:cs typeface="Arial" panose="020B0604020202020204" pitchFamily="34" charset="0"/>
-              </a:rPr>
-              <a:t>:</a:t>
-            </a:r>
-            <a:r>
-              <a:rPr lang="en-US" b="1" dirty="0">
-                <a:solidFill>
-                  <a:srgbClr val="CCCCCC"/>
-                </a:solidFill>
-                <a:effectLst/>
-                <a:latin typeface="Arial" panose="020B0604020202020204" pitchFamily="34" charset="0"/>
-                <a:cs typeface="Arial" panose="020B0604020202020204" pitchFamily="34" charset="0"/>
-              </a:rPr>
-              <a:t> </a:t>
-            </a:r>
-            <a:r>
-              <a:rPr lang="en-US" b="1" dirty="0" err="1">
-                <a:solidFill>
-                  <a:srgbClr val="569CD6"/>
-                </a:solidFill>
-                <a:effectLst/>
-                <a:latin typeface="Arial" panose="020B0604020202020204" pitchFamily="34" charset="0"/>
-                <a:cs typeface="Arial" panose="020B0604020202020204" pitchFamily="34" charset="0"/>
-              </a:rPr>
-              <a:t>this</a:t>
-            </a:r>
-            <a:r>
-              <a:rPr lang="en-US" b="1" dirty="0" err="1">
-                <a:solidFill>
-                  <a:srgbClr val="CCCCCC"/>
-                </a:solidFill>
-                <a:effectLst/>
-                <a:latin typeface="Arial" panose="020B0604020202020204" pitchFamily="34" charset="0"/>
-                <a:cs typeface="Arial" panose="020B0604020202020204" pitchFamily="34" charset="0"/>
-              </a:rPr>
-              <a:t>.</a:t>
-            </a:r>
-            <a:r>
-              <a:rPr lang="en-US" b="1" dirty="0" err="1">
-                <a:solidFill>
-                  <a:srgbClr val="DCDCAA"/>
-                </a:solidFill>
-                <a:effectLst/>
-                <a:latin typeface="Arial" panose="020B0604020202020204" pitchFamily="34" charset="0"/>
-                <a:cs typeface="Arial" panose="020B0604020202020204" pitchFamily="34" charset="0"/>
-              </a:rPr>
-              <a:t>searchSharepoint</a:t>
-            </a:r>
-            <a:r>
-              <a:rPr lang="en-US" b="1" dirty="0">
-                <a:solidFill>
-                  <a:srgbClr val="CCCCCC"/>
-                </a:solidFill>
-                <a:effectLst/>
-                <a:latin typeface="Arial" panose="020B0604020202020204" pitchFamily="34" charset="0"/>
-                <a:cs typeface="Arial" panose="020B0604020202020204" pitchFamily="34" charset="0"/>
-              </a:rPr>
-              <a:t>,</a:t>
-            </a:r>
-          </a:p>
-          <a:p>
-            <a:pPr marL="0" indent="0">
-              <a:buNone/>
-            </a:pPr>
-            <a:r>
-              <a:rPr lang="en-US" b="1" dirty="0">
-                <a:solidFill>
-                  <a:srgbClr val="CCCCCC"/>
-                </a:solidFill>
-                <a:effectLst/>
-                <a:latin typeface="Arial" panose="020B0604020202020204" pitchFamily="34" charset="0"/>
-                <a:cs typeface="Arial" panose="020B0604020202020204" pitchFamily="34" charset="0"/>
-              </a:rPr>
-              <a:t>  };</a:t>
-            </a:r>
-          </a:p>
-          <a:p>
-            <a:pPr marL="0" indent="0">
-              <a:buNone/>
-            </a:pPr>
-            <a:endParaRPr lang="en-US" dirty="0"/>
-          </a:p>
-          <a:p>
-            <a:pPr marL="914400" lvl="1" indent="-457200">
-              <a:buFont typeface="+mj-lt"/>
-              <a:buAutoNum type="arabicPeriod"/>
-            </a:pPr>
-            <a:endParaRPr lang="en-US" dirty="0"/>
-          </a:p>
-          <a:p>
-            <a:endParaRPr lang="en-US" dirty="0"/>
+              <a:t>SharePoint List: Supports up to 5000 Chats, Built-in “One-Click” list provisioning, Chat Privacy and Security Trimming for SharePoint Search</a:t>
+            </a:r>
+          </a:p>
+          <a:p>
+            <a:pPr lvl="1"/>
+            <a:r>
+              <a:rPr lang="en-US" dirty="0"/>
+              <a:t>Azure SQL Database: Provides more advanced storage capabilities tested on 1 Million+ Chat records</a:t>
+            </a:r>
+          </a:p>
+          <a:p>
+            <a:pPr lvl="1"/>
+            <a:r>
+              <a:rPr lang="en-US" dirty="0"/>
+              <a:t>Local Storage: it can be used to provide quick demo without long-time configurations</a:t>
+            </a:r>
           </a:p>
         </p:txBody>
       </p:sp>
     </p:spTree>
     <p:extLst>
       <p:ext uri="{BB962C8B-B14F-4D97-AF65-F5344CB8AC3E}">
-        <p14:creationId xmlns:p14="http://schemas.microsoft.com/office/powerpoint/2010/main" val="1810371528"/>
+        <p14:creationId xmlns:p14="http://schemas.microsoft.com/office/powerpoint/2010/main" val="678765667"/>
       </p:ext>
     </p:extLst>
   </p:cSld>
@@ -19652,14 +18963,6 @@
 <file path=ppt/slides/slide8.xml><?xml version="1.0" encoding="utf-8"?>
 <p:sld xmlns:a="http://schemas.openxmlformats.org/drawingml/2006/main" xmlns:r="http://schemas.openxmlformats.org/officeDocument/2006/relationships" xmlns:p="http://schemas.openxmlformats.org/presentationml/2006/main">
   <p:cSld>
-    <p:bg>
-      <p:bgPr>
-        <a:solidFill>
-          <a:schemeClr val="bg1"/>
-        </a:solidFill>
-        <a:effectLst/>
-      </p:bgPr>
-    </p:bg>
     <p:spTree>
       <p:nvGrpSpPr>
         <p:cNvPr id="1" name=""/>
@@ -19676,76 +18979,10 @@
       </p:grpSpPr>
       <p:sp>
         <p:nvSpPr>
-          <p:cNvPr id="40" name="Down Arrow 7">
-            <a:extLst>
-              <a:ext uri="{FF2B5EF4-FFF2-40B4-BE49-F238E27FC236}">
-                <a16:creationId xmlns:a16="http://schemas.microsoft.com/office/drawing/2014/main" id="{D4771268-CB57-404A-9271-370EB28F6090}"/>
-              </a:ext>
-              <a:ext uri="{C183D7F6-B498-43B3-948B-1728B52AA6E4}">
-                <adec:decorative xmlns:adec="http://schemas.microsoft.com/office/drawing/2017/decorative" val="1"/>
-              </a:ext>
-            </a:extLst>
-          </p:cNvPr>
-          <p:cNvSpPr>
-            <a:spLocks noGrp="1" noRot="1" noChangeAspect="1" noMove="1" noResize="1" noEditPoints="1" noAdjustHandles="1" noChangeArrowheads="1" noChangeShapeType="1" noTextEdit="1"/>
-          </p:cNvSpPr>
-          <p:nvPr>
-            <p:extLst>
-              <p:ext uri="{386F3935-93C4-4BCD-93E2-E3B085C9AB24}">
-                <p16:designElem xmlns:p16="http://schemas.microsoft.com/office/powerpoint/2015/main" val="1"/>
-              </p:ext>
-            </p:extLst>
-          </p:nvPr>
-        </p:nvSpPr>
-        <p:spPr>
-          <a:xfrm rot="16200000">
-            <a:off x="800100" y="1491343"/>
-            <a:ext cx="3333749" cy="3499103"/>
-          </a:xfrm>
-          <a:prstGeom prst="downArrow">
-            <a:avLst>
-              <a:gd name="adj1" fmla="val 100000"/>
-              <a:gd name="adj2" fmla="val 15788"/>
-            </a:avLst>
-          </a:prstGeom>
-          <a:solidFill>
-            <a:srgbClr val="404040"/>
-          </a:solidFill>
-          <a:ln w="53975">
-            <a:noFill/>
-          </a:ln>
-        </p:spPr>
-        <p:style>
-          <a:lnRef idx="2">
-            <a:schemeClr val="accent1">
-              <a:shade val="50000"/>
-            </a:schemeClr>
-          </a:lnRef>
-          <a:fillRef idx="1">
-            <a:schemeClr val="accent1"/>
-          </a:fillRef>
-          <a:effectRef idx="0">
-            <a:schemeClr val="accent1"/>
-          </a:effectRef>
-          <a:fontRef idx="minor">
-            <a:schemeClr val="lt1"/>
-          </a:fontRef>
-        </p:style>
-        <p:txBody>
-          <a:bodyPr rtlCol="0" anchor="ctr"/>
-          <a:lstStyle/>
-          <a:p>
-            <a:pPr algn="ctr"/>
-            <a:endParaRPr lang="en-US"/>
-          </a:p>
-        </p:txBody>
-      </p:sp>
-      <p:sp>
-        <p:nvSpPr>
           <p:cNvPr id="2" name="Title 1">
             <a:extLst>
               <a:ext uri="{FF2B5EF4-FFF2-40B4-BE49-F238E27FC236}">
-                <a16:creationId xmlns:a16="http://schemas.microsoft.com/office/drawing/2014/main" id="{EAFEF875-A7E4-5CCE-5AED-7D80496B5A60}"/>
+                <a16:creationId xmlns:a16="http://schemas.microsoft.com/office/drawing/2014/main" id="{372E33F5-15E4-66F2-F002-5CE98856317A}"/>
               </a:ext>
             </a:extLst>
           </p:cNvPr>
@@ -19758,71 +18995,985 @@
         </p:nvSpPr>
         <p:spPr>
           <a:xfrm>
-            <a:off x="1028700" y="1967266"/>
-            <a:ext cx="2628900" cy="2547257"/>
-          </a:xfrm>
-          <a:prstGeom prst="ellipse">
-            <a:avLst/>
-          </a:prstGeom>
-          <a:noFill/>
-        </p:spPr>
-        <p:txBody>
-          <a:bodyPr vert="horz" lIns="91440" tIns="45720" rIns="91440" bIns="45720" rtlCol="0" anchor="ctr">
-            <a:normAutofit/>
+            <a:off x="838199" y="203201"/>
+            <a:ext cx="10613571" cy="567382"/>
+          </a:xfrm>
+        </p:spPr>
+        <p:txBody>
+          <a:bodyPr>
+            <a:noAutofit/>
           </a:bodyPr>
           <a:lstStyle/>
           <a:p>
-            <a:pPr algn="ctr"/>
-            <a:r>
-              <a:rPr lang="en-US" sz="2500" kern="1200" dirty="0">
+            <a:r>
+              <a:rPr lang="fi-FI" sz="2200" b="1" dirty="0"/>
+              <a:t>Optional Integrations: SharePoint Search, Company Users, Local Date &amp; Time</a:t>
+            </a:r>
+            <a:endParaRPr lang="en-US" sz="2200" b="1" dirty="0"/>
+          </a:p>
+        </p:txBody>
+      </p:sp>
+      <p:sp>
+        <p:nvSpPr>
+          <p:cNvPr id="3" name="Content Placeholder 2">
+            <a:extLst>
+              <a:ext uri="{FF2B5EF4-FFF2-40B4-BE49-F238E27FC236}">
+                <a16:creationId xmlns:a16="http://schemas.microsoft.com/office/drawing/2014/main" id="{960E2D50-8FEA-D3F2-244E-86C96E33367C}"/>
+              </a:ext>
+            </a:extLst>
+          </p:cNvPr>
+          <p:cNvSpPr>
+            <a:spLocks noGrp="1"/>
+          </p:cNvSpPr>
+          <p:nvPr>
+            <p:ph idx="1"/>
+          </p:nvPr>
+        </p:nvSpPr>
+        <p:spPr>
+          <a:xfrm>
+            <a:off x="847253" y="917890"/>
+            <a:ext cx="10515600" cy="5349560"/>
+          </a:xfrm>
+        </p:spPr>
+        <p:txBody>
+          <a:bodyPr>
+            <a:normAutofit fontScale="55000" lnSpcReduction="20000"/>
+          </a:bodyPr>
+          <a:lstStyle/>
+          <a:p>
+            <a:pPr marL="0" indent="0">
+              <a:buNone/>
+            </a:pPr>
+            <a:r>
+              <a:rPr lang="en-US" sz="3600" b="1" dirty="0"/>
+              <a:t>How it works</a:t>
+            </a:r>
+          </a:p>
+          <a:p>
+            <a:pPr marL="0" indent="0">
+              <a:buNone/>
+            </a:pPr>
+            <a:r>
+              <a:rPr lang="en-US" dirty="0"/>
+              <a:t>The Function Calling feature is available in both Azure OpenAI and Native OpenAI (more advanced version). The flow for using this feature typically looks like:</a:t>
+            </a:r>
+          </a:p>
+          <a:p>
+            <a:pPr marL="457200" indent="-457200">
+              <a:buFont typeface="+mj-lt"/>
+              <a:buAutoNum type="arabicPeriod"/>
+            </a:pPr>
+            <a:r>
+              <a:rPr lang="en-US" dirty="0"/>
+              <a:t>In the process of interacting with OpenAI, you can send a request with options to call available integration functions that you have provided. </a:t>
+            </a:r>
+          </a:p>
+          <a:p>
+            <a:pPr marL="457200" indent="-457200">
+              <a:buFont typeface="+mj-lt"/>
+              <a:buAutoNum type="arabicPeriod"/>
+            </a:pPr>
+            <a:r>
+              <a:rPr lang="en-US" dirty="0"/>
+              <a:t>If OpenAI determines that it requires specific data, it will request to call a function with parameters that it deems suitable.</a:t>
+            </a:r>
+          </a:p>
+          <a:p>
+            <a:pPr marL="457200" indent="-457200">
+              <a:buFont typeface="+mj-lt"/>
+              <a:buAutoNum type="arabicPeriod"/>
+            </a:pPr>
+            <a:r>
+              <a:rPr lang="en-US" dirty="0"/>
+              <a:t>To meet OpenAI's demand, you can call the function with the proposed parameters on behalf of OpenAI. This allows you to obtain raw results locally, which you can then submit to OpenAI. You have control over what data you submit.</a:t>
+            </a:r>
+          </a:p>
+          <a:p>
+            <a:pPr marL="457200" indent="-457200">
+              <a:buFont typeface="+mj-lt"/>
+              <a:buAutoNum type="arabicPeriod"/>
+            </a:pPr>
+            <a:r>
+              <a:rPr lang="en-US" dirty="0"/>
+              <a:t>If OpenAI determines that it needs more information, it may demand calling another function, and this process can continue as necessary.</a:t>
+            </a:r>
+          </a:p>
+          <a:p>
+            <a:pPr marL="457200" indent="-457200">
+              <a:buFont typeface="+mj-lt"/>
+              <a:buAutoNum type="arabicPeriod"/>
+            </a:pPr>
+            <a:r>
+              <a:rPr lang="en-US" dirty="0"/>
+              <a:t>OpenAI handles the received data and transforms it as you have requested. The final response from OpenAI will include the results based on the processed data.</a:t>
+            </a:r>
+          </a:p>
+          <a:p>
+            <a:pPr marL="0" indent="0">
+              <a:buNone/>
+            </a:pPr>
+            <a:r>
+              <a:rPr lang="en-US" sz="2100" dirty="0">
                 <a:solidFill>
-                  <a:srgbClr val="FFFFFF"/>
+                  <a:srgbClr val="6A9955"/>
                 </a:solidFill>
-                <a:latin typeface="+mj-lt"/>
-                <a:ea typeface="+mj-ea"/>
-                <a:cs typeface="+mj-cs"/>
+                <a:latin typeface="Consolas" panose="020B0609020204030204" pitchFamily="49" charset="0"/>
               </a:rPr>
-              <a:t>Integrations</a:t>
-            </a:r>
-          </a:p>
-        </p:txBody>
-      </p:sp>
-      <p:pic>
-        <p:nvPicPr>
-          <p:cNvPr id="27" name="Content Placeholder 26">
-            <a:extLst>
-              <a:ext uri="{FF2B5EF4-FFF2-40B4-BE49-F238E27FC236}">
-                <a16:creationId xmlns:a16="http://schemas.microsoft.com/office/drawing/2014/main" id="{C589F45A-47BA-AD3F-B6B9-4C25D5583B7B}"/>
-              </a:ext>
-            </a:extLst>
-          </p:cNvPr>
-          <p:cNvPicPr>
-            <a:picLocks noGrp="1" noChangeAspect="1"/>
-          </p:cNvPicPr>
-          <p:nvPr>
-            <p:ph idx="1"/>
-          </p:nvPr>
-        </p:nvPicPr>
-        <p:blipFill>
-          <a:blip r:embed="rId2"/>
-          <a:stretch>
-            <a:fillRect/>
-          </a:stretch>
-        </p:blipFill>
-        <p:spPr>
-          <a:xfrm>
-            <a:off x="4777316" y="1105446"/>
-            <a:ext cx="6780700" cy="4644778"/>
-          </a:xfrm>
-          <a:prstGeom prst="rect">
-            <a:avLst/>
-          </a:prstGeom>
-        </p:spPr>
-      </p:pic>
+              <a:t>// 3 show cases available in the web part:</a:t>
+            </a:r>
+          </a:p>
+          <a:p>
+            <a:pPr marL="0" indent="0">
+              <a:buNone/>
+            </a:pPr>
+            <a:r>
+              <a:rPr lang="en-US" sz="2100" dirty="0">
+                <a:solidFill>
+                  <a:srgbClr val="6A9955"/>
+                </a:solidFill>
+                <a:latin typeface="Consolas" panose="020B0609020204030204" pitchFamily="49" charset="0"/>
+              </a:rPr>
+              <a:t>// Search in SharePoint for “your text“. Format the results as an HTML table.</a:t>
+            </a:r>
+          </a:p>
+          <a:p>
+            <a:pPr marL="0" indent="0">
+              <a:buNone/>
+            </a:pPr>
+            <a:r>
+              <a:rPr lang="en-US" sz="2100" dirty="0">
+                <a:solidFill>
+                  <a:srgbClr val="6A9955"/>
+                </a:solidFill>
+                <a:latin typeface="Consolas" panose="020B0609020204030204" pitchFamily="49" charset="0"/>
+              </a:rPr>
+              <a:t>// Get company users that have names starting with P. Format the results as an HTML table.</a:t>
+            </a:r>
+          </a:p>
+          <a:p>
+            <a:pPr marL="0" indent="0">
+              <a:buNone/>
+            </a:pPr>
+            <a:r>
+              <a:rPr lang="en-US" sz="2100" dirty="0">
+                <a:solidFill>
+                  <a:srgbClr val="6A9955"/>
+                </a:solidFill>
+                <a:latin typeface="Consolas" panose="020B0609020204030204" pitchFamily="49" charset="0"/>
+              </a:rPr>
+              <a:t>// Date, Time, Date and time.</a:t>
+            </a:r>
+          </a:p>
+          <a:p>
+            <a:pPr marL="0" indent="0">
+              <a:buNone/>
+            </a:pPr>
+            <a:r>
+              <a:rPr lang="en-US" b="1" dirty="0">
+                <a:solidFill>
+                  <a:srgbClr val="C586C0"/>
+                </a:solidFill>
+                <a:effectLst/>
+                <a:latin typeface="Arial" panose="020B0604020202020204" pitchFamily="34" charset="0"/>
+                <a:cs typeface="Arial" panose="020B0604020202020204" pitchFamily="34" charset="0"/>
+              </a:rPr>
+              <a:t>export</a:t>
+            </a:r>
+            <a:r>
+              <a:rPr lang="en-US" b="1" dirty="0">
+                <a:solidFill>
+                  <a:srgbClr val="CCCCCC"/>
+                </a:solidFill>
+                <a:effectLst/>
+                <a:latin typeface="Arial" panose="020B0604020202020204" pitchFamily="34" charset="0"/>
+                <a:cs typeface="Arial" panose="020B0604020202020204" pitchFamily="34" charset="0"/>
+              </a:rPr>
+              <a:t> </a:t>
+            </a:r>
+            <a:r>
+              <a:rPr lang="en-US" b="1" dirty="0">
+                <a:solidFill>
+                  <a:srgbClr val="C586C0"/>
+                </a:solidFill>
+                <a:effectLst/>
+                <a:latin typeface="Arial" panose="020B0604020202020204" pitchFamily="34" charset="0"/>
+                <a:cs typeface="Arial" panose="020B0604020202020204" pitchFamily="34" charset="0"/>
+              </a:rPr>
+              <a:t>default</a:t>
+            </a:r>
+            <a:r>
+              <a:rPr lang="en-US" b="1" dirty="0">
+                <a:solidFill>
+                  <a:srgbClr val="CCCCCC"/>
+                </a:solidFill>
+                <a:effectLst/>
+                <a:latin typeface="Arial" panose="020B0604020202020204" pitchFamily="34" charset="0"/>
+                <a:cs typeface="Arial" panose="020B0604020202020204" pitchFamily="34" charset="0"/>
+              </a:rPr>
+              <a:t> </a:t>
+            </a:r>
+            <a:r>
+              <a:rPr lang="en-US" b="1" dirty="0">
+                <a:solidFill>
+                  <a:srgbClr val="569CD6"/>
+                </a:solidFill>
+                <a:effectLst/>
+                <a:latin typeface="Arial" panose="020B0604020202020204" pitchFamily="34" charset="0"/>
+                <a:cs typeface="Arial" panose="020B0604020202020204" pitchFamily="34" charset="0"/>
+              </a:rPr>
+              <a:t>class</a:t>
+            </a:r>
+            <a:r>
+              <a:rPr lang="en-US" b="1" dirty="0">
+                <a:solidFill>
+                  <a:srgbClr val="CCCCCC"/>
+                </a:solidFill>
+                <a:effectLst/>
+                <a:latin typeface="Arial" panose="020B0604020202020204" pitchFamily="34" charset="0"/>
+                <a:cs typeface="Arial" panose="020B0604020202020204" pitchFamily="34" charset="0"/>
+              </a:rPr>
+              <a:t> </a:t>
+            </a:r>
+            <a:r>
+              <a:rPr lang="en-US" b="1" dirty="0" err="1">
+                <a:solidFill>
+                  <a:srgbClr val="4EC9B0"/>
+                </a:solidFill>
+                <a:effectLst/>
+                <a:latin typeface="Arial" panose="020B0604020202020204" pitchFamily="34" charset="0"/>
+                <a:cs typeface="Arial" panose="020B0604020202020204" pitchFamily="34" charset="0"/>
+              </a:rPr>
+              <a:t>FunctionHelper</a:t>
+            </a:r>
+            <a:r>
+              <a:rPr lang="en-US" b="1" dirty="0">
+                <a:solidFill>
+                  <a:srgbClr val="CCCCCC"/>
+                </a:solidFill>
+                <a:effectLst/>
+                <a:latin typeface="Arial" panose="020B0604020202020204" pitchFamily="34" charset="0"/>
+                <a:cs typeface="Arial" panose="020B0604020202020204" pitchFamily="34" charset="0"/>
+              </a:rPr>
+              <a:t> {</a:t>
+            </a:r>
+          </a:p>
+          <a:p>
+            <a:pPr marL="0" indent="0">
+              <a:buNone/>
+            </a:pPr>
+            <a:r>
+              <a:rPr lang="en-US" b="1" dirty="0">
+                <a:solidFill>
+                  <a:srgbClr val="CCCCCC"/>
+                </a:solidFill>
+                <a:effectLst/>
+                <a:latin typeface="Arial" panose="020B0604020202020204" pitchFamily="34" charset="0"/>
+                <a:cs typeface="Arial" panose="020B0604020202020204" pitchFamily="34" charset="0"/>
+              </a:rPr>
+              <a:t>  </a:t>
+            </a:r>
+            <a:r>
+              <a:rPr lang="en-US" b="1" dirty="0">
+                <a:solidFill>
+                  <a:srgbClr val="569CD6"/>
+                </a:solidFill>
+                <a:effectLst/>
+                <a:latin typeface="Arial" panose="020B0604020202020204" pitchFamily="34" charset="0"/>
+                <a:cs typeface="Arial" panose="020B0604020202020204" pitchFamily="34" charset="0"/>
+              </a:rPr>
+              <a:t>private</a:t>
+            </a:r>
+            <a:r>
+              <a:rPr lang="en-US" b="1" dirty="0">
+                <a:solidFill>
+                  <a:srgbClr val="CCCCCC"/>
+                </a:solidFill>
+                <a:effectLst/>
+                <a:latin typeface="Arial" panose="020B0604020202020204" pitchFamily="34" charset="0"/>
+                <a:cs typeface="Arial" panose="020B0604020202020204" pitchFamily="34" charset="0"/>
+              </a:rPr>
+              <a:t> </a:t>
+            </a:r>
+            <a:r>
+              <a:rPr lang="en-US" b="1" dirty="0">
+                <a:solidFill>
+                  <a:srgbClr val="569CD6"/>
+                </a:solidFill>
+                <a:effectLst/>
+                <a:latin typeface="Arial" panose="020B0604020202020204" pitchFamily="34" charset="0"/>
+                <a:cs typeface="Arial" panose="020B0604020202020204" pitchFamily="34" charset="0"/>
+              </a:rPr>
+              <a:t>static</a:t>
+            </a:r>
+            <a:r>
+              <a:rPr lang="en-US" b="1" dirty="0">
+                <a:solidFill>
+                  <a:srgbClr val="CCCCCC"/>
+                </a:solidFill>
+                <a:effectLst/>
+                <a:latin typeface="Arial" panose="020B0604020202020204" pitchFamily="34" charset="0"/>
+                <a:cs typeface="Arial" panose="020B0604020202020204" pitchFamily="34" charset="0"/>
+              </a:rPr>
+              <a:t> </a:t>
+            </a:r>
+            <a:r>
+              <a:rPr lang="en-US" b="1" dirty="0">
+                <a:solidFill>
+                  <a:srgbClr val="9CDCFE"/>
+                </a:solidFill>
+                <a:effectLst/>
+                <a:latin typeface="Arial" panose="020B0604020202020204" pitchFamily="34" charset="0"/>
+                <a:cs typeface="Arial" panose="020B0604020202020204" pitchFamily="34" charset="0"/>
+              </a:rPr>
+              <a:t>available</a:t>
+            </a:r>
+            <a:r>
+              <a:rPr lang="en-US" b="1" dirty="0">
+                <a:solidFill>
+                  <a:srgbClr val="D4D4D4"/>
+                </a:solidFill>
+                <a:effectLst/>
+                <a:latin typeface="Arial" panose="020B0604020202020204" pitchFamily="34" charset="0"/>
+                <a:cs typeface="Arial" panose="020B0604020202020204" pitchFamily="34" charset="0"/>
+              </a:rPr>
+              <a:t>:</a:t>
+            </a:r>
+            <a:r>
+              <a:rPr lang="en-US" b="1" dirty="0">
+                <a:solidFill>
+                  <a:srgbClr val="CCCCCC"/>
+                </a:solidFill>
+                <a:effectLst/>
+                <a:latin typeface="Arial" panose="020B0604020202020204" pitchFamily="34" charset="0"/>
+                <a:cs typeface="Arial" panose="020B0604020202020204" pitchFamily="34" charset="0"/>
+              </a:rPr>
+              <a:t> { [</a:t>
+            </a:r>
+            <a:r>
+              <a:rPr lang="en-US" b="1" dirty="0">
+                <a:solidFill>
+                  <a:srgbClr val="9CDCFE"/>
+                </a:solidFill>
+                <a:effectLst/>
+                <a:latin typeface="Arial" panose="020B0604020202020204" pitchFamily="34" charset="0"/>
+                <a:cs typeface="Arial" panose="020B0604020202020204" pitchFamily="34" charset="0"/>
+              </a:rPr>
+              <a:t>key</a:t>
+            </a:r>
+            <a:r>
+              <a:rPr lang="en-US" b="1" dirty="0">
+                <a:solidFill>
+                  <a:srgbClr val="D4D4D4"/>
+                </a:solidFill>
+                <a:effectLst/>
+                <a:latin typeface="Arial" panose="020B0604020202020204" pitchFamily="34" charset="0"/>
+                <a:cs typeface="Arial" panose="020B0604020202020204" pitchFamily="34" charset="0"/>
+              </a:rPr>
+              <a:t>:</a:t>
+            </a:r>
+            <a:r>
+              <a:rPr lang="en-US" b="1" dirty="0">
+                <a:solidFill>
+                  <a:srgbClr val="CCCCCC"/>
+                </a:solidFill>
+                <a:effectLst/>
+                <a:latin typeface="Arial" panose="020B0604020202020204" pitchFamily="34" charset="0"/>
+                <a:cs typeface="Arial" panose="020B0604020202020204" pitchFamily="34" charset="0"/>
+              </a:rPr>
+              <a:t> </a:t>
+            </a:r>
+            <a:r>
+              <a:rPr lang="en-US" b="1" dirty="0">
+                <a:solidFill>
+                  <a:srgbClr val="4EC9B0"/>
+                </a:solidFill>
+                <a:effectLst/>
+                <a:latin typeface="Arial" panose="020B0604020202020204" pitchFamily="34" charset="0"/>
+                <a:cs typeface="Arial" panose="020B0604020202020204" pitchFamily="34" charset="0"/>
+              </a:rPr>
+              <a:t>string</a:t>
+            </a:r>
+            <a:r>
+              <a:rPr lang="en-US" b="1" dirty="0">
+                <a:solidFill>
+                  <a:srgbClr val="CCCCCC"/>
+                </a:solidFill>
+                <a:effectLst/>
+                <a:latin typeface="Arial" panose="020B0604020202020204" pitchFamily="34" charset="0"/>
+                <a:cs typeface="Arial" panose="020B0604020202020204" pitchFamily="34" charset="0"/>
+              </a:rPr>
+              <a:t>]</a:t>
+            </a:r>
+            <a:r>
+              <a:rPr lang="en-US" b="1" dirty="0">
+                <a:solidFill>
+                  <a:srgbClr val="D4D4D4"/>
+                </a:solidFill>
+                <a:effectLst/>
+                <a:latin typeface="Arial" panose="020B0604020202020204" pitchFamily="34" charset="0"/>
+                <a:cs typeface="Arial" panose="020B0604020202020204" pitchFamily="34" charset="0"/>
+              </a:rPr>
+              <a:t>:</a:t>
+            </a:r>
+            <a:r>
+              <a:rPr lang="en-US" b="1" dirty="0">
+                <a:solidFill>
+                  <a:srgbClr val="CCCCCC"/>
+                </a:solidFill>
+                <a:effectLst/>
+                <a:latin typeface="Arial" panose="020B0604020202020204" pitchFamily="34" charset="0"/>
+                <a:cs typeface="Arial" panose="020B0604020202020204" pitchFamily="34" charset="0"/>
+              </a:rPr>
+              <a:t> </a:t>
+            </a:r>
+            <a:r>
+              <a:rPr lang="en-US" b="1" dirty="0">
+                <a:solidFill>
+                  <a:srgbClr val="4EC9B0"/>
+                </a:solidFill>
+                <a:effectLst/>
+                <a:latin typeface="Arial" panose="020B0604020202020204" pitchFamily="34" charset="0"/>
+                <a:cs typeface="Arial" panose="020B0604020202020204" pitchFamily="34" charset="0"/>
+              </a:rPr>
+              <a:t>any</a:t>
+            </a:r>
+            <a:r>
+              <a:rPr lang="en-US" b="1" dirty="0">
+                <a:solidFill>
+                  <a:srgbClr val="CCCCCC"/>
+                </a:solidFill>
+                <a:effectLst/>
+                <a:latin typeface="Arial" panose="020B0604020202020204" pitchFamily="34" charset="0"/>
+                <a:cs typeface="Arial" panose="020B0604020202020204" pitchFamily="34" charset="0"/>
+              </a:rPr>
+              <a:t> } </a:t>
+            </a:r>
+            <a:r>
+              <a:rPr lang="en-US" b="1" dirty="0">
+                <a:solidFill>
+                  <a:srgbClr val="D4D4D4"/>
+                </a:solidFill>
+                <a:effectLst/>
+                <a:latin typeface="Arial" panose="020B0604020202020204" pitchFamily="34" charset="0"/>
+                <a:cs typeface="Arial" panose="020B0604020202020204" pitchFamily="34" charset="0"/>
+              </a:rPr>
+              <a:t>=</a:t>
+            </a:r>
+            <a:r>
+              <a:rPr lang="en-US" b="1" dirty="0">
+                <a:solidFill>
+                  <a:srgbClr val="CCCCCC"/>
+                </a:solidFill>
+                <a:effectLst/>
+                <a:latin typeface="Arial" panose="020B0604020202020204" pitchFamily="34" charset="0"/>
+                <a:cs typeface="Arial" panose="020B0604020202020204" pitchFamily="34" charset="0"/>
+              </a:rPr>
+              <a:t> {</a:t>
+            </a:r>
+          </a:p>
+          <a:p>
+            <a:pPr marL="0" indent="0">
+              <a:buNone/>
+            </a:pPr>
+            <a:r>
+              <a:rPr lang="en-US" b="1" dirty="0">
+                <a:solidFill>
+                  <a:srgbClr val="CCCCCC"/>
+                </a:solidFill>
+                <a:effectLst/>
+                <a:latin typeface="Arial" panose="020B0604020202020204" pitchFamily="34" charset="0"/>
+                <a:cs typeface="Arial" panose="020B0604020202020204" pitchFamily="34" charset="0"/>
+              </a:rPr>
+              <a:t>      </a:t>
+            </a:r>
+            <a:r>
+              <a:rPr lang="en-US" b="1" dirty="0" err="1">
+                <a:solidFill>
+                  <a:srgbClr val="DCDCAA"/>
+                </a:solidFill>
+                <a:effectLst/>
+                <a:latin typeface="Arial" panose="020B0604020202020204" pitchFamily="34" charset="0"/>
+                <a:cs typeface="Arial" panose="020B0604020202020204" pitchFamily="34" charset="0"/>
+              </a:rPr>
+              <a:t>companyUsers</a:t>
+            </a:r>
+            <a:r>
+              <a:rPr lang="en-US" b="1" dirty="0">
+                <a:solidFill>
+                  <a:srgbClr val="9CDCFE"/>
+                </a:solidFill>
+                <a:effectLst/>
+                <a:latin typeface="Arial" panose="020B0604020202020204" pitchFamily="34" charset="0"/>
+                <a:cs typeface="Arial" panose="020B0604020202020204" pitchFamily="34" charset="0"/>
+              </a:rPr>
+              <a:t>:</a:t>
+            </a:r>
+            <a:r>
+              <a:rPr lang="en-US" b="1" dirty="0">
+                <a:solidFill>
+                  <a:srgbClr val="CCCCCC"/>
+                </a:solidFill>
+                <a:effectLst/>
+                <a:latin typeface="Arial" panose="020B0604020202020204" pitchFamily="34" charset="0"/>
+                <a:cs typeface="Arial" panose="020B0604020202020204" pitchFamily="34" charset="0"/>
+              </a:rPr>
+              <a:t> </a:t>
+            </a:r>
+            <a:r>
+              <a:rPr lang="en-US" b="1" dirty="0" err="1">
+                <a:solidFill>
+                  <a:srgbClr val="569CD6"/>
+                </a:solidFill>
+                <a:effectLst/>
+                <a:latin typeface="Arial" panose="020B0604020202020204" pitchFamily="34" charset="0"/>
+                <a:cs typeface="Arial" panose="020B0604020202020204" pitchFamily="34" charset="0"/>
+              </a:rPr>
+              <a:t>this</a:t>
+            </a:r>
+            <a:r>
+              <a:rPr lang="en-US" b="1" dirty="0" err="1">
+                <a:solidFill>
+                  <a:srgbClr val="CCCCCC"/>
+                </a:solidFill>
+                <a:effectLst/>
+                <a:latin typeface="Arial" panose="020B0604020202020204" pitchFamily="34" charset="0"/>
+                <a:cs typeface="Arial" panose="020B0604020202020204" pitchFamily="34" charset="0"/>
+              </a:rPr>
+              <a:t>.</a:t>
+            </a:r>
+            <a:r>
+              <a:rPr lang="en-US" b="1" dirty="0" err="1">
+                <a:solidFill>
+                  <a:srgbClr val="DCDCAA"/>
+                </a:solidFill>
+                <a:effectLst/>
+                <a:latin typeface="Arial" panose="020B0604020202020204" pitchFamily="34" charset="0"/>
+                <a:cs typeface="Arial" panose="020B0604020202020204" pitchFamily="34" charset="0"/>
+              </a:rPr>
+              <a:t>companyUsers</a:t>
+            </a:r>
+            <a:r>
+              <a:rPr lang="en-US" b="1" dirty="0">
+                <a:solidFill>
+                  <a:srgbClr val="CCCCCC"/>
+                </a:solidFill>
+                <a:effectLst/>
+                <a:latin typeface="Arial" panose="020B0604020202020204" pitchFamily="34" charset="0"/>
+                <a:cs typeface="Arial" panose="020B0604020202020204" pitchFamily="34" charset="0"/>
+              </a:rPr>
+              <a:t>,</a:t>
+            </a:r>
+          </a:p>
+          <a:p>
+            <a:pPr marL="0" indent="0">
+              <a:buNone/>
+            </a:pPr>
+            <a:r>
+              <a:rPr lang="en-US" b="1" dirty="0">
+                <a:solidFill>
+                  <a:srgbClr val="CCCCCC"/>
+                </a:solidFill>
+                <a:effectLst/>
+                <a:latin typeface="Arial" panose="020B0604020202020204" pitchFamily="34" charset="0"/>
+                <a:cs typeface="Arial" panose="020B0604020202020204" pitchFamily="34" charset="0"/>
+              </a:rPr>
+              <a:t>      </a:t>
+            </a:r>
+            <a:r>
+              <a:rPr lang="en-US" b="1" dirty="0" err="1">
+                <a:solidFill>
+                  <a:srgbClr val="DCDCAA"/>
+                </a:solidFill>
+                <a:effectLst/>
+                <a:latin typeface="Arial" panose="020B0604020202020204" pitchFamily="34" charset="0"/>
+                <a:cs typeface="Arial" panose="020B0604020202020204" pitchFamily="34" charset="0"/>
+              </a:rPr>
+              <a:t>currentDateOrTime</a:t>
+            </a:r>
+            <a:r>
+              <a:rPr lang="en-US" b="1" dirty="0">
+                <a:solidFill>
+                  <a:srgbClr val="9CDCFE"/>
+                </a:solidFill>
+                <a:effectLst/>
+                <a:latin typeface="Arial" panose="020B0604020202020204" pitchFamily="34" charset="0"/>
+                <a:cs typeface="Arial" panose="020B0604020202020204" pitchFamily="34" charset="0"/>
+              </a:rPr>
+              <a:t>:</a:t>
+            </a:r>
+            <a:r>
+              <a:rPr lang="en-US" b="1" dirty="0">
+                <a:solidFill>
+                  <a:srgbClr val="CCCCCC"/>
+                </a:solidFill>
+                <a:effectLst/>
+                <a:latin typeface="Arial" panose="020B0604020202020204" pitchFamily="34" charset="0"/>
+                <a:cs typeface="Arial" panose="020B0604020202020204" pitchFamily="34" charset="0"/>
+              </a:rPr>
+              <a:t> </a:t>
+            </a:r>
+            <a:r>
+              <a:rPr lang="en-US" b="1" dirty="0" err="1">
+                <a:solidFill>
+                  <a:srgbClr val="569CD6"/>
+                </a:solidFill>
+                <a:effectLst/>
+                <a:latin typeface="Arial" panose="020B0604020202020204" pitchFamily="34" charset="0"/>
+                <a:cs typeface="Arial" panose="020B0604020202020204" pitchFamily="34" charset="0"/>
+              </a:rPr>
+              <a:t>this</a:t>
+            </a:r>
+            <a:r>
+              <a:rPr lang="en-US" b="1" dirty="0" err="1">
+                <a:solidFill>
+                  <a:srgbClr val="CCCCCC"/>
+                </a:solidFill>
+                <a:effectLst/>
+                <a:latin typeface="Arial" panose="020B0604020202020204" pitchFamily="34" charset="0"/>
+                <a:cs typeface="Arial" panose="020B0604020202020204" pitchFamily="34" charset="0"/>
+              </a:rPr>
+              <a:t>.</a:t>
+            </a:r>
+            <a:r>
+              <a:rPr lang="en-US" b="1" dirty="0" err="1">
+                <a:solidFill>
+                  <a:srgbClr val="DCDCAA"/>
+                </a:solidFill>
+                <a:effectLst/>
+                <a:latin typeface="Arial" panose="020B0604020202020204" pitchFamily="34" charset="0"/>
+                <a:cs typeface="Arial" panose="020B0604020202020204" pitchFamily="34" charset="0"/>
+              </a:rPr>
+              <a:t>currentDateOrTime</a:t>
+            </a:r>
+            <a:r>
+              <a:rPr lang="en-US" b="1" dirty="0">
+                <a:solidFill>
+                  <a:srgbClr val="CCCCCC"/>
+                </a:solidFill>
+                <a:effectLst/>
+                <a:latin typeface="Arial" panose="020B0604020202020204" pitchFamily="34" charset="0"/>
+                <a:cs typeface="Arial" panose="020B0604020202020204" pitchFamily="34" charset="0"/>
+              </a:rPr>
+              <a:t>,</a:t>
+            </a:r>
+          </a:p>
+          <a:p>
+            <a:pPr marL="0" indent="0">
+              <a:buNone/>
+            </a:pPr>
+            <a:r>
+              <a:rPr lang="en-US" b="1" dirty="0">
+                <a:solidFill>
+                  <a:srgbClr val="DCDCAA"/>
+                </a:solidFill>
+                <a:effectLst/>
+                <a:latin typeface="Arial" panose="020B0604020202020204" pitchFamily="34" charset="0"/>
+                <a:cs typeface="Arial" panose="020B0604020202020204" pitchFamily="34" charset="0"/>
+              </a:rPr>
+              <a:t>      </a:t>
+            </a:r>
+            <a:r>
+              <a:rPr lang="en-US" b="1" dirty="0" err="1">
+                <a:solidFill>
+                  <a:srgbClr val="DCDCAA"/>
+                </a:solidFill>
+                <a:effectLst/>
+                <a:latin typeface="Arial" panose="020B0604020202020204" pitchFamily="34" charset="0"/>
+                <a:cs typeface="Arial" panose="020B0604020202020204" pitchFamily="34" charset="0"/>
+              </a:rPr>
+              <a:t>currentDateAndTime</a:t>
+            </a:r>
+            <a:r>
+              <a:rPr lang="en-US" b="1" dirty="0">
+                <a:solidFill>
+                  <a:srgbClr val="9CDCFE"/>
+                </a:solidFill>
+                <a:effectLst/>
+                <a:latin typeface="Arial" panose="020B0604020202020204" pitchFamily="34" charset="0"/>
+                <a:cs typeface="Arial" panose="020B0604020202020204" pitchFamily="34" charset="0"/>
+              </a:rPr>
+              <a:t>:</a:t>
+            </a:r>
+            <a:r>
+              <a:rPr lang="en-US" b="1" dirty="0">
+                <a:solidFill>
+                  <a:srgbClr val="CCCCCC"/>
+                </a:solidFill>
+                <a:effectLst/>
+                <a:latin typeface="Arial" panose="020B0604020202020204" pitchFamily="34" charset="0"/>
+                <a:cs typeface="Arial" panose="020B0604020202020204" pitchFamily="34" charset="0"/>
+              </a:rPr>
+              <a:t> </a:t>
+            </a:r>
+            <a:r>
+              <a:rPr lang="en-US" b="1" dirty="0" err="1">
+                <a:solidFill>
+                  <a:srgbClr val="569CD6"/>
+                </a:solidFill>
+                <a:effectLst/>
+                <a:latin typeface="Arial" panose="020B0604020202020204" pitchFamily="34" charset="0"/>
+                <a:cs typeface="Arial" panose="020B0604020202020204" pitchFamily="34" charset="0"/>
+              </a:rPr>
+              <a:t>this</a:t>
+            </a:r>
+            <a:r>
+              <a:rPr lang="en-US" b="1" dirty="0" err="1">
+                <a:solidFill>
+                  <a:srgbClr val="CCCCCC"/>
+                </a:solidFill>
+                <a:effectLst/>
+                <a:latin typeface="Arial" panose="020B0604020202020204" pitchFamily="34" charset="0"/>
+                <a:cs typeface="Arial" panose="020B0604020202020204" pitchFamily="34" charset="0"/>
+              </a:rPr>
+              <a:t>.</a:t>
+            </a:r>
+            <a:r>
+              <a:rPr lang="en-US" b="1" dirty="0" err="1">
+                <a:solidFill>
+                  <a:srgbClr val="DCDCAA"/>
+                </a:solidFill>
+                <a:effectLst/>
+                <a:latin typeface="Arial" panose="020B0604020202020204" pitchFamily="34" charset="0"/>
+                <a:cs typeface="Arial" panose="020B0604020202020204" pitchFamily="34" charset="0"/>
+              </a:rPr>
+              <a:t>currentDateAndTime</a:t>
+            </a:r>
+            <a:r>
+              <a:rPr lang="en-US" b="1" dirty="0">
+                <a:solidFill>
+                  <a:srgbClr val="CCCCCC"/>
+                </a:solidFill>
+                <a:effectLst/>
+                <a:latin typeface="Arial" panose="020B0604020202020204" pitchFamily="34" charset="0"/>
+                <a:cs typeface="Arial" panose="020B0604020202020204" pitchFamily="34" charset="0"/>
+              </a:rPr>
+              <a:t>,</a:t>
+            </a:r>
+          </a:p>
+          <a:p>
+            <a:pPr marL="0" indent="0">
+              <a:buNone/>
+            </a:pPr>
+            <a:r>
+              <a:rPr lang="en-US" b="1" dirty="0">
+                <a:solidFill>
+                  <a:srgbClr val="CCCCCC"/>
+                </a:solidFill>
+                <a:effectLst/>
+                <a:latin typeface="Arial" panose="020B0604020202020204" pitchFamily="34" charset="0"/>
+                <a:cs typeface="Arial" panose="020B0604020202020204" pitchFamily="34" charset="0"/>
+              </a:rPr>
+              <a:t>      </a:t>
+            </a:r>
+            <a:r>
+              <a:rPr lang="en-US" b="1" dirty="0" err="1">
+                <a:solidFill>
+                  <a:srgbClr val="DCDCAA"/>
+                </a:solidFill>
+                <a:effectLst/>
+                <a:latin typeface="Arial" panose="020B0604020202020204" pitchFamily="34" charset="0"/>
+                <a:cs typeface="Arial" panose="020B0604020202020204" pitchFamily="34" charset="0"/>
+              </a:rPr>
+              <a:t>peopleSearch</a:t>
+            </a:r>
+            <a:r>
+              <a:rPr lang="en-US" b="1" dirty="0">
+                <a:solidFill>
+                  <a:srgbClr val="9CDCFE"/>
+                </a:solidFill>
+                <a:effectLst/>
+                <a:latin typeface="Arial" panose="020B0604020202020204" pitchFamily="34" charset="0"/>
+                <a:cs typeface="Arial" panose="020B0604020202020204" pitchFamily="34" charset="0"/>
+              </a:rPr>
+              <a:t>:</a:t>
+            </a:r>
+            <a:r>
+              <a:rPr lang="en-US" b="1" dirty="0">
+                <a:solidFill>
+                  <a:srgbClr val="CCCCCC"/>
+                </a:solidFill>
+                <a:effectLst/>
+                <a:latin typeface="Arial" panose="020B0604020202020204" pitchFamily="34" charset="0"/>
+                <a:cs typeface="Arial" panose="020B0604020202020204" pitchFamily="34" charset="0"/>
+              </a:rPr>
+              <a:t> </a:t>
+            </a:r>
+            <a:r>
+              <a:rPr lang="en-US" b="1" dirty="0" err="1">
+                <a:solidFill>
+                  <a:srgbClr val="569CD6"/>
+                </a:solidFill>
+                <a:effectLst/>
+                <a:latin typeface="Arial" panose="020B0604020202020204" pitchFamily="34" charset="0"/>
+                <a:cs typeface="Arial" panose="020B0604020202020204" pitchFamily="34" charset="0"/>
+              </a:rPr>
+              <a:t>this</a:t>
+            </a:r>
+            <a:r>
+              <a:rPr lang="en-US" b="1" dirty="0" err="1">
+                <a:solidFill>
+                  <a:srgbClr val="CCCCCC"/>
+                </a:solidFill>
+                <a:effectLst/>
+                <a:latin typeface="Arial" panose="020B0604020202020204" pitchFamily="34" charset="0"/>
+                <a:cs typeface="Arial" panose="020B0604020202020204" pitchFamily="34" charset="0"/>
+              </a:rPr>
+              <a:t>.</a:t>
+            </a:r>
+            <a:r>
+              <a:rPr lang="en-US" b="1" dirty="0" err="1">
+                <a:solidFill>
+                  <a:srgbClr val="DCDCAA"/>
+                </a:solidFill>
+                <a:effectLst/>
+                <a:latin typeface="Arial" panose="020B0604020202020204" pitchFamily="34" charset="0"/>
+                <a:cs typeface="Arial" panose="020B0604020202020204" pitchFamily="34" charset="0"/>
+              </a:rPr>
+              <a:t>companyUsers</a:t>
+            </a:r>
+            <a:r>
+              <a:rPr lang="en-US" b="1" dirty="0">
+                <a:solidFill>
+                  <a:srgbClr val="CCCCCC"/>
+                </a:solidFill>
+                <a:effectLst/>
+                <a:latin typeface="Arial" panose="020B0604020202020204" pitchFamily="34" charset="0"/>
+                <a:cs typeface="Arial" panose="020B0604020202020204" pitchFamily="34" charset="0"/>
+              </a:rPr>
+              <a:t>,</a:t>
+            </a:r>
+          </a:p>
+          <a:p>
+            <a:pPr marL="0" indent="0">
+              <a:buNone/>
+            </a:pPr>
+            <a:r>
+              <a:rPr lang="en-US" b="1" dirty="0">
+                <a:solidFill>
+                  <a:srgbClr val="CCCCCC"/>
+                </a:solidFill>
+                <a:effectLst/>
+                <a:latin typeface="Arial" panose="020B0604020202020204" pitchFamily="34" charset="0"/>
+                <a:cs typeface="Arial" panose="020B0604020202020204" pitchFamily="34" charset="0"/>
+              </a:rPr>
+              <a:t>      </a:t>
+            </a:r>
+            <a:r>
+              <a:rPr lang="en-US" b="1" dirty="0" err="1">
+                <a:solidFill>
+                  <a:srgbClr val="DCDCAA"/>
+                </a:solidFill>
+                <a:effectLst/>
+                <a:latin typeface="Arial" panose="020B0604020202020204" pitchFamily="34" charset="0"/>
+                <a:cs typeface="Arial" panose="020B0604020202020204" pitchFamily="34" charset="0"/>
+              </a:rPr>
+              <a:t>searchSharepoint</a:t>
+            </a:r>
+            <a:r>
+              <a:rPr lang="en-US" b="1" dirty="0">
+                <a:solidFill>
+                  <a:srgbClr val="9CDCFE"/>
+                </a:solidFill>
+                <a:effectLst/>
+                <a:latin typeface="Arial" panose="020B0604020202020204" pitchFamily="34" charset="0"/>
+                <a:cs typeface="Arial" panose="020B0604020202020204" pitchFamily="34" charset="0"/>
+              </a:rPr>
+              <a:t>:</a:t>
+            </a:r>
+            <a:r>
+              <a:rPr lang="en-US" b="1" dirty="0">
+                <a:solidFill>
+                  <a:srgbClr val="CCCCCC"/>
+                </a:solidFill>
+                <a:effectLst/>
+                <a:latin typeface="Arial" panose="020B0604020202020204" pitchFamily="34" charset="0"/>
+                <a:cs typeface="Arial" panose="020B0604020202020204" pitchFamily="34" charset="0"/>
+              </a:rPr>
+              <a:t> </a:t>
+            </a:r>
+            <a:r>
+              <a:rPr lang="en-US" b="1" dirty="0" err="1">
+                <a:solidFill>
+                  <a:srgbClr val="569CD6"/>
+                </a:solidFill>
+                <a:effectLst/>
+                <a:latin typeface="Arial" panose="020B0604020202020204" pitchFamily="34" charset="0"/>
+                <a:cs typeface="Arial" panose="020B0604020202020204" pitchFamily="34" charset="0"/>
+              </a:rPr>
+              <a:t>this</a:t>
+            </a:r>
+            <a:r>
+              <a:rPr lang="en-US" b="1" dirty="0" err="1">
+                <a:solidFill>
+                  <a:srgbClr val="CCCCCC"/>
+                </a:solidFill>
+                <a:effectLst/>
+                <a:latin typeface="Arial" panose="020B0604020202020204" pitchFamily="34" charset="0"/>
+                <a:cs typeface="Arial" panose="020B0604020202020204" pitchFamily="34" charset="0"/>
+              </a:rPr>
+              <a:t>.</a:t>
+            </a:r>
+            <a:r>
+              <a:rPr lang="en-US" b="1" dirty="0" err="1">
+                <a:solidFill>
+                  <a:srgbClr val="DCDCAA"/>
+                </a:solidFill>
+                <a:effectLst/>
+                <a:latin typeface="Arial" panose="020B0604020202020204" pitchFamily="34" charset="0"/>
+                <a:cs typeface="Arial" panose="020B0604020202020204" pitchFamily="34" charset="0"/>
+              </a:rPr>
+              <a:t>searchSharepoint</a:t>
+            </a:r>
+            <a:r>
+              <a:rPr lang="en-US" b="1" dirty="0">
+                <a:solidFill>
+                  <a:srgbClr val="CCCCCC"/>
+                </a:solidFill>
+                <a:effectLst/>
+                <a:latin typeface="Arial" panose="020B0604020202020204" pitchFamily="34" charset="0"/>
+                <a:cs typeface="Arial" panose="020B0604020202020204" pitchFamily="34" charset="0"/>
+              </a:rPr>
+              <a:t>,</a:t>
+            </a:r>
+          </a:p>
+          <a:p>
+            <a:pPr marL="0" indent="0">
+              <a:buNone/>
+            </a:pPr>
+            <a:r>
+              <a:rPr lang="en-US" b="1" dirty="0">
+                <a:solidFill>
+                  <a:srgbClr val="CCCCCC"/>
+                </a:solidFill>
+                <a:effectLst/>
+                <a:latin typeface="Arial" panose="020B0604020202020204" pitchFamily="34" charset="0"/>
+                <a:cs typeface="Arial" panose="020B0604020202020204" pitchFamily="34" charset="0"/>
+              </a:rPr>
+              <a:t>  };</a:t>
+            </a:r>
+          </a:p>
+          <a:p>
+            <a:pPr marL="0" indent="0">
+              <a:buNone/>
+            </a:pPr>
+            <a:endParaRPr lang="en-US" dirty="0"/>
+          </a:p>
+          <a:p>
+            <a:pPr marL="914400" lvl="1" indent="-457200">
+              <a:buFont typeface="+mj-lt"/>
+              <a:buAutoNum type="arabicPeriod"/>
+            </a:pPr>
+            <a:endParaRPr lang="en-US" dirty="0"/>
+          </a:p>
+          <a:p>
+            <a:endParaRPr lang="en-US" dirty="0"/>
+          </a:p>
+        </p:txBody>
+      </p:sp>
     </p:spTree>
     <p:extLst>
       <p:ext uri="{BB962C8B-B14F-4D97-AF65-F5344CB8AC3E}">
-        <p14:creationId xmlns:p14="http://schemas.microsoft.com/office/powerpoint/2010/main" val="787447704"/>
+        <p14:creationId xmlns:p14="http://schemas.microsoft.com/office/powerpoint/2010/main" val="1810371528"/>
       </p:ext>
     </p:extLst>
   </p:cSld>
@@ -19965,24 +20116,26 @@
                 <a:ea typeface="+mj-ea"/>
                 <a:cs typeface="+mj-cs"/>
               </a:rPr>
-              <a:t>Upload and Summarize PDF content</a:t>
+              <a:t>Integrations</a:t>
             </a:r>
           </a:p>
         </p:txBody>
       </p:sp>
       <p:pic>
         <p:nvPicPr>
-          <p:cNvPr id="6" name="Picture 5">
-            <a:extLst>
-              <a:ext uri="{FF2B5EF4-FFF2-40B4-BE49-F238E27FC236}">
-                <a16:creationId xmlns:a16="http://schemas.microsoft.com/office/drawing/2014/main" id="{13A3744A-9F9C-FBF8-BC2E-266B8A5B5C82}"/>
+          <p:cNvPr id="27" name="Content Placeholder 26">
+            <a:extLst>
+              <a:ext uri="{FF2B5EF4-FFF2-40B4-BE49-F238E27FC236}">
+                <a16:creationId xmlns:a16="http://schemas.microsoft.com/office/drawing/2014/main" id="{C589F45A-47BA-AD3F-B6B9-4C25D5583B7B}"/>
               </a:ext>
             </a:extLst>
           </p:cNvPr>
           <p:cNvPicPr>
-            <a:picLocks noChangeAspect="1"/>
+            <a:picLocks noGrp="1" noChangeAspect="1"/>
           </p:cNvPicPr>
-          <p:nvPr/>
+          <p:nvPr>
+            <p:ph idx="1"/>
+          </p:nvPr>
         </p:nvPicPr>
         <p:blipFill>
           <a:blip r:embed="rId2"/>
@@ -19992,8 +20145,8 @@
         </p:blipFill>
         <p:spPr>
           <a:xfrm>
-            <a:off x="4311775" y="1557338"/>
-            <a:ext cx="7741186" cy="3776662"/>
+            <a:off x="4777316" y="1105446"/>
+            <a:ext cx="6780700" cy="4644778"/>
           </a:xfrm>
           <a:prstGeom prst="rect">
             <a:avLst/>
@@ -20003,7 +20156,7 @@
     </p:spTree>
     <p:extLst>
       <p:ext uri="{BB962C8B-B14F-4D97-AF65-F5344CB8AC3E}">
-        <p14:creationId xmlns:p14="http://schemas.microsoft.com/office/powerpoint/2010/main" val="3216709208"/>
+        <p14:creationId xmlns:p14="http://schemas.microsoft.com/office/powerpoint/2010/main" val="787447704"/>
       </p:ext>
     </p:extLst>
   </p:cSld>
@@ -21743,6 +21896,40 @@
 </file>
 
 <file path=customXml/item1.xml><?xml version="1.0" encoding="utf-8"?>
+<p:properties xmlns:p="http://schemas.microsoft.com/office/2006/metadata/properties" xmlns:xsi="http://www.w3.org/2001/XMLSchema-instance" xmlns:pc="http://schemas.microsoft.com/office/infopath/2007/PartnerControls">
+  <documentManagement>
+    <SharedWithUsers xmlns="c798f8e1-d94f-43b6-bccc-367c41141139">
+      <UserInfo>
+        <DisplayName>Mikko Niemi</DisplayName>
+        <AccountId>737</AccountId>
+        <AccountType/>
+      </UserInfo>
+      <UserInfo>
+        <DisplayName>Paul Borisov</DisplayName>
+        <AccountId>877</AccountId>
+        <AccountType/>
+      </UserInfo>
+    </SharedWithUsers>
+    <Active xmlns="392cedaa-eab3-47fe-9a6e-9ea878a2bb54">true</Active>
+    <lcf76f155ced4ddcb4097134ff3c332f xmlns="392cedaa-eab3-47fe-9a6e-9ea878a2bb54">
+      <Terms xmlns="http://schemas.microsoft.com/office/infopath/2007/PartnerControls"/>
+    </lcf76f155ced4ddcb4097134ff3c332f>
+    <TaxCatchAll xmlns="c798f8e1-d94f-43b6-bccc-367c41141139" xsi:nil="true"/>
+    <_Flow_SignoffStatus xmlns="392cedaa-eab3-47fe-9a6e-9ea878a2bb54" xsi:nil="true"/>
+  </documentManagement>
+</p:properties>
+</file>
+
+<file path=customXml/item2.xml><?xml version="1.0" encoding="utf-8"?>
+<?mso-contentType ?>
+<FormTemplates xmlns="http://schemas.microsoft.com/sharepoint/v3/contenttype/forms">
+  <Display>DocumentLibraryForm</Display>
+  <Edit>DocumentLibraryForm</Edit>
+  <New>DocumentLibraryForm</New>
+</FormTemplates>
+</file>
+
+<file path=customXml/item3.xml><?xml version="1.0" encoding="utf-8"?>
 <ct:contentTypeSchema xmlns:ct="http://schemas.microsoft.com/office/2006/metadata/contentType" xmlns:ma="http://schemas.microsoft.com/office/2006/metadata/properties/metaAttributes" ct:_="" ma:_="" ma:contentTypeName="Document" ma:contentTypeID="0x0101008D2B64339E820D49817C0EC2C570556A" ma:contentTypeVersion="20" ma:contentTypeDescription="Create a new document." ma:contentTypeScope="" ma:versionID="a73d3dbd2a54abdd6f0b69909c857179">
   <xsd:schema xmlns:xsd="http://www.w3.org/2001/XMLSchema" xmlns:xs="http://www.w3.org/2001/XMLSchema" xmlns:p="http://schemas.microsoft.com/office/2006/metadata/properties" xmlns:ns2="392cedaa-eab3-47fe-9a6e-9ea878a2bb54" xmlns:ns3="c798f8e1-d94f-43b6-bccc-367c41141139" targetNamespace="http://schemas.microsoft.com/office/2006/metadata/properties" ma:root="true" ma:fieldsID="9b05d43af1f1fef90c53f865b6e9612b" ns2:_="" ns3:_="">
     <xsd:import namespace="392cedaa-eab3-47fe-9a6e-9ea878a2bb54"/>
@@ -22003,41 +22190,32 @@
 </ct:contentTypeSchema>
 </file>
 
-<file path=customXml/item2.xml><?xml version="1.0" encoding="utf-8"?>
-<?mso-contentType ?>
-<FormTemplates xmlns="http://schemas.microsoft.com/sharepoint/v3/contenttype/forms">
-  <Display>DocumentLibraryForm</Display>
-  <Edit>DocumentLibraryForm</Edit>
-  <New>DocumentLibraryForm</New>
-</FormTemplates>
+<file path=customXml/itemProps1.xml><?xml version="1.0" encoding="utf-8"?>
+<ds:datastoreItem xmlns:ds="http://schemas.openxmlformats.org/officeDocument/2006/customXml" ds:itemID="{F046CC52-5A97-4F3F-A94E-EB63C63EC836}">
+  <ds:schemaRefs>
+    <ds:schemaRef ds:uri="http://purl.org/dc/dcmitype/"/>
+    <ds:schemaRef ds:uri="392cedaa-eab3-47fe-9a6e-9ea878a2bb54"/>
+    <ds:schemaRef ds:uri="http://purl.org/dc/elements/1.1/"/>
+    <ds:schemaRef ds:uri="c798f8e1-d94f-43b6-bccc-367c41141139"/>
+    <ds:schemaRef ds:uri="http://www.w3.org/XML/1998/namespace"/>
+    <ds:schemaRef ds:uri="http://schemas.microsoft.com/office/2006/metadata/properties"/>
+    <ds:schemaRef ds:uri="http://schemas.openxmlformats.org/package/2006/metadata/core-properties"/>
+    <ds:schemaRef ds:uri="http://purl.org/dc/terms/"/>
+    <ds:schemaRef ds:uri="http://schemas.microsoft.com/office/2006/documentManagement/types"/>
+    <ds:schemaRef ds:uri="http://schemas.microsoft.com/office/infopath/2007/PartnerControls"/>
+  </ds:schemaRefs>
+</ds:datastoreItem>
 </file>
 
-<file path=customXml/item3.xml><?xml version="1.0" encoding="utf-8"?>
-<p:properties xmlns:p="http://schemas.microsoft.com/office/2006/metadata/properties" xmlns:xsi="http://www.w3.org/2001/XMLSchema-instance" xmlns:pc="http://schemas.microsoft.com/office/infopath/2007/PartnerControls">
-  <documentManagement>
-    <SharedWithUsers xmlns="c798f8e1-d94f-43b6-bccc-367c41141139">
-      <UserInfo>
-        <DisplayName>Mikko Niemi</DisplayName>
-        <AccountId>737</AccountId>
-        <AccountType/>
-      </UserInfo>
-      <UserInfo>
-        <DisplayName>Paul Borisov</DisplayName>
-        <AccountId>877</AccountId>
-        <AccountType/>
-      </UserInfo>
-    </SharedWithUsers>
-    <Active xmlns="392cedaa-eab3-47fe-9a6e-9ea878a2bb54">true</Active>
-    <lcf76f155ced4ddcb4097134ff3c332f xmlns="392cedaa-eab3-47fe-9a6e-9ea878a2bb54">
-      <Terms xmlns="http://schemas.microsoft.com/office/infopath/2007/PartnerControls"/>
-    </lcf76f155ced4ddcb4097134ff3c332f>
-    <TaxCatchAll xmlns="c798f8e1-d94f-43b6-bccc-367c41141139" xsi:nil="true"/>
-    <_Flow_SignoffStatus xmlns="392cedaa-eab3-47fe-9a6e-9ea878a2bb54" xsi:nil="true"/>
-  </documentManagement>
-</p:properties>
+<file path=customXml/itemProps2.xml><?xml version="1.0" encoding="utf-8"?>
+<ds:datastoreItem xmlns:ds="http://schemas.openxmlformats.org/officeDocument/2006/customXml" ds:itemID="{57BC327B-C3C1-4E06-92DC-7EC1EA012C4A}">
+  <ds:schemaRefs>
+    <ds:schemaRef ds:uri="http://schemas.microsoft.com/sharepoint/v3/contenttype/forms"/>
+  </ds:schemaRefs>
+</ds:datastoreItem>
 </file>
 
-<file path=customXml/itemProps1.xml><?xml version="1.0" encoding="utf-8"?>
+<file path=customXml/itemProps3.xml><?xml version="1.0" encoding="utf-8"?>
 <ds:datastoreItem xmlns:ds="http://schemas.openxmlformats.org/officeDocument/2006/customXml" ds:itemID="{B8C4BC3E-5712-4D8B-9BE3-2381F7BB3389}">
   <ds:schemaRefs>
     <ds:schemaRef ds:uri="http://schemas.microsoft.com/office/2006/metadata/contentType"/>
@@ -22056,31 +22234,6 @@
 </ds:datastoreItem>
 </file>
 
-<file path=customXml/itemProps2.xml><?xml version="1.0" encoding="utf-8"?>
-<ds:datastoreItem xmlns:ds="http://schemas.openxmlformats.org/officeDocument/2006/customXml" ds:itemID="{57BC327B-C3C1-4E06-92DC-7EC1EA012C4A}">
-  <ds:schemaRefs>
-    <ds:schemaRef ds:uri="http://schemas.microsoft.com/sharepoint/v3/contenttype/forms"/>
-  </ds:schemaRefs>
-</ds:datastoreItem>
-</file>
-
-<file path=customXml/itemProps3.xml><?xml version="1.0" encoding="utf-8"?>
-<ds:datastoreItem xmlns:ds="http://schemas.openxmlformats.org/officeDocument/2006/customXml" ds:itemID="{F046CC52-5A97-4F3F-A94E-EB63C63EC836}">
-  <ds:schemaRefs>
-    <ds:schemaRef ds:uri="http://purl.org/dc/dcmitype/"/>
-    <ds:schemaRef ds:uri="392cedaa-eab3-47fe-9a6e-9ea878a2bb54"/>
-    <ds:schemaRef ds:uri="http://purl.org/dc/elements/1.1/"/>
-    <ds:schemaRef ds:uri="c798f8e1-d94f-43b6-bccc-367c41141139"/>
-    <ds:schemaRef ds:uri="http://www.w3.org/XML/1998/namespace"/>
-    <ds:schemaRef ds:uri="http://schemas.microsoft.com/office/2006/metadata/properties"/>
-    <ds:schemaRef ds:uri="http://schemas.openxmlformats.org/package/2006/metadata/core-properties"/>
-    <ds:schemaRef ds:uri="http://purl.org/dc/terms/"/>
-    <ds:schemaRef ds:uri="http://schemas.microsoft.com/office/2006/documentManagement/types"/>
-    <ds:schemaRef ds:uri="http://schemas.microsoft.com/office/infopath/2007/PartnerControls"/>
-  </ds:schemaRefs>
-</ds:datastoreItem>
-</file>
-
 <file path=docMetadata/LabelInfo.xml><?xml version="1.0" encoding="utf-8"?>
 <clbl:labelList xmlns:clbl="http://schemas.microsoft.com/office/2020/mipLabelMetadata">
   <clbl:label id="{70d22a8d-923a-445e-82d4-32329da21746}" enabled="0" method="" siteId="{70d22a8d-923a-445e-82d4-32329da21746}" removed="1"/>

</xml_diff>

<commit_message>
Version 1.3.4, added support for gpt-4.1, gpt-4.1-mini, gpt-4.1-nano, o4-mini
</commit_message>
<xml_diff>
--- a/docs/azure-openai-chat-web-part-presentation.pptx
+++ b/docs/azure-openai-chat-web-part-presentation.pptx
@@ -223,7 +223,7 @@
           <a:p>
             <a:fld id="{36A20F55-E09E-7F42-B5C2-206BEAFB62A2}" type="datetimeFigureOut">
               <a:rPr lang="sv-SE" smtClean="0"/>
-              <a:t>2023-12-23</a:t>
+              <a:t>2025-04-18</a:t>
             </a:fld>
             <a:endParaRPr lang="sv-SE"/>
           </a:p>
@@ -909,7 +909,7 @@
             <a:fld id="{C6F47C66-D121-9A42-BA24-809897433D99}" type="datetimeFigureOut">
               <a:rPr lang="sv-SE" smtClean="0"/>
               <a:pPr/>
-              <a:t>2023-12-23</a:t>
+              <a:t>2025-04-18</a:t>
             </a:fld>
             <a:endParaRPr lang="sv-SE" dirty="0"/>
           </a:p>
@@ -4299,7 +4299,7 @@
             <a:fld id="{C6F47C66-D121-9A42-BA24-809897433D99}" type="datetimeFigureOut">
               <a:rPr lang="sv-SE" smtClean="0"/>
               <a:pPr/>
-              <a:t>2023-12-23</a:t>
+              <a:t>2025-04-18</a:t>
             </a:fld>
             <a:endParaRPr lang="sv-SE" dirty="0"/>
           </a:p>
@@ -13186,7 +13186,7 @@
           <a:p>
             <a:fld id="{787A3980-9F17-4DF1-B0CE-86F31B480A53}" type="datetimeFigureOut">
               <a:rPr lang="en-US" smtClean="0"/>
-              <a:t>12/23/2023</a:t>
+              <a:t>4/18/2025</a:t>
             </a:fld>
             <a:endParaRPr lang="en-US"/>
           </a:p>
@@ -16852,13 +16852,8 @@
             </a:br>
             <a:r>
               <a:rPr lang="en-US" dirty="0"/>
-              <a:t>for </a:t>
-            </a:r>
-            <a:r>
-              <a:rPr lang="en-US"/>
-              <a:t>SharePoint Online</a:t>
-            </a:r>
-            <a:endParaRPr lang="en-US" dirty="0"/>
+              <a:t>for SharePoint Online</a:t>
+            </a:r>
           </a:p>
         </p:txBody>
       </p:sp>
@@ -16889,9 +16884,25 @@
           <a:lstStyle/>
           <a:p>
             <a:r>
-              <a:rPr lang="en-US" dirty="0"/>
-              <a:t>Paul Borisov, Cloud Architect</a:t>
-            </a:r>
+              <a:rPr lang="en-US" dirty="0">
+                <a:solidFill>
+                  <a:schemeClr val="tx1"/>
+                </a:solidFill>
+                <a:hlinkClick r:id="rId2">
+                  <a:extLst>
+                    <a:ext uri="{A12FA001-AC4F-418D-AE19-62706E023703}">
+                      <ahyp:hlinkClr xmlns:ahyp="http://schemas.microsoft.com/office/drawing/2018/hyperlinkcolor" val="tx"/>
+                    </a:ext>
+                  </a:extLst>
+                </a:hlinkClick>
+              </a:rPr>
+              <a:t>Paul Borisov</a:t>
+            </a:r>
+            <a:endParaRPr lang="en-US" dirty="0">
+              <a:solidFill>
+                <a:schemeClr val="tx1"/>
+              </a:solidFill>
+            </a:endParaRPr>
           </a:p>
         </p:txBody>
       </p:sp>
@@ -16955,7 +16966,7 @@
                 <a:ea typeface="+mn-ea"/>
                 <a:cs typeface="+mn-cs"/>
               </a:rPr>
-              <a:t>December 2023</a:t>
+              <a:t>April 2025</a:t>
             </a:r>
           </a:p>
         </p:txBody>
@@ -17926,10 +17937,10 @@
       </p:pic>
       <p:pic>
         <p:nvPicPr>
-          <p:cNvPr id="4" name="Picture 3">
-            <a:extLst>
-              <a:ext uri="{FF2B5EF4-FFF2-40B4-BE49-F238E27FC236}">
-                <a16:creationId xmlns:a16="http://schemas.microsoft.com/office/drawing/2014/main" id="{002F5C68-4223-2106-1D8E-28AC1425264E}"/>
+          <p:cNvPr id="5" name="Picture 4">
+            <a:extLst>
+              <a:ext uri="{FF2B5EF4-FFF2-40B4-BE49-F238E27FC236}">
+                <a16:creationId xmlns:a16="http://schemas.microsoft.com/office/drawing/2014/main" id="{3A119C81-00A6-B856-FF85-165D56058D56}"/>
               </a:ext>
             </a:extLst>
           </p:cNvPr>
@@ -17946,8 +17957,8 @@
         </p:blipFill>
         <p:spPr>
           <a:xfrm>
-            <a:off x="9690597" y="824137"/>
-            <a:ext cx="2021502" cy="5747657"/>
+            <a:off x="9558196" y="539310"/>
+            <a:ext cx="2029108" cy="6106377"/>
           </a:xfrm>
           <a:prstGeom prst="rect">
             <a:avLst/>
@@ -18024,7 +18035,7 @@
           <p:cNvPr id="5" name="Picture 4">
             <a:extLst>
               <a:ext uri="{FF2B5EF4-FFF2-40B4-BE49-F238E27FC236}">
-                <a16:creationId xmlns:a16="http://schemas.microsoft.com/office/drawing/2014/main" id="{E6B26F55-27D3-CC56-D259-B29EBBC498A4}"/>
+                <a16:creationId xmlns:a16="http://schemas.microsoft.com/office/drawing/2014/main" id="{F41AE9A3-3A50-0865-432C-E66ADCDB5A8B}"/>
               </a:ext>
             </a:extLst>
           </p:cNvPr>
@@ -18041,8 +18052,8 @@
         </p:blipFill>
         <p:spPr>
           <a:xfrm>
-            <a:off x="838199" y="642548"/>
-            <a:ext cx="10868705" cy="5981367"/>
+            <a:off x="1032756" y="652075"/>
+            <a:ext cx="10620056" cy="5824546"/>
           </a:xfrm>
           <a:prstGeom prst="rect">
             <a:avLst/>
@@ -18408,10 +18419,10 @@
       </p:sp>
       <p:pic>
         <p:nvPicPr>
-          <p:cNvPr id="4" name="Picture 3">
-            <a:extLst>
-              <a:ext uri="{FF2B5EF4-FFF2-40B4-BE49-F238E27FC236}">
-                <a16:creationId xmlns:a16="http://schemas.microsoft.com/office/drawing/2014/main" id="{B91501B0-EB55-FE6F-AC2B-D763F70A8014}"/>
+          <p:cNvPr id="5" name="Picture 4">
+            <a:extLst>
+              <a:ext uri="{FF2B5EF4-FFF2-40B4-BE49-F238E27FC236}">
+                <a16:creationId xmlns:a16="http://schemas.microsoft.com/office/drawing/2014/main" id="{A070154A-7B13-05FD-BEA4-051A0D7FA2E5}"/>
               </a:ext>
             </a:extLst>
           </p:cNvPr>
@@ -18428,8 +18439,8 @@
         </p:blipFill>
         <p:spPr>
           <a:xfrm>
-            <a:off x="756555" y="881042"/>
-            <a:ext cx="10471026" cy="5853133"/>
+            <a:off x="821871" y="814811"/>
+            <a:ext cx="10446203" cy="5840377"/>
           </a:xfrm>
           <a:prstGeom prst="rect">
             <a:avLst/>
@@ -18662,7 +18673,7 @@
           <a:p>
             <a:r>
               <a:rPr lang="en-US" dirty="0"/>
-              <a:t>Support for the latest text language models provided by Microsoft and Native OpenAI: GPT-4 32k, GPT 3.5 16k, GPT-4 Vision, GPT-4 Turbo (1106, 128k)</a:t>
+              <a:t>Support for the latest text language models provided by Microsoft and Native OpenAI: GPT 4.1, GPT 4.1 Mini, GPT 4.1 Nano, O1, O1 Mini, O3 Mini, O4 Mini, GPT-4o, GPT 4o Mini, GPT-4 Turbo and older models.</a:t>
             </a:r>
           </a:p>
           <a:p>
@@ -21896,31 +21907,6 @@
 </file>
 
 <file path=customXml/item1.xml><?xml version="1.0" encoding="utf-8"?>
-<p:properties xmlns:p="http://schemas.microsoft.com/office/2006/metadata/properties" xmlns:xsi="http://www.w3.org/2001/XMLSchema-instance" xmlns:pc="http://schemas.microsoft.com/office/infopath/2007/PartnerControls">
-  <documentManagement>
-    <SharedWithUsers xmlns="c798f8e1-d94f-43b6-bccc-367c41141139">
-      <UserInfo>
-        <DisplayName>Mikko Niemi</DisplayName>
-        <AccountId>737</AccountId>
-        <AccountType/>
-      </UserInfo>
-      <UserInfo>
-        <DisplayName>Paul Borisov</DisplayName>
-        <AccountId>877</AccountId>
-        <AccountType/>
-      </UserInfo>
-    </SharedWithUsers>
-    <Active xmlns="392cedaa-eab3-47fe-9a6e-9ea878a2bb54">true</Active>
-    <lcf76f155ced4ddcb4097134ff3c332f xmlns="392cedaa-eab3-47fe-9a6e-9ea878a2bb54">
-      <Terms xmlns="http://schemas.microsoft.com/office/infopath/2007/PartnerControls"/>
-    </lcf76f155ced4ddcb4097134ff3c332f>
-    <TaxCatchAll xmlns="c798f8e1-d94f-43b6-bccc-367c41141139" xsi:nil="true"/>
-    <_Flow_SignoffStatus xmlns="392cedaa-eab3-47fe-9a6e-9ea878a2bb54" xsi:nil="true"/>
-  </documentManagement>
-</p:properties>
-</file>
-
-<file path=customXml/item2.xml><?xml version="1.0" encoding="utf-8"?>
 <?mso-contentType ?>
 <FormTemplates xmlns="http://schemas.microsoft.com/sharepoint/v3/contenttype/forms">
   <Display>DocumentLibraryForm</Display>
@@ -21929,7 +21915,7 @@
 </FormTemplates>
 </file>
 
-<file path=customXml/item3.xml><?xml version="1.0" encoding="utf-8"?>
+<file path=customXml/item2.xml><?xml version="1.0" encoding="utf-8"?>
 <ct:contentTypeSchema xmlns:ct="http://schemas.microsoft.com/office/2006/metadata/contentType" xmlns:ma="http://schemas.microsoft.com/office/2006/metadata/properties/metaAttributes" ct:_="" ma:_="" ma:contentTypeName="Document" ma:contentTypeID="0x0101008D2B64339E820D49817C0EC2C570556A" ma:contentTypeVersion="20" ma:contentTypeDescription="Create a new document." ma:contentTypeScope="" ma:versionID="a73d3dbd2a54abdd6f0b69909c857179">
   <xsd:schema xmlns:xsd="http://www.w3.org/2001/XMLSchema" xmlns:xs="http://www.w3.org/2001/XMLSchema" xmlns:p="http://schemas.microsoft.com/office/2006/metadata/properties" xmlns:ns2="392cedaa-eab3-47fe-9a6e-9ea878a2bb54" xmlns:ns3="c798f8e1-d94f-43b6-bccc-367c41141139" targetNamespace="http://schemas.microsoft.com/office/2006/metadata/properties" ma:root="true" ma:fieldsID="9b05d43af1f1fef90c53f865b6e9612b" ns2:_="" ns3:_="">
     <xsd:import namespace="392cedaa-eab3-47fe-9a6e-9ea878a2bb54"/>
@@ -22190,24 +22176,32 @@
 </ct:contentTypeSchema>
 </file>
 
-<file path=customXml/itemProps1.xml><?xml version="1.0" encoding="utf-8"?>
-<ds:datastoreItem xmlns:ds="http://schemas.openxmlformats.org/officeDocument/2006/customXml" ds:itemID="{F046CC52-5A97-4F3F-A94E-EB63C63EC836}">
-  <ds:schemaRefs>
-    <ds:schemaRef ds:uri="http://purl.org/dc/dcmitype/"/>
-    <ds:schemaRef ds:uri="392cedaa-eab3-47fe-9a6e-9ea878a2bb54"/>
-    <ds:schemaRef ds:uri="http://purl.org/dc/elements/1.1/"/>
-    <ds:schemaRef ds:uri="c798f8e1-d94f-43b6-bccc-367c41141139"/>
-    <ds:schemaRef ds:uri="http://www.w3.org/XML/1998/namespace"/>
-    <ds:schemaRef ds:uri="http://schemas.microsoft.com/office/2006/metadata/properties"/>
-    <ds:schemaRef ds:uri="http://schemas.openxmlformats.org/package/2006/metadata/core-properties"/>
-    <ds:schemaRef ds:uri="http://purl.org/dc/terms/"/>
-    <ds:schemaRef ds:uri="http://schemas.microsoft.com/office/2006/documentManagement/types"/>
-    <ds:schemaRef ds:uri="http://schemas.microsoft.com/office/infopath/2007/PartnerControls"/>
-  </ds:schemaRefs>
-</ds:datastoreItem>
+<file path=customXml/item3.xml><?xml version="1.0" encoding="utf-8"?>
+<p:properties xmlns:p="http://schemas.microsoft.com/office/2006/metadata/properties" xmlns:xsi="http://www.w3.org/2001/XMLSchema-instance" xmlns:pc="http://schemas.microsoft.com/office/infopath/2007/PartnerControls">
+  <documentManagement>
+    <SharedWithUsers xmlns="c798f8e1-d94f-43b6-bccc-367c41141139">
+      <UserInfo>
+        <DisplayName>Mikko Niemi</DisplayName>
+        <AccountId>737</AccountId>
+        <AccountType/>
+      </UserInfo>
+      <UserInfo>
+        <DisplayName>Paul Borisov</DisplayName>
+        <AccountId>877</AccountId>
+        <AccountType/>
+      </UserInfo>
+    </SharedWithUsers>
+    <Active xmlns="392cedaa-eab3-47fe-9a6e-9ea878a2bb54">true</Active>
+    <lcf76f155ced4ddcb4097134ff3c332f xmlns="392cedaa-eab3-47fe-9a6e-9ea878a2bb54">
+      <Terms xmlns="http://schemas.microsoft.com/office/infopath/2007/PartnerControls"/>
+    </lcf76f155ced4ddcb4097134ff3c332f>
+    <TaxCatchAll xmlns="c798f8e1-d94f-43b6-bccc-367c41141139" xsi:nil="true"/>
+    <_Flow_SignoffStatus xmlns="392cedaa-eab3-47fe-9a6e-9ea878a2bb54" xsi:nil="true"/>
+  </documentManagement>
+</p:properties>
 </file>
 
-<file path=customXml/itemProps2.xml><?xml version="1.0" encoding="utf-8"?>
+<file path=customXml/itemProps1.xml><?xml version="1.0" encoding="utf-8"?>
 <ds:datastoreItem xmlns:ds="http://schemas.openxmlformats.org/officeDocument/2006/customXml" ds:itemID="{57BC327B-C3C1-4E06-92DC-7EC1EA012C4A}">
   <ds:schemaRefs>
     <ds:schemaRef ds:uri="http://schemas.microsoft.com/sharepoint/v3/contenttype/forms"/>
@@ -22215,7 +22209,7 @@
 </ds:datastoreItem>
 </file>
 
-<file path=customXml/itemProps3.xml><?xml version="1.0" encoding="utf-8"?>
+<file path=customXml/itemProps2.xml><?xml version="1.0" encoding="utf-8"?>
 <ds:datastoreItem xmlns:ds="http://schemas.openxmlformats.org/officeDocument/2006/customXml" ds:itemID="{B8C4BC3E-5712-4D8B-9BE3-2381F7BB3389}">
   <ds:schemaRefs>
     <ds:schemaRef ds:uri="http://schemas.microsoft.com/office/2006/metadata/contentType"/>
@@ -22234,6 +22228,23 @@
 </ds:datastoreItem>
 </file>
 
+<file path=customXml/itemProps3.xml><?xml version="1.0" encoding="utf-8"?>
+<ds:datastoreItem xmlns:ds="http://schemas.openxmlformats.org/officeDocument/2006/customXml" ds:itemID="{F046CC52-5A97-4F3F-A94E-EB63C63EC836}">
+  <ds:schemaRefs>
+    <ds:schemaRef ds:uri="http://purl.org/dc/dcmitype/"/>
+    <ds:schemaRef ds:uri="392cedaa-eab3-47fe-9a6e-9ea878a2bb54"/>
+    <ds:schemaRef ds:uri="http://purl.org/dc/elements/1.1/"/>
+    <ds:schemaRef ds:uri="c798f8e1-d94f-43b6-bccc-367c41141139"/>
+    <ds:schemaRef ds:uri="http://www.w3.org/XML/1998/namespace"/>
+    <ds:schemaRef ds:uri="http://schemas.microsoft.com/office/2006/metadata/properties"/>
+    <ds:schemaRef ds:uri="http://schemas.openxmlformats.org/package/2006/metadata/core-properties"/>
+    <ds:schemaRef ds:uri="http://purl.org/dc/terms/"/>
+    <ds:schemaRef ds:uri="http://schemas.microsoft.com/office/2006/documentManagement/types"/>
+    <ds:schemaRef ds:uri="http://schemas.microsoft.com/office/infopath/2007/PartnerControls"/>
+  </ds:schemaRefs>
+</ds:datastoreItem>
+</file>
+
 <file path=docMetadata/LabelInfo.xml><?xml version="1.0" encoding="utf-8"?>
 <clbl:labelList xmlns:clbl="http://schemas.microsoft.com/office/2020/mipLabelMetadata">
   <clbl:label id="{70d22a8d-923a-445e-82d4-32329da21746}" enabled="0" method="" siteId="{70d22a8d-923a-445e-82d4-32329da21746}" removed="1"/>

</xml_diff>